<commit_message>
Design up to the pyramid apex
Optimization of the focal length of the lens to have a F#=60, a beam footprint on the TT modulation mirror of approx 5mm and the TT mirror tilted at 20° to allow us to insert the ADC around the pupil plane
</commit_message>
<xml_diff>
--- a/20180518_AO_design_report/images/images_sketch.pptx
+++ b/20180518_AO_design_report/images/images_sketch.pptx
@@ -5,7 +5,7 @@
     <p:sldMasterId id="2147483648" r:id="rId1"/>
   </p:sldMasterIdLst>
   <p:notesMasterIdLst>
-    <p:notesMasterId r:id="rId8"/>
+    <p:notesMasterId r:id="rId10"/>
   </p:notesMasterIdLst>
   <p:sldIdLst>
     <p:sldId id="256" r:id="rId2"/>
@@ -14,6 +14,8 @@
     <p:sldId id="259" r:id="rId5"/>
     <p:sldId id="260" r:id="rId6"/>
     <p:sldId id="261" r:id="rId7"/>
+    <p:sldId id="262" r:id="rId8"/>
+    <p:sldId id="263" r:id="rId9"/>
   </p:sldIdLst>
   <p:sldSz cx="12192000" cy="6858000"/>
   <p:notesSz cx="6858000" cy="9144000"/>
@@ -202,7 +204,7 @@
           <a:p>
             <a:fld id="{8EDEE2E2-4BE4-41CA-94FC-BC9DC2A64380}" type="datetimeFigureOut">
               <a:rPr lang="en-GB" smtClean="0"/>
-              <a:t>24/05/2018</a:t>
+              <a:t>30/05/2018</a:t>
             </a:fld>
             <a:endParaRPr lang="en-GB"/>
           </a:p>
@@ -601,7 +603,7 @@
           <a:p>
             <a:fld id="{24AF4860-EF53-429F-9816-8C3FCB6EDEF9}" type="datetimeFigureOut">
               <a:rPr lang="en-GB" smtClean="0"/>
-              <a:t>24/05/2018</a:t>
+              <a:t>30/05/2018</a:t>
             </a:fld>
             <a:endParaRPr lang="en-GB"/>
           </a:p>
@@ -771,7 +773,7 @@
           <a:p>
             <a:fld id="{24AF4860-EF53-429F-9816-8C3FCB6EDEF9}" type="datetimeFigureOut">
               <a:rPr lang="en-GB" smtClean="0"/>
-              <a:t>24/05/2018</a:t>
+              <a:t>30/05/2018</a:t>
             </a:fld>
             <a:endParaRPr lang="en-GB"/>
           </a:p>
@@ -951,7 +953,7 @@
           <a:p>
             <a:fld id="{24AF4860-EF53-429F-9816-8C3FCB6EDEF9}" type="datetimeFigureOut">
               <a:rPr lang="en-GB" smtClean="0"/>
-              <a:t>24/05/2018</a:t>
+              <a:t>30/05/2018</a:t>
             </a:fld>
             <a:endParaRPr lang="en-GB"/>
           </a:p>
@@ -1121,7 +1123,7 @@
           <a:p>
             <a:fld id="{24AF4860-EF53-429F-9816-8C3FCB6EDEF9}" type="datetimeFigureOut">
               <a:rPr lang="en-GB" smtClean="0"/>
-              <a:t>24/05/2018</a:t>
+              <a:t>30/05/2018</a:t>
             </a:fld>
             <a:endParaRPr lang="en-GB"/>
           </a:p>
@@ -1367,7 +1369,7 @@
           <a:p>
             <a:fld id="{24AF4860-EF53-429F-9816-8C3FCB6EDEF9}" type="datetimeFigureOut">
               <a:rPr lang="en-GB" smtClean="0"/>
-              <a:t>24/05/2018</a:t>
+              <a:t>30/05/2018</a:t>
             </a:fld>
             <a:endParaRPr lang="en-GB"/>
           </a:p>
@@ -1599,7 +1601,7 @@
           <a:p>
             <a:fld id="{24AF4860-EF53-429F-9816-8C3FCB6EDEF9}" type="datetimeFigureOut">
               <a:rPr lang="en-GB" smtClean="0"/>
-              <a:t>24/05/2018</a:t>
+              <a:t>30/05/2018</a:t>
             </a:fld>
             <a:endParaRPr lang="en-GB"/>
           </a:p>
@@ -1966,7 +1968,7 @@
           <a:p>
             <a:fld id="{24AF4860-EF53-429F-9816-8C3FCB6EDEF9}" type="datetimeFigureOut">
               <a:rPr lang="en-GB" smtClean="0"/>
-              <a:t>24/05/2018</a:t>
+              <a:t>30/05/2018</a:t>
             </a:fld>
             <a:endParaRPr lang="en-GB"/>
           </a:p>
@@ -2084,7 +2086,7 @@
           <a:p>
             <a:fld id="{24AF4860-EF53-429F-9816-8C3FCB6EDEF9}" type="datetimeFigureOut">
               <a:rPr lang="en-GB" smtClean="0"/>
-              <a:t>24/05/2018</a:t>
+              <a:t>30/05/2018</a:t>
             </a:fld>
             <a:endParaRPr lang="en-GB"/>
           </a:p>
@@ -2179,7 +2181,7 @@
           <a:p>
             <a:fld id="{24AF4860-EF53-429F-9816-8C3FCB6EDEF9}" type="datetimeFigureOut">
               <a:rPr lang="en-GB" smtClean="0"/>
-              <a:t>24/05/2018</a:t>
+              <a:t>30/05/2018</a:t>
             </a:fld>
             <a:endParaRPr lang="en-GB"/>
           </a:p>
@@ -2456,7 +2458,7 @@
           <a:p>
             <a:fld id="{24AF4860-EF53-429F-9816-8C3FCB6EDEF9}" type="datetimeFigureOut">
               <a:rPr lang="en-GB" smtClean="0"/>
-              <a:t>24/05/2018</a:t>
+              <a:t>30/05/2018</a:t>
             </a:fld>
             <a:endParaRPr lang="en-GB"/>
           </a:p>
@@ -2709,7 +2711,7 @@
           <a:p>
             <a:fld id="{24AF4860-EF53-429F-9816-8C3FCB6EDEF9}" type="datetimeFigureOut">
               <a:rPr lang="en-GB" smtClean="0"/>
-              <a:t>24/05/2018</a:t>
+              <a:t>30/05/2018</a:t>
             </a:fld>
             <a:endParaRPr lang="en-GB"/>
           </a:p>
@@ -2922,7 +2924,7 @@
           <a:p>
             <a:fld id="{24AF4860-EF53-429F-9816-8C3FCB6EDEF9}" type="datetimeFigureOut">
               <a:rPr lang="en-GB" smtClean="0"/>
-              <a:t>24/05/2018</a:t>
+              <a:t>30/05/2018</a:t>
             </a:fld>
             <a:endParaRPr lang="en-GB"/>
           </a:p>
@@ -6357,8 +6359,8 @@
           </a:p>
         </p:txBody>
       </p:sp>
-      <mc:AlternateContent xmlns:mc="http://schemas.openxmlformats.org/markup-compatibility/2006">
-        <mc:Choice xmlns:a14="http://schemas.microsoft.com/office/drawing/2010/main" Requires="a14">
+      <mc:AlternateContent xmlns:mc="http://schemas.openxmlformats.org/markup-compatibility/2006" xmlns:a14="http://schemas.microsoft.com/office/drawing/2010/main">
+        <mc:Choice Requires="a14">
           <p:sp>
             <p:nvSpPr>
               <p:cNvPr id="10" name="ZoneTexte 9"/>
@@ -6403,7 +6405,7 @@
             </p:txBody>
           </p:sp>
         </mc:Choice>
-        <mc:Fallback>
+        <mc:Fallback xmlns="">
           <p:sp>
             <p:nvSpPr>
               <p:cNvPr id="10" name="ZoneTexte 9"/>
@@ -7185,6 +7187,533 @@
     <p:extLst>
       <p:ext uri="{BB962C8B-B14F-4D97-AF65-F5344CB8AC3E}">
         <p14:creationId xmlns:p14="http://schemas.microsoft.com/office/powerpoint/2010/main" val="679710243"/>
+      </p:ext>
+    </p:extLst>
+  </p:cSld>
+  <p:clrMapOvr>
+    <a:masterClrMapping/>
+  </p:clrMapOvr>
+</p:sld>
+</file>
+
+<file path=ppt/slides/slide7.xml><?xml version="1.0" encoding="utf-8"?>
+<p:sld xmlns:a="http://schemas.openxmlformats.org/drawingml/2006/main" xmlns:r="http://schemas.openxmlformats.org/officeDocument/2006/relationships" xmlns:p="http://schemas.openxmlformats.org/presentationml/2006/main">
+  <p:cSld>
+    <p:spTree>
+      <p:nvGrpSpPr>
+        <p:cNvPr id="1" name=""/>
+        <p:cNvGrpSpPr/>
+        <p:nvPr/>
+      </p:nvGrpSpPr>
+      <p:grpSpPr>
+        <a:xfrm>
+          <a:off x="0" y="0"/>
+          <a:ext cx="0" cy="0"/>
+          <a:chOff x="0" y="0"/>
+          <a:chExt cx="0" cy="0"/>
+        </a:xfrm>
+      </p:grpSpPr>
+      <p:pic>
+        <p:nvPicPr>
+          <p:cNvPr id="13" name="Image 12"/>
+          <p:cNvPicPr>
+            <a:picLocks noChangeAspect="1"/>
+          </p:cNvPicPr>
+          <p:nvPr/>
+        </p:nvPicPr>
+        <p:blipFill>
+          <a:blip r:embed="rId2"/>
+          <a:stretch>
+            <a:fillRect/>
+          </a:stretch>
+        </p:blipFill>
+        <p:spPr>
+          <a:xfrm>
+            <a:off x="-133350" y="-128588"/>
+            <a:ext cx="12458700" cy="7115175"/>
+          </a:xfrm>
+          <a:prstGeom prst="rect">
+            <a:avLst/>
+          </a:prstGeom>
+        </p:spPr>
+      </p:pic>
+      <p:sp>
+        <p:nvSpPr>
+          <p:cNvPr id="5" name="ZoneTexte 4"/>
+          <p:cNvSpPr txBox="1"/>
+          <p:nvPr/>
+        </p:nvSpPr>
+        <p:spPr>
+          <a:xfrm>
+            <a:off x="1462238" y="4577122"/>
+            <a:ext cx="766555" cy="553998"/>
+          </a:xfrm>
+          <a:prstGeom prst="rect">
+            <a:avLst/>
+          </a:prstGeom>
+          <a:noFill/>
+        </p:spPr>
+        <p:txBody>
+          <a:bodyPr wrap="none" rtlCol="0">
+            <a:spAutoFit/>
+          </a:bodyPr>
+          <a:lstStyle/>
+          <a:p>
+            <a:pPr algn="ctr"/>
+            <a:r>
+              <a:rPr lang="en-GB" sz="1000" b="1" dirty="0" smtClean="0"/>
+              <a:t>Telescope</a:t>
+            </a:r>
+          </a:p>
+          <a:p>
+            <a:pPr algn="ctr"/>
+            <a:r>
+              <a:rPr lang="en-GB" sz="1000" b="1" dirty="0"/>
+              <a:t>f</a:t>
+            </a:r>
+            <a:r>
+              <a:rPr lang="en-GB" sz="1000" b="1" dirty="0" smtClean="0"/>
+              <a:t>ocal plane</a:t>
+            </a:r>
+          </a:p>
+          <a:p>
+            <a:pPr algn="ctr"/>
+            <a:r>
+              <a:rPr lang="en-GB" sz="1000" b="1" dirty="0" smtClean="0"/>
+              <a:t>(FoV = 1’)</a:t>
+            </a:r>
+            <a:endParaRPr lang="en-GB" sz="1000" b="1" dirty="0"/>
+          </a:p>
+        </p:txBody>
+      </p:sp>
+      <p:sp>
+        <p:nvSpPr>
+          <p:cNvPr id="6" name="ZoneTexte 5"/>
+          <p:cNvSpPr txBox="1"/>
+          <p:nvPr/>
+        </p:nvSpPr>
+        <p:spPr>
+          <a:xfrm>
+            <a:off x="2726680" y="5091210"/>
+            <a:ext cx="881972" cy="553998"/>
+          </a:xfrm>
+          <a:prstGeom prst="rect">
+            <a:avLst/>
+          </a:prstGeom>
+          <a:noFill/>
+        </p:spPr>
+        <p:txBody>
+          <a:bodyPr wrap="none" rtlCol="0">
+            <a:spAutoFit/>
+          </a:bodyPr>
+          <a:lstStyle/>
+          <a:p>
+            <a:pPr algn="ctr"/>
+            <a:r>
+              <a:rPr lang="en-GB" sz="1000" b="1" dirty="0" smtClean="0"/>
+              <a:t>Intermediate</a:t>
+            </a:r>
+          </a:p>
+          <a:p>
+            <a:pPr algn="ctr"/>
+            <a:r>
+              <a:rPr lang="en-GB" sz="1000" b="1" dirty="0"/>
+              <a:t>f</a:t>
+            </a:r>
+            <a:r>
+              <a:rPr lang="en-GB" sz="1000" b="1" dirty="0" smtClean="0"/>
+              <a:t>ocal plane</a:t>
+            </a:r>
+          </a:p>
+          <a:p>
+            <a:pPr algn="ctr"/>
+            <a:r>
+              <a:rPr lang="en-GB" sz="1000" b="1" dirty="0" smtClean="0"/>
+              <a:t>(FoV = 1’)</a:t>
+            </a:r>
+            <a:endParaRPr lang="en-GB" sz="1000" b="1" dirty="0"/>
+          </a:p>
+        </p:txBody>
+      </p:sp>
+      <p:sp>
+        <p:nvSpPr>
+          <p:cNvPr id="7" name="Rectangle 6"/>
+          <p:cNvSpPr/>
+          <p:nvPr/>
+        </p:nvSpPr>
+        <p:spPr>
+          <a:xfrm>
+            <a:off x="1406315" y="4028167"/>
+            <a:ext cx="1001172" cy="996594"/>
+          </a:xfrm>
+          <a:prstGeom prst="rect">
+            <a:avLst/>
+          </a:prstGeom>
+          <a:solidFill>
+            <a:srgbClr val="5B9BD5">
+              <a:alpha val="21176"/>
+            </a:srgbClr>
+          </a:solidFill>
+          <a:ln>
+            <a:solidFill>
+              <a:schemeClr val="tx1"/>
+            </a:solidFill>
+          </a:ln>
+        </p:spPr>
+        <p:style>
+          <a:lnRef idx="2">
+            <a:schemeClr val="accent1">
+              <a:shade val="50000"/>
+            </a:schemeClr>
+          </a:lnRef>
+          <a:fillRef idx="1">
+            <a:schemeClr val="accent1"/>
+          </a:fillRef>
+          <a:effectRef idx="0">
+            <a:schemeClr val="accent1"/>
+          </a:effectRef>
+          <a:fontRef idx="minor">
+            <a:schemeClr val="lt1"/>
+          </a:fontRef>
+        </p:style>
+        <p:txBody>
+          <a:bodyPr rtlCol="0" anchor="ctr"/>
+          <a:lstStyle/>
+          <a:p>
+            <a:pPr algn="ctr"/>
+            <a:endParaRPr lang="en-GB" dirty="0"/>
+          </a:p>
+        </p:txBody>
+      </p:sp>
+      <p:sp>
+        <p:nvSpPr>
+          <p:cNvPr id="8" name="ZoneTexte 7"/>
+          <p:cNvSpPr txBox="1"/>
+          <p:nvPr/>
+        </p:nvSpPr>
+        <p:spPr>
+          <a:xfrm>
+            <a:off x="1406314" y="4045922"/>
+            <a:ext cx="457731" cy="246221"/>
+          </a:xfrm>
+          <a:prstGeom prst="rect">
+            <a:avLst/>
+          </a:prstGeom>
+          <a:noFill/>
+        </p:spPr>
+        <p:txBody>
+          <a:bodyPr wrap="square" rtlCol="0">
+            <a:spAutoFit/>
+          </a:bodyPr>
+          <a:lstStyle/>
+          <a:p>
+            <a:r>
+              <a:rPr lang="en-GB" sz="1000" b="1" dirty="0"/>
+              <a:t>FCL</a:t>
+            </a:r>
+          </a:p>
+        </p:txBody>
+      </p:sp>
+      <p:sp>
+        <p:nvSpPr>
+          <p:cNvPr id="9" name="ZoneTexte 8"/>
+          <p:cNvSpPr txBox="1"/>
+          <p:nvPr/>
+        </p:nvSpPr>
+        <p:spPr>
+          <a:xfrm>
+            <a:off x="1460385" y="3532758"/>
+            <a:ext cx="377026" cy="246221"/>
+          </a:xfrm>
+          <a:prstGeom prst="rect">
+            <a:avLst/>
+          </a:prstGeom>
+          <a:noFill/>
+        </p:spPr>
+        <p:txBody>
+          <a:bodyPr wrap="none" rtlCol="0">
+            <a:spAutoFit/>
+          </a:bodyPr>
+          <a:lstStyle/>
+          <a:p>
+            <a:r>
+              <a:rPr lang="en-GB" sz="1000" b="1" dirty="0" smtClean="0"/>
+              <a:t>DM</a:t>
+            </a:r>
+            <a:endParaRPr lang="en-GB" sz="1000" b="1" dirty="0"/>
+          </a:p>
+        </p:txBody>
+      </p:sp>
+      <p:sp>
+        <p:nvSpPr>
+          <p:cNvPr id="10" name="ZoneTexte 9"/>
+          <p:cNvSpPr txBox="1"/>
+          <p:nvPr/>
+        </p:nvSpPr>
+        <p:spPr>
+          <a:xfrm>
+            <a:off x="4296889" y="4454011"/>
+            <a:ext cx="482824" cy="246221"/>
+          </a:xfrm>
+          <a:prstGeom prst="rect">
+            <a:avLst/>
+          </a:prstGeom>
+          <a:noFill/>
+        </p:spPr>
+        <p:txBody>
+          <a:bodyPr wrap="none" rtlCol="0">
+            <a:spAutoFit/>
+          </a:bodyPr>
+          <a:lstStyle/>
+          <a:p>
+            <a:r>
+              <a:rPr lang="en-GB" sz="1000" b="1" dirty="0" smtClean="0"/>
+              <a:t>OAP0</a:t>
+            </a:r>
+            <a:endParaRPr lang="en-GB" sz="1000" b="1" dirty="0"/>
+          </a:p>
+        </p:txBody>
+      </p:sp>
+      <p:sp>
+        <p:nvSpPr>
+          <p:cNvPr id="11" name="ZoneTexte 10"/>
+          <p:cNvSpPr txBox="1"/>
+          <p:nvPr/>
+        </p:nvSpPr>
+        <p:spPr>
+          <a:xfrm>
+            <a:off x="2363097" y="2939686"/>
+            <a:ext cx="482824" cy="246221"/>
+          </a:xfrm>
+          <a:prstGeom prst="rect">
+            <a:avLst/>
+          </a:prstGeom>
+          <a:noFill/>
+        </p:spPr>
+        <p:txBody>
+          <a:bodyPr wrap="none" rtlCol="0">
+            <a:spAutoFit/>
+          </a:bodyPr>
+          <a:lstStyle/>
+          <a:p>
+            <a:r>
+              <a:rPr lang="en-GB" sz="1000" b="1" dirty="0" smtClean="0"/>
+              <a:t>OAP1</a:t>
+            </a:r>
+            <a:endParaRPr lang="en-GB" sz="1000" b="1" dirty="0"/>
+          </a:p>
+        </p:txBody>
+      </p:sp>
+      <p:sp>
+        <p:nvSpPr>
+          <p:cNvPr id="12" name="ZoneTexte 11"/>
+          <p:cNvSpPr txBox="1"/>
+          <p:nvPr/>
+        </p:nvSpPr>
+        <p:spPr>
+          <a:xfrm>
+            <a:off x="3677809" y="3620357"/>
+            <a:ext cx="619080" cy="400110"/>
+          </a:xfrm>
+          <a:prstGeom prst="rect">
+            <a:avLst/>
+          </a:prstGeom>
+          <a:noFill/>
+        </p:spPr>
+        <p:txBody>
+          <a:bodyPr wrap="none" rtlCol="0">
+            <a:spAutoFit/>
+          </a:bodyPr>
+          <a:lstStyle/>
+          <a:p>
+            <a:r>
+              <a:rPr lang="en-GB" sz="1000" b="1" dirty="0" smtClean="0"/>
+              <a:t>Folding </a:t>
+            </a:r>
+          </a:p>
+          <a:p>
+            <a:r>
+              <a:rPr lang="en-GB" sz="1000" b="1" dirty="0" smtClean="0"/>
+              <a:t>mirror 1</a:t>
+            </a:r>
+            <a:endParaRPr lang="en-GB" sz="1000" b="1" dirty="0"/>
+          </a:p>
+        </p:txBody>
+      </p:sp>
+      <p:sp>
+        <p:nvSpPr>
+          <p:cNvPr id="14" name="ZoneTexte 13"/>
+          <p:cNvSpPr txBox="1"/>
+          <p:nvPr/>
+        </p:nvSpPr>
+        <p:spPr>
+          <a:xfrm>
+            <a:off x="4296889" y="5817531"/>
+            <a:ext cx="883575" cy="246221"/>
+          </a:xfrm>
+          <a:prstGeom prst="rect">
+            <a:avLst/>
+          </a:prstGeom>
+          <a:noFill/>
+        </p:spPr>
+        <p:txBody>
+          <a:bodyPr wrap="none" rtlCol="0">
+            <a:spAutoFit/>
+          </a:bodyPr>
+          <a:lstStyle/>
+          <a:p>
+            <a:r>
+              <a:rPr lang="en-GB" sz="1000" b="1" dirty="0" smtClean="0"/>
+              <a:t>Paraxial lens</a:t>
+            </a:r>
+            <a:endParaRPr lang="en-GB" sz="1000" b="1" dirty="0"/>
+          </a:p>
+        </p:txBody>
+      </p:sp>
+      <p:sp>
+        <p:nvSpPr>
+          <p:cNvPr id="15" name="ZoneTexte 14"/>
+          <p:cNvSpPr txBox="1"/>
+          <p:nvPr/>
+        </p:nvSpPr>
+        <p:spPr>
+          <a:xfrm>
+            <a:off x="3428357" y="6457890"/>
+            <a:ext cx="962123" cy="400110"/>
+          </a:xfrm>
+          <a:prstGeom prst="rect">
+            <a:avLst/>
+          </a:prstGeom>
+          <a:noFill/>
+        </p:spPr>
+        <p:txBody>
+          <a:bodyPr wrap="none" rtlCol="0">
+            <a:spAutoFit/>
+          </a:bodyPr>
+          <a:lstStyle/>
+          <a:p>
+            <a:pPr algn="ctr"/>
+            <a:r>
+              <a:rPr lang="en-GB" sz="1000" b="1" dirty="0" smtClean="0"/>
+              <a:t>TT modulation</a:t>
+            </a:r>
+          </a:p>
+          <a:p>
+            <a:pPr algn="ctr"/>
+            <a:r>
+              <a:rPr lang="en-GB" sz="1000" b="1" dirty="0" smtClean="0"/>
+              <a:t>mirror</a:t>
+            </a:r>
+            <a:endParaRPr lang="en-GB" sz="1000" b="1" dirty="0"/>
+          </a:p>
+        </p:txBody>
+      </p:sp>
+    </p:spTree>
+    <p:extLst>
+      <p:ext uri="{BB962C8B-B14F-4D97-AF65-F5344CB8AC3E}">
+        <p14:creationId xmlns:p14="http://schemas.microsoft.com/office/powerpoint/2010/main" val="1211330501"/>
+      </p:ext>
+    </p:extLst>
+  </p:cSld>
+  <p:clrMapOvr>
+    <a:masterClrMapping/>
+  </p:clrMapOvr>
+</p:sld>
+</file>
+
+<file path=ppt/slides/slide8.xml><?xml version="1.0" encoding="utf-8"?>
+<p:sld xmlns:a="http://schemas.openxmlformats.org/drawingml/2006/main" xmlns:r="http://schemas.openxmlformats.org/officeDocument/2006/relationships" xmlns:p="http://schemas.openxmlformats.org/presentationml/2006/main">
+  <p:cSld>
+    <p:spTree>
+      <p:nvGrpSpPr>
+        <p:cNvPr id="1" name=""/>
+        <p:cNvGrpSpPr/>
+        <p:nvPr/>
+      </p:nvGrpSpPr>
+      <p:grpSpPr>
+        <a:xfrm>
+          <a:off x="0" y="0"/>
+          <a:ext cx="0" cy="0"/>
+          <a:chOff x="0" y="0"/>
+          <a:chExt cx="0" cy="0"/>
+        </a:xfrm>
+      </p:grpSpPr>
+      <p:pic>
+        <p:nvPicPr>
+          <p:cNvPr id="4" name="Image 3"/>
+          <p:cNvPicPr>
+            <a:picLocks noChangeAspect="1"/>
+          </p:cNvPicPr>
+          <p:nvPr/>
+        </p:nvPicPr>
+        <p:blipFill>
+          <a:blip r:embed="rId2"/>
+          <a:stretch>
+            <a:fillRect/>
+          </a:stretch>
+        </p:blipFill>
+        <p:spPr>
+          <a:xfrm>
+            <a:off x="-868680" y="-100584"/>
+            <a:ext cx="13952314" cy="6281928"/>
+          </a:xfrm>
+          <a:prstGeom prst="rect">
+            <a:avLst/>
+          </a:prstGeom>
+        </p:spPr>
+      </p:pic>
+      <p:pic>
+        <p:nvPicPr>
+          <p:cNvPr id="5" name="Image 4"/>
+          <p:cNvPicPr>
+            <a:picLocks noChangeAspect="1"/>
+          </p:cNvPicPr>
+          <p:nvPr/>
+        </p:nvPicPr>
+        <p:blipFill>
+          <a:blip r:embed="rId3"/>
+          <a:stretch>
+            <a:fillRect/>
+          </a:stretch>
+        </p:blipFill>
+        <p:spPr>
+          <a:xfrm>
+            <a:off x="5141214" y="5840659"/>
+            <a:ext cx="3902202" cy="258389"/>
+          </a:xfrm>
+          <a:prstGeom prst="rect">
+            <a:avLst/>
+          </a:prstGeom>
+        </p:spPr>
+      </p:pic>
+      <p:pic>
+        <p:nvPicPr>
+          <p:cNvPr id="6" name="Image 5"/>
+          <p:cNvPicPr>
+            <a:picLocks noChangeAspect="1"/>
+          </p:cNvPicPr>
+          <p:nvPr/>
+        </p:nvPicPr>
+        <p:blipFill>
+          <a:blip r:embed="rId4"/>
+          <a:stretch>
+            <a:fillRect/>
+          </a:stretch>
+        </p:blipFill>
+        <p:spPr>
+          <a:xfrm>
+            <a:off x="9202033" y="5635288"/>
+            <a:ext cx="2575439" cy="518624"/>
+          </a:xfrm>
+          <a:prstGeom prst="rect">
+            <a:avLst/>
+          </a:prstGeom>
+        </p:spPr>
+      </p:pic>
+    </p:spTree>
+    <p:extLst>
+      <p:ext uri="{BB962C8B-B14F-4D97-AF65-F5344CB8AC3E}">
+        <p14:creationId xmlns:p14="http://schemas.microsoft.com/office/powerpoint/2010/main" val="2562911443"/>
       </p:ext>
     </p:extLst>
   </p:cSld>

</xml_diff>

<commit_message>
Design up to the CCD with fold mirror
Final design of the optics bending the beam before the pyramid apex to save space.
XYZ stage for the WFS path so place it in a movable box (shoe box)
</commit_message>
<xml_diff>
--- a/20180518_AO_design_report/images/images_sketch.pptx
+++ b/20180518_AO_design_report/images/images_sketch.pptx
@@ -5,7 +5,7 @@
     <p:sldMasterId id="2147483648" r:id="rId1"/>
   </p:sldMasterIdLst>
   <p:notesMasterIdLst>
-    <p:notesMasterId r:id="rId10"/>
+    <p:notesMasterId r:id="rId12"/>
   </p:notesMasterIdLst>
   <p:sldIdLst>
     <p:sldId id="256" r:id="rId2"/>
@@ -16,6 +16,8 @@
     <p:sldId id="261" r:id="rId7"/>
     <p:sldId id="262" r:id="rId8"/>
     <p:sldId id="263" r:id="rId9"/>
+    <p:sldId id="264" r:id="rId10"/>
+    <p:sldId id="265" r:id="rId11"/>
   </p:sldIdLst>
   <p:sldSz cx="12192000" cy="6858000"/>
   <p:notesSz cx="6858000" cy="9144000"/>
@@ -115,6 +117,24 @@
     </a:lvl9pPr>
   </p:defaultTextStyle>
   <p:extLst>
+    <p:ext uri="{521415D9-36F7-43E2-AB2F-B90AF26B5E84}">
+      <p14:sectionLst xmlns:p14="http://schemas.microsoft.com/office/powerpoint/2010/main">
+        <p14:section name="Section par défaut" id="{D40955F2-4310-4598-9AE6-957DCF6AAC6B}">
+          <p14:sldIdLst>
+            <p14:sldId id="256"/>
+            <p14:sldId id="257"/>
+            <p14:sldId id="258"/>
+            <p14:sldId id="259"/>
+            <p14:sldId id="260"/>
+            <p14:sldId id="261"/>
+            <p14:sldId id="262"/>
+            <p14:sldId id="263"/>
+            <p14:sldId id="264"/>
+            <p14:sldId id="265"/>
+          </p14:sldIdLst>
+        </p14:section>
+      </p14:sectionLst>
+    </p:ext>
     <p:ext uri="{EFAFB233-063F-42B5-8137-9DF3F51BA10A}">
       <p15:sldGuideLst xmlns:p15="http://schemas.microsoft.com/office/powerpoint/2012/main"/>
     </p:ext>
@@ -204,7 +224,7 @@
           <a:p>
             <a:fld id="{8EDEE2E2-4BE4-41CA-94FC-BC9DC2A64380}" type="datetimeFigureOut">
               <a:rPr lang="en-GB" smtClean="0"/>
-              <a:t>30/05/2018</a:t>
+              <a:t>01/06/2018</a:t>
             </a:fld>
             <a:endParaRPr lang="en-GB"/>
           </a:p>
@@ -603,7 +623,7 @@
           <a:p>
             <a:fld id="{24AF4860-EF53-429F-9816-8C3FCB6EDEF9}" type="datetimeFigureOut">
               <a:rPr lang="en-GB" smtClean="0"/>
-              <a:t>30/05/2018</a:t>
+              <a:t>01/06/2018</a:t>
             </a:fld>
             <a:endParaRPr lang="en-GB"/>
           </a:p>
@@ -773,7 +793,7 @@
           <a:p>
             <a:fld id="{24AF4860-EF53-429F-9816-8C3FCB6EDEF9}" type="datetimeFigureOut">
               <a:rPr lang="en-GB" smtClean="0"/>
-              <a:t>30/05/2018</a:t>
+              <a:t>01/06/2018</a:t>
             </a:fld>
             <a:endParaRPr lang="en-GB"/>
           </a:p>
@@ -953,7 +973,7 @@
           <a:p>
             <a:fld id="{24AF4860-EF53-429F-9816-8C3FCB6EDEF9}" type="datetimeFigureOut">
               <a:rPr lang="en-GB" smtClean="0"/>
-              <a:t>30/05/2018</a:t>
+              <a:t>01/06/2018</a:t>
             </a:fld>
             <a:endParaRPr lang="en-GB"/>
           </a:p>
@@ -1123,7 +1143,7 @@
           <a:p>
             <a:fld id="{24AF4860-EF53-429F-9816-8C3FCB6EDEF9}" type="datetimeFigureOut">
               <a:rPr lang="en-GB" smtClean="0"/>
-              <a:t>30/05/2018</a:t>
+              <a:t>01/06/2018</a:t>
             </a:fld>
             <a:endParaRPr lang="en-GB"/>
           </a:p>
@@ -1369,7 +1389,7 @@
           <a:p>
             <a:fld id="{24AF4860-EF53-429F-9816-8C3FCB6EDEF9}" type="datetimeFigureOut">
               <a:rPr lang="en-GB" smtClean="0"/>
-              <a:t>30/05/2018</a:t>
+              <a:t>01/06/2018</a:t>
             </a:fld>
             <a:endParaRPr lang="en-GB"/>
           </a:p>
@@ -1601,7 +1621,7 @@
           <a:p>
             <a:fld id="{24AF4860-EF53-429F-9816-8C3FCB6EDEF9}" type="datetimeFigureOut">
               <a:rPr lang="en-GB" smtClean="0"/>
-              <a:t>30/05/2018</a:t>
+              <a:t>01/06/2018</a:t>
             </a:fld>
             <a:endParaRPr lang="en-GB"/>
           </a:p>
@@ -1968,7 +1988,7 @@
           <a:p>
             <a:fld id="{24AF4860-EF53-429F-9816-8C3FCB6EDEF9}" type="datetimeFigureOut">
               <a:rPr lang="en-GB" smtClean="0"/>
-              <a:t>30/05/2018</a:t>
+              <a:t>01/06/2018</a:t>
             </a:fld>
             <a:endParaRPr lang="en-GB"/>
           </a:p>
@@ -2086,7 +2106,7 @@
           <a:p>
             <a:fld id="{24AF4860-EF53-429F-9816-8C3FCB6EDEF9}" type="datetimeFigureOut">
               <a:rPr lang="en-GB" smtClean="0"/>
-              <a:t>30/05/2018</a:t>
+              <a:t>01/06/2018</a:t>
             </a:fld>
             <a:endParaRPr lang="en-GB"/>
           </a:p>
@@ -2181,7 +2201,7 @@
           <a:p>
             <a:fld id="{24AF4860-EF53-429F-9816-8C3FCB6EDEF9}" type="datetimeFigureOut">
               <a:rPr lang="en-GB" smtClean="0"/>
-              <a:t>30/05/2018</a:t>
+              <a:t>01/06/2018</a:t>
             </a:fld>
             <a:endParaRPr lang="en-GB"/>
           </a:p>
@@ -2458,7 +2478,7 @@
           <a:p>
             <a:fld id="{24AF4860-EF53-429F-9816-8C3FCB6EDEF9}" type="datetimeFigureOut">
               <a:rPr lang="en-GB" smtClean="0"/>
-              <a:t>30/05/2018</a:t>
+              <a:t>01/06/2018</a:t>
             </a:fld>
             <a:endParaRPr lang="en-GB"/>
           </a:p>
@@ -2711,7 +2731,7 @@
           <a:p>
             <a:fld id="{24AF4860-EF53-429F-9816-8C3FCB6EDEF9}" type="datetimeFigureOut">
               <a:rPr lang="en-GB" smtClean="0"/>
-              <a:t>30/05/2018</a:t>
+              <a:t>01/06/2018</a:t>
             </a:fld>
             <a:endParaRPr lang="en-GB"/>
           </a:p>
@@ -2924,7 +2944,7 @@
           <a:p>
             <a:fld id="{24AF4860-EF53-429F-9816-8C3FCB6EDEF9}" type="datetimeFigureOut">
               <a:rPr lang="en-GB" smtClean="0"/>
-              <a:t>30/05/2018</a:t>
+              <a:t>01/06/2018</a:t>
             </a:fld>
             <a:endParaRPr lang="en-GB"/>
           </a:p>
@@ -4329,6 +4349,564 @@
 </p:sld>
 </file>
 
+<file path=ppt/slides/slide10.xml><?xml version="1.0" encoding="utf-8"?>
+<p:sld xmlns:a="http://schemas.openxmlformats.org/drawingml/2006/main" xmlns:r="http://schemas.openxmlformats.org/officeDocument/2006/relationships" xmlns:p="http://schemas.openxmlformats.org/presentationml/2006/main">
+  <p:cSld>
+    <p:spTree>
+      <p:nvGrpSpPr>
+        <p:cNvPr id="1" name=""/>
+        <p:cNvGrpSpPr/>
+        <p:nvPr/>
+      </p:nvGrpSpPr>
+      <p:grpSpPr>
+        <a:xfrm>
+          <a:off x="0" y="0"/>
+          <a:ext cx="0" cy="0"/>
+          <a:chOff x="0" y="0"/>
+          <a:chExt cx="0" cy="0"/>
+        </a:xfrm>
+      </p:grpSpPr>
+      <p:pic>
+        <p:nvPicPr>
+          <p:cNvPr id="4" name="Image 3"/>
+          <p:cNvPicPr>
+            <a:picLocks noChangeAspect="1"/>
+          </p:cNvPicPr>
+          <p:nvPr/>
+        </p:nvPicPr>
+        <p:blipFill>
+          <a:blip r:embed="rId2"/>
+          <a:stretch>
+            <a:fillRect/>
+          </a:stretch>
+        </p:blipFill>
+        <p:spPr>
+          <a:xfrm>
+            <a:off x="-661833" y="133164"/>
+            <a:ext cx="13534649" cy="6374167"/>
+          </a:xfrm>
+          <a:prstGeom prst="rect">
+            <a:avLst/>
+          </a:prstGeom>
+        </p:spPr>
+      </p:pic>
+      <p:sp>
+        <p:nvSpPr>
+          <p:cNvPr id="5" name="ZoneTexte 4"/>
+          <p:cNvSpPr txBox="1"/>
+          <p:nvPr/>
+        </p:nvSpPr>
+        <p:spPr>
+          <a:xfrm>
+            <a:off x="1169630" y="4291753"/>
+            <a:ext cx="766555" cy="553998"/>
+          </a:xfrm>
+          <a:prstGeom prst="rect">
+            <a:avLst/>
+          </a:prstGeom>
+          <a:noFill/>
+        </p:spPr>
+        <p:txBody>
+          <a:bodyPr wrap="none" rtlCol="0">
+            <a:spAutoFit/>
+          </a:bodyPr>
+          <a:lstStyle/>
+          <a:p>
+            <a:pPr algn="ctr"/>
+            <a:r>
+              <a:rPr lang="en-GB" sz="1000" b="1" dirty="0" smtClean="0"/>
+              <a:t>Telescope</a:t>
+            </a:r>
+          </a:p>
+          <a:p>
+            <a:pPr algn="ctr"/>
+            <a:r>
+              <a:rPr lang="en-GB" sz="1000" b="1" dirty="0"/>
+              <a:t>f</a:t>
+            </a:r>
+            <a:r>
+              <a:rPr lang="en-GB" sz="1000" b="1" dirty="0" smtClean="0"/>
+              <a:t>ocal plane</a:t>
+            </a:r>
+          </a:p>
+          <a:p>
+            <a:pPr algn="ctr"/>
+            <a:r>
+              <a:rPr lang="en-GB" sz="1000" b="1" dirty="0" smtClean="0"/>
+              <a:t>(FoV = 1’)</a:t>
+            </a:r>
+            <a:endParaRPr lang="en-GB" sz="1000" b="1" dirty="0"/>
+          </a:p>
+        </p:txBody>
+      </p:sp>
+      <p:sp>
+        <p:nvSpPr>
+          <p:cNvPr id="6" name="ZoneTexte 5"/>
+          <p:cNvSpPr txBox="1"/>
+          <p:nvPr/>
+        </p:nvSpPr>
+        <p:spPr>
+          <a:xfrm>
+            <a:off x="2234863" y="4679820"/>
+            <a:ext cx="881972" cy="553998"/>
+          </a:xfrm>
+          <a:prstGeom prst="rect">
+            <a:avLst/>
+          </a:prstGeom>
+          <a:noFill/>
+        </p:spPr>
+        <p:txBody>
+          <a:bodyPr wrap="none" rtlCol="0">
+            <a:spAutoFit/>
+          </a:bodyPr>
+          <a:lstStyle/>
+          <a:p>
+            <a:pPr algn="ctr"/>
+            <a:r>
+              <a:rPr lang="en-GB" sz="1000" b="1" dirty="0" smtClean="0"/>
+              <a:t>Intermediate</a:t>
+            </a:r>
+          </a:p>
+          <a:p>
+            <a:pPr algn="ctr"/>
+            <a:r>
+              <a:rPr lang="en-GB" sz="1000" b="1" dirty="0"/>
+              <a:t>f</a:t>
+            </a:r>
+            <a:r>
+              <a:rPr lang="en-GB" sz="1000" b="1" dirty="0" smtClean="0"/>
+              <a:t>ocal plane</a:t>
+            </a:r>
+          </a:p>
+          <a:p>
+            <a:pPr algn="ctr"/>
+            <a:r>
+              <a:rPr lang="en-GB" sz="1000" b="1" dirty="0" smtClean="0"/>
+              <a:t>(FoV = 1’)</a:t>
+            </a:r>
+            <a:endParaRPr lang="en-GB" sz="1000" b="1" dirty="0"/>
+          </a:p>
+        </p:txBody>
+      </p:sp>
+      <p:sp>
+        <p:nvSpPr>
+          <p:cNvPr id="7" name="Rectangle 6"/>
+          <p:cNvSpPr/>
+          <p:nvPr/>
+        </p:nvSpPr>
+        <p:spPr>
+          <a:xfrm>
+            <a:off x="1113707" y="3790423"/>
+            <a:ext cx="850824" cy="857777"/>
+          </a:xfrm>
+          <a:prstGeom prst="rect">
+            <a:avLst/>
+          </a:prstGeom>
+          <a:solidFill>
+            <a:srgbClr val="5B9BD5">
+              <a:alpha val="21176"/>
+            </a:srgbClr>
+          </a:solidFill>
+          <a:ln>
+            <a:solidFill>
+              <a:schemeClr val="tx1"/>
+            </a:solidFill>
+          </a:ln>
+        </p:spPr>
+        <p:style>
+          <a:lnRef idx="2">
+            <a:schemeClr val="accent1">
+              <a:shade val="50000"/>
+            </a:schemeClr>
+          </a:lnRef>
+          <a:fillRef idx="1">
+            <a:schemeClr val="accent1"/>
+          </a:fillRef>
+          <a:effectRef idx="0">
+            <a:schemeClr val="accent1"/>
+          </a:effectRef>
+          <a:fontRef idx="minor">
+            <a:schemeClr val="lt1"/>
+          </a:fontRef>
+        </p:style>
+        <p:txBody>
+          <a:bodyPr rtlCol="0" anchor="ctr"/>
+          <a:lstStyle/>
+          <a:p>
+            <a:pPr algn="ctr"/>
+            <a:endParaRPr lang="en-GB" dirty="0"/>
+          </a:p>
+        </p:txBody>
+      </p:sp>
+      <p:sp>
+        <p:nvSpPr>
+          <p:cNvPr id="8" name="ZoneTexte 7"/>
+          <p:cNvSpPr txBox="1"/>
+          <p:nvPr/>
+        </p:nvSpPr>
+        <p:spPr>
+          <a:xfrm>
+            <a:off x="1113706" y="3808178"/>
+            <a:ext cx="457731" cy="246221"/>
+          </a:xfrm>
+          <a:prstGeom prst="rect">
+            <a:avLst/>
+          </a:prstGeom>
+          <a:noFill/>
+        </p:spPr>
+        <p:txBody>
+          <a:bodyPr wrap="square" rtlCol="0">
+            <a:spAutoFit/>
+          </a:bodyPr>
+          <a:lstStyle/>
+          <a:p>
+            <a:r>
+              <a:rPr lang="en-GB" sz="1000" b="1" dirty="0"/>
+              <a:t>FCL</a:t>
+            </a:r>
+          </a:p>
+        </p:txBody>
+      </p:sp>
+      <p:sp>
+        <p:nvSpPr>
+          <p:cNvPr id="9" name="ZoneTexte 8"/>
+          <p:cNvSpPr txBox="1"/>
+          <p:nvPr/>
+        </p:nvSpPr>
+        <p:spPr>
+          <a:xfrm>
+            <a:off x="1143965" y="3346651"/>
+            <a:ext cx="377026" cy="246221"/>
+          </a:xfrm>
+          <a:prstGeom prst="rect">
+            <a:avLst/>
+          </a:prstGeom>
+          <a:noFill/>
+        </p:spPr>
+        <p:txBody>
+          <a:bodyPr wrap="none" rtlCol="0">
+            <a:spAutoFit/>
+          </a:bodyPr>
+          <a:lstStyle/>
+          <a:p>
+            <a:r>
+              <a:rPr lang="en-GB" sz="1000" b="1" dirty="0" smtClean="0"/>
+              <a:t>DM</a:t>
+            </a:r>
+            <a:endParaRPr lang="en-GB" sz="1000" b="1" dirty="0"/>
+          </a:p>
+        </p:txBody>
+      </p:sp>
+      <p:sp>
+        <p:nvSpPr>
+          <p:cNvPr id="10" name="ZoneTexte 9"/>
+          <p:cNvSpPr txBox="1"/>
+          <p:nvPr/>
+        </p:nvSpPr>
+        <p:spPr>
+          <a:xfrm>
+            <a:off x="3498659" y="3915443"/>
+            <a:ext cx="482824" cy="246221"/>
+          </a:xfrm>
+          <a:prstGeom prst="rect">
+            <a:avLst/>
+          </a:prstGeom>
+          <a:noFill/>
+        </p:spPr>
+        <p:txBody>
+          <a:bodyPr wrap="none" rtlCol="0">
+            <a:spAutoFit/>
+          </a:bodyPr>
+          <a:lstStyle/>
+          <a:p>
+            <a:r>
+              <a:rPr lang="en-GB" sz="1000" b="1" dirty="0" smtClean="0"/>
+              <a:t>OAP0</a:t>
+            </a:r>
+            <a:endParaRPr lang="en-GB" sz="1000" b="1" dirty="0"/>
+          </a:p>
+        </p:txBody>
+      </p:sp>
+      <p:sp>
+        <p:nvSpPr>
+          <p:cNvPr id="11" name="ZoneTexte 10"/>
+          <p:cNvSpPr txBox="1"/>
+          <p:nvPr/>
+        </p:nvSpPr>
+        <p:spPr>
+          <a:xfrm>
+            <a:off x="1857425" y="2843985"/>
+            <a:ext cx="482824" cy="246221"/>
+          </a:xfrm>
+          <a:prstGeom prst="rect">
+            <a:avLst/>
+          </a:prstGeom>
+          <a:noFill/>
+        </p:spPr>
+        <p:txBody>
+          <a:bodyPr wrap="none" rtlCol="0">
+            <a:spAutoFit/>
+          </a:bodyPr>
+          <a:lstStyle/>
+          <a:p>
+            <a:r>
+              <a:rPr lang="en-GB" sz="1000" b="1" dirty="0" smtClean="0"/>
+              <a:t>OAP1</a:t>
+            </a:r>
+            <a:endParaRPr lang="en-GB" sz="1000" b="1" dirty="0"/>
+          </a:p>
+        </p:txBody>
+      </p:sp>
+      <p:sp>
+        <p:nvSpPr>
+          <p:cNvPr id="12" name="ZoneTexte 11"/>
+          <p:cNvSpPr txBox="1"/>
+          <p:nvPr/>
+        </p:nvSpPr>
+        <p:spPr>
+          <a:xfrm>
+            <a:off x="3017249" y="3293383"/>
+            <a:ext cx="619080" cy="400110"/>
+          </a:xfrm>
+          <a:prstGeom prst="rect">
+            <a:avLst/>
+          </a:prstGeom>
+          <a:noFill/>
+        </p:spPr>
+        <p:txBody>
+          <a:bodyPr wrap="none" rtlCol="0">
+            <a:spAutoFit/>
+          </a:bodyPr>
+          <a:lstStyle/>
+          <a:p>
+            <a:r>
+              <a:rPr lang="en-GB" sz="1000" b="1" dirty="0" smtClean="0"/>
+              <a:t>Folding </a:t>
+            </a:r>
+          </a:p>
+          <a:p>
+            <a:r>
+              <a:rPr lang="en-GB" sz="1000" b="1" dirty="0" smtClean="0"/>
+              <a:t>mirror 1</a:t>
+            </a:r>
+            <a:endParaRPr lang="en-GB" sz="1000" b="1" dirty="0"/>
+          </a:p>
+        </p:txBody>
+      </p:sp>
+      <p:sp>
+        <p:nvSpPr>
+          <p:cNvPr id="13" name="ZoneTexte 12"/>
+          <p:cNvSpPr txBox="1"/>
+          <p:nvPr/>
+        </p:nvSpPr>
+        <p:spPr>
+          <a:xfrm>
+            <a:off x="2575461" y="5501243"/>
+            <a:ext cx="883575" cy="246221"/>
+          </a:xfrm>
+          <a:prstGeom prst="rect">
+            <a:avLst/>
+          </a:prstGeom>
+          <a:noFill/>
+        </p:spPr>
+        <p:txBody>
+          <a:bodyPr wrap="none" rtlCol="0">
+            <a:spAutoFit/>
+          </a:bodyPr>
+          <a:lstStyle/>
+          <a:p>
+            <a:r>
+              <a:rPr lang="en-GB" sz="1000" b="1" dirty="0" smtClean="0"/>
+              <a:t>Paraxial lens</a:t>
+            </a:r>
+            <a:endParaRPr lang="en-GB" sz="1000" b="1" dirty="0"/>
+          </a:p>
+        </p:txBody>
+      </p:sp>
+      <p:sp>
+        <p:nvSpPr>
+          <p:cNvPr id="14" name="ZoneTexte 13"/>
+          <p:cNvSpPr txBox="1"/>
+          <p:nvPr/>
+        </p:nvSpPr>
+        <p:spPr>
+          <a:xfrm>
+            <a:off x="2757855" y="6014889"/>
+            <a:ext cx="962123" cy="400110"/>
+          </a:xfrm>
+          <a:prstGeom prst="rect">
+            <a:avLst/>
+          </a:prstGeom>
+          <a:noFill/>
+        </p:spPr>
+        <p:txBody>
+          <a:bodyPr wrap="none" rtlCol="0">
+            <a:spAutoFit/>
+          </a:bodyPr>
+          <a:lstStyle/>
+          <a:p>
+            <a:pPr algn="ctr"/>
+            <a:r>
+              <a:rPr lang="en-GB" sz="1000" b="1" dirty="0" smtClean="0"/>
+              <a:t>TT modulation</a:t>
+            </a:r>
+          </a:p>
+          <a:p>
+            <a:pPr algn="ctr"/>
+            <a:r>
+              <a:rPr lang="en-GB" sz="1000" b="1" dirty="0" smtClean="0"/>
+              <a:t>mirror</a:t>
+            </a:r>
+            <a:endParaRPr lang="en-GB" sz="1000" b="1" dirty="0"/>
+          </a:p>
+        </p:txBody>
+      </p:sp>
+      <p:sp>
+        <p:nvSpPr>
+          <p:cNvPr id="15" name="ZoneTexte 14"/>
+          <p:cNvSpPr txBox="1"/>
+          <p:nvPr/>
+        </p:nvSpPr>
+        <p:spPr>
+          <a:xfrm>
+            <a:off x="4338577" y="5101133"/>
+            <a:ext cx="910827" cy="246221"/>
+          </a:xfrm>
+          <a:prstGeom prst="rect">
+            <a:avLst/>
+          </a:prstGeom>
+          <a:noFill/>
+        </p:spPr>
+        <p:txBody>
+          <a:bodyPr wrap="none" rtlCol="0">
+            <a:spAutoFit/>
+          </a:bodyPr>
+          <a:lstStyle/>
+          <a:p>
+            <a:pPr algn="ctr"/>
+            <a:r>
+              <a:rPr lang="en-GB" sz="1000" b="1" dirty="0" smtClean="0"/>
+              <a:t>Pyramid apex</a:t>
+            </a:r>
+            <a:endParaRPr lang="en-GB" sz="1000" b="1" dirty="0"/>
+          </a:p>
+        </p:txBody>
+      </p:sp>
+      <p:sp>
+        <p:nvSpPr>
+          <p:cNvPr id="16" name="ZoneTexte 15"/>
+          <p:cNvSpPr txBox="1"/>
+          <p:nvPr/>
+        </p:nvSpPr>
+        <p:spPr>
+          <a:xfrm>
+            <a:off x="4338577" y="6014889"/>
+            <a:ext cx="721672" cy="246221"/>
+          </a:xfrm>
+          <a:prstGeom prst="rect">
+            <a:avLst/>
+          </a:prstGeom>
+          <a:noFill/>
+        </p:spPr>
+        <p:txBody>
+          <a:bodyPr wrap="none" rtlCol="0">
+            <a:spAutoFit/>
+          </a:bodyPr>
+          <a:lstStyle/>
+          <a:p>
+            <a:pPr algn="ctr"/>
+            <a:r>
+              <a:rPr lang="en-GB" sz="1000" b="1" dirty="0" smtClean="0"/>
+              <a:t>Relay lens</a:t>
+            </a:r>
+            <a:endParaRPr lang="en-GB" sz="1000" b="1" dirty="0"/>
+          </a:p>
+        </p:txBody>
+      </p:sp>
+      <p:sp>
+        <p:nvSpPr>
+          <p:cNvPr id="17" name="ZoneTexte 16"/>
+          <p:cNvSpPr txBox="1"/>
+          <p:nvPr/>
+        </p:nvSpPr>
+        <p:spPr>
+          <a:xfrm>
+            <a:off x="4150297" y="6264981"/>
+            <a:ext cx="881973" cy="246221"/>
+          </a:xfrm>
+          <a:prstGeom prst="rect">
+            <a:avLst/>
+          </a:prstGeom>
+          <a:noFill/>
+        </p:spPr>
+        <p:txBody>
+          <a:bodyPr wrap="none" rtlCol="0">
+            <a:spAutoFit/>
+          </a:bodyPr>
+          <a:lstStyle/>
+          <a:p>
+            <a:pPr algn="ctr"/>
+            <a:r>
+              <a:rPr lang="en-GB" sz="1000" b="1" dirty="0" smtClean="0"/>
+              <a:t>CCD detector</a:t>
+            </a:r>
+            <a:endParaRPr lang="en-GB" sz="1000" b="1" dirty="0"/>
+          </a:p>
+        </p:txBody>
+      </p:sp>
+      <p:sp>
+        <p:nvSpPr>
+          <p:cNvPr id="18" name="ZoneTexte 17"/>
+          <p:cNvSpPr txBox="1"/>
+          <p:nvPr/>
+        </p:nvSpPr>
+        <p:spPr>
+          <a:xfrm>
+            <a:off x="4029037" y="4019256"/>
+            <a:ext cx="619080" cy="400110"/>
+          </a:xfrm>
+          <a:prstGeom prst="rect">
+            <a:avLst/>
+          </a:prstGeom>
+          <a:noFill/>
+        </p:spPr>
+        <p:txBody>
+          <a:bodyPr wrap="none" rtlCol="0">
+            <a:spAutoFit/>
+          </a:bodyPr>
+          <a:lstStyle/>
+          <a:p>
+            <a:r>
+              <a:rPr lang="en-GB" sz="1000" b="1" dirty="0" smtClean="0"/>
+              <a:t>Folding </a:t>
+            </a:r>
+          </a:p>
+          <a:p>
+            <a:r>
+              <a:rPr lang="en-GB" sz="1000" b="1" dirty="0" smtClean="0"/>
+              <a:t>mirror </a:t>
+            </a:r>
+            <a:r>
+              <a:rPr lang="en-GB" sz="1000" b="1" dirty="0" smtClean="0"/>
+              <a:t>2</a:t>
+            </a:r>
+            <a:endParaRPr lang="en-GB" sz="1000" b="1" dirty="0"/>
+          </a:p>
+        </p:txBody>
+      </p:sp>
+    </p:spTree>
+    <p:extLst>
+      <p:ext uri="{BB962C8B-B14F-4D97-AF65-F5344CB8AC3E}">
+        <p14:creationId xmlns:p14="http://schemas.microsoft.com/office/powerpoint/2010/main" val="665358164"/>
+      </p:ext>
+    </p:extLst>
+  </p:cSld>
+  <p:clrMapOvr>
+    <a:masterClrMapping/>
+  </p:clrMapOvr>
+</p:sld>
+</file>
+
 <file path=ppt/slides/slide2.xml><?xml version="1.0" encoding="utf-8"?>
 <p:sld xmlns:a="http://schemas.openxmlformats.org/drawingml/2006/main" xmlns:r="http://schemas.openxmlformats.org/officeDocument/2006/relationships" xmlns:p="http://schemas.openxmlformats.org/presentationml/2006/main">
   <p:cSld>
@@ -7714,6 +8292,546 @@
     <p:extLst>
       <p:ext uri="{BB962C8B-B14F-4D97-AF65-F5344CB8AC3E}">
         <p14:creationId xmlns:p14="http://schemas.microsoft.com/office/powerpoint/2010/main" val="2562911443"/>
+      </p:ext>
+    </p:extLst>
+  </p:cSld>
+  <p:clrMapOvr>
+    <a:masterClrMapping/>
+  </p:clrMapOvr>
+</p:sld>
+</file>
+
+<file path=ppt/slides/slide9.xml><?xml version="1.0" encoding="utf-8"?>
+<p:sld xmlns:a="http://schemas.openxmlformats.org/drawingml/2006/main" xmlns:r="http://schemas.openxmlformats.org/officeDocument/2006/relationships" xmlns:p="http://schemas.openxmlformats.org/presentationml/2006/main">
+  <p:cSld>
+    <p:spTree>
+      <p:nvGrpSpPr>
+        <p:cNvPr id="1" name=""/>
+        <p:cNvGrpSpPr/>
+        <p:nvPr/>
+      </p:nvGrpSpPr>
+      <p:grpSpPr>
+        <a:xfrm>
+          <a:off x="0" y="0"/>
+          <a:ext cx="0" cy="0"/>
+          <a:chOff x="0" y="0"/>
+          <a:chExt cx="0" cy="0"/>
+        </a:xfrm>
+      </p:grpSpPr>
+      <p:pic>
+        <p:nvPicPr>
+          <p:cNvPr id="19" name="Image 18"/>
+          <p:cNvPicPr>
+            <a:picLocks noChangeAspect="1"/>
+          </p:cNvPicPr>
+          <p:nvPr/>
+        </p:nvPicPr>
+        <p:blipFill>
+          <a:blip r:embed="rId2"/>
+          <a:stretch>
+            <a:fillRect/>
+          </a:stretch>
+        </p:blipFill>
+        <p:spPr>
+          <a:xfrm>
+            <a:off x="-657313" y="0"/>
+            <a:ext cx="13628214" cy="6090082"/>
+          </a:xfrm>
+          <a:prstGeom prst="rect">
+            <a:avLst/>
+          </a:prstGeom>
+        </p:spPr>
+      </p:pic>
+      <p:sp>
+        <p:nvSpPr>
+          <p:cNvPr id="20" name="ZoneTexte 19"/>
+          <p:cNvSpPr txBox="1"/>
+          <p:nvPr/>
+        </p:nvSpPr>
+        <p:spPr>
+          <a:xfrm>
+            <a:off x="-435561" y="4132278"/>
+            <a:ext cx="766555" cy="553998"/>
+          </a:xfrm>
+          <a:prstGeom prst="rect">
+            <a:avLst/>
+          </a:prstGeom>
+          <a:noFill/>
+        </p:spPr>
+        <p:txBody>
+          <a:bodyPr wrap="none" rtlCol="0">
+            <a:spAutoFit/>
+          </a:bodyPr>
+          <a:lstStyle/>
+          <a:p>
+            <a:pPr algn="ctr"/>
+            <a:r>
+              <a:rPr lang="en-GB" sz="1000" b="1" dirty="0" smtClean="0"/>
+              <a:t>Telescope</a:t>
+            </a:r>
+          </a:p>
+          <a:p>
+            <a:pPr algn="ctr"/>
+            <a:r>
+              <a:rPr lang="en-GB" sz="1000" b="1" dirty="0"/>
+              <a:t>f</a:t>
+            </a:r>
+            <a:r>
+              <a:rPr lang="en-GB" sz="1000" b="1" dirty="0" smtClean="0"/>
+              <a:t>ocal plane</a:t>
+            </a:r>
+          </a:p>
+          <a:p>
+            <a:pPr algn="ctr"/>
+            <a:r>
+              <a:rPr lang="en-GB" sz="1000" b="1" dirty="0" smtClean="0"/>
+              <a:t>(FoV = 1’)</a:t>
+            </a:r>
+            <a:endParaRPr lang="en-GB" sz="1000" b="1" dirty="0"/>
+          </a:p>
+        </p:txBody>
+      </p:sp>
+      <p:sp>
+        <p:nvSpPr>
+          <p:cNvPr id="21" name="ZoneTexte 20"/>
+          <p:cNvSpPr txBox="1"/>
+          <p:nvPr/>
+        </p:nvSpPr>
+        <p:spPr>
+          <a:xfrm>
+            <a:off x="551086" y="4510088"/>
+            <a:ext cx="881972" cy="553998"/>
+          </a:xfrm>
+          <a:prstGeom prst="rect">
+            <a:avLst/>
+          </a:prstGeom>
+          <a:noFill/>
+        </p:spPr>
+        <p:txBody>
+          <a:bodyPr wrap="none" rtlCol="0">
+            <a:spAutoFit/>
+          </a:bodyPr>
+          <a:lstStyle/>
+          <a:p>
+            <a:pPr algn="ctr"/>
+            <a:r>
+              <a:rPr lang="en-GB" sz="1000" b="1" dirty="0" smtClean="0"/>
+              <a:t>Intermediate</a:t>
+            </a:r>
+          </a:p>
+          <a:p>
+            <a:pPr algn="ctr"/>
+            <a:r>
+              <a:rPr lang="en-GB" sz="1000" b="1" dirty="0"/>
+              <a:t>f</a:t>
+            </a:r>
+            <a:r>
+              <a:rPr lang="en-GB" sz="1000" b="1" dirty="0" smtClean="0"/>
+              <a:t>ocal plane</a:t>
+            </a:r>
+          </a:p>
+          <a:p>
+            <a:pPr algn="ctr"/>
+            <a:r>
+              <a:rPr lang="en-GB" sz="1000" b="1" dirty="0" smtClean="0"/>
+              <a:t>(FoV = 1’)</a:t>
+            </a:r>
+            <a:endParaRPr lang="en-GB" sz="1000" b="1" dirty="0"/>
+          </a:p>
+        </p:txBody>
+      </p:sp>
+      <p:sp>
+        <p:nvSpPr>
+          <p:cNvPr id="22" name="Rectangle 21"/>
+          <p:cNvSpPr/>
+          <p:nvPr/>
+        </p:nvSpPr>
+        <p:spPr>
+          <a:xfrm>
+            <a:off x="-467997" y="3702978"/>
+            <a:ext cx="798991" cy="807110"/>
+          </a:xfrm>
+          <a:prstGeom prst="rect">
+            <a:avLst/>
+          </a:prstGeom>
+          <a:solidFill>
+            <a:srgbClr val="5B9BD5">
+              <a:alpha val="21176"/>
+            </a:srgbClr>
+          </a:solidFill>
+          <a:ln>
+            <a:solidFill>
+              <a:schemeClr val="tx1"/>
+            </a:solidFill>
+          </a:ln>
+        </p:spPr>
+        <p:style>
+          <a:lnRef idx="2">
+            <a:schemeClr val="accent1">
+              <a:shade val="50000"/>
+            </a:schemeClr>
+          </a:lnRef>
+          <a:fillRef idx="1">
+            <a:schemeClr val="accent1"/>
+          </a:fillRef>
+          <a:effectRef idx="0">
+            <a:schemeClr val="accent1"/>
+          </a:effectRef>
+          <a:fontRef idx="minor">
+            <a:schemeClr val="lt1"/>
+          </a:fontRef>
+        </p:style>
+        <p:txBody>
+          <a:bodyPr rtlCol="0" anchor="ctr"/>
+          <a:lstStyle/>
+          <a:p>
+            <a:pPr algn="ctr"/>
+            <a:endParaRPr lang="en-GB" dirty="0"/>
+          </a:p>
+        </p:txBody>
+      </p:sp>
+      <p:sp>
+        <p:nvSpPr>
+          <p:cNvPr id="23" name="ZoneTexte 22"/>
+          <p:cNvSpPr txBox="1"/>
+          <p:nvPr/>
+        </p:nvSpPr>
+        <p:spPr>
+          <a:xfrm>
+            <a:off x="-467998" y="3720733"/>
+            <a:ext cx="457731" cy="246221"/>
+          </a:xfrm>
+          <a:prstGeom prst="rect">
+            <a:avLst/>
+          </a:prstGeom>
+          <a:noFill/>
+        </p:spPr>
+        <p:txBody>
+          <a:bodyPr wrap="square" rtlCol="0">
+            <a:spAutoFit/>
+          </a:bodyPr>
+          <a:lstStyle/>
+          <a:p>
+            <a:r>
+              <a:rPr lang="en-GB" sz="1000" b="1" dirty="0"/>
+              <a:t>FCL</a:t>
+            </a:r>
+          </a:p>
+        </p:txBody>
+      </p:sp>
+      <p:sp>
+        <p:nvSpPr>
+          <p:cNvPr id="24" name="ZoneTexte 23"/>
+          <p:cNvSpPr txBox="1"/>
+          <p:nvPr/>
+        </p:nvSpPr>
+        <p:spPr>
+          <a:xfrm>
+            <a:off x="-467998" y="3280569"/>
+            <a:ext cx="377026" cy="246221"/>
+          </a:xfrm>
+          <a:prstGeom prst="rect">
+            <a:avLst/>
+          </a:prstGeom>
+          <a:noFill/>
+        </p:spPr>
+        <p:txBody>
+          <a:bodyPr wrap="none" rtlCol="0">
+            <a:spAutoFit/>
+          </a:bodyPr>
+          <a:lstStyle/>
+          <a:p>
+            <a:r>
+              <a:rPr lang="en-GB" sz="1000" b="1" dirty="0" smtClean="0"/>
+              <a:t>DM</a:t>
+            </a:r>
+            <a:endParaRPr lang="en-GB" sz="1000" b="1" dirty="0"/>
+          </a:p>
+        </p:txBody>
+      </p:sp>
+      <p:sp>
+        <p:nvSpPr>
+          <p:cNvPr id="25" name="ZoneTexte 24"/>
+          <p:cNvSpPr txBox="1"/>
+          <p:nvPr/>
+        </p:nvSpPr>
+        <p:spPr>
+          <a:xfrm>
+            <a:off x="1653151" y="3817210"/>
+            <a:ext cx="482824" cy="246221"/>
+          </a:xfrm>
+          <a:prstGeom prst="rect">
+            <a:avLst/>
+          </a:prstGeom>
+          <a:noFill/>
+        </p:spPr>
+        <p:txBody>
+          <a:bodyPr wrap="none" rtlCol="0">
+            <a:spAutoFit/>
+          </a:bodyPr>
+          <a:lstStyle/>
+          <a:p>
+            <a:r>
+              <a:rPr lang="en-GB" sz="1000" b="1" dirty="0" smtClean="0"/>
+              <a:t>OAP0</a:t>
+            </a:r>
+            <a:endParaRPr lang="en-GB" sz="1000" b="1" dirty="0"/>
+          </a:p>
+        </p:txBody>
+      </p:sp>
+      <p:sp>
+        <p:nvSpPr>
+          <p:cNvPr id="26" name="ZoneTexte 25"/>
+          <p:cNvSpPr txBox="1"/>
+          <p:nvPr/>
+        </p:nvSpPr>
+        <p:spPr>
+          <a:xfrm>
+            <a:off x="211062" y="2728472"/>
+            <a:ext cx="482824" cy="246221"/>
+          </a:xfrm>
+          <a:prstGeom prst="rect">
+            <a:avLst/>
+          </a:prstGeom>
+          <a:noFill/>
+        </p:spPr>
+        <p:txBody>
+          <a:bodyPr wrap="none" rtlCol="0">
+            <a:spAutoFit/>
+          </a:bodyPr>
+          <a:lstStyle/>
+          <a:p>
+            <a:r>
+              <a:rPr lang="en-GB" sz="1000" b="1" dirty="0" smtClean="0"/>
+              <a:t>OAP1</a:t>
+            </a:r>
+            <a:endParaRPr lang="en-GB" sz="1000" b="1" dirty="0"/>
+          </a:p>
+        </p:txBody>
+      </p:sp>
+      <p:sp>
+        <p:nvSpPr>
+          <p:cNvPr id="27" name="ZoneTexte 26"/>
+          <p:cNvSpPr txBox="1"/>
+          <p:nvPr/>
+        </p:nvSpPr>
+        <p:spPr>
+          <a:xfrm>
+            <a:off x="1343611" y="3259960"/>
+            <a:ext cx="619080" cy="400110"/>
+          </a:xfrm>
+          <a:prstGeom prst="rect">
+            <a:avLst/>
+          </a:prstGeom>
+          <a:noFill/>
+        </p:spPr>
+        <p:txBody>
+          <a:bodyPr wrap="none" rtlCol="0">
+            <a:spAutoFit/>
+          </a:bodyPr>
+          <a:lstStyle/>
+          <a:p>
+            <a:r>
+              <a:rPr lang="en-GB" sz="1000" b="1" dirty="0" smtClean="0"/>
+              <a:t>Folding </a:t>
+            </a:r>
+          </a:p>
+          <a:p>
+            <a:r>
+              <a:rPr lang="en-GB" sz="1000" b="1" dirty="0" smtClean="0"/>
+              <a:t>mirror 1</a:t>
+            </a:r>
+            <a:endParaRPr lang="en-GB" sz="1000" b="1" dirty="0"/>
+          </a:p>
+        </p:txBody>
+      </p:sp>
+      <p:sp>
+        <p:nvSpPr>
+          <p:cNvPr id="28" name="ZoneTexte 27"/>
+          <p:cNvSpPr txBox="1"/>
+          <p:nvPr/>
+        </p:nvSpPr>
+        <p:spPr>
+          <a:xfrm>
+            <a:off x="901823" y="5330862"/>
+            <a:ext cx="883575" cy="246221"/>
+          </a:xfrm>
+          <a:prstGeom prst="rect">
+            <a:avLst/>
+          </a:prstGeom>
+          <a:noFill/>
+        </p:spPr>
+        <p:txBody>
+          <a:bodyPr wrap="none" rtlCol="0">
+            <a:spAutoFit/>
+          </a:bodyPr>
+          <a:lstStyle/>
+          <a:p>
+            <a:r>
+              <a:rPr lang="en-GB" sz="1000" b="1" dirty="0" smtClean="0"/>
+              <a:t>Paraxial lens</a:t>
+            </a:r>
+            <a:endParaRPr lang="en-GB" sz="1000" b="1" dirty="0"/>
+          </a:p>
+        </p:txBody>
+      </p:sp>
+      <p:sp>
+        <p:nvSpPr>
+          <p:cNvPr id="29" name="ZoneTexte 28"/>
+          <p:cNvSpPr txBox="1"/>
+          <p:nvPr/>
+        </p:nvSpPr>
+        <p:spPr>
+          <a:xfrm>
+            <a:off x="1962691" y="5704445"/>
+            <a:ext cx="962123" cy="400110"/>
+          </a:xfrm>
+          <a:prstGeom prst="rect">
+            <a:avLst/>
+          </a:prstGeom>
+          <a:noFill/>
+        </p:spPr>
+        <p:txBody>
+          <a:bodyPr wrap="none" rtlCol="0">
+            <a:spAutoFit/>
+          </a:bodyPr>
+          <a:lstStyle/>
+          <a:p>
+            <a:pPr algn="ctr"/>
+            <a:r>
+              <a:rPr lang="en-GB" sz="1000" b="1" dirty="0" smtClean="0"/>
+              <a:t>TT modulation</a:t>
+            </a:r>
+          </a:p>
+          <a:p>
+            <a:pPr algn="ctr"/>
+            <a:r>
+              <a:rPr lang="en-GB" sz="1000" b="1" dirty="0" smtClean="0"/>
+              <a:t>mirror</a:t>
+            </a:r>
+            <a:endParaRPr lang="en-GB" sz="1000" b="1" dirty="0"/>
+          </a:p>
+        </p:txBody>
+      </p:sp>
+      <p:sp>
+        <p:nvSpPr>
+          <p:cNvPr id="30" name="ZoneTexte 29"/>
+          <p:cNvSpPr txBox="1"/>
+          <p:nvPr/>
+        </p:nvSpPr>
+        <p:spPr>
+          <a:xfrm>
+            <a:off x="2041239" y="2623852"/>
+            <a:ext cx="721672" cy="246221"/>
+          </a:xfrm>
+          <a:prstGeom prst="rect">
+            <a:avLst/>
+          </a:prstGeom>
+          <a:noFill/>
+        </p:spPr>
+        <p:txBody>
+          <a:bodyPr wrap="none" rtlCol="0">
+            <a:spAutoFit/>
+          </a:bodyPr>
+          <a:lstStyle/>
+          <a:p>
+            <a:r>
+              <a:rPr lang="en-GB" sz="1000" b="1" dirty="0" smtClean="0"/>
+              <a:t>Relay lens</a:t>
+            </a:r>
+            <a:endParaRPr lang="en-GB" sz="1000" b="1" dirty="0"/>
+          </a:p>
+        </p:txBody>
+      </p:sp>
+      <p:sp>
+        <p:nvSpPr>
+          <p:cNvPr id="31" name="ZoneTexte 30"/>
+          <p:cNvSpPr txBox="1"/>
+          <p:nvPr/>
+        </p:nvSpPr>
+        <p:spPr>
+          <a:xfrm>
+            <a:off x="2041239" y="2303558"/>
+            <a:ext cx="881973" cy="246221"/>
+          </a:xfrm>
+          <a:prstGeom prst="rect">
+            <a:avLst/>
+          </a:prstGeom>
+          <a:noFill/>
+        </p:spPr>
+        <p:txBody>
+          <a:bodyPr wrap="none" rtlCol="0">
+            <a:spAutoFit/>
+          </a:bodyPr>
+          <a:lstStyle/>
+          <a:p>
+            <a:r>
+              <a:rPr lang="en-GB" sz="1000" b="1" dirty="0" smtClean="0"/>
+              <a:t>CCD detector</a:t>
+            </a:r>
+            <a:endParaRPr lang="en-GB" sz="1000" b="1" dirty="0"/>
+          </a:p>
+        </p:txBody>
+      </p:sp>
+      <p:pic>
+        <p:nvPicPr>
+          <p:cNvPr id="32" name="Image 31"/>
+          <p:cNvPicPr>
+            <a:picLocks noChangeAspect="1"/>
+          </p:cNvPicPr>
+          <p:nvPr/>
+        </p:nvPicPr>
+        <p:blipFill>
+          <a:blip r:embed="rId3"/>
+          <a:stretch>
+            <a:fillRect/>
+          </a:stretch>
+        </p:blipFill>
+        <p:spPr>
+          <a:xfrm>
+            <a:off x="3506237" y="5330862"/>
+            <a:ext cx="4647060" cy="548730"/>
+          </a:xfrm>
+          <a:prstGeom prst="rect">
+            <a:avLst/>
+          </a:prstGeom>
+        </p:spPr>
+      </p:pic>
+      <p:sp>
+        <p:nvSpPr>
+          <p:cNvPr id="33" name="ZoneTexte 32"/>
+          <p:cNvSpPr txBox="1"/>
+          <p:nvPr/>
+        </p:nvSpPr>
+        <p:spPr>
+          <a:xfrm>
+            <a:off x="2513081" y="3539928"/>
+            <a:ext cx="910827" cy="246221"/>
+          </a:xfrm>
+          <a:prstGeom prst="rect">
+            <a:avLst/>
+          </a:prstGeom>
+          <a:noFill/>
+        </p:spPr>
+        <p:txBody>
+          <a:bodyPr wrap="none" rtlCol="0">
+            <a:spAutoFit/>
+          </a:bodyPr>
+          <a:lstStyle/>
+          <a:p>
+            <a:pPr algn="ctr"/>
+            <a:r>
+              <a:rPr lang="en-GB" sz="1000" b="1" dirty="0" smtClean="0"/>
+              <a:t>Pyramid apex</a:t>
+            </a:r>
+            <a:endParaRPr lang="en-GB" sz="1000" b="1" dirty="0"/>
+          </a:p>
+        </p:txBody>
+      </p:sp>
+    </p:spTree>
+    <p:extLst>
+      <p:ext uri="{BB962C8B-B14F-4D97-AF65-F5344CB8AC3E}">
+        <p14:creationId xmlns:p14="http://schemas.microsoft.com/office/powerpoint/2010/main" val="2515465048"/>
       </p:ext>
     </p:extLst>
   </p:cSld>

</xml_diff>

<commit_message>
Design with the ADC made of air and the science path
This version contains all the optical elements needed in paraxial mode.
The Zemax design is with 20° angle for the OAPs
The report does not have the section explaning about the necessity or not of a field correction lens.
</commit_message>
<xml_diff>
--- a/20180518_AO_design_report/images/images_sketch.pptx
+++ b/20180518_AO_design_report/images/images_sketch.pptx
@@ -5,7 +5,7 @@
     <p:sldMasterId id="2147483648" r:id="rId1"/>
   </p:sldMasterIdLst>
   <p:notesMasterIdLst>
-    <p:notesMasterId r:id="rId12"/>
+    <p:notesMasterId r:id="rId15"/>
   </p:notesMasterIdLst>
   <p:sldIdLst>
     <p:sldId id="256" r:id="rId2"/>
@@ -18,6 +18,9 @@
     <p:sldId id="263" r:id="rId9"/>
     <p:sldId id="264" r:id="rId10"/>
     <p:sldId id="265" r:id="rId11"/>
+    <p:sldId id="266" r:id="rId12"/>
+    <p:sldId id="267" r:id="rId13"/>
+    <p:sldId id="268" r:id="rId14"/>
   </p:sldIdLst>
   <p:sldSz cx="12192000" cy="6858000"/>
   <p:notesSz cx="6858000" cy="9144000"/>
@@ -131,6 +134,9 @@
             <p14:sldId id="263"/>
             <p14:sldId id="264"/>
             <p14:sldId id="265"/>
+            <p14:sldId id="266"/>
+            <p14:sldId id="267"/>
+            <p14:sldId id="268"/>
           </p14:sldIdLst>
         </p14:section>
       </p14:sectionLst>
@@ -224,7 +230,7 @@
           <a:p>
             <a:fld id="{8EDEE2E2-4BE4-41CA-94FC-BC9DC2A64380}" type="datetimeFigureOut">
               <a:rPr lang="en-GB" smtClean="0"/>
-              <a:t>01/06/2018</a:t>
+              <a:t>05/06/2018</a:t>
             </a:fld>
             <a:endParaRPr lang="en-GB"/>
           </a:p>
@@ -623,7 +629,7 @@
           <a:p>
             <a:fld id="{24AF4860-EF53-429F-9816-8C3FCB6EDEF9}" type="datetimeFigureOut">
               <a:rPr lang="en-GB" smtClean="0"/>
-              <a:t>01/06/2018</a:t>
+              <a:t>05/06/2018</a:t>
             </a:fld>
             <a:endParaRPr lang="en-GB"/>
           </a:p>
@@ -793,7 +799,7 @@
           <a:p>
             <a:fld id="{24AF4860-EF53-429F-9816-8C3FCB6EDEF9}" type="datetimeFigureOut">
               <a:rPr lang="en-GB" smtClean="0"/>
-              <a:t>01/06/2018</a:t>
+              <a:t>05/06/2018</a:t>
             </a:fld>
             <a:endParaRPr lang="en-GB"/>
           </a:p>
@@ -973,7 +979,7 @@
           <a:p>
             <a:fld id="{24AF4860-EF53-429F-9816-8C3FCB6EDEF9}" type="datetimeFigureOut">
               <a:rPr lang="en-GB" smtClean="0"/>
-              <a:t>01/06/2018</a:t>
+              <a:t>05/06/2018</a:t>
             </a:fld>
             <a:endParaRPr lang="en-GB"/>
           </a:p>
@@ -1143,7 +1149,7 @@
           <a:p>
             <a:fld id="{24AF4860-EF53-429F-9816-8C3FCB6EDEF9}" type="datetimeFigureOut">
               <a:rPr lang="en-GB" smtClean="0"/>
-              <a:t>01/06/2018</a:t>
+              <a:t>05/06/2018</a:t>
             </a:fld>
             <a:endParaRPr lang="en-GB"/>
           </a:p>
@@ -1389,7 +1395,7 @@
           <a:p>
             <a:fld id="{24AF4860-EF53-429F-9816-8C3FCB6EDEF9}" type="datetimeFigureOut">
               <a:rPr lang="en-GB" smtClean="0"/>
-              <a:t>01/06/2018</a:t>
+              <a:t>05/06/2018</a:t>
             </a:fld>
             <a:endParaRPr lang="en-GB"/>
           </a:p>
@@ -1621,7 +1627,7 @@
           <a:p>
             <a:fld id="{24AF4860-EF53-429F-9816-8C3FCB6EDEF9}" type="datetimeFigureOut">
               <a:rPr lang="en-GB" smtClean="0"/>
-              <a:t>01/06/2018</a:t>
+              <a:t>05/06/2018</a:t>
             </a:fld>
             <a:endParaRPr lang="en-GB"/>
           </a:p>
@@ -1988,7 +1994,7 @@
           <a:p>
             <a:fld id="{24AF4860-EF53-429F-9816-8C3FCB6EDEF9}" type="datetimeFigureOut">
               <a:rPr lang="en-GB" smtClean="0"/>
-              <a:t>01/06/2018</a:t>
+              <a:t>05/06/2018</a:t>
             </a:fld>
             <a:endParaRPr lang="en-GB"/>
           </a:p>
@@ -2106,7 +2112,7 @@
           <a:p>
             <a:fld id="{24AF4860-EF53-429F-9816-8C3FCB6EDEF9}" type="datetimeFigureOut">
               <a:rPr lang="en-GB" smtClean="0"/>
-              <a:t>01/06/2018</a:t>
+              <a:t>05/06/2018</a:t>
             </a:fld>
             <a:endParaRPr lang="en-GB"/>
           </a:p>
@@ -2201,7 +2207,7 @@
           <a:p>
             <a:fld id="{24AF4860-EF53-429F-9816-8C3FCB6EDEF9}" type="datetimeFigureOut">
               <a:rPr lang="en-GB" smtClean="0"/>
-              <a:t>01/06/2018</a:t>
+              <a:t>05/06/2018</a:t>
             </a:fld>
             <a:endParaRPr lang="en-GB"/>
           </a:p>
@@ -2478,7 +2484,7 @@
           <a:p>
             <a:fld id="{24AF4860-EF53-429F-9816-8C3FCB6EDEF9}" type="datetimeFigureOut">
               <a:rPr lang="en-GB" smtClean="0"/>
-              <a:t>01/06/2018</a:t>
+              <a:t>05/06/2018</a:t>
             </a:fld>
             <a:endParaRPr lang="en-GB"/>
           </a:p>
@@ -2731,7 +2737,7 @@
           <a:p>
             <a:fld id="{24AF4860-EF53-429F-9816-8C3FCB6EDEF9}" type="datetimeFigureOut">
               <a:rPr lang="en-GB" smtClean="0"/>
-              <a:t>01/06/2018</a:t>
+              <a:t>05/06/2018</a:t>
             </a:fld>
             <a:endParaRPr lang="en-GB"/>
           </a:p>
@@ -2944,7 +2950,7 @@
           <a:p>
             <a:fld id="{24AF4860-EF53-429F-9816-8C3FCB6EDEF9}" type="datetimeFigureOut">
               <a:rPr lang="en-GB" smtClean="0"/>
-              <a:t>01/06/2018</a:t>
+              <a:t>05/06/2018</a:t>
             </a:fld>
             <a:endParaRPr lang="en-GB"/>
           </a:p>
@@ -4884,11 +4890,7 @@
           <a:p>
             <a:r>
               <a:rPr lang="en-GB" sz="1000" b="1" dirty="0" smtClean="0"/>
-              <a:t>mirror </a:t>
-            </a:r>
-            <a:r>
-              <a:rPr lang="en-GB" sz="1000" b="1" dirty="0" smtClean="0"/>
-              <a:t>2</a:t>
+              <a:t>mirror 2</a:t>
             </a:r>
             <a:endParaRPr lang="en-GB" sz="1000" b="1" dirty="0"/>
           </a:p>
@@ -4898,6 +4900,2616 @@
     <p:extLst>
       <p:ext uri="{BB962C8B-B14F-4D97-AF65-F5344CB8AC3E}">
         <p14:creationId xmlns:p14="http://schemas.microsoft.com/office/powerpoint/2010/main" val="665358164"/>
+      </p:ext>
+    </p:extLst>
+  </p:cSld>
+  <p:clrMapOvr>
+    <a:masterClrMapping/>
+  </p:clrMapOvr>
+</p:sld>
+</file>
+
+<file path=ppt/slides/slide11.xml><?xml version="1.0" encoding="utf-8"?>
+<p:sld xmlns:a="http://schemas.openxmlformats.org/drawingml/2006/main" xmlns:r="http://schemas.openxmlformats.org/officeDocument/2006/relationships" xmlns:p="http://schemas.openxmlformats.org/presentationml/2006/main">
+  <p:cSld>
+    <p:spTree>
+      <p:nvGrpSpPr>
+        <p:cNvPr id="1" name=""/>
+        <p:cNvGrpSpPr/>
+        <p:nvPr/>
+      </p:nvGrpSpPr>
+      <p:grpSpPr>
+        <a:xfrm>
+          <a:off x="0" y="0"/>
+          <a:ext cx="0" cy="0"/>
+          <a:chOff x="0" y="0"/>
+          <a:chExt cx="0" cy="0"/>
+        </a:xfrm>
+      </p:grpSpPr>
+      <p:sp>
+        <p:nvSpPr>
+          <p:cNvPr id="51" name="Rectangle 50"/>
+          <p:cNvSpPr/>
+          <p:nvPr/>
+        </p:nvSpPr>
+        <p:spPr>
+          <a:xfrm>
+            <a:off x="6847654" y="-561958"/>
+            <a:ext cx="5362575" cy="1097520"/>
+          </a:xfrm>
+          <a:prstGeom prst="rect">
+            <a:avLst/>
+          </a:prstGeom>
+          <a:solidFill>
+            <a:schemeClr val="bg1"/>
+          </a:solidFill>
+          <a:ln>
+            <a:noFill/>
+          </a:ln>
+        </p:spPr>
+        <p:style>
+          <a:lnRef idx="2">
+            <a:schemeClr val="accent1">
+              <a:shade val="50000"/>
+            </a:schemeClr>
+          </a:lnRef>
+          <a:fillRef idx="1">
+            <a:schemeClr val="accent1"/>
+          </a:fillRef>
+          <a:effectRef idx="0">
+            <a:schemeClr val="accent1"/>
+          </a:effectRef>
+          <a:fontRef idx="minor">
+            <a:schemeClr val="lt1"/>
+          </a:fontRef>
+        </p:style>
+        <p:txBody>
+          <a:bodyPr rtlCol="0" anchor="ctr"/>
+          <a:lstStyle/>
+          <a:p>
+            <a:pPr algn="ctr"/>
+            <a:endParaRPr lang="en-GB"/>
+          </a:p>
+        </p:txBody>
+      </p:sp>
+      <p:sp>
+        <p:nvSpPr>
+          <p:cNvPr id="27" name="Rectangle 26"/>
+          <p:cNvSpPr/>
+          <p:nvPr/>
+        </p:nvSpPr>
+        <p:spPr>
+          <a:xfrm>
+            <a:off x="1103540" y="6382016"/>
+            <a:ext cx="10629900" cy="1304925"/>
+          </a:xfrm>
+          <a:prstGeom prst="rect">
+            <a:avLst/>
+          </a:prstGeom>
+          <a:solidFill>
+            <a:schemeClr val="bg1"/>
+          </a:solidFill>
+          <a:ln>
+            <a:noFill/>
+          </a:ln>
+        </p:spPr>
+        <p:style>
+          <a:lnRef idx="2">
+            <a:schemeClr val="accent1">
+              <a:shade val="50000"/>
+            </a:schemeClr>
+          </a:lnRef>
+          <a:fillRef idx="1">
+            <a:schemeClr val="accent1"/>
+          </a:fillRef>
+          <a:effectRef idx="0">
+            <a:schemeClr val="accent1"/>
+          </a:effectRef>
+          <a:fontRef idx="minor">
+            <a:schemeClr val="lt1"/>
+          </a:fontRef>
+        </p:style>
+        <p:txBody>
+          <a:bodyPr rtlCol="0" anchor="ctr"/>
+          <a:lstStyle/>
+          <a:p>
+            <a:pPr algn="ctr"/>
+            <a:endParaRPr lang="en-GB"/>
+          </a:p>
+        </p:txBody>
+      </p:sp>
+      <p:pic>
+        <p:nvPicPr>
+          <p:cNvPr id="39" name="Image 38"/>
+          <p:cNvPicPr>
+            <a:picLocks noChangeAspect="1"/>
+          </p:cNvPicPr>
+          <p:nvPr/>
+        </p:nvPicPr>
+        <p:blipFill>
+          <a:blip r:embed="rId2"/>
+          <a:stretch>
+            <a:fillRect/>
+          </a:stretch>
+        </p:blipFill>
+        <p:spPr>
+          <a:xfrm>
+            <a:off x="2475816" y="-148570"/>
+            <a:ext cx="11026708" cy="7099086"/>
+          </a:xfrm>
+          <a:prstGeom prst="rect">
+            <a:avLst/>
+          </a:prstGeom>
+        </p:spPr>
+      </p:pic>
+      <p:sp>
+        <p:nvSpPr>
+          <p:cNvPr id="5" name="ZoneTexte 4"/>
+          <p:cNvSpPr txBox="1"/>
+          <p:nvPr/>
+        </p:nvSpPr>
+        <p:spPr>
+          <a:xfrm>
+            <a:off x="2841662" y="3866848"/>
+            <a:ext cx="996876" cy="738664"/>
+          </a:xfrm>
+          <a:prstGeom prst="rect">
+            <a:avLst/>
+          </a:prstGeom>
+          <a:noFill/>
+        </p:spPr>
+        <p:txBody>
+          <a:bodyPr wrap="none" rtlCol="0">
+            <a:spAutoFit/>
+          </a:bodyPr>
+          <a:lstStyle/>
+          <a:p>
+            <a:pPr algn="ctr"/>
+            <a:r>
+              <a:rPr lang="en-GB" sz="1400" b="1" dirty="0" smtClean="0"/>
+              <a:t>Telescope</a:t>
+            </a:r>
+          </a:p>
+          <a:p>
+            <a:pPr algn="ctr"/>
+            <a:r>
+              <a:rPr lang="en-GB" sz="1400" b="1" dirty="0"/>
+              <a:t>f</a:t>
+            </a:r>
+            <a:r>
+              <a:rPr lang="en-GB" sz="1400" b="1" dirty="0" smtClean="0"/>
+              <a:t>ocal plane</a:t>
+            </a:r>
+          </a:p>
+          <a:p>
+            <a:pPr algn="ctr"/>
+            <a:r>
+              <a:rPr lang="en-GB" sz="1400" b="1" dirty="0" smtClean="0"/>
+              <a:t>(FoV = 1’)</a:t>
+            </a:r>
+            <a:endParaRPr lang="en-GB" sz="1400" b="1" dirty="0"/>
+          </a:p>
+        </p:txBody>
+      </p:sp>
+      <p:sp>
+        <p:nvSpPr>
+          <p:cNvPr id="6" name="ZoneTexte 5"/>
+          <p:cNvSpPr txBox="1"/>
+          <p:nvPr/>
+        </p:nvSpPr>
+        <p:spPr>
+          <a:xfrm>
+            <a:off x="4621495" y="4838277"/>
+            <a:ext cx="1310423" cy="815608"/>
+          </a:xfrm>
+          <a:prstGeom prst="rect">
+            <a:avLst/>
+          </a:prstGeom>
+          <a:noFill/>
+        </p:spPr>
+        <p:txBody>
+          <a:bodyPr wrap="none" rtlCol="0">
+            <a:spAutoFit/>
+          </a:bodyPr>
+          <a:lstStyle/>
+          <a:p>
+            <a:pPr algn="ctr"/>
+            <a:r>
+              <a:rPr lang="en-GB" sz="1400" b="1" dirty="0" smtClean="0"/>
+              <a:t>Dichroic mirror</a:t>
+            </a:r>
+          </a:p>
+          <a:p>
+            <a:pPr algn="ctr"/>
+            <a:r>
+              <a:rPr lang="en-GB" sz="1050" b="1" dirty="0" smtClean="0"/>
+              <a:t>@Intermediate</a:t>
+            </a:r>
+          </a:p>
+          <a:p>
+            <a:pPr algn="ctr"/>
+            <a:r>
+              <a:rPr lang="en-GB" sz="1050" b="1" dirty="0"/>
+              <a:t>f</a:t>
+            </a:r>
+            <a:r>
+              <a:rPr lang="en-GB" sz="1050" b="1" dirty="0" smtClean="0"/>
+              <a:t>ocal plane</a:t>
+            </a:r>
+          </a:p>
+          <a:p>
+            <a:pPr algn="ctr"/>
+            <a:r>
+              <a:rPr lang="en-GB" sz="1050" b="1" dirty="0" smtClean="0"/>
+              <a:t>(FoV = 1’)</a:t>
+            </a:r>
+            <a:endParaRPr lang="en-GB" sz="1050" b="1" dirty="0"/>
+          </a:p>
+        </p:txBody>
+      </p:sp>
+      <p:sp>
+        <p:nvSpPr>
+          <p:cNvPr id="9" name="ZoneTexte 8"/>
+          <p:cNvSpPr txBox="1"/>
+          <p:nvPr/>
+        </p:nvSpPr>
+        <p:spPr>
+          <a:xfrm>
+            <a:off x="2812250" y="2564857"/>
+            <a:ext cx="455574" cy="307777"/>
+          </a:xfrm>
+          <a:prstGeom prst="rect">
+            <a:avLst/>
+          </a:prstGeom>
+          <a:noFill/>
+        </p:spPr>
+        <p:txBody>
+          <a:bodyPr wrap="none" rtlCol="0">
+            <a:spAutoFit/>
+          </a:bodyPr>
+          <a:lstStyle/>
+          <a:p>
+            <a:r>
+              <a:rPr lang="en-GB" sz="1400" b="1" dirty="0" smtClean="0"/>
+              <a:t>DM</a:t>
+            </a:r>
+            <a:endParaRPr lang="en-GB" sz="1400" b="1" dirty="0"/>
+          </a:p>
+        </p:txBody>
+      </p:sp>
+      <p:sp>
+        <p:nvSpPr>
+          <p:cNvPr id="10" name="ZoneTexte 9"/>
+          <p:cNvSpPr txBox="1"/>
+          <p:nvPr/>
+        </p:nvSpPr>
+        <p:spPr>
+          <a:xfrm>
+            <a:off x="6418490" y="3740979"/>
+            <a:ext cx="600614" cy="307777"/>
+          </a:xfrm>
+          <a:prstGeom prst="rect">
+            <a:avLst/>
+          </a:prstGeom>
+          <a:noFill/>
+        </p:spPr>
+        <p:txBody>
+          <a:bodyPr wrap="none" rtlCol="0">
+            <a:spAutoFit/>
+          </a:bodyPr>
+          <a:lstStyle/>
+          <a:p>
+            <a:r>
+              <a:rPr lang="en-GB" sz="1400" b="1" dirty="0" smtClean="0"/>
+              <a:t>OAP0</a:t>
+            </a:r>
+            <a:endParaRPr lang="en-GB" sz="1400" b="1" dirty="0"/>
+          </a:p>
+        </p:txBody>
+      </p:sp>
+      <p:sp>
+        <p:nvSpPr>
+          <p:cNvPr id="11" name="ZoneTexte 10"/>
+          <p:cNvSpPr txBox="1"/>
+          <p:nvPr/>
+        </p:nvSpPr>
+        <p:spPr>
+          <a:xfrm>
+            <a:off x="3829594" y="1755873"/>
+            <a:ext cx="600614" cy="307777"/>
+          </a:xfrm>
+          <a:prstGeom prst="rect">
+            <a:avLst/>
+          </a:prstGeom>
+          <a:noFill/>
+        </p:spPr>
+        <p:txBody>
+          <a:bodyPr wrap="none" rtlCol="0">
+            <a:spAutoFit/>
+          </a:bodyPr>
+          <a:lstStyle/>
+          <a:p>
+            <a:r>
+              <a:rPr lang="en-GB" sz="1400" b="1" dirty="0" smtClean="0"/>
+              <a:t>OAP1</a:t>
+            </a:r>
+            <a:endParaRPr lang="en-GB" sz="1400" b="1" dirty="0"/>
+          </a:p>
+        </p:txBody>
+      </p:sp>
+      <p:sp>
+        <p:nvSpPr>
+          <p:cNvPr id="12" name="ZoneTexte 11"/>
+          <p:cNvSpPr txBox="1"/>
+          <p:nvPr/>
+        </p:nvSpPr>
+        <p:spPr>
+          <a:xfrm>
+            <a:off x="5637330" y="2628780"/>
+            <a:ext cx="793230" cy="523220"/>
+          </a:xfrm>
+          <a:prstGeom prst="rect">
+            <a:avLst/>
+          </a:prstGeom>
+          <a:noFill/>
+        </p:spPr>
+        <p:txBody>
+          <a:bodyPr wrap="none" rtlCol="0">
+            <a:spAutoFit/>
+          </a:bodyPr>
+          <a:lstStyle/>
+          <a:p>
+            <a:r>
+              <a:rPr lang="en-GB" sz="1400" b="1" dirty="0" smtClean="0"/>
+              <a:t>Folding </a:t>
+            </a:r>
+          </a:p>
+          <a:p>
+            <a:r>
+              <a:rPr lang="en-GB" sz="1400" b="1" dirty="0" smtClean="0"/>
+              <a:t>mirror 1</a:t>
+            </a:r>
+            <a:endParaRPr lang="en-GB" sz="1400" b="1" dirty="0"/>
+          </a:p>
+        </p:txBody>
+      </p:sp>
+      <p:sp>
+        <p:nvSpPr>
+          <p:cNvPr id="13" name="ZoneTexte 12"/>
+          <p:cNvSpPr txBox="1"/>
+          <p:nvPr/>
+        </p:nvSpPr>
+        <p:spPr>
+          <a:xfrm>
+            <a:off x="5178574" y="5702632"/>
+            <a:ext cx="1120820" cy="307777"/>
+          </a:xfrm>
+          <a:prstGeom prst="rect">
+            <a:avLst/>
+          </a:prstGeom>
+          <a:noFill/>
+        </p:spPr>
+        <p:txBody>
+          <a:bodyPr wrap="none" rtlCol="0">
+            <a:spAutoFit/>
+          </a:bodyPr>
+          <a:lstStyle/>
+          <a:p>
+            <a:r>
+              <a:rPr lang="en-GB" sz="1400" b="1" dirty="0" smtClean="0"/>
+              <a:t>Imaging lens</a:t>
+            </a:r>
+            <a:endParaRPr lang="en-GB" sz="1400" b="1" dirty="0"/>
+          </a:p>
+        </p:txBody>
+      </p:sp>
+      <p:sp>
+        <p:nvSpPr>
+          <p:cNvPr id="14" name="ZoneTexte 13"/>
+          <p:cNvSpPr txBox="1"/>
+          <p:nvPr/>
+        </p:nvSpPr>
+        <p:spPr>
+          <a:xfrm>
+            <a:off x="6775433" y="6337778"/>
+            <a:ext cx="1268809" cy="523220"/>
+          </a:xfrm>
+          <a:prstGeom prst="rect">
+            <a:avLst/>
+          </a:prstGeom>
+          <a:noFill/>
+        </p:spPr>
+        <p:txBody>
+          <a:bodyPr wrap="none" rtlCol="0">
+            <a:spAutoFit/>
+          </a:bodyPr>
+          <a:lstStyle/>
+          <a:p>
+            <a:pPr algn="ctr"/>
+            <a:r>
+              <a:rPr lang="en-GB" sz="1400" b="1" dirty="0" smtClean="0"/>
+              <a:t>TT modulation</a:t>
+            </a:r>
+          </a:p>
+          <a:p>
+            <a:pPr algn="ctr"/>
+            <a:r>
+              <a:rPr lang="en-GB" sz="1400" b="1" dirty="0" smtClean="0"/>
+              <a:t>mirror</a:t>
+            </a:r>
+            <a:endParaRPr lang="en-GB" sz="1400" b="1" dirty="0"/>
+          </a:p>
+        </p:txBody>
+      </p:sp>
+      <p:sp>
+        <p:nvSpPr>
+          <p:cNvPr id="15" name="ZoneTexte 14"/>
+          <p:cNvSpPr txBox="1"/>
+          <p:nvPr/>
+        </p:nvSpPr>
+        <p:spPr>
+          <a:xfrm>
+            <a:off x="7791055" y="2698856"/>
+            <a:ext cx="1337803" cy="307777"/>
+          </a:xfrm>
+          <a:prstGeom prst="rect">
+            <a:avLst/>
+          </a:prstGeom>
+          <a:noFill/>
+        </p:spPr>
+        <p:txBody>
+          <a:bodyPr wrap="none" rtlCol="0">
+            <a:spAutoFit/>
+          </a:bodyPr>
+          <a:lstStyle/>
+          <a:p>
+            <a:pPr algn="ctr"/>
+            <a:r>
+              <a:rPr lang="en-GB" sz="1400" b="1" dirty="0" smtClean="0"/>
+              <a:t>Pyramid prisms</a:t>
+            </a:r>
+            <a:endParaRPr lang="en-GB" sz="1400" b="1" dirty="0"/>
+          </a:p>
+        </p:txBody>
+      </p:sp>
+      <p:sp>
+        <p:nvSpPr>
+          <p:cNvPr id="16" name="ZoneTexte 15"/>
+          <p:cNvSpPr txBox="1"/>
+          <p:nvPr/>
+        </p:nvSpPr>
+        <p:spPr>
+          <a:xfrm>
+            <a:off x="8308977" y="1531665"/>
+            <a:ext cx="930576" cy="307777"/>
+          </a:xfrm>
+          <a:prstGeom prst="rect">
+            <a:avLst/>
+          </a:prstGeom>
+          <a:noFill/>
+        </p:spPr>
+        <p:txBody>
+          <a:bodyPr wrap="none" rtlCol="0">
+            <a:spAutoFit/>
+          </a:bodyPr>
+          <a:lstStyle/>
+          <a:p>
+            <a:pPr algn="ctr"/>
+            <a:r>
+              <a:rPr lang="en-GB" sz="1400" b="1" dirty="0" smtClean="0"/>
+              <a:t>Relay lens</a:t>
+            </a:r>
+            <a:endParaRPr lang="en-GB" sz="1400" b="1" dirty="0"/>
+          </a:p>
+        </p:txBody>
+      </p:sp>
+      <p:sp>
+        <p:nvSpPr>
+          <p:cNvPr id="17" name="ZoneTexte 16"/>
+          <p:cNvSpPr txBox="1"/>
+          <p:nvPr/>
+        </p:nvSpPr>
+        <p:spPr>
+          <a:xfrm>
+            <a:off x="7855775" y="314552"/>
+            <a:ext cx="815929" cy="523220"/>
+          </a:xfrm>
+          <a:prstGeom prst="rect">
+            <a:avLst/>
+          </a:prstGeom>
+          <a:noFill/>
+        </p:spPr>
+        <p:txBody>
+          <a:bodyPr wrap="none" rtlCol="0">
+            <a:spAutoFit/>
+          </a:bodyPr>
+          <a:lstStyle/>
+          <a:p>
+            <a:pPr algn="ctr"/>
+            <a:r>
+              <a:rPr lang="en-GB" sz="1400" b="1" dirty="0" smtClean="0"/>
+              <a:t>CCD</a:t>
+            </a:r>
+          </a:p>
+          <a:p>
+            <a:pPr algn="ctr"/>
+            <a:r>
+              <a:rPr lang="en-GB" sz="1400" b="1" dirty="0" smtClean="0"/>
+              <a:t>detector</a:t>
+            </a:r>
+            <a:endParaRPr lang="en-GB" sz="1400" b="1" dirty="0"/>
+          </a:p>
+        </p:txBody>
+      </p:sp>
+      <p:sp>
+        <p:nvSpPr>
+          <p:cNvPr id="18" name="ZoneTexte 17"/>
+          <p:cNvSpPr txBox="1"/>
+          <p:nvPr/>
+        </p:nvSpPr>
+        <p:spPr>
+          <a:xfrm>
+            <a:off x="3967736" y="4050642"/>
+            <a:ext cx="793230" cy="523220"/>
+          </a:xfrm>
+          <a:prstGeom prst="rect">
+            <a:avLst/>
+          </a:prstGeom>
+          <a:noFill/>
+        </p:spPr>
+        <p:txBody>
+          <a:bodyPr wrap="none" rtlCol="0">
+            <a:spAutoFit/>
+          </a:bodyPr>
+          <a:lstStyle/>
+          <a:p>
+            <a:r>
+              <a:rPr lang="en-GB" sz="1400" b="1" dirty="0" smtClean="0"/>
+              <a:t>Folding </a:t>
+            </a:r>
+          </a:p>
+          <a:p>
+            <a:r>
+              <a:rPr lang="en-GB" sz="1400" b="1" dirty="0" smtClean="0"/>
+              <a:t>mirror 2</a:t>
+            </a:r>
+            <a:endParaRPr lang="en-GB" sz="1400" b="1" dirty="0"/>
+          </a:p>
+        </p:txBody>
+      </p:sp>
+      <p:sp>
+        <p:nvSpPr>
+          <p:cNvPr id="20" name="ZoneTexte 19"/>
+          <p:cNvSpPr txBox="1"/>
+          <p:nvPr/>
+        </p:nvSpPr>
+        <p:spPr>
+          <a:xfrm>
+            <a:off x="5443880" y="6137723"/>
+            <a:ext cx="1180130" cy="461665"/>
+          </a:xfrm>
+          <a:prstGeom prst="rect">
+            <a:avLst/>
+          </a:prstGeom>
+          <a:noFill/>
+        </p:spPr>
+        <p:txBody>
+          <a:bodyPr wrap="none" rtlCol="0">
+            <a:spAutoFit/>
+          </a:bodyPr>
+          <a:lstStyle/>
+          <a:p>
+            <a:pPr algn="ctr"/>
+            <a:r>
+              <a:rPr lang="en-GB" sz="1400" b="1" dirty="0" smtClean="0"/>
+              <a:t>ADC</a:t>
+            </a:r>
+          </a:p>
+          <a:p>
+            <a:pPr algn="ctr"/>
+            <a:r>
+              <a:rPr lang="en-GB" sz="1000" b="1" dirty="0" smtClean="0"/>
+              <a:t>compound prism 1</a:t>
+            </a:r>
+            <a:endParaRPr lang="en-GB" sz="1000" b="1" dirty="0"/>
+          </a:p>
+        </p:txBody>
+      </p:sp>
+      <p:sp>
+        <p:nvSpPr>
+          <p:cNvPr id="21" name="ZoneTexte 20"/>
+          <p:cNvSpPr txBox="1"/>
+          <p:nvPr/>
+        </p:nvSpPr>
+        <p:spPr>
+          <a:xfrm>
+            <a:off x="6918646" y="5838003"/>
+            <a:ext cx="1180130" cy="461665"/>
+          </a:xfrm>
+          <a:prstGeom prst="rect">
+            <a:avLst/>
+          </a:prstGeom>
+          <a:noFill/>
+        </p:spPr>
+        <p:txBody>
+          <a:bodyPr wrap="none" rtlCol="0">
+            <a:spAutoFit/>
+          </a:bodyPr>
+          <a:lstStyle/>
+          <a:p>
+            <a:pPr algn="ctr"/>
+            <a:r>
+              <a:rPr lang="en-GB" sz="1400" b="1" dirty="0" smtClean="0"/>
+              <a:t>ADC</a:t>
+            </a:r>
+          </a:p>
+          <a:p>
+            <a:pPr algn="ctr"/>
+            <a:r>
+              <a:rPr lang="en-GB" sz="1000" b="1" dirty="0" smtClean="0"/>
+              <a:t>compound prism 2</a:t>
+            </a:r>
+            <a:endParaRPr lang="en-GB" sz="1000" b="1" dirty="0"/>
+          </a:p>
+        </p:txBody>
+      </p:sp>
+      <p:grpSp>
+        <p:nvGrpSpPr>
+          <p:cNvPr id="26" name="Groupe 25"/>
+          <p:cNvGrpSpPr/>
+          <p:nvPr/>
+        </p:nvGrpSpPr>
+        <p:grpSpPr>
+          <a:xfrm>
+            <a:off x="7536986" y="2715526"/>
+            <a:ext cx="290214" cy="191292"/>
+            <a:chOff x="9574923" y="2683345"/>
+            <a:chExt cx="290214" cy="191292"/>
+          </a:xfrm>
+        </p:grpSpPr>
+        <p:sp>
+          <p:nvSpPr>
+            <p:cNvPr id="22" name="Triangle isocèle 21"/>
+            <p:cNvSpPr/>
+            <p:nvPr/>
+          </p:nvSpPr>
+          <p:spPr>
+            <a:xfrm rot="1013070" flipV="1">
+              <a:off x="9574923" y="2810026"/>
+              <a:ext cx="248575" cy="64611"/>
+            </a:xfrm>
+            <a:prstGeom prst="triangle">
+              <a:avLst/>
+            </a:prstGeom>
+            <a:noFill/>
+            <a:ln>
+              <a:solidFill>
+                <a:schemeClr val="tx1"/>
+              </a:solidFill>
+            </a:ln>
+          </p:spPr>
+          <p:style>
+            <a:lnRef idx="2">
+              <a:schemeClr val="accent1">
+                <a:shade val="50000"/>
+              </a:schemeClr>
+            </a:lnRef>
+            <a:fillRef idx="1">
+              <a:schemeClr val="accent1"/>
+            </a:fillRef>
+            <a:effectRef idx="0">
+              <a:schemeClr val="accent1"/>
+            </a:effectRef>
+            <a:fontRef idx="minor">
+              <a:schemeClr val="lt1"/>
+            </a:fontRef>
+          </p:style>
+          <p:txBody>
+            <a:bodyPr rtlCol="0" anchor="ctr"/>
+            <a:lstStyle/>
+            <a:p>
+              <a:pPr algn="ctr"/>
+              <a:endParaRPr lang="en-GB"/>
+            </a:p>
+          </p:txBody>
+        </p:sp>
+        <p:sp>
+          <p:nvSpPr>
+            <p:cNvPr id="23" name="Triangle isocèle 22"/>
+            <p:cNvSpPr/>
+            <p:nvPr/>
+          </p:nvSpPr>
+          <p:spPr>
+            <a:xfrm rot="1013070">
+              <a:off x="9616562" y="2683345"/>
+              <a:ext cx="248575" cy="64398"/>
+            </a:xfrm>
+            <a:prstGeom prst="triangle">
+              <a:avLst/>
+            </a:prstGeom>
+            <a:noFill/>
+            <a:ln>
+              <a:solidFill>
+                <a:schemeClr val="tx1"/>
+              </a:solidFill>
+            </a:ln>
+          </p:spPr>
+          <p:style>
+            <a:lnRef idx="2">
+              <a:schemeClr val="accent1">
+                <a:shade val="50000"/>
+              </a:schemeClr>
+            </a:lnRef>
+            <a:fillRef idx="1">
+              <a:schemeClr val="accent1"/>
+            </a:fillRef>
+            <a:effectRef idx="0">
+              <a:schemeClr val="accent1"/>
+            </a:effectRef>
+            <a:fontRef idx="minor">
+              <a:schemeClr val="lt1"/>
+            </a:fontRef>
+          </p:style>
+          <p:txBody>
+            <a:bodyPr rtlCol="0" anchor="ctr"/>
+            <a:lstStyle/>
+            <a:p>
+              <a:pPr algn="ctr"/>
+              <a:endParaRPr lang="en-GB"/>
+            </a:p>
+          </p:txBody>
+        </p:sp>
+        <p:sp>
+          <p:nvSpPr>
+            <p:cNvPr id="24" name="Rectangle 23"/>
+            <p:cNvSpPr/>
+            <p:nvPr/>
+          </p:nvSpPr>
+          <p:spPr>
+            <a:xfrm rot="1002748">
+              <a:off x="9580954" y="2744206"/>
+              <a:ext cx="278119" cy="69121"/>
+            </a:xfrm>
+            <a:prstGeom prst="rect">
+              <a:avLst/>
+            </a:prstGeom>
+            <a:noFill/>
+            <a:ln>
+              <a:solidFill>
+                <a:schemeClr val="tx1"/>
+              </a:solidFill>
+            </a:ln>
+          </p:spPr>
+          <p:style>
+            <a:lnRef idx="2">
+              <a:schemeClr val="accent1">
+                <a:shade val="50000"/>
+              </a:schemeClr>
+            </a:lnRef>
+            <a:fillRef idx="1">
+              <a:schemeClr val="accent1"/>
+            </a:fillRef>
+            <a:effectRef idx="0">
+              <a:schemeClr val="accent1"/>
+            </a:effectRef>
+            <a:fontRef idx="minor">
+              <a:schemeClr val="lt1"/>
+            </a:fontRef>
+          </p:style>
+          <p:txBody>
+            <a:bodyPr rtlCol="0" anchor="ctr"/>
+            <a:lstStyle/>
+            <a:p>
+              <a:pPr algn="ctr"/>
+              <a:endParaRPr lang="en-GB"/>
+            </a:p>
+          </p:txBody>
+        </p:sp>
+      </p:grpSp>
+      <p:cxnSp>
+        <p:nvCxnSpPr>
+          <p:cNvPr id="29" name="Connecteur droit 28"/>
+          <p:cNvCxnSpPr/>
+          <p:nvPr/>
+        </p:nvCxnSpPr>
+        <p:spPr>
+          <a:xfrm>
+            <a:off x="6437703" y="6223581"/>
+            <a:ext cx="46440" cy="80849"/>
+          </a:xfrm>
+          <a:prstGeom prst="line">
+            <a:avLst/>
+          </a:prstGeom>
+          <a:ln>
+            <a:solidFill>
+              <a:schemeClr val="tx1"/>
+            </a:solidFill>
+          </a:ln>
+        </p:spPr>
+        <p:style>
+          <a:lnRef idx="1">
+            <a:schemeClr val="accent1"/>
+          </a:lnRef>
+          <a:fillRef idx="0">
+            <a:schemeClr val="accent1"/>
+          </a:fillRef>
+          <a:effectRef idx="0">
+            <a:schemeClr val="accent1"/>
+          </a:effectRef>
+          <a:fontRef idx="minor">
+            <a:schemeClr val="tx1"/>
+          </a:fontRef>
+        </p:style>
+      </p:cxnSp>
+      <p:cxnSp>
+        <p:nvCxnSpPr>
+          <p:cNvPr id="32" name="Connecteur droit 31"/>
+          <p:cNvCxnSpPr/>
+          <p:nvPr/>
+        </p:nvCxnSpPr>
+        <p:spPr>
+          <a:xfrm>
+            <a:off x="6577570" y="6155788"/>
+            <a:ext cx="46440" cy="80849"/>
+          </a:xfrm>
+          <a:prstGeom prst="line">
+            <a:avLst/>
+          </a:prstGeom>
+          <a:ln>
+            <a:solidFill>
+              <a:schemeClr val="tx1"/>
+            </a:solidFill>
+          </a:ln>
+        </p:spPr>
+        <p:style>
+          <a:lnRef idx="1">
+            <a:schemeClr val="accent1"/>
+          </a:lnRef>
+          <a:fillRef idx="0">
+            <a:schemeClr val="accent1"/>
+          </a:fillRef>
+          <a:effectRef idx="0">
+            <a:schemeClr val="accent1"/>
+          </a:effectRef>
+          <a:fontRef idx="minor">
+            <a:schemeClr val="tx1"/>
+          </a:fontRef>
+        </p:style>
+      </p:cxnSp>
+      <p:cxnSp>
+        <p:nvCxnSpPr>
+          <p:cNvPr id="33" name="Connecteur droit 32"/>
+          <p:cNvCxnSpPr/>
+          <p:nvPr/>
+        </p:nvCxnSpPr>
+        <p:spPr>
+          <a:xfrm flipH="1">
+            <a:off x="6858000" y="6124909"/>
+            <a:ext cx="28575" cy="102182"/>
+          </a:xfrm>
+          <a:prstGeom prst="line">
+            <a:avLst/>
+          </a:prstGeom>
+          <a:ln>
+            <a:solidFill>
+              <a:schemeClr val="tx1"/>
+            </a:solidFill>
+          </a:ln>
+        </p:spPr>
+        <p:style>
+          <a:lnRef idx="1">
+            <a:schemeClr val="accent1"/>
+          </a:lnRef>
+          <a:fillRef idx="0">
+            <a:schemeClr val="accent1"/>
+          </a:fillRef>
+          <a:effectRef idx="0">
+            <a:schemeClr val="accent1"/>
+          </a:effectRef>
+          <a:fontRef idx="minor">
+            <a:schemeClr val="tx1"/>
+          </a:fontRef>
+        </p:style>
+      </p:cxnSp>
+      <p:cxnSp>
+        <p:nvCxnSpPr>
+          <p:cNvPr id="36" name="Connecteur droit 35"/>
+          <p:cNvCxnSpPr/>
+          <p:nvPr/>
+        </p:nvCxnSpPr>
+        <p:spPr>
+          <a:xfrm flipH="1">
+            <a:off x="6712429" y="6082013"/>
+            <a:ext cx="28575" cy="102182"/>
+          </a:xfrm>
+          <a:prstGeom prst="line">
+            <a:avLst/>
+          </a:prstGeom>
+          <a:ln>
+            <a:solidFill>
+              <a:schemeClr val="tx1"/>
+            </a:solidFill>
+          </a:ln>
+        </p:spPr>
+        <p:style>
+          <a:lnRef idx="1">
+            <a:schemeClr val="accent1"/>
+          </a:lnRef>
+          <a:fillRef idx="0">
+            <a:schemeClr val="accent1"/>
+          </a:fillRef>
+          <a:effectRef idx="0">
+            <a:schemeClr val="accent1"/>
+          </a:effectRef>
+          <a:fontRef idx="minor">
+            <a:schemeClr val="tx1"/>
+          </a:fontRef>
+        </p:style>
+      </p:cxnSp>
+      <p:cxnSp>
+        <p:nvCxnSpPr>
+          <p:cNvPr id="38" name="Connecteur droit avec flèche 37"/>
+          <p:cNvCxnSpPr/>
+          <p:nvPr/>
+        </p:nvCxnSpPr>
+        <p:spPr>
+          <a:xfrm flipV="1">
+            <a:off x="2475816" y="7475851"/>
+            <a:ext cx="6431296" cy="1442"/>
+          </a:xfrm>
+          <a:prstGeom prst="straightConnector1">
+            <a:avLst/>
+          </a:prstGeom>
+          <a:ln>
+            <a:solidFill>
+              <a:schemeClr val="tx1"/>
+            </a:solidFill>
+            <a:headEnd type="triangle"/>
+            <a:tailEnd type="triangle"/>
+          </a:ln>
+        </p:spPr>
+        <p:style>
+          <a:lnRef idx="1">
+            <a:schemeClr val="accent1"/>
+          </a:lnRef>
+          <a:fillRef idx="0">
+            <a:schemeClr val="accent1"/>
+          </a:fillRef>
+          <a:effectRef idx="0">
+            <a:schemeClr val="accent1"/>
+          </a:effectRef>
+          <a:fontRef idx="minor">
+            <a:schemeClr val="tx1"/>
+          </a:fontRef>
+        </p:style>
+      </p:cxnSp>
+      <p:sp>
+        <p:nvSpPr>
+          <p:cNvPr id="40" name="Rectangle 39"/>
+          <p:cNvSpPr/>
+          <p:nvPr/>
+        </p:nvSpPr>
+        <p:spPr>
+          <a:xfrm>
+            <a:off x="1981654" y="-706767"/>
+            <a:ext cx="5362575" cy="1097520"/>
+          </a:xfrm>
+          <a:prstGeom prst="rect">
+            <a:avLst/>
+          </a:prstGeom>
+          <a:solidFill>
+            <a:schemeClr val="bg1"/>
+          </a:solidFill>
+          <a:ln>
+            <a:noFill/>
+          </a:ln>
+        </p:spPr>
+        <p:style>
+          <a:lnRef idx="2">
+            <a:schemeClr val="accent1">
+              <a:shade val="50000"/>
+            </a:schemeClr>
+          </a:lnRef>
+          <a:fillRef idx="1">
+            <a:schemeClr val="accent1"/>
+          </a:fillRef>
+          <a:effectRef idx="0">
+            <a:schemeClr val="accent1"/>
+          </a:effectRef>
+          <a:fontRef idx="minor">
+            <a:schemeClr val="lt1"/>
+          </a:fontRef>
+        </p:style>
+        <p:txBody>
+          <a:bodyPr rtlCol="0" anchor="ctr"/>
+          <a:lstStyle/>
+          <a:p>
+            <a:pPr algn="ctr"/>
+            <a:endParaRPr lang="en-GB"/>
+          </a:p>
+        </p:txBody>
+      </p:sp>
+      <p:sp>
+        <p:nvSpPr>
+          <p:cNvPr id="43" name="ZoneTexte 42"/>
+          <p:cNvSpPr txBox="1"/>
+          <p:nvPr/>
+        </p:nvSpPr>
+        <p:spPr>
+          <a:xfrm>
+            <a:off x="5282239" y="7194469"/>
+            <a:ext cx="461986" cy="307777"/>
+          </a:xfrm>
+          <a:prstGeom prst="rect">
+            <a:avLst/>
+          </a:prstGeom>
+          <a:noFill/>
+        </p:spPr>
+        <p:txBody>
+          <a:bodyPr wrap="none" rtlCol="0">
+            <a:spAutoFit/>
+          </a:bodyPr>
+          <a:lstStyle/>
+          <a:p>
+            <a:r>
+              <a:rPr lang="en-GB" sz="1400" b="1" dirty="0" smtClean="0"/>
+              <a:t>1 m</a:t>
+            </a:r>
+            <a:endParaRPr lang="en-GB" sz="1400" b="1" dirty="0"/>
+          </a:p>
+        </p:txBody>
+      </p:sp>
+      <p:sp>
+        <p:nvSpPr>
+          <p:cNvPr id="48" name="ZoneTexte 47"/>
+          <p:cNvSpPr txBox="1"/>
+          <p:nvPr/>
+        </p:nvSpPr>
+        <p:spPr>
+          <a:xfrm>
+            <a:off x="7970124" y="3751164"/>
+            <a:ext cx="936988" cy="307777"/>
+          </a:xfrm>
+          <a:prstGeom prst="rect">
+            <a:avLst/>
+          </a:prstGeom>
+          <a:noFill/>
+        </p:spPr>
+        <p:txBody>
+          <a:bodyPr wrap="none" rtlCol="0">
+            <a:spAutoFit/>
+          </a:bodyPr>
+          <a:lstStyle/>
+          <a:p>
+            <a:pPr algn="ctr"/>
+            <a:r>
+              <a:rPr lang="en-GB" sz="1400" b="1" i="1" dirty="0" smtClean="0">
+                <a:solidFill>
+                  <a:srgbClr val="FF0000"/>
+                </a:solidFill>
+              </a:rPr>
+              <a:t>To science</a:t>
+            </a:r>
+            <a:endParaRPr lang="en-GB" sz="1400" b="1" i="1" dirty="0">
+              <a:solidFill>
+                <a:srgbClr val="FF0000"/>
+              </a:solidFill>
+            </a:endParaRPr>
+          </a:p>
+        </p:txBody>
+      </p:sp>
+      <p:cxnSp>
+        <p:nvCxnSpPr>
+          <p:cNvPr id="50" name="Connecteur droit avec flèche 49"/>
+          <p:cNvCxnSpPr/>
+          <p:nvPr/>
+        </p:nvCxnSpPr>
+        <p:spPr>
+          <a:xfrm>
+            <a:off x="8263739" y="4032574"/>
+            <a:ext cx="865119" cy="0"/>
+          </a:xfrm>
+          <a:prstGeom prst="straightConnector1">
+            <a:avLst/>
+          </a:prstGeom>
+          <a:ln>
+            <a:solidFill>
+              <a:srgbClr val="FF0000"/>
+            </a:solidFill>
+            <a:tailEnd type="triangle"/>
+          </a:ln>
+        </p:spPr>
+        <p:style>
+          <a:lnRef idx="1">
+            <a:schemeClr val="accent1"/>
+          </a:lnRef>
+          <a:fillRef idx="0">
+            <a:schemeClr val="accent1"/>
+          </a:fillRef>
+          <a:effectRef idx="0">
+            <a:schemeClr val="accent1"/>
+          </a:effectRef>
+          <a:fontRef idx="minor">
+            <a:schemeClr val="tx1"/>
+          </a:fontRef>
+        </p:style>
+      </p:cxnSp>
+    </p:spTree>
+    <p:extLst>
+      <p:ext uri="{BB962C8B-B14F-4D97-AF65-F5344CB8AC3E}">
+        <p14:creationId xmlns:p14="http://schemas.microsoft.com/office/powerpoint/2010/main" val="2373580723"/>
+      </p:ext>
+    </p:extLst>
+  </p:cSld>
+  <p:clrMapOvr>
+    <a:masterClrMapping/>
+  </p:clrMapOvr>
+</p:sld>
+</file>
+
+<file path=ppt/slides/slide12.xml><?xml version="1.0" encoding="utf-8"?>
+<p:sld xmlns:a="http://schemas.openxmlformats.org/drawingml/2006/main" xmlns:r="http://schemas.openxmlformats.org/officeDocument/2006/relationships" xmlns:p="http://schemas.openxmlformats.org/presentationml/2006/main">
+  <p:cSld>
+    <p:spTree>
+      <p:nvGrpSpPr>
+        <p:cNvPr id="1" name=""/>
+        <p:cNvGrpSpPr/>
+        <p:nvPr/>
+      </p:nvGrpSpPr>
+      <p:grpSpPr>
+        <a:xfrm>
+          <a:off x="0" y="0"/>
+          <a:ext cx="0" cy="0"/>
+          <a:chOff x="0" y="0"/>
+          <a:chExt cx="0" cy="0"/>
+        </a:xfrm>
+      </p:grpSpPr>
+      <p:sp>
+        <p:nvSpPr>
+          <p:cNvPr id="51" name="Rectangle 50"/>
+          <p:cNvSpPr/>
+          <p:nvPr/>
+        </p:nvSpPr>
+        <p:spPr>
+          <a:xfrm>
+            <a:off x="6847654" y="-561958"/>
+            <a:ext cx="5362575" cy="1097520"/>
+          </a:xfrm>
+          <a:prstGeom prst="rect">
+            <a:avLst/>
+          </a:prstGeom>
+          <a:solidFill>
+            <a:schemeClr val="bg1"/>
+          </a:solidFill>
+          <a:ln>
+            <a:noFill/>
+          </a:ln>
+        </p:spPr>
+        <p:style>
+          <a:lnRef idx="2">
+            <a:schemeClr val="accent1">
+              <a:shade val="50000"/>
+            </a:schemeClr>
+          </a:lnRef>
+          <a:fillRef idx="1">
+            <a:schemeClr val="accent1"/>
+          </a:fillRef>
+          <a:effectRef idx="0">
+            <a:schemeClr val="accent1"/>
+          </a:effectRef>
+          <a:fontRef idx="minor">
+            <a:schemeClr val="lt1"/>
+          </a:fontRef>
+        </p:style>
+        <p:txBody>
+          <a:bodyPr rtlCol="0" anchor="ctr"/>
+          <a:lstStyle/>
+          <a:p>
+            <a:pPr algn="ctr"/>
+            <a:endParaRPr lang="en-GB"/>
+          </a:p>
+        </p:txBody>
+      </p:sp>
+      <p:sp>
+        <p:nvSpPr>
+          <p:cNvPr id="27" name="Rectangle 26"/>
+          <p:cNvSpPr/>
+          <p:nvPr/>
+        </p:nvSpPr>
+        <p:spPr>
+          <a:xfrm>
+            <a:off x="1103540" y="6382016"/>
+            <a:ext cx="10629900" cy="1304925"/>
+          </a:xfrm>
+          <a:prstGeom prst="rect">
+            <a:avLst/>
+          </a:prstGeom>
+          <a:solidFill>
+            <a:schemeClr val="bg1"/>
+          </a:solidFill>
+          <a:ln>
+            <a:noFill/>
+          </a:ln>
+        </p:spPr>
+        <p:style>
+          <a:lnRef idx="2">
+            <a:schemeClr val="accent1">
+              <a:shade val="50000"/>
+            </a:schemeClr>
+          </a:lnRef>
+          <a:fillRef idx="1">
+            <a:schemeClr val="accent1"/>
+          </a:fillRef>
+          <a:effectRef idx="0">
+            <a:schemeClr val="accent1"/>
+          </a:effectRef>
+          <a:fontRef idx="minor">
+            <a:schemeClr val="lt1"/>
+          </a:fontRef>
+        </p:style>
+        <p:txBody>
+          <a:bodyPr rtlCol="0" anchor="ctr"/>
+          <a:lstStyle/>
+          <a:p>
+            <a:pPr algn="ctr"/>
+            <a:endParaRPr lang="en-GB"/>
+          </a:p>
+        </p:txBody>
+      </p:sp>
+      <p:pic>
+        <p:nvPicPr>
+          <p:cNvPr id="39" name="Image 38"/>
+          <p:cNvPicPr>
+            <a:picLocks noChangeAspect="1"/>
+          </p:cNvPicPr>
+          <p:nvPr/>
+        </p:nvPicPr>
+        <p:blipFill>
+          <a:blip r:embed="rId2"/>
+          <a:stretch>
+            <a:fillRect/>
+          </a:stretch>
+        </p:blipFill>
+        <p:spPr>
+          <a:xfrm>
+            <a:off x="2475816" y="-148570"/>
+            <a:ext cx="11026708" cy="7099086"/>
+          </a:xfrm>
+          <a:prstGeom prst="rect">
+            <a:avLst/>
+          </a:prstGeom>
+        </p:spPr>
+      </p:pic>
+      <p:sp>
+        <p:nvSpPr>
+          <p:cNvPr id="5" name="ZoneTexte 4"/>
+          <p:cNvSpPr txBox="1"/>
+          <p:nvPr/>
+        </p:nvSpPr>
+        <p:spPr>
+          <a:xfrm>
+            <a:off x="2841662" y="3866848"/>
+            <a:ext cx="996876" cy="738664"/>
+          </a:xfrm>
+          <a:prstGeom prst="rect">
+            <a:avLst/>
+          </a:prstGeom>
+          <a:noFill/>
+        </p:spPr>
+        <p:txBody>
+          <a:bodyPr wrap="none" rtlCol="0">
+            <a:spAutoFit/>
+          </a:bodyPr>
+          <a:lstStyle/>
+          <a:p>
+            <a:pPr algn="ctr"/>
+            <a:r>
+              <a:rPr lang="en-GB" sz="1400" b="1" dirty="0" smtClean="0"/>
+              <a:t>Telescope</a:t>
+            </a:r>
+          </a:p>
+          <a:p>
+            <a:pPr algn="ctr"/>
+            <a:r>
+              <a:rPr lang="en-GB" sz="1400" b="1" dirty="0"/>
+              <a:t>f</a:t>
+            </a:r>
+            <a:r>
+              <a:rPr lang="en-GB" sz="1400" b="1" dirty="0" smtClean="0"/>
+              <a:t>ocal plane</a:t>
+            </a:r>
+          </a:p>
+          <a:p>
+            <a:pPr algn="ctr"/>
+            <a:r>
+              <a:rPr lang="en-GB" sz="1400" b="1" dirty="0" smtClean="0"/>
+              <a:t>(FoV = 1’)</a:t>
+            </a:r>
+            <a:endParaRPr lang="en-GB" sz="1400" b="1" dirty="0"/>
+          </a:p>
+        </p:txBody>
+      </p:sp>
+      <p:sp>
+        <p:nvSpPr>
+          <p:cNvPr id="6" name="ZoneTexte 5"/>
+          <p:cNvSpPr txBox="1"/>
+          <p:nvPr/>
+        </p:nvSpPr>
+        <p:spPr>
+          <a:xfrm>
+            <a:off x="4621495" y="4838277"/>
+            <a:ext cx="1310423" cy="815608"/>
+          </a:xfrm>
+          <a:prstGeom prst="rect">
+            <a:avLst/>
+          </a:prstGeom>
+          <a:noFill/>
+        </p:spPr>
+        <p:txBody>
+          <a:bodyPr wrap="none" rtlCol="0">
+            <a:spAutoFit/>
+          </a:bodyPr>
+          <a:lstStyle/>
+          <a:p>
+            <a:pPr algn="ctr"/>
+            <a:r>
+              <a:rPr lang="en-GB" sz="1400" b="1" dirty="0" smtClean="0"/>
+              <a:t>Dichroic mirror</a:t>
+            </a:r>
+          </a:p>
+          <a:p>
+            <a:pPr algn="ctr"/>
+            <a:r>
+              <a:rPr lang="en-GB" sz="1050" b="1" dirty="0" smtClean="0"/>
+              <a:t>@Intermediate</a:t>
+            </a:r>
+          </a:p>
+          <a:p>
+            <a:pPr algn="ctr"/>
+            <a:r>
+              <a:rPr lang="en-GB" sz="1050" b="1" dirty="0"/>
+              <a:t>f</a:t>
+            </a:r>
+            <a:r>
+              <a:rPr lang="en-GB" sz="1050" b="1" dirty="0" smtClean="0"/>
+              <a:t>ocal plane</a:t>
+            </a:r>
+          </a:p>
+          <a:p>
+            <a:pPr algn="ctr"/>
+            <a:r>
+              <a:rPr lang="en-GB" sz="1050" b="1" dirty="0" smtClean="0"/>
+              <a:t>(FoV = 1’)</a:t>
+            </a:r>
+            <a:endParaRPr lang="en-GB" sz="1050" b="1" dirty="0"/>
+          </a:p>
+        </p:txBody>
+      </p:sp>
+      <p:sp>
+        <p:nvSpPr>
+          <p:cNvPr id="9" name="ZoneTexte 8"/>
+          <p:cNvSpPr txBox="1"/>
+          <p:nvPr/>
+        </p:nvSpPr>
+        <p:spPr>
+          <a:xfrm>
+            <a:off x="2812250" y="2564857"/>
+            <a:ext cx="455574" cy="307777"/>
+          </a:xfrm>
+          <a:prstGeom prst="rect">
+            <a:avLst/>
+          </a:prstGeom>
+          <a:noFill/>
+        </p:spPr>
+        <p:txBody>
+          <a:bodyPr wrap="none" rtlCol="0">
+            <a:spAutoFit/>
+          </a:bodyPr>
+          <a:lstStyle/>
+          <a:p>
+            <a:r>
+              <a:rPr lang="en-GB" sz="1400" b="1" dirty="0" smtClean="0"/>
+              <a:t>DM</a:t>
+            </a:r>
+            <a:endParaRPr lang="en-GB" sz="1400" b="1" dirty="0"/>
+          </a:p>
+        </p:txBody>
+      </p:sp>
+      <p:sp>
+        <p:nvSpPr>
+          <p:cNvPr id="10" name="ZoneTexte 9"/>
+          <p:cNvSpPr txBox="1"/>
+          <p:nvPr/>
+        </p:nvSpPr>
+        <p:spPr>
+          <a:xfrm>
+            <a:off x="6418490" y="3740979"/>
+            <a:ext cx="600614" cy="307777"/>
+          </a:xfrm>
+          <a:prstGeom prst="rect">
+            <a:avLst/>
+          </a:prstGeom>
+          <a:noFill/>
+        </p:spPr>
+        <p:txBody>
+          <a:bodyPr wrap="none" rtlCol="0">
+            <a:spAutoFit/>
+          </a:bodyPr>
+          <a:lstStyle/>
+          <a:p>
+            <a:r>
+              <a:rPr lang="en-GB" sz="1400" b="1" dirty="0" smtClean="0"/>
+              <a:t>OAP0</a:t>
+            </a:r>
+            <a:endParaRPr lang="en-GB" sz="1400" b="1" dirty="0"/>
+          </a:p>
+        </p:txBody>
+      </p:sp>
+      <p:sp>
+        <p:nvSpPr>
+          <p:cNvPr id="11" name="ZoneTexte 10"/>
+          <p:cNvSpPr txBox="1"/>
+          <p:nvPr/>
+        </p:nvSpPr>
+        <p:spPr>
+          <a:xfrm>
+            <a:off x="3829594" y="1755873"/>
+            <a:ext cx="600614" cy="307777"/>
+          </a:xfrm>
+          <a:prstGeom prst="rect">
+            <a:avLst/>
+          </a:prstGeom>
+          <a:noFill/>
+        </p:spPr>
+        <p:txBody>
+          <a:bodyPr wrap="none" rtlCol="0">
+            <a:spAutoFit/>
+          </a:bodyPr>
+          <a:lstStyle/>
+          <a:p>
+            <a:r>
+              <a:rPr lang="en-GB" sz="1400" b="1" dirty="0" smtClean="0"/>
+              <a:t>OAP1</a:t>
+            </a:r>
+            <a:endParaRPr lang="en-GB" sz="1400" b="1" dirty="0"/>
+          </a:p>
+        </p:txBody>
+      </p:sp>
+      <p:sp>
+        <p:nvSpPr>
+          <p:cNvPr id="12" name="ZoneTexte 11"/>
+          <p:cNvSpPr txBox="1"/>
+          <p:nvPr/>
+        </p:nvSpPr>
+        <p:spPr>
+          <a:xfrm>
+            <a:off x="5637330" y="2628780"/>
+            <a:ext cx="793230" cy="523220"/>
+          </a:xfrm>
+          <a:prstGeom prst="rect">
+            <a:avLst/>
+          </a:prstGeom>
+          <a:noFill/>
+        </p:spPr>
+        <p:txBody>
+          <a:bodyPr wrap="none" rtlCol="0">
+            <a:spAutoFit/>
+          </a:bodyPr>
+          <a:lstStyle/>
+          <a:p>
+            <a:r>
+              <a:rPr lang="en-GB" sz="1400" b="1" dirty="0" smtClean="0"/>
+              <a:t>Folding </a:t>
+            </a:r>
+          </a:p>
+          <a:p>
+            <a:r>
+              <a:rPr lang="en-GB" sz="1400" b="1" dirty="0" smtClean="0"/>
+              <a:t>mirror 1</a:t>
+            </a:r>
+            <a:endParaRPr lang="en-GB" sz="1400" b="1" dirty="0"/>
+          </a:p>
+        </p:txBody>
+      </p:sp>
+      <p:sp>
+        <p:nvSpPr>
+          <p:cNvPr id="13" name="ZoneTexte 12"/>
+          <p:cNvSpPr txBox="1"/>
+          <p:nvPr/>
+        </p:nvSpPr>
+        <p:spPr>
+          <a:xfrm>
+            <a:off x="5178574" y="5702632"/>
+            <a:ext cx="1120820" cy="307777"/>
+          </a:xfrm>
+          <a:prstGeom prst="rect">
+            <a:avLst/>
+          </a:prstGeom>
+          <a:noFill/>
+        </p:spPr>
+        <p:txBody>
+          <a:bodyPr wrap="none" rtlCol="0">
+            <a:spAutoFit/>
+          </a:bodyPr>
+          <a:lstStyle/>
+          <a:p>
+            <a:r>
+              <a:rPr lang="en-GB" sz="1400" b="1" dirty="0" smtClean="0"/>
+              <a:t>Imaging lens</a:t>
+            </a:r>
+            <a:endParaRPr lang="en-GB" sz="1400" b="1" dirty="0"/>
+          </a:p>
+        </p:txBody>
+      </p:sp>
+      <p:sp>
+        <p:nvSpPr>
+          <p:cNvPr id="14" name="ZoneTexte 13"/>
+          <p:cNvSpPr txBox="1"/>
+          <p:nvPr/>
+        </p:nvSpPr>
+        <p:spPr>
+          <a:xfrm>
+            <a:off x="6775433" y="6337778"/>
+            <a:ext cx="1268809" cy="523220"/>
+          </a:xfrm>
+          <a:prstGeom prst="rect">
+            <a:avLst/>
+          </a:prstGeom>
+          <a:noFill/>
+        </p:spPr>
+        <p:txBody>
+          <a:bodyPr wrap="none" rtlCol="0">
+            <a:spAutoFit/>
+          </a:bodyPr>
+          <a:lstStyle/>
+          <a:p>
+            <a:pPr algn="ctr"/>
+            <a:r>
+              <a:rPr lang="en-GB" sz="1400" b="1" dirty="0" smtClean="0"/>
+              <a:t>TT modulation</a:t>
+            </a:r>
+          </a:p>
+          <a:p>
+            <a:pPr algn="ctr"/>
+            <a:r>
+              <a:rPr lang="en-GB" sz="1400" b="1" dirty="0" smtClean="0"/>
+              <a:t>mirror</a:t>
+            </a:r>
+            <a:endParaRPr lang="en-GB" sz="1400" b="1" dirty="0"/>
+          </a:p>
+        </p:txBody>
+      </p:sp>
+      <p:sp>
+        <p:nvSpPr>
+          <p:cNvPr id="15" name="ZoneTexte 14"/>
+          <p:cNvSpPr txBox="1"/>
+          <p:nvPr/>
+        </p:nvSpPr>
+        <p:spPr>
+          <a:xfrm>
+            <a:off x="7791055" y="2698856"/>
+            <a:ext cx="1337803" cy="307777"/>
+          </a:xfrm>
+          <a:prstGeom prst="rect">
+            <a:avLst/>
+          </a:prstGeom>
+          <a:noFill/>
+        </p:spPr>
+        <p:txBody>
+          <a:bodyPr wrap="none" rtlCol="0">
+            <a:spAutoFit/>
+          </a:bodyPr>
+          <a:lstStyle/>
+          <a:p>
+            <a:pPr algn="ctr"/>
+            <a:r>
+              <a:rPr lang="en-GB" sz="1400" b="1" dirty="0" smtClean="0"/>
+              <a:t>Pyramid prisms</a:t>
+            </a:r>
+            <a:endParaRPr lang="en-GB" sz="1400" b="1" dirty="0"/>
+          </a:p>
+        </p:txBody>
+      </p:sp>
+      <p:sp>
+        <p:nvSpPr>
+          <p:cNvPr id="16" name="ZoneTexte 15"/>
+          <p:cNvSpPr txBox="1"/>
+          <p:nvPr/>
+        </p:nvSpPr>
+        <p:spPr>
+          <a:xfrm>
+            <a:off x="8308977" y="1531665"/>
+            <a:ext cx="930576" cy="307777"/>
+          </a:xfrm>
+          <a:prstGeom prst="rect">
+            <a:avLst/>
+          </a:prstGeom>
+          <a:noFill/>
+        </p:spPr>
+        <p:txBody>
+          <a:bodyPr wrap="none" rtlCol="0">
+            <a:spAutoFit/>
+          </a:bodyPr>
+          <a:lstStyle/>
+          <a:p>
+            <a:pPr algn="ctr"/>
+            <a:r>
+              <a:rPr lang="en-GB" sz="1400" b="1" dirty="0" smtClean="0"/>
+              <a:t>Relay lens</a:t>
+            </a:r>
+            <a:endParaRPr lang="en-GB" sz="1400" b="1" dirty="0"/>
+          </a:p>
+        </p:txBody>
+      </p:sp>
+      <p:sp>
+        <p:nvSpPr>
+          <p:cNvPr id="17" name="ZoneTexte 16"/>
+          <p:cNvSpPr txBox="1"/>
+          <p:nvPr/>
+        </p:nvSpPr>
+        <p:spPr>
+          <a:xfrm>
+            <a:off x="7855775" y="314552"/>
+            <a:ext cx="815929" cy="523220"/>
+          </a:xfrm>
+          <a:prstGeom prst="rect">
+            <a:avLst/>
+          </a:prstGeom>
+          <a:noFill/>
+        </p:spPr>
+        <p:txBody>
+          <a:bodyPr wrap="none" rtlCol="0">
+            <a:spAutoFit/>
+          </a:bodyPr>
+          <a:lstStyle/>
+          <a:p>
+            <a:pPr algn="ctr"/>
+            <a:r>
+              <a:rPr lang="en-GB" sz="1400" b="1" dirty="0" smtClean="0"/>
+              <a:t>CCD</a:t>
+            </a:r>
+          </a:p>
+          <a:p>
+            <a:pPr algn="ctr"/>
+            <a:r>
+              <a:rPr lang="en-GB" sz="1400" b="1" dirty="0" smtClean="0"/>
+              <a:t>detector</a:t>
+            </a:r>
+            <a:endParaRPr lang="en-GB" sz="1400" b="1" dirty="0"/>
+          </a:p>
+        </p:txBody>
+      </p:sp>
+      <p:sp>
+        <p:nvSpPr>
+          <p:cNvPr id="18" name="ZoneTexte 17"/>
+          <p:cNvSpPr txBox="1"/>
+          <p:nvPr/>
+        </p:nvSpPr>
+        <p:spPr>
+          <a:xfrm>
+            <a:off x="3967736" y="4050642"/>
+            <a:ext cx="793230" cy="523220"/>
+          </a:xfrm>
+          <a:prstGeom prst="rect">
+            <a:avLst/>
+          </a:prstGeom>
+          <a:noFill/>
+        </p:spPr>
+        <p:txBody>
+          <a:bodyPr wrap="none" rtlCol="0">
+            <a:spAutoFit/>
+          </a:bodyPr>
+          <a:lstStyle/>
+          <a:p>
+            <a:r>
+              <a:rPr lang="en-GB" sz="1400" b="1" dirty="0" smtClean="0"/>
+              <a:t>Folding </a:t>
+            </a:r>
+          </a:p>
+          <a:p>
+            <a:r>
+              <a:rPr lang="en-GB" sz="1400" b="1" dirty="0" smtClean="0"/>
+              <a:t>mirror 2</a:t>
+            </a:r>
+            <a:endParaRPr lang="en-GB" sz="1400" b="1" dirty="0"/>
+          </a:p>
+        </p:txBody>
+      </p:sp>
+      <p:sp>
+        <p:nvSpPr>
+          <p:cNvPr id="20" name="ZoneTexte 19"/>
+          <p:cNvSpPr txBox="1"/>
+          <p:nvPr/>
+        </p:nvSpPr>
+        <p:spPr>
+          <a:xfrm>
+            <a:off x="5443880" y="6137723"/>
+            <a:ext cx="1180130" cy="461665"/>
+          </a:xfrm>
+          <a:prstGeom prst="rect">
+            <a:avLst/>
+          </a:prstGeom>
+          <a:noFill/>
+        </p:spPr>
+        <p:txBody>
+          <a:bodyPr wrap="none" rtlCol="0">
+            <a:spAutoFit/>
+          </a:bodyPr>
+          <a:lstStyle/>
+          <a:p>
+            <a:pPr algn="ctr"/>
+            <a:r>
+              <a:rPr lang="en-GB" sz="1400" b="1" dirty="0" smtClean="0"/>
+              <a:t>ADC</a:t>
+            </a:r>
+          </a:p>
+          <a:p>
+            <a:pPr algn="ctr"/>
+            <a:r>
+              <a:rPr lang="en-GB" sz="1000" b="1" dirty="0" smtClean="0"/>
+              <a:t>compound prism 1</a:t>
+            </a:r>
+            <a:endParaRPr lang="en-GB" sz="1000" b="1" dirty="0"/>
+          </a:p>
+        </p:txBody>
+      </p:sp>
+      <p:sp>
+        <p:nvSpPr>
+          <p:cNvPr id="21" name="ZoneTexte 20"/>
+          <p:cNvSpPr txBox="1"/>
+          <p:nvPr/>
+        </p:nvSpPr>
+        <p:spPr>
+          <a:xfrm>
+            <a:off x="6918646" y="5838003"/>
+            <a:ext cx="1180130" cy="461665"/>
+          </a:xfrm>
+          <a:prstGeom prst="rect">
+            <a:avLst/>
+          </a:prstGeom>
+          <a:noFill/>
+        </p:spPr>
+        <p:txBody>
+          <a:bodyPr wrap="none" rtlCol="0">
+            <a:spAutoFit/>
+          </a:bodyPr>
+          <a:lstStyle/>
+          <a:p>
+            <a:pPr algn="ctr"/>
+            <a:r>
+              <a:rPr lang="en-GB" sz="1400" b="1" dirty="0" smtClean="0"/>
+              <a:t>ADC</a:t>
+            </a:r>
+          </a:p>
+          <a:p>
+            <a:pPr algn="ctr"/>
+            <a:r>
+              <a:rPr lang="en-GB" sz="1000" b="1" dirty="0" smtClean="0"/>
+              <a:t>compound prism 2</a:t>
+            </a:r>
+            <a:endParaRPr lang="en-GB" sz="1000" b="1" dirty="0"/>
+          </a:p>
+        </p:txBody>
+      </p:sp>
+      <p:grpSp>
+        <p:nvGrpSpPr>
+          <p:cNvPr id="26" name="Groupe 25"/>
+          <p:cNvGrpSpPr/>
+          <p:nvPr/>
+        </p:nvGrpSpPr>
+        <p:grpSpPr>
+          <a:xfrm>
+            <a:off x="7536986" y="2715526"/>
+            <a:ext cx="290214" cy="191292"/>
+            <a:chOff x="9574923" y="2683345"/>
+            <a:chExt cx="290214" cy="191292"/>
+          </a:xfrm>
+        </p:grpSpPr>
+        <p:sp>
+          <p:nvSpPr>
+            <p:cNvPr id="22" name="Triangle isocèle 21"/>
+            <p:cNvSpPr/>
+            <p:nvPr/>
+          </p:nvSpPr>
+          <p:spPr>
+            <a:xfrm rot="1013070" flipV="1">
+              <a:off x="9574923" y="2810026"/>
+              <a:ext cx="248575" cy="64611"/>
+            </a:xfrm>
+            <a:prstGeom prst="triangle">
+              <a:avLst/>
+            </a:prstGeom>
+            <a:noFill/>
+            <a:ln>
+              <a:solidFill>
+                <a:schemeClr val="tx1"/>
+              </a:solidFill>
+            </a:ln>
+          </p:spPr>
+          <p:style>
+            <a:lnRef idx="2">
+              <a:schemeClr val="accent1">
+                <a:shade val="50000"/>
+              </a:schemeClr>
+            </a:lnRef>
+            <a:fillRef idx="1">
+              <a:schemeClr val="accent1"/>
+            </a:fillRef>
+            <a:effectRef idx="0">
+              <a:schemeClr val="accent1"/>
+            </a:effectRef>
+            <a:fontRef idx="minor">
+              <a:schemeClr val="lt1"/>
+            </a:fontRef>
+          </p:style>
+          <p:txBody>
+            <a:bodyPr rtlCol="0" anchor="ctr"/>
+            <a:lstStyle/>
+            <a:p>
+              <a:pPr algn="ctr"/>
+              <a:endParaRPr lang="en-GB"/>
+            </a:p>
+          </p:txBody>
+        </p:sp>
+        <p:sp>
+          <p:nvSpPr>
+            <p:cNvPr id="23" name="Triangle isocèle 22"/>
+            <p:cNvSpPr/>
+            <p:nvPr/>
+          </p:nvSpPr>
+          <p:spPr>
+            <a:xfrm rot="1013070">
+              <a:off x="9616562" y="2683345"/>
+              <a:ext cx="248575" cy="64398"/>
+            </a:xfrm>
+            <a:prstGeom prst="triangle">
+              <a:avLst/>
+            </a:prstGeom>
+            <a:noFill/>
+            <a:ln>
+              <a:solidFill>
+                <a:schemeClr val="tx1"/>
+              </a:solidFill>
+            </a:ln>
+          </p:spPr>
+          <p:style>
+            <a:lnRef idx="2">
+              <a:schemeClr val="accent1">
+                <a:shade val="50000"/>
+              </a:schemeClr>
+            </a:lnRef>
+            <a:fillRef idx="1">
+              <a:schemeClr val="accent1"/>
+            </a:fillRef>
+            <a:effectRef idx="0">
+              <a:schemeClr val="accent1"/>
+            </a:effectRef>
+            <a:fontRef idx="minor">
+              <a:schemeClr val="lt1"/>
+            </a:fontRef>
+          </p:style>
+          <p:txBody>
+            <a:bodyPr rtlCol="0" anchor="ctr"/>
+            <a:lstStyle/>
+            <a:p>
+              <a:pPr algn="ctr"/>
+              <a:endParaRPr lang="en-GB"/>
+            </a:p>
+          </p:txBody>
+        </p:sp>
+        <p:sp>
+          <p:nvSpPr>
+            <p:cNvPr id="24" name="Rectangle 23"/>
+            <p:cNvSpPr/>
+            <p:nvPr/>
+          </p:nvSpPr>
+          <p:spPr>
+            <a:xfrm rot="1002748">
+              <a:off x="9580954" y="2744206"/>
+              <a:ext cx="278119" cy="69121"/>
+            </a:xfrm>
+            <a:prstGeom prst="rect">
+              <a:avLst/>
+            </a:prstGeom>
+            <a:noFill/>
+            <a:ln>
+              <a:solidFill>
+                <a:schemeClr val="tx1"/>
+              </a:solidFill>
+            </a:ln>
+          </p:spPr>
+          <p:style>
+            <a:lnRef idx="2">
+              <a:schemeClr val="accent1">
+                <a:shade val="50000"/>
+              </a:schemeClr>
+            </a:lnRef>
+            <a:fillRef idx="1">
+              <a:schemeClr val="accent1"/>
+            </a:fillRef>
+            <a:effectRef idx="0">
+              <a:schemeClr val="accent1"/>
+            </a:effectRef>
+            <a:fontRef idx="minor">
+              <a:schemeClr val="lt1"/>
+            </a:fontRef>
+          </p:style>
+          <p:txBody>
+            <a:bodyPr rtlCol="0" anchor="ctr"/>
+            <a:lstStyle/>
+            <a:p>
+              <a:pPr algn="ctr"/>
+              <a:endParaRPr lang="en-GB"/>
+            </a:p>
+          </p:txBody>
+        </p:sp>
+      </p:grpSp>
+      <p:cxnSp>
+        <p:nvCxnSpPr>
+          <p:cNvPr id="29" name="Connecteur droit 28"/>
+          <p:cNvCxnSpPr/>
+          <p:nvPr/>
+        </p:nvCxnSpPr>
+        <p:spPr>
+          <a:xfrm>
+            <a:off x="6437703" y="6223581"/>
+            <a:ext cx="46440" cy="80849"/>
+          </a:xfrm>
+          <a:prstGeom prst="line">
+            <a:avLst/>
+          </a:prstGeom>
+          <a:ln>
+            <a:solidFill>
+              <a:schemeClr val="tx1"/>
+            </a:solidFill>
+          </a:ln>
+        </p:spPr>
+        <p:style>
+          <a:lnRef idx="1">
+            <a:schemeClr val="accent1"/>
+          </a:lnRef>
+          <a:fillRef idx="0">
+            <a:schemeClr val="accent1"/>
+          </a:fillRef>
+          <a:effectRef idx="0">
+            <a:schemeClr val="accent1"/>
+          </a:effectRef>
+          <a:fontRef idx="minor">
+            <a:schemeClr val="tx1"/>
+          </a:fontRef>
+        </p:style>
+      </p:cxnSp>
+      <p:cxnSp>
+        <p:nvCxnSpPr>
+          <p:cNvPr id="32" name="Connecteur droit 31"/>
+          <p:cNvCxnSpPr/>
+          <p:nvPr/>
+        </p:nvCxnSpPr>
+        <p:spPr>
+          <a:xfrm>
+            <a:off x="6577570" y="6155788"/>
+            <a:ext cx="46440" cy="80849"/>
+          </a:xfrm>
+          <a:prstGeom prst="line">
+            <a:avLst/>
+          </a:prstGeom>
+          <a:ln>
+            <a:solidFill>
+              <a:schemeClr val="tx1"/>
+            </a:solidFill>
+          </a:ln>
+        </p:spPr>
+        <p:style>
+          <a:lnRef idx="1">
+            <a:schemeClr val="accent1"/>
+          </a:lnRef>
+          <a:fillRef idx="0">
+            <a:schemeClr val="accent1"/>
+          </a:fillRef>
+          <a:effectRef idx="0">
+            <a:schemeClr val="accent1"/>
+          </a:effectRef>
+          <a:fontRef idx="minor">
+            <a:schemeClr val="tx1"/>
+          </a:fontRef>
+        </p:style>
+      </p:cxnSp>
+      <p:cxnSp>
+        <p:nvCxnSpPr>
+          <p:cNvPr id="33" name="Connecteur droit 32"/>
+          <p:cNvCxnSpPr/>
+          <p:nvPr/>
+        </p:nvCxnSpPr>
+        <p:spPr>
+          <a:xfrm flipH="1">
+            <a:off x="6858000" y="6124909"/>
+            <a:ext cx="28575" cy="102182"/>
+          </a:xfrm>
+          <a:prstGeom prst="line">
+            <a:avLst/>
+          </a:prstGeom>
+          <a:ln>
+            <a:solidFill>
+              <a:schemeClr val="tx1"/>
+            </a:solidFill>
+          </a:ln>
+        </p:spPr>
+        <p:style>
+          <a:lnRef idx="1">
+            <a:schemeClr val="accent1"/>
+          </a:lnRef>
+          <a:fillRef idx="0">
+            <a:schemeClr val="accent1"/>
+          </a:fillRef>
+          <a:effectRef idx="0">
+            <a:schemeClr val="accent1"/>
+          </a:effectRef>
+          <a:fontRef idx="minor">
+            <a:schemeClr val="tx1"/>
+          </a:fontRef>
+        </p:style>
+      </p:cxnSp>
+      <p:cxnSp>
+        <p:nvCxnSpPr>
+          <p:cNvPr id="36" name="Connecteur droit 35"/>
+          <p:cNvCxnSpPr/>
+          <p:nvPr/>
+        </p:nvCxnSpPr>
+        <p:spPr>
+          <a:xfrm flipH="1">
+            <a:off x="6712429" y="6082013"/>
+            <a:ext cx="28575" cy="102182"/>
+          </a:xfrm>
+          <a:prstGeom prst="line">
+            <a:avLst/>
+          </a:prstGeom>
+          <a:ln>
+            <a:solidFill>
+              <a:schemeClr val="tx1"/>
+            </a:solidFill>
+          </a:ln>
+        </p:spPr>
+        <p:style>
+          <a:lnRef idx="1">
+            <a:schemeClr val="accent1"/>
+          </a:lnRef>
+          <a:fillRef idx="0">
+            <a:schemeClr val="accent1"/>
+          </a:fillRef>
+          <a:effectRef idx="0">
+            <a:schemeClr val="accent1"/>
+          </a:effectRef>
+          <a:fontRef idx="minor">
+            <a:schemeClr val="tx1"/>
+          </a:fontRef>
+        </p:style>
+      </p:cxnSp>
+      <p:cxnSp>
+        <p:nvCxnSpPr>
+          <p:cNvPr id="38" name="Connecteur droit avec flèche 37"/>
+          <p:cNvCxnSpPr/>
+          <p:nvPr/>
+        </p:nvCxnSpPr>
+        <p:spPr>
+          <a:xfrm flipV="1">
+            <a:off x="2475816" y="7475851"/>
+            <a:ext cx="6431296" cy="1442"/>
+          </a:xfrm>
+          <a:prstGeom prst="straightConnector1">
+            <a:avLst/>
+          </a:prstGeom>
+          <a:ln>
+            <a:solidFill>
+              <a:schemeClr val="tx1"/>
+            </a:solidFill>
+            <a:headEnd type="triangle"/>
+            <a:tailEnd type="triangle"/>
+          </a:ln>
+        </p:spPr>
+        <p:style>
+          <a:lnRef idx="1">
+            <a:schemeClr val="accent1"/>
+          </a:lnRef>
+          <a:fillRef idx="0">
+            <a:schemeClr val="accent1"/>
+          </a:fillRef>
+          <a:effectRef idx="0">
+            <a:schemeClr val="accent1"/>
+          </a:effectRef>
+          <a:fontRef idx="minor">
+            <a:schemeClr val="tx1"/>
+          </a:fontRef>
+        </p:style>
+      </p:cxnSp>
+      <p:sp>
+        <p:nvSpPr>
+          <p:cNvPr id="40" name="Rectangle 39"/>
+          <p:cNvSpPr/>
+          <p:nvPr/>
+        </p:nvSpPr>
+        <p:spPr>
+          <a:xfrm>
+            <a:off x="1981654" y="-706767"/>
+            <a:ext cx="5362575" cy="1097520"/>
+          </a:xfrm>
+          <a:prstGeom prst="rect">
+            <a:avLst/>
+          </a:prstGeom>
+          <a:solidFill>
+            <a:schemeClr val="bg1"/>
+          </a:solidFill>
+          <a:ln>
+            <a:noFill/>
+          </a:ln>
+        </p:spPr>
+        <p:style>
+          <a:lnRef idx="2">
+            <a:schemeClr val="accent1">
+              <a:shade val="50000"/>
+            </a:schemeClr>
+          </a:lnRef>
+          <a:fillRef idx="1">
+            <a:schemeClr val="accent1"/>
+          </a:fillRef>
+          <a:effectRef idx="0">
+            <a:schemeClr val="accent1"/>
+          </a:effectRef>
+          <a:fontRef idx="minor">
+            <a:schemeClr val="lt1"/>
+          </a:fontRef>
+        </p:style>
+        <p:txBody>
+          <a:bodyPr rtlCol="0" anchor="ctr"/>
+          <a:lstStyle/>
+          <a:p>
+            <a:pPr algn="ctr"/>
+            <a:endParaRPr lang="en-GB"/>
+          </a:p>
+        </p:txBody>
+      </p:sp>
+      <p:sp>
+        <p:nvSpPr>
+          <p:cNvPr id="43" name="ZoneTexte 42"/>
+          <p:cNvSpPr txBox="1"/>
+          <p:nvPr/>
+        </p:nvSpPr>
+        <p:spPr>
+          <a:xfrm>
+            <a:off x="5282239" y="7194469"/>
+            <a:ext cx="461986" cy="307777"/>
+          </a:xfrm>
+          <a:prstGeom prst="rect">
+            <a:avLst/>
+          </a:prstGeom>
+          <a:noFill/>
+        </p:spPr>
+        <p:txBody>
+          <a:bodyPr wrap="none" rtlCol="0">
+            <a:spAutoFit/>
+          </a:bodyPr>
+          <a:lstStyle/>
+          <a:p>
+            <a:r>
+              <a:rPr lang="en-GB" sz="1400" b="1" dirty="0" smtClean="0"/>
+              <a:t>1 m</a:t>
+            </a:r>
+            <a:endParaRPr lang="en-GB" sz="1400" b="1" dirty="0"/>
+          </a:p>
+        </p:txBody>
+      </p:sp>
+      <p:sp>
+        <p:nvSpPr>
+          <p:cNvPr id="48" name="ZoneTexte 47"/>
+          <p:cNvSpPr txBox="1"/>
+          <p:nvPr/>
+        </p:nvSpPr>
+        <p:spPr>
+          <a:xfrm>
+            <a:off x="7970124" y="3751164"/>
+            <a:ext cx="936988" cy="307777"/>
+          </a:xfrm>
+          <a:prstGeom prst="rect">
+            <a:avLst/>
+          </a:prstGeom>
+          <a:noFill/>
+        </p:spPr>
+        <p:txBody>
+          <a:bodyPr wrap="none" rtlCol="0">
+            <a:spAutoFit/>
+          </a:bodyPr>
+          <a:lstStyle/>
+          <a:p>
+            <a:pPr algn="ctr"/>
+            <a:r>
+              <a:rPr lang="en-GB" sz="1400" b="1" i="1" dirty="0" smtClean="0">
+                <a:solidFill>
+                  <a:srgbClr val="FF0000"/>
+                </a:solidFill>
+              </a:rPr>
+              <a:t>To science</a:t>
+            </a:r>
+            <a:endParaRPr lang="en-GB" sz="1400" b="1" i="1" dirty="0">
+              <a:solidFill>
+                <a:srgbClr val="FF0000"/>
+              </a:solidFill>
+            </a:endParaRPr>
+          </a:p>
+        </p:txBody>
+      </p:sp>
+      <p:cxnSp>
+        <p:nvCxnSpPr>
+          <p:cNvPr id="50" name="Connecteur droit avec flèche 49"/>
+          <p:cNvCxnSpPr/>
+          <p:nvPr/>
+        </p:nvCxnSpPr>
+        <p:spPr>
+          <a:xfrm>
+            <a:off x="8263739" y="4032574"/>
+            <a:ext cx="865119" cy="0"/>
+          </a:xfrm>
+          <a:prstGeom prst="straightConnector1">
+            <a:avLst/>
+          </a:prstGeom>
+          <a:ln>
+            <a:solidFill>
+              <a:srgbClr val="FF0000"/>
+            </a:solidFill>
+            <a:tailEnd type="triangle"/>
+          </a:ln>
+        </p:spPr>
+        <p:style>
+          <a:lnRef idx="1">
+            <a:schemeClr val="accent1"/>
+          </a:lnRef>
+          <a:fillRef idx="0">
+            <a:schemeClr val="accent1"/>
+          </a:fillRef>
+          <a:effectRef idx="0">
+            <a:schemeClr val="accent1"/>
+          </a:effectRef>
+          <a:fontRef idx="minor">
+            <a:schemeClr val="tx1"/>
+          </a:fontRef>
+        </p:style>
+      </p:cxnSp>
+      <p:sp>
+        <p:nvSpPr>
+          <p:cNvPr id="2" name="Rectangle 1"/>
+          <p:cNvSpPr/>
+          <p:nvPr/>
+        </p:nvSpPr>
+        <p:spPr>
+          <a:xfrm rot="898269">
+            <a:off x="7320883" y="-147178"/>
+            <a:ext cx="1345911" cy="3217555"/>
+          </a:xfrm>
+          <a:prstGeom prst="rect">
+            <a:avLst/>
+          </a:prstGeom>
+          <a:noFill/>
+          <a:ln>
+            <a:solidFill>
+              <a:schemeClr val="accent1"/>
+            </a:solidFill>
+          </a:ln>
+        </p:spPr>
+        <p:style>
+          <a:lnRef idx="2">
+            <a:schemeClr val="accent1">
+              <a:shade val="50000"/>
+            </a:schemeClr>
+          </a:lnRef>
+          <a:fillRef idx="1">
+            <a:schemeClr val="accent1"/>
+          </a:fillRef>
+          <a:effectRef idx="0">
+            <a:schemeClr val="accent1"/>
+          </a:effectRef>
+          <a:fontRef idx="minor">
+            <a:schemeClr val="lt1"/>
+          </a:fontRef>
+        </p:style>
+        <p:txBody>
+          <a:bodyPr rtlCol="0" anchor="ctr"/>
+          <a:lstStyle/>
+          <a:p>
+            <a:pPr algn="ctr"/>
+            <a:endParaRPr lang="en-GB"/>
+          </a:p>
+        </p:txBody>
+      </p:sp>
+      <p:cxnSp>
+        <p:nvCxnSpPr>
+          <p:cNvPr id="4" name="Connecteur droit avec flèche 3"/>
+          <p:cNvCxnSpPr/>
+          <p:nvPr/>
+        </p:nvCxnSpPr>
+        <p:spPr>
+          <a:xfrm flipH="1">
+            <a:off x="7146925" y="314552"/>
+            <a:ext cx="197305" cy="761773"/>
+          </a:xfrm>
+          <a:prstGeom prst="straightConnector1">
+            <a:avLst/>
+          </a:prstGeom>
+          <a:ln>
+            <a:headEnd type="triangle"/>
+            <a:tailEnd type="triangle"/>
+          </a:ln>
+        </p:spPr>
+        <p:style>
+          <a:lnRef idx="1">
+            <a:schemeClr val="accent1"/>
+          </a:lnRef>
+          <a:fillRef idx="0">
+            <a:schemeClr val="accent1"/>
+          </a:fillRef>
+          <a:effectRef idx="0">
+            <a:schemeClr val="accent1"/>
+          </a:effectRef>
+          <a:fontRef idx="minor">
+            <a:schemeClr val="tx1"/>
+          </a:fontRef>
+        </p:style>
+      </p:cxnSp>
+      <p:cxnSp>
+        <p:nvCxnSpPr>
+          <p:cNvPr id="41" name="Connecteur droit avec flèche 40"/>
+          <p:cNvCxnSpPr/>
+          <p:nvPr/>
+        </p:nvCxnSpPr>
+        <p:spPr>
+          <a:xfrm flipH="1" flipV="1">
+            <a:off x="8166100" y="-358218"/>
+            <a:ext cx="727504" cy="180827"/>
+          </a:xfrm>
+          <a:prstGeom prst="straightConnector1">
+            <a:avLst/>
+          </a:prstGeom>
+          <a:ln>
+            <a:headEnd type="triangle"/>
+            <a:tailEnd type="triangle"/>
+          </a:ln>
+        </p:spPr>
+        <p:style>
+          <a:lnRef idx="1">
+            <a:schemeClr val="accent1"/>
+          </a:lnRef>
+          <a:fillRef idx="0">
+            <a:schemeClr val="accent1"/>
+          </a:fillRef>
+          <a:effectRef idx="0">
+            <a:schemeClr val="accent1"/>
+          </a:effectRef>
+          <a:fontRef idx="minor">
+            <a:schemeClr val="tx1"/>
+          </a:fontRef>
+        </p:style>
+      </p:cxnSp>
+    </p:spTree>
+    <p:extLst>
+      <p:ext uri="{BB962C8B-B14F-4D97-AF65-F5344CB8AC3E}">
+        <p14:creationId xmlns:p14="http://schemas.microsoft.com/office/powerpoint/2010/main" val="2588953172"/>
+      </p:ext>
+    </p:extLst>
+  </p:cSld>
+  <p:clrMapOvr>
+    <a:masterClrMapping/>
+  </p:clrMapOvr>
+</p:sld>
+</file>
+
+<file path=ppt/slides/slide13.xml><?xml version="1.0" encoding="utf-8"?>
+<p:sld xmlns:a="http://schemas.openxmlformats.org/drawingml/2006/main" xmlns:r="http://schemas.openxmlformats.org/officeDocument/2006/relationships" xmlns:p="http://schemas.openxmlformats.org/presentationml/2006/main">
+  <p:cSld>
+    <p:spTree>
+      <p:nvGrpSpPr>
+        <p:cNvPr id="1" name=""/>
+        <p:cNvGrpSpPr/>
+        <p:nvPr/>
+      </p:nvGrpSpPr>
+      <p:grpSpPr>
+        <a:xfrm>
+          <a:off x="0" y="0"/>
+          <a:ext cx="0" cy="0"/>
+          <a:chOff x="0" y="0"/>
+          <a:chExt cx="0" cy="0"/>
+        </a:xfrm>
+      </p:grpSpPr>
+      <p:grpSp>
+        <p:nvGrpSpPr>
+          <p:cNvPr id="7" name="Groupe 6"/>
+          <p:cNvGrpSpPr/>
+          <p:nvPr/>
+        </p:nvGrpSpPr>
+        <p:grpSpPr>
+          <a:xfrm>
+            <a:off x="2048950" y="16042"/>
+            <a:ext cx="5992586" cy="6858000"/>
+            <a:chOff x="3099707" y="0"/>
+            <a:chExt cx="5992586" cy="6858000"/>
+          </a:xfrm>
+        </p:grpSpPr>
+        <p:pic>
+          <p:nvPicPr>
+            <p:cNvPr id="4" name="Image 3"/>
+            <p:cNvPicPr>
+              <a:picLocks noChangeAspect="1"/>
+            </p:cNvPicPr>
+            <p:nvPr/>
+          </p:nvPicPr>
+          <p:blipFill>
+            <a:blip r:embed="rId2">
+              <a:extLst>
+                <a:ext uri="{28A0092B-C50C-407E-A947-70E740481C1C}">
+                  <a14:useLocalDpi xmlns:a14="http://schemas.microsoft.com/office/drawing/2010/main" val="0"/>
+                </a:ext>
+              </a:extLst>
+            </a:blip>
+            <a:stretch>
+              <a:fillRect/>
+            </a:stretch>
+          </p:blipFill>
+          <p:spPr>
+            <a:xfrm>
+              <a:off x="3099707" y="0"/>
+              <a:ext cx="5992586" cy="6858000"/>
+            </a:xfrm>
+            <a:prstGeom prst="rect">
+              <a:avLst/>
+            </a:prstGeom>
+          </p:spPr>
+        </p:pic>
+        <p:sp>
+          <p:nvSpPr>
+            <p:cNvPr id="6" name="Ellipse 5"/>
+            <p:cNvSpPr/>
+            <p:nvPr/>
+          </p:nvSpPr>
+          <p:spPr>
+            <a:xfrm rot="1161802">
+              <a:off x="7462838" y="3162300"/>
+              <a:ext cx="83343" cy="52388"/>
+            </a:xfrm>
+            <a:prstGeom prst="ellipse">
+              <a:avLst/>
+            </a:prstGeom>
+          </p:spPr>
+          <p:style>
+            <a:lnRef idx="2">
+              <a:schemeClr val="accent1">
+                <a:shade val="50000"/>
+              </a:schemeClr>
+            </a:lnRef>
+            <a:fillRef idx="1">
+              <a:schemeClr val="accent1"/>
+            </a:fillRef>
+            <a:effectRef idx="0">
+              <a:schemeClr val="accent1"/>
+            </a:effectRef>
+            <a:fontRef idx="minor">
+              <a:schemeClr val="lt1"/>
+            </a:fontRef>
+          </p:style>
+          <p:txBody>
+            <a:bodyPr rtlCol="0" anchor="ctr"/>
+            <a:lstStyle/>
+            <a:p>
+              <a:pPr algn="ctr"/>
+              <a:endParaRPr lang="en-GB"/>
+            </a:p>
+          </p:txBody>
+        </p:sp>
+      </p:grpSp>
+      <p:pic>
+        <p:nvPicPr>
+          <p:cNvPr id="5" name="Image 4"/>
+          <p:cNvPicPr>
+            <a:picLocks noChangeAspect="1"/>
+          </p:cNvPicPr>
+          <p:nvPr/>
+        </p:nvPicPr>
+        <p:blipFill>
+          <a:blip r:embed="rId3">
+            <a:clrChange>
+              <a:clrFrom>
+                <a:srgbClr val="FFFFFF"/>
+              </a:clrFrom>
+              <a:clrTo>
+                <a:srgbClr val="FFFFFF">
+                  <a:alpha val="0"/>
+                </a:srgbClr>
+              </a:clrTo>
+            </a:clrChange>
+          </a:blip>
+          <a:stretch>
+            <a:fillRect/>
+          </a:stretch>
+        </p:blipFill>
+        <p:spPr>
+          <a:xfrm rot="18204505">
+            <a:off x="4275474" y="437527"/>
+            <a:ext cx="2093244" cy="3175956"/>
+          </a:xfrm>
+          <a:prstGeom prst="rect">
+            <a:avLst/>
+          </a:prstGeom>
+        </p:spPr>
+      </p:pic>
+      <p:pic>
+        <p:nvPicPr>
+          <p:cNvPr id="8" name="Image 7"/>
+          <p:cNvPicPr>
+            <a:picLocks noChangeAspect="1"/>
+          </p:cNvPicPr>
+          <p:nvPr/>
+        </p:nvPicPr>
+        <p:blipFill>
+          <a:blip r:embed="rId3">
+            <a:clrChange>
+              <a:clrFrom>
+                <a:srgbClr val="FFFFFF"/>
+              </a:clrFrom>
+              <a:clrTo>
+                <a:srgbClr val="FFFFFF">
+                  <a:alpha val="0"/>
+                </a:srgbClr>
+              </a:clrTo>
+            </a:clrChange>
+          </a:blip>
+          <a:stretch>
+            <a:fillRect/>
+          </a:stretch>
+        </p:blipFill>
+        <p:spPr>
+          <a:xfrm rot="8873883">
+            <a:off x="5957841" y="3172709"/>
+            <a:ext cx="2093244" cy="3175956"/>
+          </a:xfrm>
+          <a:prstGeom prst="rect">
+            <a:avLst/>
+          </a:prstGeom>
+        </p:spPr>
+      </p:pic>
+      <p:pic>
+        <p:nvPicPr>
+          <p:cNvPr id="9" name="Image 8"/>
+          <p:cNvPicPr>
+            <a:picLocks noChangeAspect="1"/>
+          </p:cNvPicPr>
+          <p:nvPr/>
+        </p:nvPicPr>
+        <p:blipFill>
+          <a:blip r:embed="rId3">
+            <a:clrChange>
+              <a:clrFrom>
+                <a:srgbClr val="FFFFFF"/>
+              </a:clrFrom>
+              <a:clrTo>
+                <a:srgbClr val="FFFFFF">
+                  <a:alpha val="0"/>
+                </a:srgbClr>
+              </a:clrTo>
+            </a:clrChange>
+          </a:blip>
+          <a:stretch>
+            <a:fillRect/>
+          </a:stretch>
+        </p:blipFill>
+        <p:spPr>
+          <a:xfrm rot="3678122">
+            <a:off x="7002935" y="1191504"/>
+            <a:ext cx="2093244" cy="3175956"/>
+          </a:xfrm>
+          <a:prstGeom prst="rect">
+            <a:avLst/>
+          </a:prstGeom>
+        </p:spPr>
+      </p:pic>
+    </p:spTree>
+    <p:extLst>
+      <p:ext uri="{BB962C8B-B14F-4D97-AF65-F5344CB8AC3E}">
+        <p14:creationId xmlns:p14="http://schemas.microsoft.com/office/powerpoint/2010/main" val="3933185360"/>
       </p:ext>
     </p:extLst>
   </p:cSld>

</xml_diff>

<commit_message>
Design using an OAP of 15deg
I have deleted the _V2_OAP15deg version and changed the values in the V1_optimization_Model in order to have only one file updated.

The Zemax design is complete exept for the science path.
</commit_message>
<xml_diff>
--- a/20180518_AO_design_report/images/images_sketch.pptx
+++ b/20180518_AO_design_report/images/images_sketch.pptx
@@ -5,7 +5,7 @@
     <p:sldMasterId id="2147483648" r:id="rId1"/>
   </p:sldMasterIdLst>
   <p:notesMasterIdLst>
-    <p:notesMasterId r:id="rId15"/>
+    <p:notesMasterId r:id="rId16"/>
   </p:notesMasterIdLst>
   <p:sldIdLst>
     <p:sldId id="256" r:id="rId2"/>
@@ -15,12 +15,13 @@
     <p:sldId id="260" r:id="rId6"/>
     <p:sldId id="261" r:id="rId7"/>
     <p:sldId id="262" r:id="rId8"/>
-    <p:sldId id="263" r:id="rId9"/>
-    <p:sldId id="264" r:id="rId10"/>
-    <p:sldId id="265" r:id="rId11"/>
-    <p:sldId id="266" r:id="rId12"/>
-    <p:sldId id="267" r:id="rId13"/>
-    <p:sldId id="268" r:id="rId14"/>
+    <p:sldId id="269" r:id="rId9"/>
+    <p:sldId id="263" r:id="rId10"/>
+    <p:sldId id="264" r:id="rId11"/>
+    <p:sldId id="265" r:id="rId12"/>
+    <p:sldId id="266" r:id="rId13"/>
+    <p:sldId id="267" r:id="rId14"/>
+    <p:sldId id="268" r:id="rId15"/>
   </p:sldIdLst>
   <p:sldSz cx="12192000" cy="6858000"/>
   <p:notesSz cx="6858000" cy="9144000"/>
@@ -131,6 +132,7 @@
             <p14:sldId id="260"/>
             <p14:sldId id="261"/>
             <p14:sldId id="262"/>
+            <p14:sldId id="269"/>
             <p14:sldId id="263"/>
             <p14:sldId id="264"/>
             <p14:sldId id="265"/>
@@ -230,7 +232,7 @@
           <a:p>
             <a:fld id="{8EDEE2E2-4BE4-41CA-94FC-BC9DC2A64380}" type="datetimeFigureOut">
               <a:rPr lang="en-GB" smtClean="0"/>
-              <a:t>05/06/2018</a:t>
+              <a:t>07/06/2018</a:t>
             </a:fld>
             <a:endParaRPr lang="en-GB"/>
           </a:p>
@@ -629,7 +631,7 @@
           <a:p>
             <a:fld id="{24AF4860-EF53-429F-9816-8C3FCB6EDEF9}" type="datetimeFigureOut">
               <a:rPr lang="en-GB" smtClean="0"/>
-              <a:t>05/06/2018</a:t>
+              <a:t>07/06/2018</a:t>
             </a:fld>
             <a:endParaRPr lang="en-GB"/>
           </a:p>
@@ -799,7 +801,7 @@
           <a:p>
             <a:fld id="{24AF4860-EF53-429F-9816-8C3FCB6EDEF9}" type="datetimeFigureOut">
               <a:rPr lang="en-GB" smtClean="0"/>
-              <a:t>05/06/2018</a:t>
+              <a:t>07/06/2018</a:t>
             </a:fld>
             <a:endParaRPr lang="en-GB"/>
           </a:p>
@@ -979,7 +981,7 @@
           <a:p>
             <a:fld id="{24AF4860-EF53-429F-9816-8C3FCB6EDEF9}" type="datetimeFigureOut">
               <a:rPr lang="en-GB" smtClean="0"/>
-              <a:t>05/06/2018</a:t>
+              <a:t>07/06/2018</a:t>
             </a:fld>
             <a:endParaRPr lang="en-GB"/>
           </a:p>
@@ -1149,7 +1151,7 @@
           <a:p>
             <a:fld id="{24AF4860-EF53-429F-9816-8C3FCB6EDEF9}" type="datetimeFigureOut">
               <a:rPr lang="en-GB" smtClean="0"/>
-              <a:t>05/06/2018</a:t>
+              <a:t>07/06/2018</a:t>
             </a:fld>
             <a:endParaRPr lang="en-GB"/>
           </a:p>
@@ -1395,7 +1397,7 @@
           <a:p>
             <a:fld id="{24AF4860-EF53-429F-9816-8C3FCB6EDEF9}" type="datetimeFigureOut">
               <a:rPr lang="en-GB" smtClean="0"/>
-              <a:t>05/06/2018</a:t>
+              <a:t>07/06/2018</a:t>
             </a:fld>
             <a:endParaRPr lang="en-GB"/>
           </a:p>
@@ -1627,7 +1629,7 @@
           <a:p>
             <a:fld id="{24AF4860-EF53-429F-9816-8C3FCB6EDEF9}" type="datetimeFigureOut">
               <a:rPr lang="en-GB" smtClean="0"/>
-              <a:t>05/06/2018</a:t>
+              <a:t>07/06/2018</a:t>
             </a:fld>
             <a:endParaRPr lang="en-GB"/>
           </a:p>
@@ -1994,7 +1996,7 @@
           <a:p>
             <a:fld id="{24AF4860-EF53-429F-9816-8C3FCB6EDEF9}" type="datetimeFigureOut">
               <a:rPr lang="en-GB" smtClean="0"/>
-              <a:t>05/06/2018</a:t>
+              <a:t>07/06/2018</a:t>
             </a:fld>
             <a:endParaRPr lang="en-GB"/>
           </a:p>
@@ -2112,7 +2114,7 @@
           <a:p>
             <a:fld id="{24AF4860-EF53-429F-9816-8C3FCB6EDEF9}" type="datetimeFigureOut">
               <a:rPr lang="en-GB" smtClean="0"/>
-              <a:t>05/06/2018</a:t>
+              <a:t>07/06/2018</a:t>
             </a:fld>
             <a:endParaRPr lang="en-GB"/>
           </a:p>
@@ -2207,7 +2209,7 @@
           <a:p>
             <a:fld id="{24AF4860-EF53-429F-9816-8C3FCB6EDEF9}" type="datetimeFigureOut">
               <a:rPr lang="en-GB" smtClean="0"/>
-              <a:t>05/06/2018</a:t>
+              <a:t>07/06/2018</a:t>
             </a:fld>
             <a:endParaRPr lang="en-GB"/>
           </a:p>
@@ -2484,7 +2486,7 @@
           <a:p>
             <a:fld id="{24AF4860-EF53-429F-9816-8C3FCB6EDEF9}" type="datetimeFigureOut">
               <a:rPr lang="en-GB" smtClean="0"/>
-              <a:t>05/06/2018</a:t>
+              <a:t>07/06/2018</a:t>
             </a:fld>
             <a:endParaRPr lang="en-GB"/>
           </a:p>
@@ -2737,7 +2739,7 @@
           <a:p>
             <a:fld id="{24AF4860-EF53-429F-9816-8C3FCB6EDEF9}" type="datetimeFigureOut">
               <a:rPr lang="en-GB" smtClean="0"/>
-              <a:t>05/06/2018</a:t>
+              <a:t>07/06/2018</a:t>
             </a:fld>
             <a:endParaRPr lang="en-GB"/>
           </a:p>
@@ -2950,7 +2952,7 @@
           <a:p>
             <a:fld id="{24AF4860-EF53-429F-9816-8C3FCB6EDEF9}" type="datetimeFigureOut">
               <a:rPr lang="en-GB" smtClean="0"/>
-              <a:t>05/06/2018</a:t>
+              <a:t>07/06/2018</a:t>
             </a:fld>
             <a:endParaRPr lang="en-GB"/>
           </a:p>
@@ -4374,6 +4376,455 @@
       </p:grpSpPr>
       <p:pic>
         <p:nvPicPr>
+          <p:cNvPr id="3" name="Image 2"/>
+          <p:cNvPicPr>
+            <a:picLocks noChangeAspect="1"/>
+          </p:cNvPicPr>
+          <p:nvPr/>
+        </p:nvPicPr>
+        <p:blipFill>
+          <a:blip r:embed="rId2"/>
+          <a:stretch>
+            <a:fillRect/>
+          </a:stretch>
+        </p:blipFill>
+        <p:spPr>
+          <a:xfrm>
+            <a:off x="-762000" y="-307453"/>
+            <a:ext cx="14123039" cy="7365478"/>
+          </a:xfrm>
+          <a:prstGeom prst="rect">
+            <a:avLst/>
+          </a:prstGeom>
+        </p:spPr>
+      </p:pic>
+      <p:sp>
+        <p:nvSpPr>
+          <p:cNvPr id="20" name="ZoneTexte 19"/>
+          <p:cNvSpPr txBox="1"/>
+          <p:nvPr/>
+        </p:nvSpPr>
+        <p:spPr>
+          <a:xfrm>
+            <a:off x="928854" y="5085194"/>
+            <a:ext cx="883575" cy="646331"/>
+          </a:xfrm>
+          <a:prstGeom prst="rect">
+            <a:avLst/>
+          </a:prstGeom>
+          <a:noFill/>
+        </p:spPr>
+        <p:txBody>
+          <a:bodyPr wrap="none" rtlCol="0">
+            <a:spAutoFit/>
+          </a:bodyPr>
+          <a:lstStyle/>
+          <a:p>
+            <a:pPr algn="ctr"/>
+            <a:r>
+              <a:rPr lang="en-GB" sz="1200" b="1" dirty="0" smtClean="0"/>
+              <a:t>Telescope</a:t>
+            </a:r>
+          </a:p>
+          <a:p>
+            <a:pPr algn="ctr"/>
+            <a:r>
+              <a:rPr lang="en-GB" sz="1200" b="1" dirty="0"/>
+              <a:t>f</a:t>
+            </a:r>
+            <a:r>
+              <a:rPr lang="en-GB" sz="1200" b="1" dirty="0" smtClean="0"/>
+              <a:t>ocal plane</a:t>
+            </a:r>
+          </a:p>
+          <a:p>
+            <a:pPr algn="ctr"/>
+            <a:r>
+              <a:rPr lang="en-GB" sz="1200" b="1" dirty="0" smtClean="0"/>
+              <a:t>(FoV = 1’)</a:t>
+            </a:r>
+            <a:endParaRPr lang="en-GB" sz="1200" b="1" dirty="0"/>
+          </a:p>
+        </p:txBody>
+      </p:sp>
+      <p:sp>
+        <p:nvSpPr>
+          <p:cNvPr id="21" name="ZoneTexte 20"/>
+          <p:cNvSpPr txBox="1"/>
+          <p:nvPr/>
+        </p:nvSpPr>
+        <p:spPr>
+          <a:xfrm>
+            <a:off x="2082439" y="5281720"/>
+            <a:ext cx="1016496" cy="646331"/>
+          </a:xfrm>
+          <a:prstGeom prst="rect">
+            <a:avLst/>
+          </a:prstGeom>
+          <a:noFill/>
+        </p:spPr>
+        <p:txBody>
+          <a:bodyPr wrap="none" rtlCol="0">
+            <a:spAutoFit/>
+          </a:bodyPr>
+          <a:lstStyle/>
+          <a:p>
+            <a:pPr algn="ctr"/>
+            <a:r>
+              <a:rPr lang="en-GB" sz="1200" b="1" dirty="0" smtClean="0"/>
+              <a:t>Intermediate</a:t>
+            </a:r>
+          </a:p>
+          <a:p>
+            <a:pPr algn="ctr"/>
+            <a:r>
+              <a:rPr lang="en-GB" sz="1200" b="1" dirty="0"/>
+              <a:t>f</a:t>
+            </a:r>
+            <a:r>
+              <a:rPr lang="en-GB" sz="1200" b="1" dirty="0" smtClean="0"/>
+              <a:t>ocal plane</a:t>
+            </a:r>
+          </a:p>
+          <a:p>
+            <a:pPr algn="ctr"/>
+            <a:r>
+              <a:rPr lang="en-GB" sz="1200" b="1" dirty="0" smtClean="0"/>
+              <a:t>(FoV = 1’)</a:t>
+            </a:r>
+            <a:endParaRPr lang="en-GB" sz="1200" b="1" dirty="0"/>
+          </a:p>
+        </p:txBody>
+      </p:sp>
+      <p:sp>
+        <p:nvSpPr>
+          <p:cNvPr id="24" name="ZoneTexte 23"/>
+          <p:cNvSpPr txBox="1"/>
+          <p:nvPr/>
+        </p:nvSpPr>
+        <p:spPr>
+          <a:xfrm>
+            <a:off x="845082" y="4291247"/>
+            <a:ext cx="417102" cy="276999"/>
+          </a:xfrm>
+          <a:prstGeom prst="rect">
+            <a:avLst/>
+          </a:prstGeom>
+          <a:noFill/>
+        </p:spPr>
+        <p:txBody>
+          <a:bodyPr wrap="none" rtlCol="0">
+            <a:spAutoFit/>
+          </a:bodyPr>
+          <a:lstStyle/>
+          <a:p>
+            <a:r>
+              <a:rPr lang="en-GB" sz="1200" b="1" dirty="0" smtClean="0"/>
+              <a:t>DM</a:t>
+            </a:r>
+            <a:endParaRPr lang="en-GB" sz="1200" b="1" dirty="0"/>
+          </a:p>
+        </p:txBody>
+      </p:sp>
+      <p:sp>
+        <p:nvSpPr>
+          <p:cNvPr id="25" name="ZoneTexte 24"/>
+          <p:cNvSpPr txBox="1"/>
+          <p:nvPr/>
+        </p:nvSpPr>
+        <p:spPr>
+          <a:xfrm>
+            <a:off x="3576254" y="4946695"/>
+            <a:ext cx="540020" cy="276999"/>
+          </a:xfrm>
+          <a:prstGeom prst="rect">
+            <a:avLst/>
+          </a:prstGeom>
+          <a:noFill/>
+        </p:spPr>
+        <p:txBody>
+          <a:bodyPr wrap="none" rtlCol="0">
+            <a:spAutoFit/>
+          </a:bodyPr>
+          <a:lstStyle/>
+          <a:p>
+            <a:r>
+              <a:rPr lang="en-GB" sz="1200" b="1" dirty="0" smtClean="0"/>
+              <a:t>OAP0</a:t>
+            </a:r>
+            <a:endParaRPr lang="en-GB" sz="1200" b="1" dirty="0"/>
+          </a:p>
+        </p:txBody>
+      </p:sp>
+      <p:sp>
+        <p:nvSpPr>
+          <p:cNvPr id="26" name="ZoneTexte 25"/>
+          <p:cNvSpPr txBox="1"/>
+          <p:nvPr/>
+        </p:nvSpPr>
+        <p:spPr>
+          <a:xfrm>
+            <a:off x="1542419" y="3605258"/>
+            <a:ext cx="540020" cy="276999"/>
+          </a:xfrm>
+          <a:prstGeom prst="rect">
+            <a:avLst/>
+          </a:prstGeom>
+          <a:noFill/>
+        </p:spPr>
+        <p:txBody>
+          <a:bodyPr wrap="none" rtlCol="0">
+            <a:spAutoFit/>
+          </a:bodyPr>
+          <a:lstStyle/>
+          <a:p>
+            <a:r>
+              <a:rPr lang="en-GB" sz="1200" b="1" dirty="0" smtClean="0"/>
+              <a:t>OAP1</a:t>
+            </a:r>
+            <a:endParaRPr lang="en-GB" sz="1200" b="1" dirty="0"/>
+          </a:p>
+        </p:txBody>
+      </p:sp>
+      <p:sp>
+        <p:nvSpPr>
+          <p:cNvPr id="27" name="ZoneTexte 26"/>
+          <p:cNvSpPr txBox="1"/>
+          <p:nvPr/>
+        </p:nvSpPr>
+        <p:spPr>
+          <a:xfrm>
+            <a:off x="2869266" y="4256065"/>
+            <a:ext cx="706988" cy="461665"/>
+          </a:xfrm>
+          <a:prstGeom prst="rect">
+            <a:avLst/>
+          </a:prstGeom>
+          <a:noFill/>
+        </p:spPr>
+        <p:txBody>
+          <a:bodyPr wrap="none" rtlCol="0">
+            <a:spAutoFit/>
+          </a:bodyPr>
+          <a:lstStyle/>
+          <a:p>
+            <a:r>
+              <a:rPr lang="en-GB" sz="1200" b="1" dirty="0" smtClean="0"/>
+              <a:t>Folding </a:t>
+            </a:r>
+          </a:p>
+          <a:p>
+            <a:r>
+              <a:rPr lang="en-GB" sz="1200" b="1" dirty="0" smtClean="0"/>
+              <a:t>mirror 1</a:t>
+            </a:r>
+            <a:endParaRPr lang="en-GB" sz="1200" b="1" dirty="0"/>
+          </a:p>
+        </p:txBody>
+      </p:sp>
+      <p:sp>
+        <p:nvSpPr>
+          <p:cNvPr id="28" name="ZoneTexte 27"/>
+          <p:cNvSpPr txBox="1"/>
+          <p:nvPr/>
+        </p:nvSpPr>
+        <p:spPr>
+          <a:xfrm>
+            <a:off x="2744327" y="6111604"/>
+            <a:ext cx="990977" cy="276999"/>
+          </a:xfrm>
+          <a:prstGeom prst="rect">
+            <a:avLst/>
+          </a:prstGeom>
+          <a:noFill/>
+        </p:spPr>
+        <p:txBody>
+          <a:bodyPr wrap="none" rtlCol="0">
+            <a:spAutoFit/>
+          </a:bodyPr>
+          <a:lstStyle/>
+          <a:p>
+            <a:r>
+              <a:rPr lang="en-GB" sz="1200" b="1" dirty="0" smtClean="0"/>
+              <a:t>Imaging </a:t>
+            </a:r>
+            <a:r>
+              <a:rPr lang="en-GB" sz="1200" b="1" dirty="0" smtClean="0"/>
+              <a:t>lens</a:t>
+            </a:r>
+            <a:endParaRPr lang="en-GB" sz="1200" b="1" dirty="0"/>
+          </a:p>
+        </p:txBody>
+      </p:sp>
+      <p:sp>
+        <p:nvSpPr>
+          <p:cNvPr id="29" name="ZoneTexte 28"/>
+          <p:cNvSpPr txBox="1"/>
+          <p:nvPr/>
+        </p:nvSpPr>
+        <p:spPr>
+          <a:xfrm>
+            <a:off x="4226269" y="6627167"/>
+            <a:ext cx="1121269" cy="461665"/>
+          </a:xfrm>
+          <a:prstGeom prst="rect">
+            <a:avLst/>
+          </a:prstGeom>
+          <a:noFill/>
+        </p:spPr>
+        <p:txBody>
+          <a:bodyPr wrap="none" rtlCol="0">
+            <a:spAutoFit/>
+          </a:bodyPr>
+          <a:lstStyle/>
+          <a:p>
+            <a:pPr algn="ctr"/>
+            <a:r>
+              <a:rPr lang="en-GB" sz="1200" b="1" dirty="0" smtClean="0"/>
+              <a:t>TT modulation</a:t>
+            </a:r>
+          </a:p>
+          <a:p>
+            <a:pPr algn="ctr"/>
+            <a:r>
+              <a:rPr lang="en-GB" sz="1200" b="1" dirty="0" smtClean="0"/>
+              <a:t>mirror</a:t>
+            </a:r>
+            <a:endParaRPr lang="en-GB" sz="1200" b="1" dirty="0"/>
+          </a:p>
+        </p:txBody>
+      </p:sp>
+      <p:sp>
+        <p:nvSpPr>
+          <p:cNvPr id="30" name="ZoneTexte 29"/>
+          <p:cNvSpPr txBox="1"/>
+          <p:nvPr/>
+        </p:nvSpPr>
+        <p:spPr>
+          <a:xfrm>
+            <a:off x="3402197" y="2828416"/>
+            <a:ext cx="824072" cy="276999"/>
+          </a:xfrm>
+          <a:prstGeom prst="rect">
+            <a:avLst/>
+          </a:prstGeom>
+          <a:noFill/>
+        </p:spPr>
+        <p:txBody>
+          <a:bodyPr wrap="none" rtlCol="0">
+            <a:spAutoFit/>
+          </a:bodyPr>
+          <a:lstStyle/>
+          <a:p>
+            <a:r>
+              <a:rPr lang="en-GB" sz="1200" b="1" dirty="0" smtClean="0"/>
+              <a:t>Relay lens</a:t>
+            </a:r>
+            <a:endParaRPr lang="en-GB" sz="1200" b="1" dirty="0"/>
+          </a:p>
+        </p:txBody>
+      </p:sp>
+      <p:sp>
+        <p:nvSpPr>
+          <p:cNvPr id="31" name="ZoneTexte 30"/>
+          <p:cNvSpPr txBox="1"/>
+          <p:nvPr/>
+        </p:nvSpPr>
+        <p:spPr>
+          <a:xfrm>
+            <a:off x="4170066" y="2020449"/>
+            <a:ext cx="725327" cy="461665"/>
+          </a:xfrm>
+          <a:prstGeom prst="rect">
+            <a:avLst/>
+          </a:prstGeom>
+          <a:noFill/>
+        </p:spPr>
+        <p:txBody>
+          <a:bodyPr wrap="none" rtlCol="0">
+            <a:spAutoFit/>
+          </a:bodyPr>
+          <a:lstStyle/>
+          <a:p>
+            <a:pPr algn="ctr"/>
+            <a:r>
+              <a:rPr lang="en-GB" sz="1200" b="1" dirty="0" smtClean="0"/>
+              <a:t>CCD</a:t>
+            </a:r>
+          </a:p>
+          <a:p>
+            <a:pPr algn="ctr"/>
+            <a:r>
+              <a:rPr lang="en-GB" sz="1200" b="1" dirty="0" smtClean="0"/>
+              <a:t>detector</a:t>
+            </a:r>
+            <a:endParaRPr lang="en-GB" sz="1200" b="1" dirty="0"/>
+          </a:p>
+        </p:txBody>
+      </p:sp>
+      <p:sp>
+        <p:nvSpPr>
+          <p:cNvPr id="33" name="ZoneTexte 32"/>
+          <p:cNvSpPr txBox="1"/>
+          <p:nvPr/>
+        </p:nvSpPr>
+        <p:spPr>
+          <a:xfrm>
+            <a:off x="4420889" y="3882257"/>
+            <a:ext cx="1052018" cy="276999"/>
+          </a:xfrm>
+          <a:prstGeom prst="rect">
+            <a:avLst/>
+          </a:prstGeom>
+          <a:noFill/>
+        </p:spPr>
+        <p:txBody>
+          <a:bodyPr wrap="none" rtlCol="0">
+            <a:spAutoFit/>
+          </a:bodyPr>
+          <a:lstStyle/>
+          <a:p>
+            <a:pPr algn="ctr"/>
+            <a:r>
+              <a:rPr lang="en-GB" sz="1200" b="1" dirty="0" smtClean="0"/>
+              <a:t>Pyramid apex</a:t>
+            </a:r>
+            <a:endParaRPr lang="en-GB" sz="1200" b="1" dirty="0"/>
+          </a:p>
+        </p:txBody>
+      </p:sp>
+    </p:spTree>
+    <p:extLst>
+      <p:ext uri="{BB962C8B-B14F-4D97-AF65-F5344CB8AC3E}">
+        <p14:creationId xmlns:p14="http://schemas.microsoft.com/office/powerpoint/2010/main" val="2515465048"/>
+      </p:ext>
+    </p:extLst>
+  </p:cSld>
+  <p:clrMapOvr>
+    <a:masterClrMapping/>
+  </p:clrMapOvr>
+</p:sld>
+</file>
+
+<file path=ppt/slides/slide11.xml><?xml version="1.0" encoding="utf-8"?>
+<p:sld xmlns:a="http://schemas.openxmlformats.org/drawingml/2006/main" xmlns:r="http://schemas.openxmlformats.org/officeDocument/2006/relationships" xmlns:p="http://schemas.openxmlformats.org/presentationml/2006/main">
+  <p:cSld>
+    <p:spTree>
+      <p:nvGrpSpPr>
+        <p:cNvPr id="1" name=""/>
+        <p:cNvGrpSpPr/>
+        <p:nvPr/>
+      </p:nvGrpSpPr>
+      <p:grpSpPr>
+        <a:xfrm>
+          <a:off x="0" y="0"/>
+          <a:ext cx="0" cy="0"/>
+          <a:chOff x="0" y="0"/>
+          <a:chExt cx="0" cy="0"/>
+        </a:xfrm>
+      </p:grpSpPr>
+      <p:pic>
+        <p:nvPicPr>
           <p:cNvPr id="4" name="Image 3"/>
           <p:cNvPicPr>
             <a:picLocks noChangeAspect="1"/>
@@ -4909,7 +5360,7 @@
 </p:sld>
 </file>
 
-<file path=ppt/slides/slide11.xml><?xml version="1.0" encoding="utf-8"?>
+<file path=ppt/slides/slide12.xml><?xml version="1.0" encoding="utf-8"?>
 <p:sld xmlns:a="http://schemas.openxmlformats.org/drawingml/2006/main" xmlns:r="http://schemas.openxmlformats.org/officeDocument/2006/relationships" xmlns:p="http://schemas.openxmlformats.org/presentationml/2006/main">
   <p:cSld>
     <p:spTree>
@@ -6047,7 +6498,7 @@
 </p:sld>
 </file>
 
-<file path=ppt/slides/slide12.xml><?xml version="1.0" encoding="utf-8"?>
+<file path=ppt/slides/slide13.xml><?xml version="1.0" encoding="utf-8"?>
 <p:sld xmlns:a="http://schemas.openxmlformats.org/drawingml/2006/main" xmlns:r="http://schemas.openxmlformats.org/officeDocument/2006/relationships" xmlns:p="http://schemas.openxmlformats.org/presentationml/2006/main">
   <p:cSld>
     <p:spTree>
@@ -7299,7 +7750,7 @@
 </p:sld>
 </file>
 
-<file path=ppt/slides/slide13.xml><?xml version="1.0" encoding="utf-8"?>
+<file path=ppt/slides/slide14.xml><?xml version="1.0" encoding="utf-8"?>
 <p:sld xmlns:a="http://schemas.openxmlformats.org/drawingml/2006/main" xmlns:r="http://schemas.openxmlformats.org/officeDocument/2006/relationships" xmlns:p="http://schemas.openxmlformats.org/presentationml/2006/main">
   <p:cSld>
     <p:spTree>
@@ -8469,7 +8920,7 @@
       </p:grpSpPr>
       <p:pic>
         <p:nvPicPr>
-          <p:cNvPr id="4" name="Image 3"/>
+          <p:cNvPr id="2" name="Image 1"/>
           <p:cNvPicPr>
             <a:picLocks noChangeAspect="1"/>
           </p:cNvPicPr>
@@ -8483,8 +8934,8 @@
         </p:blipFill>
         <p:spPr>
           <a:xfrm>
-            <a:off x="660966" y="322334"/>
-            <a:ext cx="5766285" cy="3648722"/>
+            <a:off x="1051690" y="192656"/>
+            <a:ext cx="7344677" cy="4324100"/>
           </a:xfrm>
           <a:prstGeom prst="rect">
             <a:avLst/>
@@ -8493,63 +8944,13 @@
       </p:pic>
       <p:sp>
         <p:nvSpPr>
-          <p:cNvPr id="13" name="Rectangle 12"/>
-          <p:cNvSpPr/>
-          <p:nvPr/>
-        </p:nvSpPr>
-        <p:spPr>
-          <a:xfrm>
-            <a:off x="1281568" y="1701103"/>
-            <a:ext cx="1743259" cy="1710660"/>
-          </a:xfrm>
-          <a:prstGeom prst="rect">
-            <a:avLst/>
-          </a:prstGeom>
-          <a:solidFill>
-            <a:srgbClr val="5B9BD5">
-              <a:alpha val="21176"/>
-            </a:srgbClr>
-          </a:solidFill>
-          <a:ln>
-            <a:solidFill>
-              <a:schemeClr val="tx1"/>
-            </a:solidFill>
-          </a:ln>
-        </p:spPr>
-        <p:style>
-          <a:lnRef idx="2">
-            <a:schemeClr val="accent1">
-              <a:shade val="50000"/>
-            </a:schemeClr>
-          </a:lnRef>
-          <a:fillRef idx="1">
-            <a:schemeClr val="accent1"/>
-          </a:fillRef>
-          <a:effectRef idx="0">
-            <a:schemeClr val="accent1"/>
-          </a:effectRef>
-          <a:fontRef idx="minor">
-            <a:schemeClr val="lt1"/>
-          </a:fontRef>
-        </p:style>
-        <p:txBody>
-          <a:bodyPr rtlCol="0" anchor="ctr"/>
-          <a:lstStyle/>
-          <a:p>
-            <a:pPr algn="ctr"/>
-            <a:endParaRPr lang="en-GB" dirty="0"/>
-          </a:p>
-        </p:txBody>
-      </p:sp>
-      <p:sp>
-        <p:nvSpPr>
           <p:cNvPr id="5" name="ZoneTexte 4"/>
           <p:cNvSpPr txBox="1"/>
           <p:nvPr/>
         </p:nvSpPr>
         <p:spPr>
           <a:xfrm>
-            <a:off x="2268118" y="325679"/>
+            <a:off x="2179887" y="293595"/>
             <a:ext cx="1275990" cy="369332"/>
           </a:xfrm>
           <a:prstGeom prst="rect">
@@ -8587,7 +8988,7 @@
         </p:nvCxnSpPr>
         <p:spPr>
           <a:xfrm>
-            <a:off x="2247543" y="667170"/>
+            <a:off x="2159312" y="635086"/>
             <a:ext cx="0" cy="945411"/>
           </a:xfrm>
           <a:prstGeom prst="line">
@@ -8622,7 +9023,7 @@
         </p:nvSpPr>
         <p:spPr>
           <a:xfrm>
-            <a:off x="5903869" y="1821751"/>
+            <a:off x="7170821" y="1743588"/>
             <a:ext cx="703078" cy="369332"/>
           </a:xfrm>
           <a:prstGeom prst="rect">
@@ -8726,9 +9127,9 @@
           <p:nvPr/>
         </p:nvSpPr>
         <p:spPr>
-          <a:xfrm rot="4004274">
-            <a:off x="3593067" y="2557630"/>
-            <a:ext cx="630911" cy="663847"/>
+          <a:xfrm rot="4060880">
+            <a:off x="3566705" y="2334400"/>
+            <a:ext cx="765351" cy="688359"/>
           </a:xfrm>
           <a:prstGeom prst="arc">
             <a:avLst/>
@@ -8770,7 +9171,7 @@
         </p:nvSpPr>
         <p:spPr>
           <a:xfrm>
-            <a:off x="4233967" y="2804900"/>
+            <a:off x="4290114" y="2660522"/>
             <a:ext cx="788999" cy="369332"/>
           </a:xfrm>
           <a:prstGeom prst="rect">
@@ -8790,7 +9191,11 @@
             </a:r>
             <a:r>
               <a:rPr lang="fr-CH" dirty="0" smtClean="0"/>
-              <a:t>= 20°</a:t>
+              <a:t>= </a:t>
+            </a:r>
+            <a:r>
+              <a:rPr lang="fr-CH" dirty="0" smtClean="0"/>
+              <a:t>15°</a:t>
             </a:r>
             <a:endParaRPr lang="en-GB" dirty="0"/>
           </a:p>
@@ -8834,7 +9239,7 @@
         <p:spPr>
           <a:xfrm>
             <a:off x="2153197" y="2556433"/>
-            <a:ext cx="3632306" cy="1317737"/>
+            <a:ext cx="5017624" cy="1332144"/>
           </a:xfrm>
           <a:prstGeom prst="line">
             <a:avLst/>
@@ -8887,7 +9292,7 @@
       </p:grpSpPr>
       <p:pic>
         <p:nvPicPr>
-          <p:cNvPr id="4" name="Image 3"/>
+          <p:cNvPr id="2" name="Image 1"/>
           <p:cNvPicPr>
             <a:picLocks noChangeAspect="1"/>
           </p:cNvPicPr>
@@ -8901,8 +9306,8 @@
         </p:blipFill>
         <p:spPr>
           <a:xfrm>
-            <a:off x="829152" y="275495"/>
-            <a:ext cx="5759656" cy="3204567"/>
+            <a:off x="747478" y="185771"/>
+            <a:ext cx="6527106" cy="3506915"/>
           </a:xfrm>
           <a:prstGeom prst="rect">
             <a:avLst/>
@@ -8911,63 +9316,13 @@
       </p:pic>
       <p:sp>
         <p:nvSpPr>
-          <p:cNvPr id="5" name="Rectangle 4"/>
-          <p:cNvSpPr/>
-          <p:nvPr/>
-        </p:nvSpPr>
-        <p:spPr>
-          <a:xfrm>
-            <a:off x="1323249" y="1555824"/>
-            <a:ext cx="1743259" cy="1710660"/>
-          </a:xfrm>
-          <a:prstGeom prst="rect">
-            <a:avLst/>
-          </a:prstGeom>
-          <a:solidFill>
-            <a:srgbClr val="5B9BD5">
-              <a:alpha val="21176"/>
-            </a:srgbClr>
-          </a:solidFill>
-          <a:ln>
-            <a:solidFill>
-              <a:schemeClr val="tx1"/>
-            </a:solidFill>
-          </a:ln>
-        </p:spPr>
-        <p:style>
-          <a:lnRef idx="2">
-            <a:schemeClr val="accent1">
-              <a:shade val="50000"/>
-            </a:schemeClr>
-          </a:lnRef>
-          <a:fillRef idx="1">
-            <a:schemeClr val="accent1"/>
-          </a:fillRef>
-          <a:effectRef idx="0">
-            <a:schemeClr val="accent1"/>
-          </a:effectRef>
-          <a:fontRef idx="minor">
-            <a:schemeClr val="lt1"/>
-          </a:fontRef>
-        </p:style>
-        <p:txBody>
-          <a:bodyPr rtlCol="0" anchor="ctr"/>
-          <a:lstStyle/>
-          <a:p>
-            <a:pPr algn="ctr"/>
-            <a:endParaRPr lang="en-GB" dirty="0"/>
-          </a:p>
-        </p:txBody>
-      </p:sp>
-      <p:sp>
-        <p:nvSpPr>
           <p:cNvPr id="6" name="ZoneTexte 5"/>
           <p:cNvSpPr txBox="1"/>
           <p:nvPr/>
         </p:nvSpPr>
         <p:spPr>
           <a:xfrm>
-            <a:off x="6237269" y="1942912"/>
+            <a:off x="6714369" y="1754562"/>
             <a:ext cx="703078" cy="369332"/>
           </a:xfrm>
           <a:prstGeom prst="rect">
@@ -9072,7 +9427,7 @@
         </p:nvSpPr>
         <p:spPr>
           <a:xfrm rot="4004274">
-            <a:off x="3634748" y="2412351"/>
+            <a:off x="3592649" y="2230290"/>
             <a:ext cx="630911" cy="663847"/>
           </a:xfrm>
           <a:prstGeom prst="arc">
@@ -9115,7 +9470,7 @@
         </p:nvSpPr>
         <p:spPr>
           <a:xfrm>
-            <a:off x="4275648" y="2659621"/>
+            <a:off x="4238564" y="2522596"/>
             <a:ext cx="788999" cy="369332"/>
           </a:xfrm>
           <a:prstGeom prst="rect">
@@ -9135,38 +9490,13 @@
             </a:r>
             <a:r>
               <a:rPr lang="fr-CH" dirty="0" smtClean="0"/>
-              <a:t>= 20°</a:t>
+              <a:t>= </a:t>
+            </a:r>
+            <a:r>
+              <a:rPr lang="fr-CH" dirty="0" smtClean="0"/>
+              <a:t>15°</a:t>
             </a:r>
             <a:endParaRPr lang="en-GB" dirty="0"/>
-          </a:p>
-        </p:txBody>
-      </p:sp>
-      <p:sp>
-        <p:nvSpPr>
-          <p:cNvPr id="11" name="ZoneTexte 10"/>
-          <p:cNvSpPr txBox="1"/>
-          <p:nvPr/>
-        </p:nvSpPr>
-        <p:spPr>
-          <a:xfrm>
-            <a:off x="1323250" y="1573580"/>
-            <a:ext cx="569896" cy="369332"/>
-          </a:xfrm>
-          <a:prstGeom prst="rect">
-            <a:avLst/>
-          </a:prstGeom>
-          <a:noFill/>
-        </p:spPr>
-        <p:txBody>
-          <a:bodyPr wrap="square" rtlCol="0">
-            <a:spAutoFit/>
-          </a:bodyPr>
-          <a:lstStyle/>
-          <a:p>
-            <a:r>
-              <a:rPr lang="en-GB" dirty="0"/>
-              <a:t>FCL</a:t>
-            </a:r>
           </a:p>
         </p:txBody>
       </p:sp>
@@ -9179,7 +9509,7 @@
         <p:spPr>
           <a:xfrm>
             <a:off x="2194878" y="2411154"/>
-            <a:ext cx="3632306" cy="1317737"/>
+            <a:ext cx="4519491" cy="1164996"/>
           </a:xfrm>
           <a:prstGeom prst="line">
             <a:avLst/>
@@ -9208,7 +9538,7 @@
         </p:nvSpPr>
         <p:spPr>
           <a:xfrm>
-            <a:off x="1481938" y="686910"/>
+            <a:off x="1289433" y="807226"/>
             <a:ext cx="524503" cy="369332"/>
           </a:xfrm>
           <a:prstGeom prst="rect">
@@ -9238,7 +9568,7 @@
         </p:nvSpPr>
         <p:spPr>
           <a:xfrm rot="4004274">
-            <a:off x="3977685" y="984797"/>
+            <a:off x="4002551" y="830363"/>
             <a:ext cx="807045" cy="936199"/>
           </a:xfrm>
           <a:prstGeom prst="arc">
@@ -9281,7 +9611,7 @@
         </p:nvSpPr>
         <p:spPr>
           <a:xfrm>
-            <a:off x="4823215" y="1421056"/>
+            <a:off x="4848081" y="1266622"/>
             <a:ext cx="433132" cy="369332"/>
           </a:xfrm>
           <a:prstGeom prst="rect">
@@ -9339,7 +9669,7 @@
       </p:grpSpPr>
       <p:pic>
         <p:nvPicPr>
-          <p:cNvPr id="4" name="Image 3"/>
+          <p:cNvPr id="2" name="Image 1"/>
           <p:cNvPicPr>
             <a:picLocks noChangeAspect="1"/>
           </p:cNvPicPr>
@@ -9353,8 +9683,8 @@
         </p:blipFill>
         <p:spPr>
           <a:xfrm>
-            <a:off x="0" y="479394"/>
-            <a:ext cx="12191681" cy="5859262"/>
+            <a:off x="0" y="349443"/>
+            <a:ext cx="12192000" cy="6265438"/>
           </a:xfrm>
           <a:prstGeom prst="rect">
             <a:avLst/>
@@ -9369,7 +9699,7 @@
         </p:nvSpPr>
         <p:spPr>
           <a:xfrm>
-            <a:off x="718493" y="4299450"/>
+            <a:off x="413694" y="4103553"/>
             <a:ext cx="377026" cy="246221"/>
           </a:xfrm>
           <a:prstGeom prst="rect">
@@ -9399,7 +9729,7 @@
         </p:nvSpPr>
         <p:spPr>
           <a:xfrm>
-            <a:off x="140451" y="5706554"/>
+            <a:off x="116388" y="5112996"/>
             <a:ext cx="766555" cy="553998"/>
           </a:xfrm>
           <a:prstGeom prst="rect">
@@ -9448,7 +9778,7 @@
         </p:nvSpPr>
         <p:spPr>
           <a:xfrm>
-            <a:off x="2798415" y="5648312"/>
+            <a:off x="3095194" y="5174551"/>
             <a:ext cx="482824" cy="246221"/>
           </a:xfrm>
           <a:prstGeom prst="rect">
@@ -9478,7 +9808,7 @@
         </p:nvSpPr>
         <p:spPr>
           <a:xfrm>
-            <a:off x="3565152" y="4299450"/>
+            <a:off x="3509005" y="3857331"/>
             <a:ext cx="482824" cy="246221"/>
           </a:xfrm>
           <a:prstGeom prst="rect">
@@ -9508,7 +9838,7 @@
         </p:nvSpPr>
         <p:spPr>
           <a:xfrm>
-            <a:off x="1044062" y="5722518"/>
+            <a:off x="1019999" y="5128960"/>
             <a:ext cx="881972" cy="553998"/>
           </a:xfrm>
           <a:prstGeom prst="rect">
@@ -9549,8 +9879,8 @@
           </a:p>
         </p:txBody>
       </p:sp>
-      <mc:AlternateContent xmlns:mc="http://schemas.openxmlformats.org/markup-compatibility/2006" xmlns:a14="http://schemas.microsoft.com/office/drawing/2010/main">
-        <mc:Choice Requires="a14">
+      <mc:AlternateContent xmlns:mc="http://schemas.openxmlformats.org/markup-compatibility/2006">
+        <mc:Choice xmlns:a14="http://schemas.microsoft.com/office/drawing/2010/main" Requires="a14">
           <p:sp>
             <p:nvSpPr>
               <p:cNvPr id="10" name="ZoneTexte 9"/>
@@ -9559,7 +9889,7 @@
             </p:nvSpPr>
             <p:spPr>
               <a:xfrm>
-                <a:off x="718493" y="5875831"/>
+                <a:off x="694430" y="5282273"/>
                 <a:ext cx="497150" cy="276999"/>
               </a:xfrm>
               <a:prstGeom prst="rect">
@@ -9595,7 +9925,7 @@
             </p:txBody>
           </p:sp>
         </mc:Choice>
-        <mc:Fallback xmlns="">
+        <mc:Fallback>
           <p:sp>
             <p:nvSpPr>
               <p:cNvPr id="10" name="ZoneTexte 9"/>
@@ -9606,7 +9936,7 @@
             </p:nvSpPr>
             <p:spPr>
               <a:xfrm>
-                <a:off x="718493" y="5875831"/>
+                <a:off x="694430" y="5282273"/>
                 <a:ext cx="497150" cy="276999"/>
               </a:xfrm>
               <a:prstGeom prst="rect">
@@ -9634,85 +9964,6 @@
           </p:sp>
         </mc:Fallback>
       </mc:AlternateContent>
-      <p:sp>
-        <p:nvSpPr>
-          <p:cNvPr id="11" name="Rectangle 10"/>
-          <p:cNvSpPr/>
-          <p:nvPr/>
-        </p:nvSpPr>
-        <p:spPr>
-          <a:xfrm>
-            <a:off x="651255" y="4792982"/>
-            <a:ext cx="994190" cy="975712"/>
-          </a:xfrm>
-          <a:prstGeom prst="rect">
-            <a:avLst/>
-          </a:prstGeom>
-          <a:solidFill>
-            <a:srgbClr val="5B9BD5">
-              <a:alpha val="21176"/>
-            </a:srgbClr>
-          </a:solidFill>
-          <a:ln>
-            <a:solidFill>
-              <a:schemeClr val="tx1"/>
-            </a:solidFill>
-          </a:ln>
-        </p:spPr>
-        <p:style>
-          <a:lnRef idx="2">
-            <a:schemeClr val="accent1">
-              <a:shade val="50000"/>
-            </a:schemeClr>
-          </a:lnRef>
-          <a:fillRef idx="1">
-            <a:schemeClr val="accent1"/>
-          </a:fillRef>
-          <a:effectRef idx="0">
-            <a:schemeClr val="accent1"/>
-          </a:effectRef>
-          <a:fontRef idx="minor">
-            <a:schemeClr val="lt1"/>
-          </a:fontRef>
-        </p:style>
-        <p:txBody>
-          <a:bodyPr rtlCol="0" anchor="ctr"/>
-          <a:lstStyle/>
-          <a:p>
-            <a:pPr algn="ctr"/>
-            <a:endParaRPr lang="en-GB" dirty="0"/>
-          </a:p>
-        </p:txBody>
-      </p:sp>
-      <p:sp>
-        <p:nvSpPr>
-          <p:cNvPr id="13" name="ZoneTexte 12"/>
-          <p:cNvSpPr txBox="1"/>
-          <p:nvPr/>
-        </p:nvSpPr>
-        <p:spPr>
-          <a:xfrm>
-            <a:off x="651255" y="4810737"/>
-            <a:ext cx="444264" cy="246221"/>
-          </a:xfrm>
-          <a:prstGeom prst="rect">
-            <a:avLst/>
-          </a:prstGeom>
-          <a:noFill/>
-        </p:spPr>
-        <p:txBody>
-          <a:bodyPr wrap="square" rtlCol="0">
-            <a:spAutoFit/>
-          </a:bodyPr>
-          <a:lstStyle/>
-          <a:p>
-            <a:r>
-              <a:rPr lang="en-GB" sz="1000" b="1" dirty="0"/>
-              <a:t>FCL</a:t>
-            </a:r>
-          </a:p>
-        </p:txBody>
-      </p:sp>
     </p:spTree>
     <p:extLst>
       <p:ext uri="{BB962C8B-B14F-4D97-AF65-F5344CB8AC3E}">
@@ -9745,7 +9996,7 @@
       </p:grpSpPr>
       <p:pic>
         <p:nvPicPr>
-          <p:cNvPr id="5" name="Image 4"/>
+          <p:cNvPr id="2" name="Image 1"/>
           <p:cNvPicPr>
             <a:picLocks noChangeAspect="1"/>
           </p:cNvPicPr>
@@ -9759,8 +10010,8 @@
         </p:blipFill>
         <p:spPr>
           <a:xfrm>
-            <a:off x="-674703" y="78477"/>
-            <a:ext cx="13605134" cy="6171401"/>
+            <a:off x="-1321645" y="-416148"/>
+            <a:ext cx="14643805" cy="7375217"/>
           </a:xfrm>
           <a:prstGeom prst="rect">
             <a:avLst/>
@@ -9775,7 +10026,7 @@
         </p:nvSpPr>
         <p:spPr>
           <a:xfrm>
-            <a:off x="2760357" y="4290572"/>
+            <a:off x="2738618" y="5248369"/>
             <a:ext cx="377026" cy="246221"/>
           </a:xfrm>
           <a:prstGeom prst="rect">
@@ -9805,7 +10056,7 @@
         </p:nvSpPr>
         <p:spPr>
           <a:xfrm>
-            <a:off x="-384317" y="5358357"/>
+            <a:off x="-937278" y="6082257"/>
             <a:ext cx="766555" cy="553998"/>
           </a:xfrm>
           <a:prstGeom prst="rect">
@@ -9854,7 +10105,7 @@
         </p:nvSpPr>
         <p:spPr>
           <a:xfrm>
-            <a:off x="5364062" y="4933847"/>
+            <a:off x="5517433" y="5644890"/>
             <a:ext cx="482824" cy="246221"/>
           </a:xfrm>
           <a:prstGeom prst="rect">
@@ -9884,7 +10135,7 @@
         </p:nvSpPr>
         <p:spPr>
           <a:xfrm>
-            <a:off x="3716073" y="3678013"/>
+            <a:off x="3625603" y="4538844"/>
             <a:ext cx="482824" cy="246221"/>
           </a:xfrm>
           <a:prstGeom prst="rect">
@@ -9914,7 +10165,7 @@
         </p:nvSpPr>
         <p:spPr>
           <a:xfrm>
-            <a:off x="880125" y="5872445"/>
+            <a:off x="582596" y="6458058"/>
             <a:ext cx="881972" cy="553998"/>
           </a:xfrm>
           <a:prstGeom prst="rect">
@@ -9957,171 +10208,13 @@
       </p:sp>
       <p:sp>
         <p:nvSpPr>
-          <p:cNvPr id="11" name="Rectangle 10"/>
-          <p:cNvSpPr/>
-          <p:nvPr/>
-        </p:nvSpPr>
-        <p:spPr>
-          <a:xfrm>
-            <a:off x="2691747" y="4791647"/>
-            <a:ext cx="1024326" cy="975712"/>
-          </a:xfrm>
-          <a:prstGeom prst="rect">
-            <a:avLst/>
-          </a:prstGeom>
-          <a:solidFill>
-            <a:srgbClr val="5B9BD5">
-              <a:alpha val="21176"/>
-            </a:srgbClr>
-          </a:solidFill>
-          <a:ln>
-            <a:solidFill>
-              <a:schemeClr val="tx1"/>
-            </a:solidFill>
-          </a:ln>
-        </p:spPr>
-        <p:style>
-          <a:lnRef idx="2">
-            <a:schemeClr val="accent1">
-              <a:shade val="50000"/>
-            </a:schemeClr>
-          </a:lnRef>
-          <a:fillRef idx="1">
-            <a:schemeClr val="accent1"/>
-          </a:fillRef>
-          <a:effectRef idx="0">
-            <a:schemeClr val="accent1"/>
-          </a:effectRef>
-          <a:fontRef idx="minor">
-            <a:schemeClr val="lt1"/>
-          </a:fontRef>
-        </p:style>
-        <p:txBody>
-          <a:bodyPr rtlCol="0" anchor="ctr"/>
-          <a:lstStyle/>
-          <a:p>
-            <a:pPr algn="ctr"/>
-            <a:endParaRPr lang="en-GB" dirty="0"/>
-          </a:p>
-        </p:txBody>
-      </p:sp>
-      <p:sp>
-        <p:nvSpPr>
-          <p:cNvPr id="12" name="ZoneTexte 11"/>
-          <p:cNvSpPr txBox="1"/>
-          <p:nvPr/>
-        </p:nvSpPr>
-        <p:spPr>
-          <a:xfrm>
-            <a:off x="2691746" y="4809402"/>
-            <a:ext cx="457731" cy="246221"/>
-          </a:xfrm>
-          <a:prstGeom prst="rect">
-            <a:avLst/>
-          </a:prstGeom>
-          <a:noFill/>
-        </p:spPr>
-        <p:txBody>
-          <a:bodyPr wrap="square" rtlCol="0">
-            <a:spAutoFit/>
-          </a:bodyPr>
-          <a:lstStyle/>
-          <a:p>
-            <a:r>
-              <a:rPr lang="en-GB" sz="1000" b="1" dirty="0"/>
-              <a:t>FCL</a:t>
-            </a:r>
-          </a:p>
-        </p:txBody>
-      </p:sp>
-      <p:sp>
-        <p:nvSpPr>
-          <p:cNvPr id="13" name="Rectangle 12"/>
-          <p:cNvSpPr/>
-          <p:nvPr/>
-        </p:nvSpPr>
-        <p:spPr>
-          <a:xfrm>
-            <a:off x="-440240" y="4809402"/>
-            <a:ext cx="917706" cy="913116"/>
-          </a:xfrm>
-          <a:prstGeom prst="rect">
-            <a:avLst/>
-          </a:prstGeom>
-          <a:solidFill>
-            <a:srgbClr val="5B9BD5">
-              <a:alpha val="21176"/>
-            </a:srgbClr>
-          </a:solidFill>
-          <a:ln>
-            <a:solidFill>
-              <a:schemeClr val="tx1"/>
-            </a:solidFill>
-          </a:ln>
-        </p:spPr>
-        <p:style>
-          <a:lnRef idx="2">
-            <a:schemeClr val="accent1">
-              <a:shade val="50000"/>
-            </a:schemeClr>
-          </a:lnRef>
-          <a:fillRef idx="1">
-            <a:schemeClr val="accent1"/>
-          </a:fillRef>
-          <a:effectRef idx="0">
-            <a:schemeClr val="accent1"/>
-          </a:effectRef>
-          <a:fontRef idx="minor">
-            <a:schemeClr val="lt1"/>
-          </a:fontRef>
-        </p:style>
-        <p:txBody>
-          <a:bodyPr rtlCol="0" anchor="ctr"/>
-          <a:lstStyle/>
-          <a:p>
-            <a:pPr algn="ctr"/>
-            <a:endParaRPr lang="en-GB" dirty="0"/>
-          </a:p>
-        </p:txBody>
-      </p:sp>
-      <p:sp>
-        <p:nvSpPr>
-          <p:cNvPr id="14" name="ZoneTexte 13"/>
-          <p:cNvSpPr txBox="1"/>
-          <p:nvPr/>
-        </p:nvSpPr>
-        <p:spPr>
-          <a:xfrm>
-            <a:off x="-440241" y="4827157"/>
-            <a:ext cx="457731" cy="246221"/>
-          </a:xfrm>
-          <a:prstGeom prst="rect">
-            <a:avLst/>
-          </a:prstGeom>
-          <a:noFill/>
-        </p:spPr>
-        <p:txBody>
-          <a:bodyPr wrap="square" rtlCol="0">
-            <a:spAutoFit/>
-          </a:bodyPr>
-          <a:lstStyle/>
-          <a:p>
-            <a:r>
-              <a:rPr lang="en-GB" sz="1000" b="1" dirty="0"/>
-              <a:t>FCL</a:t>
-            </a:r>
-          </a:p>
-        </p:txBody>
-      </p:sp>
-      <p:sp>
-        <p:nvSpPr>
           <p:cNvPr id="15" name="ZoneTexte 14"/>
           <p:cNvSpPr txBox="1"/>
           <p:nvPr/>
         </p:nvSpPr>
         <p:spPr>
           <a:xfrm>
-            <a:off x="2807164" y="5351805"/>
+            <a:off x="2859048" y="6266205"/>
             <a:ext cx="766555" cy="553998"/>
           </a:xfrm>
           <a:prstGeom prst="rect">
@@ -10170,7 +10263,7 @@
         </p:nvSpPr>
         <p:spPr>
           <a:xfrm>
-            <a:off x="4198897" y="5872445"/>
+            <a:off x="4435115" y="6431565"/>
             <a:ext cx="881972" cy="553998"/>
           </a:xfrm>
           <a:prstGeom prst="rect">
@@ -10219,7 +10312,7 @@
         </p:nvSpPr>
         <p:spPr>
           <a:xfrm>
-            <a:off x="-394784" y="4360114"/>
+            <a:off x="-1104759" y="5248368"/>
             <a:ext cx="377026" cy="246221"/>
           </a:xfrm>
           <a:prstGeom prst="rect">
@@ -10249,7 +10342,7 @@
         </p:nvSpPr>
         <p:spPr>
           <a:xfrm>
-            <a:off x="1967510" y="4932512"/>
+            <a:off x="1686113" y="5689669"/>
             <a:ext cx="482824" cy="246221"/>
           </a:xfrm>
           <a:prstGeom prst="rect">
@@ -10279,7 +10372,7 @@
         </p:nvSpPr>
         <p:spPr>
           <a:xfrm>
-            <a:off x="560932" y="3747555"/>
+            <a:off x="612816" y="4661955"/>
             <a:ext cx="482824" cy="246221"/>
           </a:xfrm>
           <a:prstGeom prst="rect">
@@ -10309,7 +10402,7 @@
         </p:nvSpPr>
         <p:spPr>
           <a:xfrm>
-            <a:off x="4986394" y="4298175"/>
+            <a:off x="5038278" y="5212575"/>
             <a:ext cx="619080" cy="400110"/>
           </a:xfrm>
           <a:prstGeom prst="rect">
@@ -10345,7 +10438,7 @@
         </p:nvSpPr>
         <p:spPr>
           <a:xfrm>
-            <a:off x="1657970" y="4375262"/>
+            <a:off x="1194901" y="5183586"/>
             <a:ext cx="619080" cy="400110"/>
           </a:xfrm>
           <a:prstGeom prst="rect">
@@ -10403,9 +10496,57 @@
           <a:chExt cx="0" cy="0"/>
         </a:xfrm>
       </p:grpSpPr>
+      <p:sp>
+        <p:nvSpPr>
+          <p:cNvPr id="3" name="Rectangle 2"/>
+          <p:cNvSpPr/>
+          <p:nvPr/>
+        </p:nvSpPr>
+        <p:spPr>
+          <a:xfrm>
+            <a:off x="-952500" y="5942049"/>
+            <a:ext cx="13963650" cy="1525551"/>
+          </a:xfrm>
+          <a:prstGeom prst="rect">
+            <a:avLst/>
+          </a:prstGeom>
+          <a:solidFill>
+            <a:schemeClr val="bg1"/>
+          </a:solidFill>
+          <a:ln>
+            <a:solidFill>
+              <a:schemeClr val="bg1"/>
+            </a:solidFill>
+          </a:ln>
+        </p:spPr>
+        <p:style>
+          <a:lnRef idx="2">
+            <a:schemeClr val="accent1">
+              <a:shade val="50000"/>
+            </a:schemeClr>
+          </a:lnRef>
+          <a:fillRef idx="1">
+            <a:schemeClr val="accent1"/>
+          </a:fillRef>
+          <a:effectRef idx="0">
+            <a:schemeClr val="accent1"/>
+          </a:effectRef>
+          <a:fontRef idx="minor">
+            <a:schemeClr val="lt1"/>
+          </a:fontRef>
+        </p:style>
+        <p:txBody>
+          <a:bodyPr rtlCol="0" anchor="ctr"/>
+          <a:lstStyle/>
+          <a:p>
+            <a:pPr algn="ctr"/>
+            <a:endParaRPr lang="en-GB"/>
+          </a:p>
+        </p:txBody>
+      </p:sp>
       <p:pic>
         <p:nvPicPr>
-          <p:cNvPr id="13" name="Image 12"/>
+          <p:cNvPr id="2" name="Image 1"/>
           <p:cNvPicPr>
             <a:picLocks noChangeAspect="1"/>
           </p:cNvPicPr>
@@ -10419,8 +10560,8 @@
         </p:blipFill>
         <p:spPr>
           <a:xfrm>
-            <a:off x="-133350" y="-128588"/>
-            <a:ext cx="12458700" cy="7115175"/>
+            <a:off x="-737015" y="-200231"/>
+            <a:ext cx="13136775" cy="6772275"/>
           </a:xfrm>
           <a:prstGeom prst="rect">
             <a:avLst/>
@@ -10435,7 +10576,7 @@
         </p:nvSpPr>
         <p:spPr>
           <a:xfrm>
-            <a:off x="1462238" y="4577122"/>
+            <a:off x="-328629" y="5166897"/>
             <a:ext cx="766555" cy="553998"/>
           </a:xfrm>
           <a:prstGeom prst="rect">
@@ -10484,7 +10625,7 @@
         </p:nvSpPr>
         <p:spPr>
           <a:xfrm>
-            <a:off x="2726680" y="5091210"/>
+            <a:off x="560471" y="5393239"/>
             <a:ext cx="881972" cy="553998"/>
           </a:xfrm>
           <a:prstGeom prst="rect">
@@ -10527,26 +10668,218 @@
       </p:sp>
       <p:sp>
         <p:nvSpPr>
-          <p:cNvPr id="7" name="Rectangle 6"/>
+          <p:cNvPr id="9" name="ZoneTexte 8"/>
+          <p:cNvSpPr txBox="1"/>
+          <p:nvPr/>
+        </p:nvSpPr>
+        <p:spPr>
+          <a:xfrm>
+            <a:off x="-328629" y="4564076"/>
+            <a:ext cx="377026" cy="246221"/>
+          </a:xfrm>
+          <a:prstGeom prst="rect">
+            <a:avLst/>
+          </a:prstGeom>
+          <a:noFill/>
+        </p:spPr>
+        <p:txBody>
+          <a:bodyPr wrap="none" rtlCol="0">
+            <a:spAutoFit/>
+          </a:bodyPr>
+          <a:lstStyle/>
+          <a:p>
+            <a:r>
+              <a:rPr lang="en-GB" sz="1000" b="1" dirty="0" smtClean="0"/>
+              <a:t>DM</a:t>
+            </a:r>
+            <a:endParaRPr lang="en-GB" sz="1000" b="1" dirty="0"/>
+          </a:p>
+        </p:txBody>
+      </p:sp>
+      <p:sp>
+        <p:nvSpPr>
+          <p:cNvPr id="10" name="ZoneTexte 9"/>
+          <p:cNvSpPr txBox="1"/>
+          <p:nvPr/>
+        </p:nvSpPr>
+        <p:spPr>
+          <a:xfrm>
+            <a:off x="1691895" y="5006842"/>
+            <a:ext cx="482824" cy="246221"/>
+          </a:xfrm>
+          <a:prstGeom prst="rect">
+            <a:avLst/>
+          </a:prstGeom>
+          <a:noFill/>
+        </p:spPr>
+        <p:txBody>
+          <a:bodyPr wrap="none" rtlCol="0">
+            <a:spAutoFit/>
+          </a:bodyPr>
+          <a:lstStyle/>
+          <a:p>
+            <a:r>
+              <a:rPr lang="en-GB" sz="1000" b="1" dirty="0" smtClean="0"/>
+              <a:t>OAP0</a:t>
+            </a:r>
+            <a:endParaRPr lang="en-GB" sz="1000" b="1" dirty="0"/>
+          </a:p>
+        </p:txBody>
+      </p:sp>
+      <p:sp>
+        <p:nvSpPr>
+          <p:cNvPr id="11" name="ZoneTexte 10"/>
+          <p:cNvSpPr txBox="1"/>
+          <p:nvPr/>
+        </p:nvSpPr>
+        <p:spPr>
+          <a:xfrm>
+            <a:off x="143772" y="4092211"/>
+            <a:ext cx="482824" cy="246221"/>
+          </a:xfrm>
+          <a:prstGeom prst="rect">
+            <a:avLst/>
+          </a:prstGeom>
+          <a:noFill/>
+        </p:spPr>
+        <p:txBody>
+          <a:bodyPr wrap="none" rtlCol="0">
+            <a:spAutoFit/>
+          </a:bodyPr>
+          <a:lstStyle/>
+          <a:p>
+            <a:r>
+              <a:rPr lang="en-GB" sz="1000" b="1" dirty="0" smtClean="0"/>
+              <a:t>OAP1</a:t>
+            </a:r>
+            <a:endParaRPr lang="en-GB" sz="1000" b="1" dirty="0"/>
+          </a:p>
+        </p:txBody>
+      </p:sp>
+      <p:sp>
+        <p:nvSpPr>
+          <p:cNvPr id="12" name="ZoneTexte 11"/>
+          <p:cNvSpPr txBox="1"/>
+          <p:nvPr/>
+        </p:nvSpPr>
+        <p:spPr>
+          <a:xfrm>
+            <a:off x="1210834" y="4487132"/>
+            <a:ext cx="619080" cy="400110"/>
+          </a:xfrm>
+          <a:prstGeom prst="rect">
+            <a:avLst/>
+          </a:prstGeom>
+          <a:noFill/>
+        </p:spPr>
+        <p:txBody>
+          <a:bodyPr wrap="none" rtlCol="0">
+            <a:spAutoFit/>
+          </a:bodyPr>
+          <a:lstStyle/>
+          <a:p>
+            <a:r>
+              <a:rPr lang="en-GB" sz="1000" b="1" dirty="0" smtClean="0"/>
+              <a:t>Folding </a:t>
+            </a:r>
+          </a:p>
+          <a:p>
+            <a:r>
+              <a:rPr lang="en-GB" sz="1000" b="1" dirty="0" smtClean="0"/>
+              <a:t>mirror 1</a:t>
+            </a:r>
+            <a:endParaRPr lang="en-GB" sz="1000" b="1" dirty="0"/>
+          </a:p>
+        </p:txBody>
+      </p:sp>
+      <p:sp>
+        <p:nvSpPr>
+          <p:cNvPr id="14" name="ZoneTexte 13"/>
+          <p:cNvSpPr txBox="1"/>
+          <p:nvPr/>
+        </p:nvSpPr>
+        <p:spPr>
+          <a:xfrm>
+            <a:off x="1015383" y="5942049"/>
+            <a:ext cx="883575" cy="246221"/>
+          </a:xfrm>
+          <a:prstGeom prst="rect">
+            <a:avLst/>
+          </a:prstGeom>
+          <a:noFill/>
+        </p:spPr>
+        <p:txBody>
+          <a:bodyPr wrap="none" rtlCol="0">
+            <a:spAutoFit/>
+          </a:bodyPr>
+          <a:lstStyle/>
+          <a:p>
+            <a:r>
+              <a:rPr lang="en-GB" sz="1000" b="1" dirty="0" smtClean="0"/>
+              <a:t>Paraxial lens</a:t>
+            </a:r>
+            <a:endParaRPr lang="en-GB" sz="1000" b="1" dirty="0"/>
+          </a:p>
+        </p:txBody>
+      </p:sp>
+      <p:sp>
+        <p:nvSpPr>
+          <p:cNvPr id="15" name="ZoneTexte 14"/>
+          <p:cNvSpPr txBox="1"/>
+          <p:nvPr/>
+        </p:nvSpPr>
+        <p:spPr>
+          <a:xfrm>
+            <a:off x="1210834" y="6371989"/>
+            <a:ext cx="962123" cy="400110"/>
+          </a:xfrm>
+          <a:prstGeom prst="rect">
+            <a:avLst/>
+          </a:prstGeom>
+          <a:noFill/>
+        </p:spPr>
+        <p:txBody>
+          <a:bodyPr wrap="none" rtlCol="0">
+            <a:spAutoFit/>
+          </a:bodyPr>
+          <a:lstStyle/>
+          <a:p>
+            <a:pPr algn="ctr"/>
+            <a:r>
+              <a:rPr lang="en-GB" sz="1000" b="1" dirty="0" smtClean="0"/>
+              <a:t>TT modulation</a:t>
+            </a:r>
+          </a:p>
+          <a:p>
+            <a:pPr algn="ctr"/>
+            <a:r>
+              <a:rPr lang="en-GB" sz="1000" b="1" dirty="0" smtClean="0"/>
+              <a:t>mirror</a:t>
+            </a:r>
+            <a:endParaRPr lang="en-GB" sz="1000" b="1" dirty="0"/>
+          </a:p>
+        </p:txBody>
+      </p:sp>
+      <p:sp>
+        <p:nvSpPr>
+          <p:cNvPr id="4" name="Rectangle 3"/>
           <p:cNvSpPr/>
           <p:nvPr/>
         </p:nvSpPr>
         <p:spPr>
           <a:xfrm>
-            <a:off x="1406315" y="4028167"/>
-            <a:ext cx="1001172" cy="996594"/>
+            <a:off x="-952500" y="6292451"/>
+            <a:ext cx="1390426" cy="565549"/>
           </a:xfrm>
           <a:prstGeom prst="rect">
             <a:avLst/>
           </a:prstGeom>
           <a:solidFill>
-            <a:srgbClr val="5B9BD5">
-              <a:alpha val="21176"/>
-            </a:srgbClr>
+            <a:schemeClr val="bg1"/>
           </a:solidFill>
           <a:ln>
             <a:solidFill>
-              <a:schemeClr val="tx1"/>
+              <a:schemeClr val="bg1"/>
             </a:solidFill>
           </a:ln>
         </p:spPr>
@@ -10571,233 +10904,58 @@
           <a:lstStyle/>
           <a:p>
             <a:pPr algn="ctr"/>
-            <a:endParaRPr lang="en-GB" dirty="0"/>
-          </a:p>
-        </p:txBody>
-      </p:sp>
-      <p:sp>
-        <p:nvSpPr>
-          <p:cNvPr id="8" name="ZoneTexte 7"/>
-          <p:cNvSpPr txBox="1"/>
-          <p:nvPr/>
-        </p:nvSpPr>
-        <p:spPr>
-          <a:xfrm>
-            <a:off x="1406314" y="4045922"/>
-            <a:ext cx="457731" cy="246221"/>
-          </a:xfrm>
-          <a:prstGeom prst="rect">
-            <a:avLst/>
-          </a:prstGeom>
-          <a:noFill/>
-        </p:spPr>
-        <p:txBody>
-          <a:bodyPr wrap="square" rtlCol="0">
-            <a:spAutoFit/>
-          </a:bodyPr>
-          <a:lstStyle/>
-          <a:p>
-            <a:r>
-              <a:rPr lang="en-GB" sz="1000" b="1" dirty="0"/>
-              <a:t>FCL</a:t>
-            </a:r>
-          </a:p>
-        </p:txBody>
-      </p:sp>
-      <p:sp>
-        <p:nvSpPr>
-          <p:cNvPr id="9" name="ZoneTexte 8"/>
-          <p:cNvSpPr txBox="1"/>
-          <p:nvPr/>
-        </p:nvSpPr>
-        <p:spPr>
-          <a:xfrm>
-            <a:off x="1460385" y="3532758"/>
-            <a:ext cx="377026" cy="246221"/>
-          </a:xfrm>
-          <a:prstGeom prst="rect">
-            <a:avLst/>
-          </a:prstGeom>
-          <a:noFill/>
-        </p:spPr>
-        <p:txBody>
-          <a:bodyPr wrap="none" rtlCol="0">
-            <a:spAutoFit/>
-          </a:bodyPr>
-          <a:lstStyle/>
-          <a:p>
-            <a:r>
-              <a:rPr lang="en-GB" sz="1000" b="1" dirty="0" smtClean="0"/>
-              <a:t>DM</a:t>
-            </a:r>
-            <a:endParaRPr lang="en-GB" sz="1000" b="1" dirty="0"/>
-          </a:p>
-        </p:txBody>
-      </p:sp>
-      <p:sp>
-        <p:nvSpPr>
-          <p:cNvPr id="10" name="ZoneTexte 9"/>
-          <p:cNvSpPr txBox="1"/>
-          <p:nvPr/>
-        </p:nvSpPr>
-        <p:spPr>
-          <a:xfrm>
-            <a:off x="4296889" y="4454011"/>
-            <a:ext cx="482824" cy="246221"/>
-          </a:xfrm>
-          <a:prstGeom prst="rect">
-            <a:avLst/>
-          </a:prstGeom>
-          <a:noFill/>
-        </p:spPr>
-        <p:txBody>
-          <a:bodyPr wrap="none" rtlCol="0">
-            <a:spAutoFit/>
-          </a:bodyPr>
-          <a:lstStyle/>
-          <a:p>
-            <a:r>
-              <a:rPr lang="en-GB" sz="1000" b="1" dirty="0" smtClean="0"/>
-              <a:t>OAP0</a:t>
-            </a:r>
-            <a:endParaRPr lang="en-GB" sz="1000" b="1" dirty="0"/>
-          </a:p>
-        </p:txBody>
-      </p:sp>
-      <p:sp>
-        <p:nvSpPr>
-          <p:cNvPr id="11" name="ZoneTexte 10"/>
-          <p:cNvSpPr txBox="1"/>
-          <p:nvPr/>
-        </p:nvSpPr>
-        <p:spPr>
-          <a:xfrm>
-            <a:off x="2363097" y="2939686"/>
-            <a:ext cx="482824" cy="246221"/>
-          </a:xfrm>
-          <a:prstGeom prst="rect">
-            <a:avLst/>
-          </a:prstGeom>
-          <a:noFill/>
-        </p:spPr>
-        <p:txBody>
-          <a:bodyPr wrap="none" rtlCol="0">
-            <a:spAutoFit/>
-          </a:bodyPr>
-          <a:lstStyle/>
-          <a:p>
-            <a:r>
-              <a:rPr lang="en-GB" sz="1000" b="1" dirty="0" smtClean="0"/>
-              <a:t>OAP1</a:t>
-            </a:r>
-            <a:endParaRPr lang="en-GB" sz="1000" b="1" dirty="0"/>
-          </a:p>
-        </p:txBody>
-      </p:sp>
-      <p:sp>
-        <p:nvSpPr>
-          <p:cNvPr id="12" name="ZoneTexte 11"/>
-          <p:cNvSpPr txBox="1"/>
-          <p:nvPr/>
-        </p:nvSpPr>
-        <p:spPr>
-          <a:xfrm>
-            <a:off x="3677809" y="3620357"/>
-            <a:ext cx="619080" cy="400110"/>
-          </a:xfrm>
-          <a:prstGeom prst="rect">
-            <a:avLst/>
-          </a:prstGeom>
-          <a:noFill/>
-        </p:spPr>
-        <p:txBody>
-          <a:bodyPr wrap="none" rtlCol="0">
-            <a:spAutoFit/>
-          </a:bodyPr>
-          <a:lstStyle/>
-          <a:p>
-            <a:r>
-              <a:rPr lang="en-GB" sz="1000" b="1" dirty="0" smtClean="0"/>
-              <a:t>Folding </a:t>
-            </a:r>
-          </a:p>
-          <a:p>
-            <a:r>
-              <a:rPr lang="en-GB" sz="1000" b="1" dirty="0" smtClean="0"/>
-              <a:t>mirror 1</a:t>
-            </a:r>
-            <a:endParaRPr lang="en-GB" sz="1000" b="1" dirty="0"/>
-          </a:p>
-        </p:txBody>
-      </p:sp>
-      <p:sp>
-        <p:nvSpPr>
-          <p:cNvPr id="14" name="ZoneTexte 13"/>
-          <p:cNvSpPr txBox="1"/>
-          <p:nvPr/>
-        </p:nvSpPr>
-        <p:spPr>
-          <a:xfrm>
-            <a:off x="4296889" y="5817531"/>
-            <a:ext cx="883575" cy="246221"/>
-          </a:xfrm>
-          <a:prstGeom prst="rect">
-            <a:avLst/>
-          </a:prstGeom>
-          <a:noFill/>
-        </p:spPr>
-        <p:txBody>
-          <a:bodyPr wrap="none" rtlCol="0">
-            <a:spAutoFit/>
-          </a:bodyPr>
-          <a:lstStyle/>
-          <a:p>
-            <a:r>
-              <a:rPr lang="en-GB" sz="1000" b="1" dirty="0" smtClean="0"/>
-              <a:t>Paraxial lens</a:t>
-            </a:r>
-            <a:endParaRPr lang="en-GB" sz="1000" b="1" dirty="0"/>
-          </a:p>
-        </p:txBody>
-      </p:sp>
-      <p:sp>
-        <p:nvSpPr>
-          <p:cNvPr id="15" name="ZoneTexte 14"/>
-          <p:cNvSpPr txBox="1"/>
-          <p:nvPr/>
-        </p:nvSpPr>
-        <p:spPr>
-          <a:xfrm>
-            <a:off x="3428357" y="6457890"/>
-            <a:ext cx="962123" cy="400110"/>
-          </a:xfrm>
-          <a:prstGeom prst="rect">
-            <a:avLst/>
-          </a:prstGeom>
-          <a:noFill/>
-        </p:spPr>
-        <p:txBody>
-          <a:bodyPr wrap="none" rtlCol="0">
-            <a:spAutoFit/>
-          </a:bodyPr>
-          <a:lstStyle/>
-          <a:p>
-            <a:pPr algn="ctr"/>
-            <a:r>
-              <a:rPr lang="en-GB" sz="1000" b="1" dirty="0" smtClean="0"/>
-              <a:t>TT modulation</a:t>
-            </a:r>
-          </a:p>
-          <a:p>
-            <a:pPr algn="ctr"/>
-            <a:r>
-              <a:rPr lang="en-GB" sz="1000" b="1" dirty="0" smtClean="0"/>
-              <a:t>mirror</a:t>
-            </a:r>
-            <a:endParaRPr lang="en-GB" sz="1000" b="1" dirty="0"/>
-          </a:p>
-        </p:txBody>
-      </p:sp>
+            <a:endParaRPr lang="en-GB"/>
+          </a:p>
+        </p:txBody>
+      </p:sp>
+      <p:pic>
+        <p:nvPicPr>
+          <p:cNvPr id="16" name="Image 15"/>
+          <p:cNvPicPr>
+            <a:picLocks noChangeAspect="1"/>
+          </p:cNvPicPr>
+          <p:nvPr/>
+        </p:nvPicPr>
+        <p:blipFill>
+          <a:blip r:embed="rId3"/>
+          <a:stretch>
+            <a:fillRect/>
+          </a:stretch>
+        </p:blipFill>
+        <p:spPr>
+          <a:xfrm>
+            <a:off x="5840784" y="6065159"/>
+            <a:ext cx="2343150" cy="523829"/>
+          </a:xfrm>
+          <a:prstGeom prst="rect">
+            <a:avLst/>
+          </a:prstGeom>
+        </p:spPr>
+      </p:pic>
+      <p:pic>
+        <p:nvPicPr>
+          <p:cNvPr id="17" name="Image 16"/>
+          <p:cNvPicPr>
+            <a:picLocks noChangeAspect="1"/>
+          </p:cNvPicPr>
+          <p:nvPr/>
+        </p:nvPicPr>
+        <p:blipFill>
+          <a:blip r:embed="rId4"/>
+          <a:stretch>
+            <a:fillRect/>
+          </a:stretch>
+        </p:blipFill>
+        <p:spPr>
+          <a:xfrm>
+            <a:off x="2437150" y="6099685"/>
+            <a:ext cx="2197261" cy="457074"/>
+          </a:xfrm>
+          <a:prstGeom prst="rect">
+            <a:avLst/>
+          </a:prstGeom>
+        </p:spPr>
+      </p:pic>
     </p:spTree>
     <p:extLst>
       <p:ext uri="{BB962C8B-B14F-4D97-AF65-F5344CB8AC3E}">
@@ -10830,7 +10988,7 @@
       </p:grpSpPr>
       <p:pic>
         <p:nvPicPr>
-          <p:cNvPr id="4" name="Image 3"/>
+          <p:cNvPr id="17" name="Image 16"/>
           <p:cNvPicPr>
             <a:picLocks noChangeAspect="1"/>
           </p:cNvPicPr>
@@ -10844,66 +11002,405 @@
         </p:blipFill>
         <p:spPr>
           <a:xfrm>
-            <a:off x="-868680" y="-100584"/>
-            <a:ext cx="13952314" cy="6281928"/>
+            <a:off x="-968908" y="-552451"/>
+            <a:ext cx="14249400" cy="7924800"/>
           </a:xfrm>
           <a:prstGeom prst="rect">
             <a:avLst/>
           </a:prstGeom>
         </p:spPr>
       </p:pic>
-      <p:pic>
-        <p:nvPicPr>
-          <p:cNvPr id="5" name="Image 4"/>
-          <p:cNvPicPr>
-            <a:picLocks noChangeAspect="1"/>
-          </p:cNvPicPr>
-          <p:nvPr/>
-        </p:nvPicPr>
-        <p:blipFill>
-          <a:blip r:embed="rId3"/>
-          <a:stretch>
-            <a:fillRect/>
-          </a:stretch>
-        </p:blipFill>
-        <p:spPr>
-          <a:xfrm>
-            <a:off x="5141214" y="5840659"/>
-            <a:ext cx="3902202" cy="258389"/>
-          </a:xfrm>
-          <a:prstGeom prst="rect">
-            <a:avLst/>
-          </a:prstGeom>
-        </p:spPr>
-      </p:pic>
-      <p:pic>
-        <p:nvPicPr>
-          <p:cNvPr id="6" name="Image 5"/>
-          <p:cNvPicPr>
-            <a:picLocks noChangeAspect="1"/>
-          </p:cNvPicPr>
-          <p:nvPr/>
-        </p:nvPicPr>
-        <p:blipFill>
-          <a:blip r:embed="rId4"/>
-          <a:stretch>
-            <a:fillRect/>
-          </a:stretch>
-        </p:blipFill>
-        <p:spPr>
-          <a:xfrm>
-            <a:off x="9202033" y="5635288"/>
-            <a:ext cx="2575439" cy="518624"/>
-          </a:xfrm>
-          <a:prstGeom prst="rect">
-            <a:avLst/>
-          </a:prstGeom>
-        </p:spPr>
-      </p:pic>
+      <p:sp>
+        <p:nvSpPr>
+          <p:cNvPr id="5" name="ZoneTexte 4"/>
+          <p:cNvSpPr txBox="1"/>
+          <p:nvPr/>
+        </p:nvSpPr>
+        <p:spPr>
+          <a:xfrm>
+            <a:off x="475871" y="5595522"/>
+            <a:ext cx="996876" cy="738664"/>
+          </a:xfrm>
+          <a:prstGeom prst="rect">
+            <a:avLst/>
+          </a:prstGeom>
+          <a:noFill/>
+        </p:spPr>
+        <p:txBody>
+          <a:bodyPr wrap="none" rtlCol="0">
+            <a:spAutoFit/>
+          </a:bodyPr>
+          <a:lstStyle/>
+          <a:p>
+            <a:pPr algn="ctr"/>
+            <a:r>
+              <a:rPr lang="en-GB" sz="1400" b="1" dirty="0" smtClean="0"/>
+              <a:t>Telescope</a:t>
+            </a:r>
+          </a:p>
+          <a:p>
+            <a:pPr algn="ctr"/>
+            <a:r>
+              <a:rPr lang="en-GB" sz="1400" b="1" dirty="0"/>
+              <a:t>f</a:t>
+            </a:r>
+            <a:r>
+              <a:rPr lang="en-GB" sz="1400" b="1" dirty="0" smtClean="0"/>
+              <a:t>ocal plane</a:t>
+            </a:r>
+          </a:p>
+          <a:p>
+            <a:pPr algn="ctr"/>
+            <a:r>
+              <a:rPr lang="en-GB" sz="1400" b="1" dirty="0" smtClean="0"/>
+              <a:t>(FoV = 1’)</a:t>
+            </a:r>
+            <a:endParaRPr lang="en-GB" sz="1400" b="1" dirty="0"/>
+          </a:p>
+        </p:txBody>
+      </p:sp>
+      <p:sp>
+        <p:nvSpPr>
+          <p:cNvPr id="6" name="ZoneTexte 5"/>
+          <p:cNvSpPr txBox="1"/>
+          <p:nvPr/>
+        </p:nvSpPr>
+        <p:spPr>
+          <a:xfrm>
+            <a:off x="5578391" y="6324536"/>
+            <a:ext cx="1154803" cy="738664"/>
+          </a:xfrm>
+          <a:prstGeom prst="rect">
+            <a:avLst/>
+          </a:prstGeom>
+          <a:noFill/>
+        </p:spPr>
+        <p:txBody>
+          <a:bodyPr wrap="none" rtlCol="0">
+            <a:spAutoFit/>
+          </a:bodyPr>
+          <a:lstStyle/>
+          <a:p>
+            <a:pPr algn="ctr"/>
+            <a:r>
+              <a:rPr lang="en-GB" sz="1400" b="1" dirty="0" smtClean="0"/>
+              <a:t>Intermediate</a:t>
+            </a:r>
+          </a:p>
+          <a:p>
+            <a:pPr algn="ctr"/>
+            <a:r>
+              <a:rPr lang="en-GB" sz="1400" b="1" dirty="0"/>
+              <a:t>f</a:t>
+            </a:r>
+            <a:r>
+              <a:rPr lang="en-GB" sz="1400" b="1" dirty="0" smtClean="0"/>
+              <a:t>ocal plane</a:t>
+            </a:r>
+          </a:p>
+          <a:p>
+            <a:pPr algn="ctr"/>
+            <a:r>
+              <a:rPr lang="en-GB" sz="1400" b="1" dirty="0" smtClean="0"/>
+              <a:t>(FoV = 1’)</a:t>
+            </a:r>
+            <a:endParaRPr lang="en-GB" sz="1400" b="1" dirty="0"/>
+          </a:p>
+        </p:txBody>
+      </p:sp>
+      <p:sp>
+        <p:nvSpPr>
+          <p:cNvPr id="7" name="ZoneTexte 6"/>
+          <p:cNvSpPr txBox="1"/>
+          <p:nvPr/>
+        </p:nvSpPr>
+        <p:spPr>
+          <a:xfrm>
+            <a:off x="214005" y="4216244"/>
+            <a:ext cx="455574" cy="307777"/>
+          </a:xfrm>
+          <a:prstGeom prst="rect">
+            <a:avLst/>
+          </a:prstGeom>
+          <a:noFill/>
+        </p:spPr>
+        <p:txBody>
+          <a:bodyPr wrap="none" rtlCol="0">
+            <a:spAutoFit/>
+          </a:bodyPr>
+          <a:lstStyle/>
+          <a:p>
+            <a:r>
+              <a:rPr lang="en-GB" sz="1400" b="1" dirty="0" smtClean="0"/>
+              <a:t>DM</a:t>
+            </a:r>
+            <a:endParaRPr lang="en-GB" sz="1400" b="1" dirty="0"/>
+          </a:p>
+        </p:txBody>
+      </p:sp>
+      <p:sp>
+        <p:nvSpPr>
+          <p:cNvPr id="8" name="ZoneTexte 7"/>
+          <p:cNvSpPr txBox="1"/>
+          <p:nvPr/>
+        </p:nvSpPr>
+        <p:spPr>
+          <a:xfrm>
+            <a:off x="4725710" y="5287745"/>
+            <a:ext cx="600614" cy="307777"/>
+          </a:xfrm>
+          <a:prstGeom prst="rect">
+            <a:avLst/>
+          </a:prstGeom>
+          <a:noFill/>
+        </p:spPr>
+        <p:txBody>
+          <a:bodyPr wrap="none" rtlCol="0">
+            <a:spAutoFit/>
+          </a:bodyPr>
+          <a:lstStyle/>
+          <a:p>
+            <a:r>
+              <a:rPr lang="en-GB" sz="1400" b="1" dirty="0" smtClean="0"/>
+              <a:t>OAP0</a:t>
+            </a:r>
+            <a:endParaRPr lang="en-GB" sz="1400" b="1" dirty="0"/>
+          </a:p>
+        </p:txBody>
+      </p:sp>
+      <p:sp>
+        <p:nvSpPr>
+          <p:cNvPr id="9" name="ZoneTexte 8"/>
+          <p:cNvSpPr txBox="1"/>
+          <p:nvPr/>
+        </p:nvSpPr>
+        <p:spPr>
+          <a:xfrm>
+            <a:off x="1472747" y="3121222"/>
+            <a:ext cx="600614" cy="307777"/>
+          </a:xfrm>
+          <a:prstGeom prst="rect">
+            <a:avLst/>
+          </a:prstGeom>
+          <a:noFill/>
+        </p:spPr>
+        <p:txBody>
+          <a:bodyPr wrap="none" rtlCol="0">
+            <a:spAutoFit/>
+          </a:bodyPr>
+          <a:lstStyle/>
+          <a:p>
+            <a:r>
+              <a:rPr lang="en-GB" sz="1400" b="1" dirty="0" smtClean="0"/>
+              <a:t>OAP1</a:t>
+            </a:r>
+            <a:endParaRPr lang="en-GB" sz="1400" b="1" dirty="0"/>
+          </a:p>
+        </p:txBody>
+      </p:sp>
+      <p:sp>
+        <p:nvSpPr>
+          <p:cNvPr id="10" name="ZoneTexte 9"/>
+          <p:cNvSpPr txBox="1"/>
+          <p:nvPr/>
+        </p:nvSpPr>
+        <p:spPr>
+          <a:xfrm>
+            <a:off x="3601609" y="4310802"/>
+            <a:ext cx="793230" cy="523220"/>
+          </a:xfrm>
+          <a:prstGeom prst="rect">
+            <a:avLst/>
+          </a:prstGeom>
+          <a:noFill/>
+        </p:spPr>
+        <p:txBody>
+          <a:bodyPr wrap="none" rtlCol="0">
+            <a:spAutoFit/>
+          </a:bodyPr>
+          <a:lstStyle/>
+          <a:p>
+            <a:r>
+              <a:rPr lang="en-GB" sz="1400" b="1" dirty="0" smtClean="0"/>
+              <a:t>Folding </a:t>
+            </a:r>
+          </a:p>
+          <a:p>
+            <a:r>
+              <a:rPr lang="en-GB" sz="1400" b="1" dirty="0" smtClean="0"/>
+              <a:t>mirror 1</a:t>
+            </a:r>
+            <a:endParaRPr lang="en-GB" sz="1400" b="1" dirty="0"/>
+          </a:p>
+        </p:txBody>
+      </p:sp>
+      <p:sp>
+        <p:nvSpPr>
+          <p:cNvPr id="14" name="ZoneTexte 13"/>
+          <p:cNvSpPr txBox="1"/>
+          <p:nvPr/>
+        </p:nvSpPr>
+        <p:spPr>
+          <a:xfrm>
+            <a:off x="4499133" y="6353050"/>
+            <a:ext cx="996619" cy="523220"/>
+          </a:xfrm>
+          <a:prstGeom prst="rect">
+            <a:avLst/>
+          </a:prstGeom>
+          <a:noFill/>
+        </p:spPr>
+        <p:txBody>
+          <a:bodyPr wrap="none" rtlCol="0">
+            <a:spAutoFit/>
+          </a:bodyPr>
+          <a:lstStyle/>
+          <a:p>
+            <a:pPr algn="ctr"/>
+            <a:r>
+              <a:rPr lang="en-GB" sz="1400" b="1" dirty="0" smtClean="0"/>
+              <a:t>Dichroic</a:t>
+            </a:r>
+          </a:p>
+          <a:p>
+            <a:pPr algn="ctr"/>
+            <a:r>
+              <a:rPr lang="en-GB" sz="1400" b="1" dirty="0" smtClean="0"/>
+              <a:t>membrane</a:t>
+            </a:r>
+            <a:endParaRPr lang="en-GB" sz="1400" b="1" dirty="0"/>
+          </a:p>
+        </p:txBody>
+      </p:sp>
+      <mc:AlternateContent xmlns:mc="http://schemas.openxmlformats.org/markup-compatibility/2006">
+        <mc:Choice xmlns:a14="http://schemas.microsoft.com/office/drawing/2010/main" Requires="a14">
+          <p:sp>
+            <p:nvSpPr>
+              <p:cNvPr id="15" name="ZoneTexte 14"/>
+              <p:cNvSpPr txBox="1"/>
+              <p:nvPr/>
+            </p:nvSpPr>
+            <p:spPr>
+              <a:xfrm>
+                <a:off x="5288497" y="6476160"/>
+                <a:ext cx="497150" cy="276999"/>
+              </a:xfrm>
+              <a:prstGeom prst="rect">
+                <a:avLst/>
+              </a:prstGeom>
+              <a:noFill/>
+            </p:spPr>
+            <p:txBody>
+              <a:bodyPr wrap="square" lIns="0" tIns="0" rIns="0" bIns="0" rtlCol="0">
+                <a:spAutoFit/>
+              </a:bodyPr>
+              <a:lstStyle/>
+              <a:p>
+                <a:pPr/>
+                <a14:m>
+                  <m:oMathPara xmlns:m="http://schemas.openxmlformats.org/officeDocument/2006/math">
+                    <m:oMathParaPr>
+                      <m:jc m:val="centerGroup"/>
+                    </m:oMathParaPr>
+                    <m:oMath xmlns:m="http://schemas.openxmlformats.org/officeDocument/2006/math">
+                      <m:r>
+                        <a:rPr lang="en-GB" i="1" smtClean="0">
+                          <a:latin typeface="Cambria Math" panose="02040503050406030204" pitchFamily="18" charset="0"/>
+                          <a:ea typeface="Cambria Math" panose="02040503050406030204" pitchFamily="18" charset="0"/>
+                        </a:rPr>
+                        <m:t>≈</m:t>
+                      </m:r>
+                    </m:oMath>
+                  </m:oMathPara>
+                </a14:m>
+                <a:endParaRPr lang="en-GB" sz="3200" dirty="0"/>
+              </a:p>
+            </p:txBody>
+          </p:sp>
+        </mc:Choice>
+        <mc:Fallback>
+          <p:sp>
+            <p:nvSpPr>
+              <p:cNvPr id="15" name="ZoneTexte 14"/>
+              <p:cNvSpPr txBox="1">
+                <a:spLocks noRot="1" noChangeAspect="1" noMove="1" noResize="1" noEditPoints="1" noAdjustHandles="1" noChangeArrowheads="1" noChangeShapeType="1" noTextEdit="1"/>
+              </p:cNvSpPr>
+              <p:nvPr/>
+            </p:nvSpPr>
+            <p:spPr>
+              <a:xfrm>
+                <a:off x="5288497" y="6476160"/>
+                <a:ext cx="497150" cy="276999"/>
+              </a:xfrm>
+              <a:prstGeom prst="rect">
+                <a:avLst/>
+              </a:prstGeom>
+              <a:blipFill>
+                <a:blip r:embed="rId3"/>
+                <a:stretch>
+                  <a:fillRect/>
+                </a:stretch>
+              </a:blipFill>
+            </p:spPr>
+            <p:txBody>
+              <a:bodyPr/>
+              <a:lstStyle/>
+              <a:p>
+                <a:r>
+                  <a:rPr lang="en-GB">
+                    <a:noFill/>
+                  </a:rPr>
+                  <a:t> </a:t>
+                </a:r>
+              </a:p>
+            </p:txBody>
+          </p:sp>
+        </mc:Fallback>
+      </mc:AlternateContent>
+      <p:sp>
+        <p:nvSpPr>
+          <p:cNvPr id="16" name="ZoneTexte 15"/>
+          <p:cNvSpPr txBox="1"/>
+          <p:nvPr/>
+        </p:nvSpPr>
+        <p:spPr>
+          <a:xfrm>
+            <a:off x="1908127" y="5801316"/>
+            <a:ext cx="793230" cy="523220"/>
+          </a:xfrm>
+          <a:prstGeom prst="rect">
+            <a:avLst/>
+          </a:prstGeom>
+          <a:noFill/>
+        </p:spPr>
+        <p:txBody>
+          <a:bodyPr wrap="none" rtlCol="0">
+            <a:spAutoFit/>
+          </a:bodyPr>
+          <a:lstStyle/>
+          <a:p>
+            <a:r>
+              <a:rPr lang="en-GB" sz="1400" b="1" dirty="0" smtClean="0"/>
+              <a:t>Folding </a:t>
+            </a:r>
+          </a:p>
+          <a:p>
+            <a:r>
+              <a:rPr lang="en-GB" sz="1400" b="1" dirty="0" smtClean="0"/>
+              <a:t>mirror </a:t>
+            </a:r>
+            <a:r>
+              <a:rPr lang="en-GB" sz="1400" b="1" dirty="0" smtClean="0"/>
+              <a:t>2</a:t>
+            </a:r>
+            <a:endParaRPr lang="en-GB" sz="1400" b="1" dirty="0"/>
+          </a:p>
+        </p:txBody>
+      </p:sp>
     </p:spTree>
     <p:extLst>
       <p:ext uri="{BB962C8B-B14F-4D97-AF65-F5344CB8AC3E}">
-        <p14:creationId xmlns:p14="http://schemas.microsoft.com/office/powerpoint/2010/main" val="2562911443"/>
+        <p14:creationId xmlns:p14="http://schemas.microsoft.com/office/powerpoint/2010/main" val="2135644561"/>
       </p:ext>
     </p:extLst>
   </p:cSld>
@@ -10932,462 +11429,30 @@
       </p:grpSpPr>
       <p:pic>
         <p:nvPicPr>
-          <p:cNvPr id="19" name="Image 18"/>
+          <p:cNvPr id="8" name="Image 7"/>
           <p:cNvPicPr>
             <a:picLocks noChangeAspect="1"/>
           </p:cNvPicPr>
           <p:nvPr/>
         </p:nvPicPr>
-        <p:blipFill>
+        <p:blipFill rotWithShape="1">
           <a:blip r:embed="rId2"/>
-          <a:stretch>
-            <a:fillRect/>
-          </a:stretch>
+          <a:srcRect r="976"/>
+          <a:stretch/>
         </p:blipFill>
         <p:spPr>
           <a:xfrm>
-            <a:off x="-657313" y="0"/>
-            <a:ext cx="13628214" cy="6090082"/>
+            <a:off x="361951" y="2268391"/>
+            <a:ext cx="11215686" cy="5515478"/>
           </a:xfrm>
           <a:prstGeom prst="rect">
             <a:avLst/>
           </a:prstGeom>
         </p:spPr>
       </p:pic>
-      <p:sp>
-        <p:nvSpPr>
-          <p:cNvPr id="20" name="ZoneTexte 19"/>
-          <p:cNvSpPr txBox="1"/>
-          <p:nvPr/>
-        </p:nvSpPr>
-        <p:spPr>
-          <a:xfrm>
-            <a:off x="-435561" y="4132278"/>
-            <a:ext cx="766555" cy="553998"/>
-          </a:xfrm>
-          <a:prstGeom prst="rect">
-            <a:avLst/>
-          </a:prstGeom>
-          <a:noFill/>
-        </p:spPr>
-        <p:txBody>
-          <a:bodyPr wrap="none" rtlCol="0">
-            <a:spAutoFit/>
-          </a:bodyPr>
-          <a:lstStyle/>
-          <a:p>
-            <a:pPr algn="ctr"/>
-            <a:r>
-              <a:rPr lang="en-GB" sz="1000" b="1" dirty="0" smtClean="0"/>
-              <a:t>Telescope</a:t>
-            </a:r>
-          </a:p>
-          <a:p>
-            <a:pPr algn="ctr"/>
-            <a:r>
-              <a:rPr lang="en-GB" sz="1000" b="1" dirty="0"/>
-              <a:t>f</a:t>
-            </a:r>
-            <a:r>
-              <a:rPr lang="en-GB" sz="1000" b="1" dirty="0" smtClean="0"/>
-              <a:t>ocal plane</a:t>
-            </a:r>
-          </a:p>
-          <a:p>
-            <a:pPr algn="ctr"/>
-            <a:r>
-              <a:rPr lang="en-GB" sz="1000" b="1" dirty="0" smtClean="0"/>
-              <a:t>(FoV = 1’)</a:t>
-            </a:r>
-            <a:endParaRPr lang="en-GB" sz="1000" b="1" dirty="0"/>
-          </a:p>
-        </p:txBody>
-      </p:sp>
-      <p:sp>
-        <p:nvSpPr>
-          <p:cNvPr id="21" name="ZoneTexte 20"/>
-          <p:cNvSpPr txBox="1"/>
-          <p:nvPr/>
-        </p:nvSpPr>
-        <p:spPr>
-          <a:xfrm>
-            <a:off x="551086" y="4510088"/>
-            <a:ext cx="881972" cy="553998"/>
-          </a:xfrm>
-          <a:prstGeom prst="rect">
-            <a:avLst/>
-          </a:prstGeom>
-          <a:noFill/>
-        </p:spPr>
-        <p:txBody>
-          <a:bodyPr wrap="none" rtlCol="0">
-            <a:spAutoFit/>
-          </a:bodyPr>
-          <a:lstStyle/>
-          <a:p>
-            <a:pPr algn="ctr"/>
-            <a:r>
-              <a:rPr lang="en-GB" sz="1000" b="1" dirty="0" smtClean="0"/>
-              <a:t>Intermediate</a:t>
-            </a:r>
-          </a:p>
-          <a:p>
-            <a:pPr algn="ctr"/>
-            <a:r>
-              <a:rPr lang="en-GB" sz="1000" b="1" dirty="0"/>
-              <a:t>f</a:t>
-            </a:r>
-            <a:r>
-              <a:rPr lang="en-GB" sz="1000" b="1" dirty="0" smtClean="0"/>
-              <a:t>ocal plane</a:t>
-            </a:r>
-          </a:p>
-          <a:p>
-            <a:pPr algn="ctr"/>
-            <a:r>
-              <a:rPr lang="en-GB" sz="1000" b="1" dirty="0" smtClean="0"/>
-              <a:t>(FoV = 1’)</a:t>
-            </a:r>
-            <a:endParaRPr lang="en-GB" sz="1000" b="1" dirty="0"/>
-          </a:p>
-        </p:txBody>
-      </p:sp>
-      <p:sp>
-        <p:nvSpPr>
-          <p:cNvPr id="22" name="Rectangle 21"/>
-          <p:cNvSpPr/>
-          <p:nvPr/>
-        </p:nvSpPr>
-        <p:spPr>
-          <a:xfrm>
-            <a:off x="-467997" y="3702978"/>
-            <a:ext cx="798991" cy="807110"/>
-          </a:xfrm>
-          <a:prstGeom prst="rect">
-            <a:avLst/>
-          </a:prstGeom>
-          <a:solidFill>
-            <a:srgbClr val="5B9BD5">
-              <a:alpha val="21176"/>
-            </a:srgbClr>
-          </a:solidFill>
-          <a:ln>
-            <a:solidFill>
-              <a:schemeClr val="tx1"/>
-            </a:solidFill>
-          </a:ln>
-        </p:spPr>
-        <p:style>
-          <a:lnRef idx="2">
-            <a:schemeClr val="accent1">
-              <a:shade val="50000"/>
-            </a:schemeClr>
-          </a:lnRef>
-          <a:fillRef idx="1">
-            <a:schemeClr val="accent1"/>
-          </a:fillRef>
-          <a:effectRef idx="0">
-            <a:schemeClr val="accent1"/>
-          </a:effectRef>
-          <a:fontRef idx="minor">
-            <a:schemeClr val="lt1"/>
-          </a:fontRef>
-        </p:style>
-        <p:txBody>
-          <a:bodyPr rtlCol="0" anchor="ctr"/>
-          <a:lstStyle/>
-          <a:p>
-            <a:pPr algn="ctr"/>
-            <a:endParaRPr lang="en-GB" dirty="0"/>
-          </a:p>
-        </p:txBody>
-      </p:sp>
-      <p:sp>
-        <p:nvSpPr>
-          <p:cNvPr id="23" name="ZoneTexte 22"/>
-          <p:cNvSpPr txBox="1"/>
-          <p:nvPr/>
-        </p:nvSpPr>
-        <p:spPr>
-          <a:xfrm>
-            <a:off x="-467998" y="3720733"/>
-            <a:ext cx="457731" cy="246221"/>
-          </a:xfrm>
-          <a:prstGeom prst="rect">
-            <a:avLst/>
-          </a:prstGeom>
-          <a:noFill/>
-        </p:spPr>
-        <p:txBody>
-          <a:bodyPr wrap="square" rtlCol="0">
-            <a:spAutoFit/>
-          </a:bodyPr>
-          <a:lstStyle/>
-          <a:p>
-            <a:r>
-              <a:rPr lang="en-GB" sz="1000" b="1" dirty="0"/>
-              <a:t>FCL</a:t>
-            </a:r>
-          </a:p>
-        </p:txBody>
-      </p:sp>
-      <p:sp>
-        <p:nvSpPr>
-          <p:cNvPr id="24" name="ZoneTexte 23"/>
-          <p:cNvSpPr txBox="1"/>
-          <p:nvPr/>
-        </p:nvSpPr>
-        <p:spPr>
-          <a:xfrm>
-            <a:off x="-467998" y="3280569"/>
-            <a:ext cx="377026" cy="246221"/>
-          </a:xfrm>
-          <a:prstGeom prst="rect">
-            <a:avLst/>
-          </a:prstGeom>
-          <a:noFill/>
-        </p:spPr>
-        <p:txBody>
-          <a:bodyPr wrap="none" rtlCol="0">
-            <a:spAutoFit/>
-          </a:bodyPr>
-          <a:lstStyle/>
-          <a:p>
-            <a:r>
-              <a:rPr lang="en-GB" sz="1000" b="1" dirty="0" smtClean="0"/>
-              <a:t>DM</a:t>
-            </a:r>
-            <a:endParaRPr lang="en-GB" sz="1000" b="1" dirty="0"/>
-          </a:p>
-        </p:txBody>
-      </p:sp>
-      <p:sp>
-        <p:nvSpPr>
-          <p:cNvPr id="25" name="ZoneTexte 24"/>
-          <p:cNvSpPr txBox="1"/>
-          <p:nvPr/>
-        </p:nvSpPr>
-        <p:spPr>
-          <a:xfrm>
-            <a:off x="1653151" y="3817210"/>
-            <a:ext cx="482824" cy="246221"/>
-          </a:xfrm>
-          <a:prstGeom prst="rect">
-            <a:avLst/>
-          </a:prstGeom>
-          <a:noFill/>
-        </p:spPr>
-        <p:txBody>
-          <a:bodyPr wrap="none" rtlCol="0">
-            <a:spAutoFit/>
-          </a:bodyPr>
-          <a:lstStyle/>
-          <a:p>
-            <a:r>
-              <a:rPr lang="en-GB" sz="1000" b="1" dirty="0" smtClean="0"/>
-              <a:t>OAP0</a:t>
-            </a:r>
-            <a:endParaRPr lang="en-GB" sz="1000" b="1" dirty="0"/>
-          </a:p>
-        </p:txBody>
-      </p:sp>
-      <p:sp>
-        <p:nvSpPr>
-          <p:cNvPr id="26" name="ZoneTexte 25"/>
-          <p:cNvSpPr txBox="1"/>
-          <p:nvPr/>
-        </p:nvSpPr>
-        <p:spPr>
-          <a:xfrm>
-            <a:off x="211062" y="2728472"/>
-            <a:ext cx="482824" cy="246221"/>
-          </a:xfrm>
-          <a:prstGeom prst="rect">
-            <a:avLst/>
-          </a:prstGeom>
-          <a:noFill/>
-        </p:spPr>
-        <p:txBody>
-          <a:bodyPr wrap="none" rtlCol="0">
-            <a:spAutoFit/>
-          </a:bodyPr>
-          <a:lstStyle/>
-          <a:p>
-            <a:r>
-              <a:rPr lang="en-GB" sz="1000" b="1" dirty="0" smtClean="0"/>
-              <a:t>OAP1</a:t>
-            </a:r>
-            <a:endParaRPr lang="en-GB" sz="1000" b="1" dirty="0"/>
-          </a:p>
-        </p:txBody>
-      </p:sp>
-      <p:sp>
-        <p:nvSpPr>
-          <p:cNvPr id="27" name="ZoneTexte 26"/>
-          <p:cNvSpPr txBox="1"/>
-          <p:nvPr/>
-        </p:nvSpPr>
-        <p:spPr>
-          <a:xfrm>
-            <a:off x="1343611" y="3259960"/>
-            <a:ext cx="619080" cy="400110"/>
-          </a:xfrm>
-          <a:prstGeom prst="rect">
-            <a:avLst/>
-          </a:prstGeom>
-          <a:noFill/>
-        </p:spPr>
-        <p:txBody>
-          <a:bodyPr wrap="none" rtlCol="0">
-            <a:spAutoFit/>
-          </a:bodyPr>
-          <a:lstStyle/>
-          <a:p>
-            <a:r>
-              <a:rPr lang="en-GB" sz="1000" b="1" dirty="0" smtClean="0"/>
-              <a:t>Folding </a:t>
-            </a:r>
-          </a:p>
-          <a:p>
-            <a:r>
-              <a:rPr lang="en-GB" sz="1000" b="1" dirty="0" smtClean="0"/>
-              <a:t>mirror 1</a:t>
-            </a:r>
-            <a:endParaRPr lang="en-GB" sz="1000" b="1" dirty="0"/>
-          </a:p>
-        </p:txBody>
-      </p:sp>
-      <p:sp>
-        <p:nvSpPr>
-          <p:cNvPr id="28" name="ZoneTexte 27"/>
-          <p:cNvSpPr txBox="1"/>
-          <p:nvPr/>
-        </p:nvSpPr>
-        <p:spPr>
-          <a:xfrm>
-            <a:off x="901823" y="5330862"/>
-            <a:ext cx="883575" cy="246221"/>
-          </a:xfrm>
-          <a:prstGeom prst="rect">
-            <a:avLst/>
-          </a:prstGeom>
-          <a:noFill/>
-        </p:spPr>
-        <p:txBody>
-          <a:bodyPr wrap="none" rtlCol="0">
-            <a:spAutoFit/>
-          </a:bodyPr>
-          <a:lstStyle/>
-          <a:p>
-            <a:r>
-              <a:rPr lang="en-GB" sz="1000" b="1" dirty="0" smtClean="0"/>
-              <a:t>Paraxial lens</a:t>
-            </a:r>
-            <a:endParaRPr lang="en-GB" sz="1000" b="1" dirty="0"/>
-          </a:p>
-        </p:txBody>
-      </p:sp>
-      <p:sp>
-        <p:nvSpPr>
-          <p:cNvPr id="29" name="ZoneTexte 28"/>
-          <p:cNvSpPr txBox="1"/>
-          <p:nvPr/>
-        </p:nvSpPr>
-        <p:spPr>
-          <a:xfrm>
-            <a:off x="1962691" y="5704445"/>
-            <a:ext cx="962123" cy="400110"/>
-          </a:xfrm>
-          <a:prstGeom prst="rect">
-            <a:avLst/>
-          </a:prstGeom>
-          <a:noFill/>
-        </p:spPr>
-        <p:txBody>
-          <a:bodyPr wrap="none" rtlCol="0">
-            <a:spAutoFit/>
-          </a:bodyPr>
-          <a:lstStyle/>
-          <a:p>
-            <a:pPr algn="ctr"/>
-            <a:r>
-              <a:rPr lang="en-GB" sz="1000" b="1" dirty="0" smtClean="0"/>
-              <a:t>TT modulation</a:t>
-            </a:r>
-          </a:p>
-          <a:p>
-            <a:pPr algn="ctr"/>
-            <a:r>
-              <a:rPr lang="en-GB" sz="1000" b="1" dirty="0" smtClean="0"/>
-              <a:t>mirror</a:t>
-            </a:r>
-            <a:endParaRPr lang="en-GB" sz="1000" b="1" dirty="0"/>
-          </a:p>
-        </p:txBody>
-      </p:sp>
-      <p:sp>
-        <p:nvSpPr>
-          <p:cNvPr id="30" name="ZoneTexte 29"/>
-          <p:cNvSpPr txBox="1"/>
-          <p:nvPr/>
-        </p:nvSpPr>
-        <p:spPr>
-          <a:xfrm>
-            <a:off x="2041239" y="2623852"/>
-            <a:ext cx="721672" cy="246221"/>
-          </a:xfrm>
-          <a:prstGeom prst="rect">
-            <a:avLst/>
-          </a:prstGeom>
-          <a:noFill/>
-        </p:spPr>
-        <p:txBody>
-          <a:bodyPr wrap="none" rtlCol="0">
-            <a:spAutoFit/>
-          </a:bodyPr>
-          <a:lstStyle/>
-          <a:p>
-            <a:r>
-              <a:rPr lang="en-GB" sz="1000" b="1" dirty="0" smtClean="0"/>
-              <a:t>Relay lens</a:t>
-            </a:r>
-            <a:endParaRPr lang="en-GB" sz="1000" b="1" dirty="0"/>
-          </a:p>
-        </p:txBody>
-      </p:sp>
-      <p:sp>
-        <p:nvSpPr>
-          <p:cNvPr id="31" name="ZoneTexte 30"/>
-          <p:cNvSpPr txBox="1"/>
-          <p:nvPr/>
-        </p:nvSpPr>
-        <p:spPr>
-          <a:xfrm>
-            <a:off x="2041239" y="2303558"/>
-            <a:ext cx="881973" cy="246221"/>
-          </a:xfrm>
-          <a:prstGeom prst="rect">
-            <a:avLst/>
-          </a:prstGeom>
-          <a:noFill/>
-        </p:spPr>
-        <p:txBody>
-          <a:bodyPr wrap="none" rtlCol="0">
-            <a:spAutoFit/>
-          </a:bodyPr>
-          <a:lstStyle/>
-          <a:p>
-            <a:r>
-              <a:rPr lang="en-GB" sz="1000" b="1" dirty="0" smtClean="0"/>
-              <a:t>CCD detector</a:t>
-            </a:r>
-            <a:endParaRPr lang="en-GB" sz="1000" b="1" dirty="0"/>
-          </a:p>
-        </p:txBody>
-      </p:sp>
       <p:pic>
         <p:nvPicPr>
-          <p:cNvPr id="32" name="Image 31"/>
+          <p:cNvPr id="3" name="Image 2"/>
           <p:cNvPicPr>
             <a:picLocks noChangeAspect="1"/>
           </p:cNvPicPr>
@@ -11401,23 +11466,439 @@
         </p:blipFill>
         <p:spPr>
           <a:xfrm>
-            <a:off x="3506237" y="5330862"/>
-            <a:ext cx="4647060" cy="548730"/>
+            <a:off x="7810501" y="7362825"/>
+            <a:ext cx="3728458" cy="421044"/>
           </a:xfrm>
           <a:prstGeom prst="rect">
             <a:avLst/>
           </a:prstGeom>
         </p:spPr>
       </p:pic>
-      <p:sp>
-        <p:nvSpPr>
-          <p:cNvPr id="33" name="ZoneTexte 32"/>
-          <p:cNvSpPr txBox="1"/>
-          <p:nvPr/>
-        </p:nvSpPr>
-        <p:spPr>
-          <a:xfrm>
-            <a:off x="2513081" y="3539928"/>
+      <p:pic>
+        <p:nvPicPr>
+          <p:cNvPr id="7" name="Image 6"/>
+          <p:cNvPicPr>
+            <a:picLocks noChangeAspect="1"/>
+          </p:cNvPicPr>
+          <p:nvPr/>
+        </p:nvPicPr>
+        <p:blipFill>
+          <a:blip r:embed="rId4"/>
+          <a:stretch>
+            <a:fillRect/>
+          </a:stretch>
+        </p:blipFill>
+        <p:spPr>
+          <a:xfrm>
+            <a:off x="3790951" y="7238155"/>
+            <a:ext cx="2571750" cy="545713"/>
+          </a:xfrm>
+          <a:prstGeom prst="rect">
+            <a:avLst/>
+          </a:prstGeom>
+        </p:spPr>
+      </p:pic>
+      <p:pic>
+        <p:nvPicPr>
+          <p:cNvPr id="9" name="Image 8"/>
+          <p:cNvPicPr>
+            <a:picLocks noChangeAspect="1"/>
+          </p:cNvPicPr>
+          <p:nvPr/>
+        </p:nvPicPr>
+        <p:blipFill>
+          <a:blip r:embed="rId5"/>
+          <a:stretch>
+            <a:fillRect/>
+          </a:stretch>
+        </p:blipFill>
+        <p:spPr>
+          <a:xfrm>
+            <a:off x="361950" y="-392842"/>
+            <a:ext cx="11215687" cy="2661233"/>
+          </a:xfrm>
+          <a:prstGeom prst="rect">
+            <a:avLst/>
+          </a:prstGeom>
+        </p:spPr>
+      </p:pic>
+      <p:sp>
+        <p:nvSpPr>
+          <p:cNvPr id="10" name="ZoneTexte 9"/>
+          <p:cNvSpPr txBox="1"/>
+          <p:nvPr/>
+        </p:nvSpPr>
+        <p:spPr>
+          <a:xfrm>
+            <a:off x="519096" y="6090822"/>
+            <a:ext cx="766555" cy="553998"/>
+          </a:xfrm>
+          <a:prstGeom prst="rect">
+            <a:avLst/>
+          </a:prstGeom>
+          <a:noFill/>
+        </p:spPr>
+        <p:txBody>
+          <a:bodyPr wrap="none" rtlCol="0">
+            <a:spAutoFit/>
+          </a:bodyPr>
+          <a:lstStyle/>
+          <a:p>
+            <a:pPr algn="ctr"/>
+            <a:r>
+              <a:rPr lang="en-GB" sz="1000" b="1" dirty="0" smtClean="0"/>
+              <a:t>Telescope</a:t>
+            </a:r>
+          </a:p>
+          <a:p>
+            <a:pPr algn="ctr"/>
+            <a:r>
+              <a:rPr lang="en-GB" sz="1000" b="1" dirty="0"/>
+              <a:t>f</a:t>
+            </a:r>
+            <a:r>
+              <a:rPr lang="en-GB" sz="1000" b="1" dirty="0" smtClean="0"/>
+              <a:t>ocal plane</a:t>
+            </a:r>
+          </a:p>
+          <a:p>
+            <a:pPr algn="ctr"/>
+            <a:r>
+              <a:rPr lang="en-GB" sz="1000" b="1" dirty="0" smtClean="0"/>
+              <a:t>(FoV = 1’)</a:t>
+            </a:r>
+            <a:endParaRPr lang="en-GB" sz="1000" b="1" dirty="0"/>
+          </a:p>
+        </p:txBody>
+      </p:sp>
+      <p:sp>
+        <p:nvSpPr>
+          <p:cNvPr id="11" name="ZoneTexte 10"/>
+          <p:cNvSpPr txBox="1"/>
+          <p:nvPr/>
+        </p:nvSpPr>
+        <p:spPr>
+          <a:xfrm>
+            <a:off x="1408196" y="6317164"/>
+            <a:ext cx="881972" cy="553998"/>
+          </a:xfrm>
+          <a:prstGeom prst="rect">
+            <a:avLst/>
+          </a:prstGeom>
+          <a:noFill/>
+        </p:spPr>
+        <p:txBody>
+          <a:bodyPr wrap="none" rtlCol="0">
+            <a:spAutoFit/>
+          </a:bodyPr>
+          <a:lstStyle/>
+          <a:p>
+            <a:pPr algn="ctr"/>
+            <a:r>
+              <a:rPr lang="en-GB" sz="1000" b="1" dirty="0" smtClean="0"/>
+              <a:t>Intermediate</a:t>
+            </a:r>
+          </a:p>
+          <a:p>
+            <a:pPr algn="ctr"/>
+            <a:r>
+              <a:rPr lang="en-GB" sz="1000" b="1" dirty="0"/>
+              <a:t>f</a:t>
+            </a:r>
+            <a:r>
+              <a:rPr lang="en-GB" sz="1000" b="1" dirty="0" smtClean="0"/>
+              <a:t>ocal plane</a:t>
+            </a:r>
+          </a:p>
+          <a:p>
+            <a:pPr algn="ctr"/>
+            <a:r>
+              <a:rPr lang="en-GB" sz="1000" b="1" dirty="0" smtClean="0"/>
+              <a:t>(FoV = 1’)</a:t>
+            </a:r>
+            <a:endParaRPr lang="en-GB" sz="1000" b="1" dirty="0"/>
+          </a:p>
+        </p:txBody>
+      </p:sp>
+      <p:sp>
+        <p:nvSpPr>
+          <p:cNvPr id="12" name="ZoneTexte 11"/>
+          <p:cNvSpPr txBox="1"/>
+          <p:nvPr/>
+        </p:nvSpPr>
+        <p:spPr>
+          <a:xfrm>
+            <a:off x="519096" y="5488001"/>
+            <a:ext cx="377026" cy="246221"/>
+          </a:xfrm>
+          <a:prstGeom prst="rect">
+            <a:avLst/>
+          </a:prstGeom>
+          <a:noFill/>
+        </p:spPr>
+        <p:txBody>
+          <a:bodyPr wrap="none" rtlCol="0">
+            <a:spAutoFit/>
+          </a:bodyPr>
+          <a:lstStyle/>
+          <a:p>
+            <a:r>
+              <a:rPr lang="en-GB" sz="1000" b="1" dirty="0" smtClean="0"/>
+              <a:t>DM</a:t>
+            </a:r>
+            <a:endParaRPr lang="en-GB" sz="1000" b="1" dirty="0"/>
+          </a:p>
+        </p:txBody>
+      </p:sp>
+      <p:sp>
+        <p:nvSpPr>
+          <p:cNvPr id="13" name="ZoneTexte 12"/>
+          <p:cNvSpPr txBox="1"/>
+          <p:nvPr/>
+        </p:nvSpPr>
+        <p:spPr>
+          <a:xfrm>
+            <a:off x="2539620" y="5930767"/>
+            <a:ext cx="482824" cy="246221"/>
+          </a:xfrm>
+          <a:prstGeom prst="rect">
+            <a:avLst/>
+          </a:prstGeom>
+          <a:noFill/>
+        </p:spPr>
+        <p:txBody>
+          <a:bodyPr wrap="none" rtlCol="0">
+            <a:spAutoFit/>
+          </a:bodyPr>
+          <a:lstStyle/>
+          <a:p>
+            <a:r>
+              <a:rPr lang="en-GB" sz="1000" b="1" dirty="0" smtClean="0"/>
+              <a:t>OAP0</a:t>
+            </a:r>
+            <a:endParaRPr lang="en-GB" sz="1000" b="1" dirty="0"/>
+          </a:p>
+        </p:txBody>
+      </p:sp>
+      <p:sp>
+        <p:nvSpPr>
+          <p:cNvPr id="14" name="ZoneTexte 13"/>
+          <p:cNvSpPr txBox="1"/>
+          <p:nvPr/>
+        </p:nvSpPr>
+        <p:spPr>
+          <a:xfrm>
+            <a:off x="991497" y="5016136"/>
+            <a:ext cx="482824" cy="246221"/>
+          </a:xfrm>
+          <a:prstGeom prst="rect">
+            <a:avLst/>
+          </a:prstGeom>
+          <a:noFill/>
+        </p:spPr>
+        <p:txBody>
+          <a:bodyPr wrap="none" rtlCol="0">
+            <a:spAutoFit/>
+          </a:bodyPr>
+          <a:lstStyle/>
+          <a:p>
+            <a:r>
+              <a:rPr lang="en-GB" sz="1000" b="1" dirty="0" smtClean="0"/>
+              <a:t>OAP1</a:t>
+            </a:r>
+            <a:endParaRPr lang="en-GB" sz="1000" b="1" dirty="0"/>
+          </a:p>
+        </p:txBody>
+      </p:sp>
+      <p:sp>
+        <p:nvSpPr>
+          <p:cNvPr id="15" name="ZoneTexte 14"/>
+          <p:cNvSpPr txBox="1"/>
+          <p:nvPr/>
+        </p:nvSpPr>
+        <p:spPr>
+          <a:xfrm>
+            <a:off x="2058559" y="5411057"/>
+            <a:ext cx="619080" cy="400110"/>
+          </a:xfrm>
+          <a:prstGeom prst="rect">
+            <a:avLst/>
+          </a:prstGeom>
+          <a:noFill/>
+        </p:spPr>
+        <p:txBody>
+          <a:bodyPr wrap="none" rtlCol="0">
+            <a:spAutoFit/>
+          </a:bodyPr>
+          <a:lstStyle/>
+          <a:p>
+            <a:r>
+              <a:rPr lang="en-GB" sz="1000" b="1" dirty="0" smtClean="0"/>
+              <a:t>Folding </a:t>
+            </a:r>
+          </a:p>
+          <a:p>
+            <a:r>
+              <a:rPr lang="en-GB" sz="1000" b="1" dirty="0" smtClean="0"/>
+              <a:t>mirror 1</a:t>
+            </a:r>
+            <a:endParaRPr lang="en-GB" sz="1000" b="1" dirty="0"/>
+          </a:p>
+        </p:txBody>
+      </p:sp>
+      <p:sp>
+        <p:nvSpPr>
+          <p:cNvPr id="16" name="ZoneTexte 15"/>
+          <p:cNvSpPr txBox="1"/>
+          <p:nvPr/>
+        </p:nvSpPr>
+        <p:spPr>
+          <a:xfrm>
+            <a:off x="1863108" y="6865974"/>
+            <a:ext cx="883575" cy="246221"/>
+          </a:xfrm>
+          <a:prstGeom prst="rect">
+            <a:avLst/>
+          </a:prstGeom>
+          <a:noFill/>
+        </p:spPr>
+        <p:txBody>
+          <a:bodyPr wrap="none" rtlCol="0">
+            <a:spAutoFit/>
+          </a:bodyPr>
+          <a:lstStyle/>
+          <a:p>
+            <a:r>
+              <a:rPr lang="en-GB" sz="1000" b="1" dirty="0" smtClean="0"/>
+              <a:t>Paraxial lens</a:t>
+            </a:r>
+            <a:endParaRPr lang="en-GB" sz="1000" b="1" dirty="0"/>
+          </a:p>
+        </p:txBody>
+      </p:sp>
+      <p:sp>
+        <p:nvSpPr>
+          <p:cNvPr id="17" name="ZoneTexte 16"/>
+          <p:cNvSpPr txBox="1"/>
+          <p:nvPr/>
+        </p:nvSpPr>
+        <p:spPr>
+          <a:xfrm>
+            <a:off x="2058559" y="7295914"/>
+            <a:ext cx="962123" cy="400110"/>
+          </a:xfrm>
+          <a:prstGeom prst="rect">
+            <a:avLst/>
+          </a:prstGeom>
+          <a:noFill/>
+        </p:spPr>
+        <p:txBody>
+          <a:bodyPr wrap="none" rtlCol="0">
+            <a:spAutoFit/>
+          </a:bodyPr>
+          <a:lstStyle/>
+          <a:p>
+            <a:pPr algn="ctr"/>
+            <a:r>
+              <a:rPr lang="en-GB" sz="1000" b="1" dirty="0" smtClean="0"/>
+              <a:t>TT modulation</a:t>
+            </a:r>
+          </a:p>
+          <a:p>
+            <a:pPr algn="ctr"/>
+            <a:r>
+              <a:rPr lang="en-GB" sz="1000" b="1" dirty="0" smtClean="0"/>
+              <a:t>mirror</a:t>
+            </a:r>
+            <a:endParaRPr lang="en-GB" sz="1000" b="1" dirty="0"/>
+          </a:p>
+        </p:txBody>
+      </p:sp>
+      <p:sp>
+        <p:nvSpPr>
+          <p:cNvPr id="20" name="ZoneTexte 19"/>
+          <p:cNvSpPr txBox="1"/>
+          <p:nvPr/>
+        </p:nvSpPr>
+        <p:spPr>
+          <a:xfrm>
+            <a:off x="2072252" y="7034542"/>
+            <a:ext cx="784189" cy="338554"/>
+          </a:xfrm>
+          <a:prstGeom prst="rect">
+            <a:avLst/>
+          </a:prstGeom>
+          <a:noFill/>
+        </p:spPr>
+        <p:txBody>
+          <a:bodyPr wrap="none" rtlCol="0">
+            <a:spAutoFit/>
+          </a:bodyPr>
+          <a:lstStyle/>
+          <a:p>
+            <a:pPr algn="ctr"/>
+            <a:r>
+              <a:rPr lang="en-GB" sz="1000" b="1" dirty="0" smtClean="0"/>
+              <a:t>ADC</a:t>
+            </a:r>
+          </a:p>
+          <a:p>
+            <a:pPr algn="ctr"/>
+            <a:r>
+              <a:rPr lang="en-GB" sz="600" b="1" dirty="0" smtClean="0"/>
+              <a:t>compound prism 1</a:t>
+            </a:r>
+            <a:endParaRPr lang="en-GB" sz="600" b="1" dirty="0"/>
+          </a:p>
+        </p:txBody>
+      </p:sp>
+      <p:sp>
+        <p:nvSpPr>
+          <p:cNvPr id="21" name="ZoneTexte 20"/>
+          <p:cNvSpPr txBox="1"/>
+          <p:nvPr/>
+        </p:nvSpPr>
+        <p:spPr>
+          <a:xfrm>
+            <a:off x="2955827" y="6899601"/>
+            <a:ext cx="784189" cy="338554"/>
+          </a:xfrm>
+          <a:prstGeom prst="rect">
+            <a:avLst/>
+          </a:prstGeom>
+          <a:noFill/>
+        </p:spPr>
+        <p:txBody>
+          <a:bodyPr wrap="none" rtlCol="0">
+            <a:spAutoFit/>
+          </a:bodyPr>
+          <a:lstStyle/>
+          <a:p>
+            <a:pPr algn="ctr"/>
+            <a:r>
+              <a:rPr lang="en-GB" sz="1000" b="1" dirty="0" smtClean="0"/>
+              <a:t>ADC</a:t>
+            </a:r>
+          </a:p>
+          <a:p>
+            <a:pPr algn="ctr"/>
+            <a:r>
+              <a:rPr lang="en-GB" sz="600" b="1" dirty="0" smtClean="0"/>
+              <a:t>compound prism 2</a:t>
+            </a:r>
+            <a:endParaRPr lang="en-GB" sz="600" b="1" dirty="0"/>
+          </a:p>
+        </p:txBody>
+      </p:sp>
+      <p:sp>
+        <p:nvSpPr>
+          <p:cNvPr id="22" name="ZoneTexte 21"/>
+          <p:cNvSpPr txBox="1"/>
+          <p:nvPr/>
+        </p:nvSpPr>
+        <p:spPr>
+          <a:xfrm>
+            <a:off x="2310332" y="5076991"/>
             <a:ext cx="910827" cy="246221"/>
           </a:xfrm>
           <a:prstGeom prst="rect">
@@ -11431,7 +11912,6 @@
           </a:bodyPr>
           <a:lstStyle/>
           <a:p>
-            <a:pPr algn="ctr"/>
             <a:r>
               <a:rPr lang="en-GB" sz="1000" b="1" dirty="0" smtClean="0"/>
               <a:t>Pyramid apex</a:t>
@@ -11443,7 +11923,7 @@
     </p:spTree>
     <p:extLst>
       <p:ext uri="{BB962C8B-B14F-4D97-AF65-F5344CB8AC3E}">
-        <p14:creationId xmlns:p14="http://schemas.microsoft.com/office/powerpoint/2010/main" val="2515465048"/>
+        <p14:creationId xmlns:p14="http://schemas.microsoft.com/office/powerpoint/2010/main" val="2562911443"/>
       </p:ext>
     </p:extLst>
   </p:cSld>

</xml_diff>

<commit_message>
Design for the entire AO system with OAP15deg
The final design of the AO.

Study of the aberrations at the pyramid apex with the new copied Zemax model : tests_aberrations_model
</commit_message>
<xml_diff>
--- a/20180518_AO_design_report/images/images_sketch.pptx
+++ b/20180518_AO_design_report/images/images_sketch.pptx
@@ -232,7 +232,7 @@
           <a:p>
             <a:fld id="{8EDEE2E2-4BE4-41CA-94FC-BC9DC2A64380}" type="datetimeFigureOut">
               <a:rPr lang="en-GB" smtClean="0"/>
-              <a:t>07/06/2018</a:t>
+              <a:t>08/06/2018</a:t>
             </a:fld>
             <a:endParaRPr lang="en-GB"/>
           </a:p>
@@ -631,7 +631,7 @@
           <a:p>
             <a:fld id="{24AF4860-EF53-429F-9816-8C3FCB6EDEF9}" type="datetimeFigureOut">
               <a:rPr lang="en-GB" smtClean="0"/>
-              <a:t>07/06/2018</a:t>
+              <a:t>08/06/2018</a:t>
             </a:fld>
             <a:endParaRPr lang="en-GB"/>
           </a:p>
@@ -801,7 +801,7 @@
           <a:p>
             <a:fld id="{24AF4860-EF53-429F-9816-8C3FCB6EDEF9}" type="datetimeFigureOut">
               <a:rPr lang="en-GB" smtClean="0"/>
-              <a:t>07/06/2018</a:t>
+              <a:t>08/06/2018</a:t>
             </a:fld>
             <a:endParaRPr lang="en-GB"/>
           </a:p>
@@ -981,7 +981,7 @@
           <a:p>
             <a:fld id="{24AF4860-EF53-429F-9816-8C3FCB6EDEF9}" type="datetimeFigureOut">
               <a:rPr lang="en-GB" smtClean="0"/>
-              <a:t>07/06/2018</a:t>
+              <a:t>08/06/2018</a:t>
             </a:fld>
             <a:endParaRPr lang="en-GB"/>
           </a:p>
@@ -1151,7 +1151,7 @@
           <a:p>
             <a:fld id="{24AF4860-EF53-429F-9816-8C3FCB6EDEF9}" type="datetimeFigureOut">
               <a:rPr lang="en-GB" smtClean="0"/>
-              <a:t>07/06/2018</a:t>
+              <a:t>08/06/2018</a:t>
             </a:fld>
             <a:endParaRPr lang="en-GB"/>
           </a:p>
@@ -1397,7 +1397,7 @@
           <a:p>
             <a:fld id="{24AF4860-EF53-429F-9816-8C3FCB6EDEF9}" type="datetimeFigureOut">
               <a:rPr lang="en-GB" smtClean="0"/>
-              <a:t>07/06/2018</a:t>
+              <a:t>08/06/2018</a:t>
             </a:fld>
             <a:endParaRPr lang="en-GB"/>
           </a:p>
@@ -1629,7 +1629,7 @@
           <a:p>
             <a:fld id="{24AF4860-EF53-429F-9816-8C3FCB6EDEF9}" type="datetimeFigureOut">
               <a:rPr lang="en-GB" smtClean="0"/>
-              <a:t>07/06/2018</a:t>
+              <a:t>08/06/2018</a:t>
             </a:fld>
             <a:endParaRPr lang="en-GB"/>
           </a:p>
@@ -1996,7 +1996,7 @@
           <a:p>
             <a:fld id="{24AF4860-EF53-429F-9816-8C3FCB6EDEF9}" type="datetimeFigureOut">
               <a:rPr lang="en-GB" smtClean="0"/>
-              <a:t>07/06/2018</a:t>
+              <a:t>08/06/2018</a:t>
             </a:fld>
             <a:endParaRPr lang="en-GB"/>
           </a:p>
@@ -2114,7 +2114,7 @@
           <a:p>
             <a:fld id="{24AF4860-EF53-429F-9816-8C3FCB6EDEF9}" type="datetimeFigureOut">
               <a:rPr lang="en-GB" smtClean="0"/>
-              <a:t>07/06/2018</a:t>
+              <a:t>08/06/2018</a:t>
             </a:fld>
             <a:endParaRPr lang="en-GB"/>
           </a:p>
@@ -2209,7 +2209,7 @@
           <a:p>
             <a:fld id="{24AF4860-EF53-429F-9816-8C3FCB6EDEF9}" type="datetimeFigureOut">
               <a:rPr lang="en-GB" smtClean="0"/>
-              <a:t>07/06/2018</a:t>
+              <a:t>08/06/2018</a:t>
             </a:fld>
             <a:endParaRPr lang="en-GB"/>
           </a:p>
@@ -2486,7 +2486,7 @@
           <a:p>
             <a:fld id="{24AF4860-EF53-429F-9816-8C3FCB6EDEF9}" type="datetimeFigureOut">
               <a:rPr lang="en-GB" smtClean="0"/>
-              <a:t>07/06/2018</a:t>
+              <a:t>08/06/2018</a:t>
             </a:fld>
             <a:endParaRPr lang="en-GB"/>
           </a:p>
@@ -2739,7 +2739,7 @@
           <a:p>
             <a:fld id="{24AF4860-EF53-429F-9816-8C3FCB6EDEF9}" type="datetimeFigureOut">
               <a:rPr lang="en-GB" smtClean="0"/>
-              <a:t>07/06/2018</a:t>
+              <a:t>08/06/2018</a:t>
             </a:fld>
             <a:endParaRPr lang="en-GB"/>
           </a:p>
@@ -2952,7 +2952,7 @@
           <a:p>
             <a:fld id="{24AF4860-EF53-429F-9816-8C3FCB6EDEF9}" type="datetimeFigureOut">
               <a:rPr lang="en-GB" smtClean="0"/>
-              <a:t>07/06/2018</a:t>
+              <a:t>08/06/2018</a:t>
             </a:fld>
             <a:endParaRPr lang="en-GB"/>
           </a:p>
@@ -4646,11 +4646,7 @@
           <a:p>
             <a:r>
               <a:rPr lang="en-GB" sz="1200" b="1" dirty="0" smtClean="0"/>
-              <a:t>Imaging </a:t>
-            </a:r>
-            <a:r>
-              <a:rPr lang="en-GB" sz="1200" b="1" dirty="0" smtClean="0"/>
-              <a:t>lens</a:t>
+              <a:t>Imaging lens</a:t>
             </a:r>
             <a:endParaRPr lang="en-GB" sz="1200" b="1" dirty="0"/>
           </a:p>
@@ -6523,8 +6519,8 @@
         </p:nvSpPr>
         <p:spPr>
           <a:xfrm>
-            <a:off x="6847654" y="-561958"/>
-            <a:ext cx="5362575" cy="1097520"/>
+            <a:off x="779102" y="-1348548"/>
+            <a:ext cx="10842341" cy="1097520"/>
           </a:xfrm>
           <a:prstGeom prst="rect">
             <a:avLst/>
@@ -6609,7 +6605,7 @@
       </p:sp>
       <p:pic>
         <p:nvPicPr>
-          <p:cNvPr id="39" name="Image 38"/>
+          <p:cNvPr id="44" name="Image 43"/>
           <p:cNvPicPr>
             <a:picLocks noChangeAspect="1"/>
           </p:cNvPicPr>
@@ -6623,8 +6619,8 @@
         </p:blipFill>
         <p:spPr>
           <a:xfrm>
-            <a:off x="2475816" y="-148570"/>
-            <a:ext cx="11026708" cy="7099086"/>
+            <a:off x="1317865" y="-691897"/>
+            <a:ext cx="10340981" cy="7688018"/>
           </a:xfrm>
           <a:prstGeom prst="rect">
             <a:avLst/>
@@ -6639,7 +6635,7 @@
         </p:nvSpPr>
         <p:spPr>
           <a:xfrm>
-            <a:off x="2841662" y="3866848"/>
+            <a:off x="1873068" y="4047744"/>
             <a:ext cx="996876" cy="738664"/>
           </a:xfrm>
           <a:prstGeom prst="rect">
@@ -6688,7 +6684,7 @@
         </p:nvSpPr>
         <p:spPr>
           <a:xfrm>
-            <a:off x="4621495" y="4838277"/>
+            <a:off x="4111126" y="4915753"/>
             <a:ext cx="1310423" cy="815608"/>
           </a:xfrm>
           <a:prstGeom prst="rect">
@@ -6744,7 +6740,7 @@
         </p:nvSpPr>
         <p:spPr>
           <a:xfrm>
-            <a:off x="2812250" y="2564857"/>
+            <a:off x="1800284" y="2970172"/>
             <a:ext cx="455574" cy="307777"/>
           </a:xfrm>
           <a:prstGeom prst="rect">
@@ -6774,7 +6770,7 @@
         </p:nvSpPr>
         <p:spPr>
           <a:xfrm>
-            <a:off x="6418490" y="3740979"/>
+            <a:off x="5681855" y="3881616"/>
             <a:ext cx="600614" cy="307777"/>
           </a:xfrm>
           <a:prstGeom prst="rect">
@@ -6804,7 +6800,7 @@
         </p:nvSpPr>
         <p:spPr>
           <a:xfrm>
-            <a:off x="3829594" y="1755873"/>
+            <a:off x="2869944" y="1975667"/>
             <a:ext cx="600614" cy="307777"/>
           </a:xfrm>
           <a:prstGeom prst="rect">
@@ -6834,7 +6830,7 @@
         </p:nvSpPr>
         <p:spPr>
           <a:xfrm>
-            <a:off x="5637330" y="2628780"/>
+            <a:off x="4766338" y="2929746"/>
             <a:ext cx="793230" cy="523220"/>
           </a:xfrm>
           <a:prstGeom prst="rect">
@@ -6870,7 +6866,7 @@
         </p:nvSpPr>
         <p:spPr>
           <a:xfrm>
-            <a:off x="5178574" y="5702632"/>
+            <a:off x="4820150" y="5797660"/>
             <a:ext cx="1120820" cy="307777"/>
           </a:xfrm>
           <a:prstGeom prst="rect">
@@ -6900,7 +6896,7 @@
         </p:nvSpPr>
         <p:spPr>
           <a:xfrm>
-            <a:off x="6775433" y="6337778"/>
+            <a:off x="6633177" y="6491498"/>
             <a:ext cx="1268809" cy="523220"/>
           </a:xfrm>
           <a:prstGeom prst="rect">
@@ -6938,7 +6934,7 @@
         </p:nvSpPr>
         <p:spPr>
           <a:xfrm>
-            <a:off x="7791055" y="2698856"/>
+            <a:off x="6998452" y="2060639"/>
             <a:ext cx="1337803" cy="307777"/>
           </a:xfrm>
           <a:prstGeom prst="rect">
@@ -6969,7 +6965,7 @@
         </p:nvSpPr>
         <p:spPr>
           <a:xfrm>
-            <a:off x="8308977" y="1531665"/>
+            <a:off x="7094374" y="1091869"/>
             <a:ext cx="930576" cy="307777"/>
           </a:xfrm>
           <a:prstGeom prst="rect">
@@ -7000,7 +6996,7 @@
         </p:nvSpPr>
         <p:spPr>
           <a:xfrm>
-            <a:off x="7855775" y="314552"/>
+            <a:off x="6670634" y="-279728"/>
             <a:ext cx="815929" cy="523220"/>
           </a:xfrm>
           <a:prstGeom prst="rect">
@@ -7038,7 +7034,7 @@
         </p:nvSpPr>
         <p:spPr>
           <a:xfrm>
-            <a:off x="3967736" y="4050642"/>
+            <a:off x="3381321" y="4348002"/>
             <a:ext cx="793230" cy="523220"/>
           </a:xfrm>
           <a:prstGeom prst="rect">
@@ -7074,7 +7070,7 @@
         </p:nvSpPr>
         <p:spPr>
           <a:xfrm>
-            <a:off x="5443880" y="6137723"/>
+            <a:off x="5329574" y="6172075"/>
             <a:ext cx="1180130" cy="461665"/>
           </a:xfrm>
           <a:prstGeom prst="rect">
@@ -7112,7 +7108,7 @@
         </p:nvSpPr>
         <p:spPr>
           <a:xfrm>
-            <a:off x="6918646" y="5838003"/>
+            <a:off x="6677516" y="5971200"/>
             <a:ext cx="1180130" cy="461665"/>
           </a:xfrm>
           <a:prstGeom prst="rect">
@@ -7149,8 +7145,8 @@
           <p:nvPr/>
         </p:nvGrpSpPr>
         <p:grpSpPr>
-          <a:xfrm>
-            <a:off x="7536986" y="2715526"/>
+          <a:xfrm rot="20909176">
+            <a:off x="6746544" y="2261821"/>
             <a:ext cx="290214" cy="191292"/>
             <a:chOff x="9574923" y="2683345"/>
             <a:chExt cx="290214" cy="191292"/>
@@ -7303,13 +7299,13 @@
         </p:nvCxnSpPr>
         <p:spPr>
           <a:xfrm>
-            <a:off x="6437703" y="6223581"/>
-            <a:ext cx="46440" cy="80849"/>
+            <a:off x="6236029" y="6280499"/>
+            <a:ext cx="46440" cy="101517"/>
           </a:xfrm>
           <a:prstGeom prst="line">
             <a:avLst/>
           </a:prstGeom>
-          <a:ln>
+          <a:ln w="12700">
             <a:solidFill>
               <a:schemeClr val="tx1"/>
             </a:solidFill>
@@ -7338,13 +7334,13 @@
         </p:nvCxnSpPr>
         <p:spPr>
           <a:xfrm>
-            <a:off x="6577570" y="6155788"/>
-            <a:ext cx="46440" cy="80849"/>
+            <a:off x="6361695" y="6193175"/>
+            <a:ext cx="56795" cy="87324"/>
           </a:xfrm>
           <a:prstGeom prst="line">
             <a:avLst/>
           </a:prstGeom>
-          <a:ln>
+          <a:ln w="12700">
             <a:solidFill>
               <a:schemeClr val="tx1"/>
             </a:solidFill>
@@ -7372,14 +7368,14 @@
           <p:nvPr/>
         </p:nvCxnSpPr>
         <p:spPr>
-          <a:xfrm flipH="1">
-            <a:off x="6858000" y="6124909"/>
-            <a:ext cx="28575" cy="102182"/>
+          <a:xfrm flipV="1">
+            <a:off x="6684734" y="6101254"/>
+            <a:ext cx="4949" cy="123837"/>
           </a:xfrm>
           <a:prstGeom prst="line">
             <a:avLst/>
           </a:prstGeom>
-          <a:ln>
+          <a:ln w="12700">
             <a:solidFill>
               <a:schemeClr val="tx1"/>
             </a:solidFill>
@@ -7408,13 +7404,13 @@
         </p:nvCxnSpPr>
         <p:spPr>
           <a:xfrm flipH="1">
-            <a:off x="6712429" y="6082013"/>
-            <a:ext cx="28575" cy="102182"/>
+            <a:off x="6523516" y="6095236"/>
+            <a:ext cx="8224" cy="106796"/>
           </a:xfrm>
           <a:prstGeom prst="line">
             <a:avLst/>
           </a:prstGeom>
-          <a:ln>
+          <a:ln w="12700">
             <a:solidFill>
               <a:schemeClr val="tx1"/>
             </a:solidFill>
@@ -7442,9 +7438,9 @@
           <p:nvPr/>
         </p:nvCxnSpPr>
         <p:spPr>
-          <a:xfrm flipV="1">
-            <a:off x="2475816" y="7475851"/>
-            <a:ext cx="6431296" cy="1442"/>
+          <a:xfrm>
+            <a:off x="1435134" y="7005160"/>
+            <a:ext cx="6950626" cy="31165"/>
           </a:xfrm>
           <a:prstGeom prst="straightConnector1">
             <a:avLst/>
@@ -7474,23 +7470,128 @@
       </p:cxnSp>
       <p:sp>
         <p:nvSpPr>
-          <p:cNvPr id="40" name="Rectangle 39"/>
+          <p:cNvPr id="43" name="ZoneTexte 42"/>
+          <p:cNvSpPr txBox="1"/>
+          <p:nvPr/>
+        </p:nvSpPr>
+        <p:spPr>
+          <a:xfrm>
+            <a:off x="4821076" y="6679343"/>
+            <a:ext cx="461986" cy="307777"/>
+          </a:xfrm>
+          <a:prstGeom prst="rect">
+            <a:avLst/>
+          </a:prstGeom>
+          <a:noFill/>
+        </p:spPr>
+        <p:txBody>
+          <a:bodyPr wrap="none" rtlCol="0">
+            <a:spAutoFit/>
+          </a:bodyPr>
+          <a:lstStyle/>
+          <a:p>
+            <a:r>
+              <a:rPr lang="en-GB" sz="1400" b="1" dirty="0" smtClean="0"/>
+              <a:t>1 m</a:t>
+            </a:r>
+            <a:endParaRPr lang="en-GB" sz="1400" b="1" dirty="0"/>
+          </a:p>
+        </p:txBody>
+      </p:sp>
+      <p:sp>
+        <p:nvSpPr>
+          <p:cNvPr id="48" name="ZoneTexte 47"/>
+          <p:cNvSpPr txBox="1"/>
+          <p:nvPr/>
+        </p:nvSpPr>
+        <p:spPr>
+          <a:xfrm>
+            <a:off x="7069769" y="4009681"/>
+            <a:ext cx="936988" cy="307777"/>
+          </a:xfrm>
+          <a:prstGeom prst="rect">
+            <a:avLst/>
+          </a:prstGeom>
+          <a:noFill/>
+        </p:spPr>
+        <p:txBody>
+          <a:bodyPr wrap="none" rtlCol="0">
+            <a:spAutoFit/>
+          </a:bodyPr>
+          <a:lstStyle/>
+          <a:p>
+            <a:pPr algn="ctr"/>
+            <a:r>
+              <a:rPr lang="en-GB" sz="1400" b="1" i="1" dirty="0" smtClean="0">
+                <a:solidFill>
+                  <a:srgbClr val="FF0000"/>
+                </a:solidFill>
+              </a:rPr>
+              <a:t>To science</a:t>
+            </a:r>
+            <a:endParaRPr lang="en-GB" sz="1400" b="1" i="1" dirty="0">
+              <a:solidFill>
+                <a:srgbClr val="FF0000"/>
+              </a:solidFill>
+            </a:endParaRPr>
+          </a:p>
+        </p:txBody>
+      </p:sp>
+      <p:cxnSp>
+        <p:nvCxnSpPr>
+          <p:cNvPr id="50" name="Connecteur droit avec flèche 49"/>
+          <p:cNvCxnSpPr/>
+          <p:nvPr/>
+        </p:nvCxnSpPr>
+        <p:spPr>
+          <a:xfrm>
+            <a:off x="7363384" y="4291091"/>
+            <a:ext cx="865119" cy="0"/>
+          </a:xfrm>
+          <a:prstGeom prst="straightConnector1">
+            <a:avLst/>
+          </a:prstGeom>
+          <a:ln>
+            <a:solidFill>
+              <a:srgbClr val="FF0000"/>
+            </a:solidFill>
+            <a:tailEnd type="triangle"/>
+          </a:ln>
+        </p:spPr>
+        <p:style>
+          <a:lnRef idx="1">
+            <a:schemeClr val="accent1"/>
+          </a:lnRef>
+          <a:fillRef idx="0">
+            <a:schemeClr val="accent1"/>
+          </a:fillRef>
+          <a:effectRef idx="0">
+            <a:schemeClr val="accent1"/>
+          </a:effectRef>
+          <a:fontRef idx="minor">
+            <a:schemeClr val="tx1"/>
+          </a:fontRef>
+        </p:style>
+      </p:cxnSp>
+      <p:sp>
+        <p:nvSpPr>
+          <p:cNvPr id="2" name="Rectangle 1"/>
           <p:cNvSpPr/>
           <p:nvPr/>
         </p:nvSpPr>
         <p:spPr>
-          <a:xfrm>
-            <a:off x="1981654" y="-706767"/>
-            <a:ext cx="5362575" cy="1097520"/>
-          </a:xfrm>
-          <a:prstGeom prst="rect">
-            <a:avLst/>
-          </a:prstGeom>
-          <a:solidFill>
-            <a:schemeClr val="bg1"/>
-          </a:solidFill>
+          <a:xfrm rot="263258">
+            <a:off x="6341874" y="-757495"/>
+            <a:ext cx="1345911" cy="3217555"/>
+          </a:xfrm>
+          <a:prstGeom prst="rect">
+            <a:avLst/>
+          </a:prstGeom>
+          <a:noFill/>
           <a:ln>
-            <a:noFill/>
+            <a:solidFill>
+              <a:schemeClr val="accent1"/>
+            </a:solidFill>
           </a:ln>
         </p:spPr>
         <p:style>
@@ -7518,157 +7619,6 @@
           </a:p>
         </p:txBody>
       </p:sp>
-      <p:sp>
-        <p:nvSpPr>
-          <p:cNvPr id="43" name="ZoneTexte 42"/>
-          <p:cNvSpPr txBox="1"/>
-          <p:nvPr/>
-        </p:nvSpPr>
-        <p:spPr>
-          <a:xfrm>
-            <a:off x="5282239" y="7194469"/>
-            <a:ext cx="461986" cy="307777"/>
-          </a:xfrm>
-          <a:prstGeom prst="rect">
-            <a:avLst/>
-          </a:prstGeom>
-          <a:noFill/>
-        </p:spPr>
-        <p:txBody>
-          <a:bodyPr wrap="none" rtlCol="0">
-            <a:spAutoFit/>
-          </a:bodyPr>
-          <a:lstStyle/>
-          <a:p>
-            <a:r>
-              <a:rPr lang="en-GB" sz="1400" b="1" dirty="0" smtClean="0"/>
-              <a:t>1 m</a:t>
-            </a:r>
-            <a:endParaRPr lang="en-GB" sz="1400" b="1" dirty="0"/>
-          </a:p>
-        </p:txBody>
-      </p:sp>
-      <p:sp>
-        <p:nvSpPr>
-          <p:cNvPr id="48" name="ZoneTexte 47"/>
-          <p:cNvSpPr txBox="1"/>
-          <p:nvPr/>
-        </p:nvSpPr>
-        <p:spPr>
-          <a:xfrm>
-            <a:off x="7970124" y="3751164"/>
-            <a:ext cx="936988" cy="307777"/>
-          </a:xfrm>
-          <a:prstGeom prst="rect">
-            <a:avLst/>
-          </a:prstGeom>
-          <a:noFill/>
-        </p:spPr>
-        <p:txBody>
-          <a:bodyPr wrap="none" rtlCol="0">
-            <a:spAutoFit/>
-          </a:bodyPr>
-          <a:lstStyle/>
-          <a:p>
-            <a:pPr algn="ctr"/>
-            <a:r>
-              <a:rPr lang="en-GB" sz="1400" b="1" i="1" dirty="0" smtClean="0">
-                <a:solidFill>
-                  <a:srgbClr val="FF0000"/>
-                </a:solidFill>
-              </a:rPr>
-              <a:t>To science</a:t>
-            </a:r>
-            <a:endParaRPr lang="en-GB" sz="1400" b="1" i="1" dirty="0">
-              <a:solidFill>
-                <a:srgbClr val="FF0000"/>
-              </a:solidFill>
-            </a:endParaRPr>
-          </a:p>
-        </p:txBody>
-      </p:sp>
-      <p:cxnSp>
-        <p:nvCxnSpPr>
-          <p:cNvPr id="50" name="Connecteur droit avec flèche 49"/>
-          <p:cNvCxnSpPr/>
-          <p:nvPr/>
-        </p:nvCxnSpPr>
-        <p:spPr>
-          <a:xfrm>
-            <a:off x="8263739" y="4032574"/>
-            <a:ext cx="865119" cy="0"/>
-          </a:xfrm>
-          <a:prstGeom prst="straightConnector1">
-            <a:avLst/>
-          </a:prstGeom>
-          <a:ln>
-            <a:solidFill>
-              <a:srgbClr val="FF0000"/>
-            </a:solidFill>
-            <a:tailEnd type="triangle"/>
-          </a:ln>
-        </p:spPr>
-        <p:style>
-          <a:lnRef idx="1">
-            <a:schemeClr val="accent1"/>
-          </a:lnRef>
-          <a:fillRef idx="0">
-            <a:schemeClr val="accent1"/>
-          </a:fillRef>
-          <a:effectRef idx="0">
-            <a:schemeClr val="accent1"/>
-          </a:effectRef>
-          <a:fontRef idx="minor">
-            <a:schemeClr val="tx1"/>
-          </a:fontRef>
-        </p:style>
-      </p:cxnSp>
-      <p:sp>
-        <p:nvSpPr>
-          <p:cNvPr id="2" name="Rectangle 1"/>
-          <p:cNvSpPr/>
-          <p:nvPr/>
-        </p:nvSpPr>
-        <p:spPr>
-          <a:xfrm rot="898269">
-            <a:off x="7320883" y="-147178"/>
-            <a:ext cx="1345911" cy="3217555"/>
-          </a:xfrm>
-          <a:prstGeom prst="rect">
-            <a:avLst/>
-          </a:prstGeom>
-          <a:noFill/>
-          <a:ln>
-            <a:solidFill>
-              <a:schemeClr val="accent1"/>
-            </a:solidFill>
-          </a:ln>
-        </p:spPr>
-        <p:style>
-          <a:lnRef idx="2">
-            <a:schemeClr val="accent1">
-              <a:shade val="50000"/>
-            </a:schemeClr>
-          </a:lnRef>
-          <a:fillRef idx="1">
-            <a:schemeClr val="accent1"/>
-          </a:fillRef>
-          <a:effectRef idx="0">
-            <a:schemeClr val="accent1"/>
-          </a:effectRef>
-          <a:fontRef idx="minor">
-            <a:schemeClr val="lt1"/>
-          </a:fontRef>
-        </p:style>
-        <p:txBody>
-          <a:bodyPr rtlCol="0" anchor="ctr"/>
-          <a:lstStyle/>
-          <a:p>
-            <a:pPr algn="ctr"/>
-            <a:endParaRPr lang="en-GB"/>
-          </a:p>
-        </p:txBody>
-      </p:sp>
       <p:cxnSp>
         <p:nvCxnSpPr>
           <p:cNvPr id="4" name="Connecteur droit avec flèche 3"/>
@@ -7677,8 +7627,8 @@
         </p:nvCxnSpPr>
         <p:spPr>
           <a:xfrm flipH="1">
-            <a:off x="7146925" y="314552"/>
-            <a:ext cx="197305" cy="761773"/>
+            <a:off x="6082703" y="195670"/>
+            <a:ext cx="73121" cy="1022988"/>
           </a:xfrm>
           <a:prstGeom prst="straightConnector1">
             <a:avLst/>
@@ -7711,8 +7661,8 @@
         </p:nvCxnSpPr>
         <p:spPr>
           <a:xfrm flipH="1" flipV="1">
-            <a:off x="8166100" y="-358218"/>
-            <a:ext cx="727504" cy="180827"/>
+            <a:off x="6753411" y="-954888"/>
+            <a:ext cx="849758" cy="62900"/>
           </a:xfrm>
           <a:prstGeom prst="straightConnector1">
             <a:avLst/>
@@ -9191,11 +9141,7 @@
             </a:r>
             <a:r>
               <a:rPr lang="fr-CH" dirty="0" smtClean="0"/>
-              <a:t>= </a:t>
-            </a:r>
-            <a:r>
-              <a:rPr lang="fr-CH" dirty="0" smtClean="0"/>
-              <a:t>15°</a:t>
+              <a:t>= 15°</a:t>
             </a:r>
             <a:endParaRPr lang="en-GB" dirty="0"/>
           </a:p>
@@ -9490,11 +9436,7 @@
             </a:r>
             <a:r>
               <a:rPr lang="fr-CH" dirty="0" smtClean="0"/>
-              <a:t>= </a:t>
-            </a:r>
-            <a:r>
-              <a:rPr lang="fr-CH" dirty="0" smtClean="0"/>
-              <a:t>15°</a:t>
+              <a:t>= 15°</a:t>
             </a:r>
             <a:endParaRPr lang="en-GB" dirty="0"/>
           </a:p>
@@ -9879,8 +9821,8 @@
           </a:p>
         </p:txBody>
       </p:sp>
-      <mc:AlternateContent xmlns:mc="http://schemas.openxmlformats.org/markup-compatibility/2006">
-        <mc:Choice xmlns:a14="http://schemas.microsoft.com/office/drawing/2010/main" Requires="a14">
+      <mc:AlternateContent xmlns:mc="http://schemas.openxmlformats.org/markup-compatibility/2006" xmlns:a14="http://schemas.microsoft.com/office/drawing/2010/main">
+        <mc:Choice Requires="a14">
           <p:sp>
             <p:nvSpPr>
               <p:cNvPr id="10" name="ZoneTexte 9"/>
@@ -9925,7 +9867,7 @@
             </p:txBody>
           </p:sp>
         </mc:Choice>
-        <mc:Fallback>
+        <mc:Fallback xmlns="">
           <p:sp>
             <p:nvSpPr>
               <p:cNvPr id="10" name="ZoneTexte 9"/>
@@ -11272,8 +11214,8 @@
           </a:p>
         </p:txBody>
       </p:sp>
-      <mc:AlternateContent xmlns:mc="http://schemas.openxmlformats.org/markup-compatibility/2006">
-        <mc:Choice xmlns:a14="http://schemas.microsoft.com/office/drawing/2010/main" Requires="a14">
+      <mc:AlternateContent xmlns:mc="http://schemas.openxmlformats.org/markup-compatibility/2006" xmlns:a14="http://schemas.microsoft.com/office/drawing/2010/main">
+        <mc:Choice Requires="a14">
           <p:sp>
             <p:nvSpPr>
               <p:cNvPr id="15" name="ZoneTexte 14"/>
@@ -11318,7 +11260,7 @@
             </p:txBody>
           </p:sp>
         </mc:Choice>
-        <mc:Fallback>
+        <mc:Fallback xmlns="">
           <p:sp>
             <p:nvSpPr>
               <p:cNvPr id="15" name="ZoneTexte 14"/>
@@ -11387,11 +11329,7 @@
           <a:p>
             <a:r>
               <a:rPr lang="en-GB" sz="1400" b="1" dirty="0" smtClean="0"/>
-              <a:t>mirror </a:t>
-            </a:r>
-            <a:r>
-              <a:rPr lang="en-GB" sz="1400" b="1" dirty="0" smtClean="0"/>
-              <a:t>2</a:t>
+              <a:t>mirror 2</a:t>
             </a:r>
             <a:endParaRPr lang="en-GB" sz="1400" b="1" dirty="0"/>
           </a:p>

</xml_diff>

<commit_message>
ADC design : changes for the dispersion formula coefficients (V1)
until now the ceffciients for the dispersion formula were taken the same for Schott and Ohara catalog (Sellmeier) or it is not true.
Changes in the functions are done but not all
</commit_message>
<xml_diff>
--- a/20180518_AO_design_report/images/images_sketch.pptx
+++ b/20180518_AO_design_report/images/images_sketch.pptx
@@ -5,7 +5,7 @@
     <p:sldMasterId id="2147483648" r:id="rId1"/>
   </p:sldMasterIdLst>
   <p:notesMasterIdLst>
-    <p:notesMasterId r:id="rId16"/>
+    <p:notesMasterId r:id="rId17"/>
   </p:notesMasterIdLst>
   <p:sldIdLst>
     <p:sldId id="256" r:id="rId2"/>
@@ -22,6 +22,7 @@
     <p:sldId id="266" r:id="rId13"/>
     <p:sldId id="267" r:id="rId14"/>
     <p:sldId id="268" r:id="rId15"/>
+    <p:sldId id="270" r:id="rId16"/>
   </p:sldIdLst>
   <p:sldSz cx="12192000" cy="6858000"/>
   <p:notesSz cx="6858000" cy="9144000"/>
@@ -139,6 +140,7 @@
             <p14:sldId id="266"/>
             <p14:sldId id="267"/>
             <p14:sldId id="268"/>
+            <p14:sldId id="270"/>
           </p14:sldIdLst>
         </p14:section>
       </p14:sectionLst>
@@ -232,7 +234,7 @@
           <a:p>
             <a:fld id="{8EDEE2E2-4BE4-41CA-94FC-BC9DC2A64380}" type="datetimeFigureOut">
               <a:rPr lang="en-GB" smtClean="0"/>
-              <a:t>08/06/2018</a:t>
+              <a:t>19/06/2018</a:t>
             </a:fld>
             <a:endParaRPr lang="en-GB"/>
           </a:p>
@@ -631,7 +633,7 @@
           <a:p>
             <a:fld id="{24AF4860-EF53-429F-9816-8C3FCB6EDEF9}" type="datetimeFigureOut">
               <a:rPr lang="en-GB" smtClean="0"/>
-              <a:t>08/06/2018</a:t>
+              <a:t>19/06/2018</a:t>
             </a:fld>
             <a:endParaRPr lang="en-GB"/>
           </a:p>
@@ -801,7 +803,7 @@
           <a:p>
             <a:fld id="{24AF4860-EF53-429F-9816-8C3FCB6EDEF9}" type="datetimeFigureOut">
               <a:rPr lang="en-GB" smtClean="0"/>
-              <a:t>08/06/2018</a:t>
+              <a:t>19/06/2018</a:t>
             </a:fld>
             <a:endParaRPr lang="en-GB"/>
           </a:p>
@@ -981,7 +983,7 @@
           <a:p>
             <a:fld id="{24AF4860-EF53-429F-9816-8C3FCB6EDEF9}" type="datetimeFigureOut">
               <a:rPr lang="en-GB" smtClean="0"/>
-              <a:t>08/06/2018</a:t>
+              <a:t>19/06/2018</a:t>
             </a:fld>
             <a:endParaRPr lang="en-GB"/>
           </a:p>
@@ -1151,7 +1153,7 @@
           <a:p>
             <a:fld id="{24AF4860-EF53-429F-9816-8C3FCB6EDEF9}" type="datetimeFigureOut">
               <a:rPr lang="en-GB" smtClean="0"/>
-              <a:t>08/06/2018</a:t>
+              <a:t>19/06/2018</a:t>
             </a:fld>
             <a:endParaRPr lang="en-GB"/>
           </a:p>
@@ -1397,7 +1399,7 @@
           <a:p>
             <a:fld id="{24AF4860-EF53-429F-9816-8C3FCB6EDEF9}" type="datetimeFigureOut">
               <a:rPr lang="en-GB" smtClean="0"/>
-              <a:t>08/06/2018</a:t>
+              <a:t>19/06/2018</a:t>
             </a:fld>
             <a:endParaRPr lang="en-GB"/>
           </a:p>
@@ -1629,7 +1631,7 @@
           <a:p>
             <a:fld id="{24AF4860-EF53-429F-9816-8C3FCB6EDEF9}" type="datetimeFigureOut">
               <a:rPr lang="en-GB" smtClean="0"/>
-              <a:t>08/06/2018</a:t>
+              <a:t>19/06/2018</a:t>
             </a:fld>
             <a:endParaRPr lang="en-GB"/>
           </a:p>
@@ -1996,7 +1998,7 @@
           <a:p>
             <a:fld id="{24AF4860-EF53-429F-9816-8C3FCB6EDEF9}" type="datetimeFigureOut">
               <a:rPr lang="en-GB" smtClean="0"/>
-              <a:t>08/06/2018</a:t>
+              <a:t>19/06/2018</a:t>
             </a:fld>
             <a:endParaRPr lang="en-GB"/>
           </a:p>
@@ -2114,7 +2116,7 @@
           <a:p>
             <a:fld id="{24AF4860-EF53-429F-9816-8C3FCB6EDEF9}" type="datetimeFigureOut">
               <a:rPr lang="en-GB" smtClean="0"/>
-              <a:t>08/06/2018</a:t>
+              <a:t>19/06/2018</a:t>
             </a:fld>
             <a:endParaRPr lang="en-GB"/>
           </a:p>
@@ -2209,7 +2211,7 @@
           <a:p>
             <a:fld id="{24AF4860-EF53-429F-9816-8C3FCB6EDEF9}" type="datetimeFigureOut">
               <a:rPr lang="en-GB" smtClean="0"/>
-              <a:t>08/06/2018</a:t>
+              <a:t>19/06/2018</a:t>
             </a:fld>
             <a:endParaRPr lang="en-GB"/>
           </a:p>
@@ -2486,7 +2488,7 @@
           <a:p>
             <a:fld id="{24AF4860-EF53-429F-9816-8C3FCB6EDEF9}" type="datetimeFigureOut">
               <a:rPr lang="en-GB" smtClean="0"/>
-              <a:t>08/06/2018</a:t>
+              <a:t>19/06/2018</a:t>
             </a:fld>
             <a:endParaRPr lang="en-GB"/>
           </a:p>
@@ -2739,7 +2741,7 @@
           <a:p>
             <a:fld id="{24AF4860-EF53-429F-9816-8C3FCB6EDEF9}" type="datetimeFigureOut">
               <a:rPr lang="en-GB" smtClean="0"/>
-              <a:t>08/06/2018</a:t>
+              <a:t>19/06/2018</a:t>
             </a:fld>
             <a:endParaRPr lang="en-GB"/>
           </a:p>
@@ -2952,7 +2954,7 @@
           <a:p>
             <a:fld id="{24AF4860-EF53-429F-9816-8C3FCB6EDEF9}" type="datetimeFigureOut">
               <a:rPr lang="en-GB" smtClean="0"/>
-              <a:t>08/06/2018</a:t>
+              <a:t>19/06/2018</a:t>
             </a:fld>
             <a:endParaRPr lang="en-GB"/>
           </a:p>
@@ -7911,6 +7913,1577 @@
     <p:extLst>
       <p:ext uri="{BB962C8B-B14F-4D97-AF65-F5344CB8AC3E}">
         <p14:creationId xmlns:p14="http://schemas.microsoft.com/office/powerpoint/2010/main" val="3933185360"/>
+      </p:ext>
+    </p:extLst>
+  </p:cSld>
+  <p:clrMapOvr>
+    <a:masterClrMapping/>
+  </p:clrMapOvr>
+</p:sld>
+</file>
+
+<file path=ppt/slides/slide15.xml><?xml version="1.0" encoding="utf-8"?>
+<p:sld xmlns:a="http://schemas.openxmlformats.org/drawingml/2006/main" xmlns:r="http://schemas.openxmlformats.org/officeDocument/2006/relationships" xmlns:p="http://schemas.openxmlformats.org/presentationml/2006/main">
+  <p:cSld>
+    <p:spTree>
+      <p:nvGrpSpPr>
+        <p:cNvPr id="1" name=""/>
+        <p:cNvGrpSpPr/>
+        <p:nvPr/>
+      </p:nvGrpSpPr>
+      <p:grpSpPr>
+        <a:xfrm>
+          <a:off x="0" y="0"/>
+          <a:ext cx="0" cy="0"/>
+          <a:chOff x="0" y="0"/>
+          <a:chExt cx="0" cy="0"/>
+        </a:xfrm>
+      </p:grpSpPr>
+      <p:grpSp>
+        <p:nvGrpSpPr>
+          <p:cNvPr id="20" name="Groupe 19"/>
+          <p:cNvGrpSpPr/>
+          <p:nvPr/>
+        </p:nvGrpSpPr>
+        <p:grpSpPr>
+          <a:xfrm>
+            <a:off x="1565329" y="-2235200"/>
+            <a:ext cx="10337369" cy="7818469"/>
+            <a:chOff x="1565329" y="-2235200"/>
+            <a:chExt cx="10337369" cy="7818469"/>
+          </a:xfrm>
+        </p:grpSpPr>
+        <p:sp>
+          <p:nvSpPr>
+            <p:cNvPr id="8" name="Organigramme : Entrée manuelle 7"/>
+            <p:cNvSpPr/>
+            <p:nvPr/>
+          </p:nvSpPr>
+          <p:spPr>
+            <a:xfrm rot="5400000">
+              <a:off x="1026762" y="2297629"/>
+              <a:ext cx="3742841" cy="1658317"/>
+            </a:xfrm>
+            <a:prstGeom prst="flowChartManualInput">
+              <a:avLst/>
+            </a:prstGeom>
+            <a:solidFill>
+              <a:schemeClr val="accent3">
+                <a:lumMod val="20000"/>
+                <a:lumOff val="80000"/>
+              </a:schemeClr>
+            </a:solidFill>
+            <a:ln>
+              <a:solidFill>
+                <a:schemeClr val="tx1"/>
+              </a:solidFill>
+            </a:ln>
+          </p:spPr>
+          <p:style>
+            <a:lnRef idx="2">
+              <a:schemeClr val="accent1">
+                <a:shade val="50000"/>
+              </a:schemeClr>
+            </a:lnRef>
+            <a:fillRef idx="1">
+              <a:schemeClr val="accent1"/>
+            </a:fillRef>
+            <a:effectRef idx="0">
+              <a:schemeClr val="accent1"/>
+            </a:effectRef>
+            <a:fontRef idx="minor">
+              <a:schemeClr val="lt1"/>
+            </a:fontRef>
+          </p:style>
+          <p:txBody>
+            <a:bodyPr rtlCol="0" anchor="ctr"/>
+            <a:lstStyle/>
+            <a:p>
+              <a:pPr algn="ctr"/>
+              <a:endParaRPr lang="en-GB"/>
+            </a:p>
+          </p:txBody>
+        </p:sp>
+        <p:sp>
+          <p:nvSpPr>
+            <p:cNvPr id="14" name="Triangle rectangle 13"/>
+            <p:cNvSpPr/>
+            <p:nvPr/>
+          </p:nvSpPr>
+          <p:spPr>
+            <a:xfrm rot="20766719">
+              <a:off x="3047778" y="-1901285"/>
+              <a:ext cx="2091800" cy="7256602"/>
+            </a:xfrm>
+            <a:prstGeom prst="rtTriangle">
+              <a:avLst/>
+            </a:prstGeom>
+            <a:solidFill>
+              <a:schemeClr val="accent3">
+                <a:lumMod val="20000"/>
+                <a:lumOff val="80000"/>
+              </a:schemeClr>
+            </a:solidFill>
+            <a:ln>
+              <a:solidFill>
+                <a:schemeClr val="tx1"/>
+              </a:solidFill>
+            </a:ln>
+          </p:spPr>
+          <p:style>
+            <a:lnRef idx="2">
+              <a:schemeClr val="accent1">
+                <a:shade val="50000"/>
+              </a:schemeClr>
+            </a:lnRef>
+            <a:fillRef idx="1">
+              <a:schemeClr val="accent1"/>
+            </a:fillRef>
+            <a:effectRef idx="0">
+              <a:schemeClr val="accent1"/>
+            </a:effectRef>
+            <a:fontRef idx="minor">
+              <a:schemeClr val="lt1"/>
+            </a:fontRef>
+          </p:style>
+          <p:txBody>
+            <a:bodyPr rtlCol="0" anchor="ctr"/>
+            <a:lstStyle/>
+            <a:p>
+              <a:pPr algn="ctr"/>
+              <a:endParaRPr lang="en-GB" dirty="0"/>
+            </a:p>
+          </p:txBody>
+        </p:sp>
+        <p:sp>
+          <p:nvSpPr>
+            <p:cNvPr id="12" name="Rectangle 11"/>
+            <p:cNvSpPr/>
+            <p:nvPr/>
+          </p:nvSpPr>
+          <p:spPr>
+            <a:xfrm>
+              <a:off x="1565329" y="-2235200"/>
+              <a:ext cx="3138407" cy="3847024"/>
+            </a:xfrm>
+            <a:prstGeom prst="rect">
+              <a:avLst/>
+            </a:prstGeom>
+            <a:solidFill>
+              <a:schemeClr val="bg1"/>
+            </a:solidFill>
+            <a:ln>
+              <a:noFill/>
+            </a:ln>
+          </p:spPr>
+          <p:style>
+            <a:lnRef idx="2">
+              <a:schemeClr val="accent1">
+                <a:shade val="50000"/>
+              </a:schemeClr>
+            </a:lnRef>
+            <a:fillRef idx="1">
+              <a:schemeClr val="accent1"/>
+            </a:fillRef>
+            <a:effectRef idx="0">
+              <a:schemeClr val="accent1"/>
+            </a:effectRef>
+            <a:fontRef idx="minor">
+              <a:schemeClr val="lt1"/>
+            </a:fontRef>
+          </p:style>
+          <p:txBody>
+            <a:bodyPr rtlCol="0" anchor="ctr"/>
+            <a:lstStyle/>
+            <a:p>
+              <a:pPr algn="ctr"/>
+              <a:endParaRPr lang="en-GB"/>
+            </a:p>
+          </p:txBody>
+        </p:sp>
+        <p:sp>
+          <p:nvSpPr>
+            <p:cNvPr id="13" name="Rectangle 12"/>
+            <p:cNvSpPr/>
+            <p:nvPr/>
+          </p:nvSpPr>
+          <p:spPr>
+            <a:xfrm>
+              <a:off x="1786179" y="4413147"/>
+              <a:ext cx="10116519" cy="1170122"/>
+            </a:xfrm>
+            <a:prstGeom prst="rect">
+              <a:avLst/>
+            </a:prstGeom>
+            <a:solidFill>
+              <a:schemeClr val="bg1"/>
+            </a:solidFill>
+            <a:ln>
+              <a:noFill/>
+            </a:ln>
+          </p:spPr>
+          <p:style>
+            <a:lnRef idx="2">
+              <a:schemeClr val="accent1">
+                <a:shade val="50000"/>
+              </a:schemeClr>
+            </a:lnRef>
+            <a:fillRef idx="1">
+              <a:schemeClr val="accent1"/>
+            </a:fillRef>
+            <a:effectRef idx="0">
+              <a:schemeClr val="accent1"/>
+            </a:effectRef>
+            <a:fontRef idx="minor">
+              <a:schemeClr val="lt1"/>
+            </a:fontRef>
+          </p:style>
+          <p:txBody>
+            <a:bodyPr rtlCol="0" anchor="ctr"/>
+            <a:lstStyle/>
+            <a:p>
+              <a:pPr algn="ctr"/>
+              <a:endParaRPr lang="en-GB"/>
+            </a:p>
+          </p:txBody>
+        </p:sp>
+        <p:cxnSp>
+          <p:nvCxnSpPr>
+            <p:cNvPr id="16" name="Connecteur droit 15"/>
+            <p:cNvCxnSpPr/>
+            <p:nvPr/>
+          </p:nvCxnSpPr>
+          <p:spPr>
+            <a:xfrm>
+              <a:off x="2069024" y="1611824"/>
+              <a:ext cx="1977196" cy="0"/>
+            </a:xfrm>
+            <a:prstGeom prst="line">
+              <a:avLst/>
+            </a:prstGeom>
+            <a:ln w="12700">
+              <a:solidFill>
+                <a:schemeClr val="tx1"/>
+              </a:solidFill>
+            </a:ln>
+          </p:spPr>
+          <p:style>
+            <a:lnRef idx="1">
+              <a:schemeClr val="accent1"/>
+            </a:lnRef>
+            <a:fillRef idx="0">
+              <a:schemeClr val="accent1"/>
+            </a:fillRef>
+            <a:effectRef idx="0">
+              <a:schemeClr val="accent1"/>
+            </a:effectRef>
+            <a:fontRef idx="minor">
+              <a:schemeClr val="tx1"/>
+            </a:fontRef>
+          </p:style>
+        </p:cxnSp>
+        <p:cxnSp>
+          <p:nvCxnSpPr>
+            <p:cNvPr id="17" name="Connecteur droit 16"/>
+            <p:cNvCxnSpPr/>
+            <p:nvPr/>
+          </p:nvCxnSpPr>
+          <p:spPr>
+            <a:xfrm>
+              <a:off x="2069024" y="4394291"/>
+              <a:ext cx="3569776" cy="18856"/>
+            </a:xfrm>
+            <a:prstGeom prst="line">
+              <a:avLst/>
+            </a:prstGeom>
+            <a:ln w="12700">
+              <a:solidFill>
+                <a:schemeClr val="tx1"/>
+              </a:solidFill>
+            </a:ln>
+          </p:spPr>
+          <p:style>
+            <a:lnRef idx="1">
+              <a:schemeClr val="accent1"/>
+            </a:lnRef>
+            <a:fillRef idx="0">
+              <a:schemeClr val="accent1"/>
+            </a:fillRef>
+            <a:effectRef idx="0">
+              <a:schemeClr val="accent1"/>
+            </a:effectRef>
+            <a:fontRef idx="minor">
+              <a:schemeClr val="tx1"/>
+            </a:fontRef>
+          </p:style>
+        </p:cxnSp>
+        <p:pic>
+          <p:nvPicPr>
+            <p:cNvPr id="19" name="Image 18"/>
+            <p:cNvPicPr>
+              <a:picLocks noChangeAspect="1"/>
+            </p:cNvPicPr>
+            <p:nvPr/>
+          </p:nvPicPr>
+          <p:blipFill>
+            <a:blip r:embed="rId2"/>
+            <a:stretch>
+              <a:fillRect/>
+            </a:stretch>
+          </p:blipFill>
+          <p:spPr>
+            <a:xfrm flipH="1">
+              <a:off x="6936217" y="1596584"/>
+              <a:ext cx="3636451" cy="2868736"/>
+            </a:xfrm>
+            <a:prstGeom prst="rect">
+              <a:avLst/>
+            </a:prstGeom>
+          </p:spPr>
+        </p:pic>
+      </p:grpSp>
+      <p:grpSp>
+        <p:nvGrpSpPr>
+          <p:cNvPr id="99" name="Groupe 98"/>
+          <p:cNvGrpSpPr/>
+          <p:nvPr/>
+        </p:nvGrpSpPr>
+        <p:grpSpPr>
+          <a:xfrm>
+            <a:off x="1377950" y="1611824"/>
+            <a:ext cx="10742613" cy="1687612"/>
+            <a:chOff x="1377950" y="1611824"/>
+            <a:chExt cx="10742613" cy="1687612"/>
+          </a:xfrm>
+        </p:grpSpPr>
+        <p:cxnSp>
+          <p:nvCxnSpPr>
+            <p:cNvPr id="22" name="Connecteur droit 21"/>
+            <p:cNvCxnSpPr/>
+            <p:nvPr/>
+          </p:nvCxnSpPr>
+          <p:spPr>
+            <a:xfrm>
+              <a:off x="2971800" y="1611824"/>
+              <a:ext cx="12700" cy="890076"/>
+            </a:xfrm>
+            <a:prstGeom prst="line">
+              <a:avLst/>
+            </a:prstGeom>
+            <a:ln>
+              <a:solidFill>
+                <a:schemeClr val="tx1"/>
+              </a:solidFill>
+              <a:prstDash val="lgDash"/>
+            </a:ln>
+          </p:spPr>
+          <p:style>
+            <a:lnRef idx="1">
+              <a:schemeClr val="accent1"/>
+            </a:lnRef>
+            <a:fillRef idx="0">
+              <a:schemeClr val="accent1"/>
+            </a:fillRef>
+            <a:effectRef idx="0">
+              <a:schemeClr val="accent1"/>
+            </a:effectRef>
+            <a:fontRef idx="minor">
+              <a:schemeClr val="tx1"/>
+            </a:fontRef>
+          </p:style>
+        </p:cxnSp>
+        <p:cxnSp>
+          <p:nvCxnSpPr>
+            <p:cNvPr id="23" name="Connecteur droit 22"/>
+            <p:cNvCxnSpPr/>
+            <p:nvPr/>
+          </p:nvCxnSpPr>
+          <p:spPr>
+            <a:xfrm>
+              <a:off x="4031152" y="1611824"/>
+              <a:ext cx="12700" cy="890076"/>
+            </a:xfrm>
+            <a:prstGeom prst="line">
+              <a:avLst/>
+            </a:prstGeom>
+            <a:ln>
+              <a:solidFill>
+                <a:schemeClr val="tx1"/>
+              </a:solidFill>
+              <a:prstDash val="lgDash"/>
+            </a:ln>
+          </p:spPr>
+          <p:style>
+            <a:lnRef idx="1">
+              <a:schemeClr val="accent1"/>
+            </a:lnRef>
+            <a:fillRef idx="0">
+              <a:schemeClr val="accent1"/>
+            </a:fillRef>
+            <a:effectRef idx="0">
+              <a:schemeClr val="accent1"/>
+            </a:effectRef>
+            <a:fontRef idx="minor">
+              <a:schemeClr val="tx1"/>
+            </a:fontRef>
+          </p:style>
+        </p:cxnSp>
+        <p:cxnSp>
+          <p:nvCxnSpPr>
+            <p:cNvPr id="24" name="Connecteur droit 23"/>
+            <p:cNvCxnSpPr/>
+            <p:nvPr/>
+          </p:nvCxnSpPr>
+          <p:spPr>
+            <a:xfrm flipH="1">
+              <a:off x="8571402" y="1611824"/>
+              <a:ext cx="1" cy="508774"/>
+            </a:xfrm>
+            <a:prstGeom prst="line">
+              <a:avLst/>
+            </a:prstGeom>
+            <a:ln>
+              <a:solidFill>
+                <a:schemeClr val="tx1"/>
+              </a:solidFill>
+              <a:prstDash val="lgDash"/>
+            </a:ln>
+          </p:spPr>
+          <p:style>
+            <a:lnRef idx="1">
+              <a:schemeClr val="accent1"/>
+            </a:lnRef>
+            <a:fillRef idx="0">
+              <a:schemeClr val="accent1"/>
+            </a:fillRef>
+            <a:effectRef idx="0">
+              <a:schemeClr val="accent1"/>
+            </a:effectRef>
+            <a:fontRef idx="minor">
+              <a:schemeClr val="tx1"/>
+            </a:fontRef>
+          </p:style>
+        </p:cxnSp>
+        <p:cxnSp>
+          <p:nvCxnSpPr>
+            <p:cNvPr id="25" name="Connecteur droit 24"/>
+            <p:cNvCxnSpPr/>
+            <p:nvPr/>
+          </p:nvCxnSpPr>
+          <p:spPr>
+            <a:xfrm>
+              <a:off x="9619152" y="1623987"/>
+              <a:ext cx="0" cy="579463"/>
+            </a:xfrm>
+            <a:prstGeom prst="line">
+              <a:avLst/>
+            </a:prstGeom>
+            <a:ln>
+              <a:solidFill>
+                <a:schemeClr val="tx1"/>
+              </a:solidFill>
+              <a:prstDash val="lgDash"/>
+            </a:ln>
+          </p:spPr>
+          <p:style>
+            <a:lnRef idx="1">
+              <a:schemeClr val="accent1"/>
+            </a:lnRef>
+            <a:fillRef idx="0">
+              <a:schemeClr val="accent1"/>
+            </a:fillRef>
+            <a:effectRef idx="0">
+              <a:schemeClr val="accent1"/>
+            </a:effectRef>
+            <a:fontRef idx="minor">
+              <a:schemeClr val="tx1"/>
+            </a:fontRef>
+          </p:style>
+        </p:cxnSp>
+        <p:sp>
+          <p:nvSpPr>
+            <p:cNvPr id="26" name="ZoneTexte 25"/>
+            <p:cNvSpPr txBox="1"/>
+            <p:nvPr/>
+          </p:nvSpPr>
+          <p:spPr>
+            <a:xfrm>
+              <a:off x="2911956" y="2142521"/>
+              <a:ext cx="325730" cy="276999"/>
+            </a:xfrm>
+            <a:prstGeom prst="rect">
+              <a:avLst/>
+            </a:prstGeom>
+            <a:noFill/>
+          </p:spPr>
+          <p:txBody>
+            <a:bodyPr wrap="none" rtlCol="0">
+              <a:spAutoFit/>
+            </a:bodyPr>
+            <a:lstStyle/>
+            <a:p>
+              <a:r>
+                <a:rPr lang="el-GR" sz="1200" dirty="0" smtClean="0"/>
+                <a:t>θ</a:t>
+              </a:r>
+              <a:r>
+                <a:rPr lang="fr-CH" sz="1200" baseline="-25000" dirty="0" smtClean="0"/>
+                <a:t>A</a:t>
+              </a:r>
+              <a:endParaRPr lang="en-GB" sz="1200" baseline="-25000" dirty="0"/>
+            </a:p>
+          </p:txBody>
+        </p:sp>
+        <p:sp>
+          <p:nvSpPr>
+            <p:cNvPr id="27" name="ZoneTexte 26"/>
+            <p:cNvSpPr txBox="1"/>
+            <p:nvPr/>
+          </p:nvSpPr>
+          <p:spPr>
+            <a:xfrm>
+              <a:off x="4002016" y="1866892"/>
+              <a:ext cx="325730" cy="276999"/>
+            </a:xfrm>
+            <a:prstGeom prst="rect">
+              <a:avLst/>
+            </a:prstGeom>
+            <a:noFill/>
+          </p:spPr>
+          <p:txBody>
+            <a:bodyPr wrap="none" rtlCol="0">
+              <a:spAutoFit/>
+            </a:bodyPr>
+            <a:lstStyle/>
+            <a:p>
+              <a:r>
+                <a:rPr lang="el-GR" sz="1200" dirty="0" smtClean="0"/>
+                <a:t>θ</a:t>
+              </a:r>
+              <a:r>
+                <a:rPr lang="fr-CH" sz="1200" baseline="-25000" dirty="0" smtClean="0"/>
+                <a:t>B</a:t>
+              </a:r>
+              <a:endParaRPr lang="en-GB" sz="1200" baseline="-25000" dirty="0"/>
+            </a:p>
+          </p:txBody>
+        </p:sp>
+        <p:sp>
+          <p:nvSpPr>
+            <p:cNvPr id="28" name="ZoneTexte 27"/>
+            <p:cNvSpPr txBox="1"/>
+            <p:nvPr/>
+          </p:nvSpPr>
+          <p:spPr>
+            <a:xfrm>
+              <a:off x="8569274" y="1790338"/>
+              <a:ext cx="325730" cy="276999"/>
+            </a:xfrm>
+            <a:prstGeom prst="rect">
+              <a:avLst/>
+            </a:prstGeom>
+            <a:noFill/>
+          </p:spPr>
+          <p:txBody>
+            <a:bodyPr wrap="none" rtlCol="0">
+              <a:spAutoFit/>
+            </a:bodyPr>
+            <a:lstStyle/>
+            <a:p>
+              <a:r>
+                <a:rPr lang="el-GR" sz="1200" dirty="0" smtClean="0"/>
+                <a:t>θ</a:t>
+              </a:r>
+              <a:r>
+                <a:rPr lang="fr-CH" sz="1200" baseline="-25000" dirty="0" smtClean="0"/>
+                <a:t>B</a:t>
+              </a:r>
+              <a:endParaRPr lang="en-GB" sz="1200" baseline="-25000" dirty="0"/>
+            </a:p>
+          </p:txBody>
+        </p:sp>
+        <p:sp>
+          <p:nvSpPr>
+            <p:cNvPr id="29" name="ZoneTexte 28"/>
+            <p:cNvSpPr txBox="1"/>
+            <p:nvPr/>
+          </p:nvSpPr>
+          <p:spPr>
+            <a:xfrm>
+              <a:off x="9404952" y="2135752"/>
+              <a:ext cx="325730" cy="276999"/>
+            </a:xfrm>
+            <a:prstGeom prst="rect">
+              <a:avLst/>
+            </a:prstGeom>
+            <a:noFill/>
+          </p:spPr>
+          <p:txBody>
+            <a:bodyPr wrap="none" rtlCol="0">
+              <a:spAutoFit/>
+            </a:bodyPr>
+            <a:lstStyle/>
+            <a:p>
+              <a:r>
+                <a:rPr lang="el-GR" sz="1200" dirty="0" smtClean="0"/>
+                <a:t>θ</a:t>
+              </a:r>
+              <a:r>
+                <a:rPr lang="fr-CH" sz="1200" baseline="-25000" dirty="0" smtClean="0"/>
+                <a:t>A</a:t>
+              </a:r>
+              <a:endParaRPr lang="en-GB" sz="1200" baseline="-25000" dirty="0"/>
+            </a:p>
+          </p:txBody>
+        </p:sp>
+        <p:cxnSp>
+          <p:nvCxnSpPr>
+            <p:cNvPr id="31" name="Connecteur droit 30"/>
+            <p:cNvCxnSpPr/>
+            <p:nvPr/>
+          </p:nvCxnSpPr>
+          <p:spPr>
+            <a:xfrm>
+              <a:off x="1733550" y="2501900"/>
+              <a:ext cx="761823" cy="0"/>
+            </a:xfrm>
+            <a:prstGeom prst="line">
+              <a:avLst/>
+            </a:prstGeom>
+            <a:ln>
+              <a:solidFill>
+                <a:schemeClr val="tx1"/>
+              </a:solidFill>
+              <a:prstDash val="dashDot"/>
+            </a:ln>
+          </p:spPr>
+          <p:style>
+            <a:lnRef idx="1">
+              <a:schemeClr val="accent1"/>
+            </a:lnRef>
+            <a:fillRef idx="0">
+              <a:schemeClr val="accent1"/>
+            </a:fillRef>
+            <a:effectRef idx="0">
+              <a:schemeClr val="accent1"/>
+            </a:effectRef>
+            <a:fontRef idx="minor">
+              <a:schemeClr val="tx1"/>
+            </a:fontRef>
+          </p:style>
+        </p:cxnSp>
+        <p:cxnSp>
+          <p:nvCxnSpPr>
+            <p:cNvPr id="36" name="Connecteur droit 35"/>
+            <p:cNvCxnSpPr/>
+            <p:nvPr/>
+          </p:nvCxnSpPr>
+          <p:spPr>
+            <a:xfrm flipV="1">
+              <a:off x="3049757" y="2871969"/>
+              <a:ext cx="590550" cy="154437"/>
+            </a:xfrm>
+            <a:prstGeom prst="line">
+              <a:avLst/>
+            </a:prstGeom>
+            <a:ln>
+              <a:solidFill>
+                <a:schemeClr val="tx1"/>
+              </a:solidFill>
+              <a:prstDash val="dashDot"/>
+            </a:ln>
+          </p:spPr>
+          <p:style>
+            <a:lnRef idx="1">
+              <a:schemeClr val="accent1"/>
+            </a:lnRef>
+            <a:fillRef idx="0">
+              <a:schemeClr val="accent1"/>
+            </a:fillRef>
+            <a:effectRef idx="0">
+              <a:schemeClr val="accent1"/>
+            </a:effectRef>
+            <a:fontRef idx="minor">
+              <a:schemeClr val="tx1"/>
+            </a:fontRef>
+          </p:style>
+        </p:cxnSp>
+        <p:cxnSp>
+          <p:nvCxnSpPr>
+            <p:cNvPr id="38" name="Connecteur droit 37"/>
+            <p:cNvCxnSpPr/>
+            <p:nvPr/>
+          </p:nvCxnSpPr>
+          <p:spPr>
+            <a:xfrm>
+              <a:off x="1377950" y="2001618"/>
+              <a:ext cx="691074" cy="500282"/>
+            </a:xfrm>
+            <a:prstGeom prst="line">
+              <a:avLst/>
+            </a:prstGeom>
+            <a:ln w="28575">
+              <a:solidFill>
+                <a:schemeClr val="accent4"/>
+              </a:solidFill>
+            </a:ln>
+          </p:spPr>
+          <p:style>
+            <a:lnRef idx="1">
+              <a:schemeClr val="accent1"/>
+            </a:lnRef>
+            <a:fillRef idx="0">
+              <a:schemeClr val="accent1"/>
+            </a:fillRef>
+            <a:effectRef idx="0">
+              <a:schemeClr val="accent1"/>
+            </a:effectRef>
+            <a:fontRef idx="minor">
+              <a:schemeClr val="tx1"/>
+            </a:fontRef>
+          </p:style>
+        </p:cxnSp>
+        <p:cxnSp>
+          <p:nvCxnSpPr>
+            <p:cNvPr id="39" name="Connecteur droit 38"/>
+            <p:cNvCxnSpPr/>
+            <p:nvPr/>
+          </p:nvCxnSpPr>
+          <p:spPr>
+            <a:xfrm>
+              <a:off x="2079087" y="2502775"/>
+              <a:ext cx="1231776" cy="447441"/>
+            </a:xfrm>
+            <a:prstGeom prst="line">
+              <a:avLst/>
+            </a:prstGeom>
+            <a:ln w="28575">
+              <a:solidFill>
+                <a:schemeClr val="accent4"/>
+              </a:solidFill>
+            </a:ln>
+          </p:spPr>
+          <p:style>
+            <a:lnRef idx="1">
+              <a:schemeClr val="accent1"/>
+            </a:lnRef>
+            <a:fillRef idx="0">
+              <a:schemeClr val="accent1"/>
+            </a:fillRef>
+            <a:effectRef idx="0">
+              <a:schemeClr val="accent1"/>
+            </a:effectRef>
+            <a:fontRef idx="minor">
+              <a:schemeClr val="tx1"/>
+            </a:fontRef>
+          </p:style>
+        </p:cxnSp>
+        <p:cxnSp>
+          <p:nvCxnSpPr>
+            <p:cNvPr id="43" name="Connecteur droit 42"/>
+            <p:cNvCxnSpPr/>
+            <p:nvPr/>
+          </p:nvCxnSpPr>
+          <p:spPr>
+            <a:xfrm>
+              <a:off x="3315080" y="2949188"/>
+              <a:ext cx="1604672" cy="245456"/>
+            </a:xfrm>
+            <a:prstGeom prst="line">
+              <a:avLst/>
+            </a:prstGeom>
+            <a:ln w="28575">
+              <a:solidFill>
+                <a:schemeClr val="accent4"/>
+              </a:solidFill>
+            </a:ln>
+          </p:spPr>
+          <p:style>
+            <a:lnRef idx="1">
+              <a:schemeClr val="accent1"/>
+            </a:lnRef>
+            <a:fillRef idx="0">
+              <a:schemeClr val="accent1"/>
+            </a:fillRef>
+            <a:effectRef idx="0">
+              <a:schemeClr val="accent1"/>
+            </a:effectRef>
+            <a:fontRef idx="minor">
+              <a:schemeClr val="tx1"/>
+            </a:fontRef>
+          </p:style>
+        </p:cxnSp>
+        <p:cxnSp>
+          <p:nvCxnSpPr>
+            <p:cNvPr id="45" name="Connecteur droit 44"/>
+            <p:cNvCxnSpPr/>
+            <p:nvPr/>
+          </p:nvCxnSpPr>
+          <p:spPr>
+            <a:xfrm flipV="1">
+              <a:off x="4718008" y="3026406"/>
+              <a:ext cx="464480" cy="273030"/>
+            </a:xfrm>
+            <a:prstGeom prst="line">
+              <a:avLst/>
+            </a:prstGeom>
+            <a:ln>
+              <a:solidFill>
+                <a:schemeClr val="tx1"/>
+              </a:solidFill>
+              <a:prstDash val="dashDot"/>
+            </a:ln>
+          </p:spPr>
+          <p:style>
+            <a:lnRef idx="1">
+              <a:schemeClr val="accent1"/>
+            </a:lnRef>
+            <a:fillRef idx="0">
+              <a:schemeClr val="accent1"/>
+            </a:fillRef>
+            <a:effectRef idx="0">
+              <a:schemeClr val="accent1"/>
+            </a:effectRef>
+            <a:fontRef idx="minor">
+              <a:schemeClr val="tx1"/>
+            </a:fontRef>
+          </p:style>
+        </p:cxnSp>
+        <p:cxnSp>
+          <p:nvCxnSpPr>
+            <p:cNvPr id="47" name="Connecteur droit 46"/>
+            <p:cNvCxnSpPr/>
+            <p:nvPr/>
+          </p:nvCxnSpPr>
+          <p:spPr>
+            <a:xfrm flipV="1">
+              <a:off x="4924043" y="3022230"/>
+              <a:ext cx="2852220" cy="166930"/>
+            </a:xfrm>
+            <a:prstGeom prst="line">
+              <a:avLst/>
+            </a:prstGeom>
+            <a:ln w="28575">
+              <a:solidFill>
+                <a:schemeClr val="accent4"/>
+              </a:solidFill>
+            </a:ln>
+          </p:spPr>
+          <p:style>
+            <a:lnRef idx="1">
+              <a:schemeClr val="accent1"/>
+            </a:lnRef>
+            <a:fillRef idx="0">
+              <a:schemeClr val="accent1"/>
+            </a:fillRef>
+            <a:effectRef idx="0">
+              <a:schemeClr val="accent1"/>
+            </a:effectRef>
+            <a:fontRef idx="minor">
+              <a:schemeClr val="tx1"/>
+            </a:fontRef>
+          </p:style>
+        </p:cxnSp>
+        <p:cxnSp>
+          <p:nvCxnSpPr>
+            <p:cNvPr id="56" name="Connecteur droit 55"/>
+            <p:cNvCxnSpPr/>
+            <p:nvPr/>
+          </p:nvCxnSpPr>
+          <p:spPr>
+            <a:xfrm>
+              <a:off x="7541847" y="2911954"/>
+              <a:ext cx="468832" cy="234853"/>
+            </a:xfrm>
+            <a:prstGeom prst="line">
+              <a:avLst/>
+            </a:prstGeom>
+            <a:ln>
+              <a:solidFill>
+                <a:schemeClr val="tx1"/>
+              </a:solidFill>
+              <a:prstDash val="dashDot"/>
+            </a:ln>
+          </p:spPr>
+          <p:style>
+            <a:lnRef idx="1">
+              <a:schemeClr val="accent1"/>
+            </a:lnRef>
+            <a:fillRef idx="0">
+              <a:schemeClr val="accent1"/>
+            </a:fillRef>
+            <a:effectRef idx="0">
+              <a:schemeClr val="accent1"/>
+            </a:effectRef>
+            <a:fontRef idx="minor">
+              <a:schemeClr val="tx1"/>
+            </a:fontRef>
+          </p:style>
+        </p:cxnSp>
+        <p:cxnSp>
+          <p:nvCxnSpPr>
+            <p:cNvPr id="59" name="Connecteur droit 58"/>
+            <p:cNvCxnSpPr/>
+            <p:nvPr/>
+          </p:nvCxnSpPr>
+          <p:spPr>
+            <a:xfrm>
+              <a:off x="7776263" y="3030905"/>
+              <a:ext cx="1462987" cy="158255"/>
+            </a:xfrm>
+            <a:prstGeom prst="line">
+              <a:avLst/>
+            </a:prstGeom>
+            <a:ln w="28575">
+              <a:solidFill>
+                <a:schemeClr val="accent4"/>
+              </a:solidFill>
+            </a:ln>
+          </p:spPr>
+          <p:style>
+            <a:lnRef idx="1">
+              <a:schemeClr val="accent1"/>
+            </a:lnRef>
+            <a:fillRef idx="0">
+              <a:schemeClr val="accent1"/>
+            </a:fillRef>
+            <a:effectRef idx="0">
+              <a:schemeClr val="accent1"/>
+            </a:effectRef>
+            <a:fontRef idx="minor">
+              <a:schemeClr val="tx1"/>
+            </a:fontRef>
+          </p:style>
+        </p:cxnSp>
+        <p:cxnSp>
+          <p:nvCxnSpPr>
+            <p:cNvPr id="63" name="Connecteur droit 62"/>
+            <p:cNvCxnSpPr>
+              <a:endCxn id="19" idx="1"/>
+            </p:cNvCxnSpPr>
+            <p:nvPr/>
+          </p:nvCxnSpPr>
+          <p:spPr>
+            <a:xfrm flipV="1">
+              <a:off x="9234450" y="3030952"/>
+              <a:ext cx="1338218" cy="140119"/>
+            </a:xfrm>
+            <a:prstGeom prst="line">
+              <a:avLst/>
+            </a:prstGeom>
+            <a:ln w="28575">
+              <a:solidFill>
+                <a:schemeClr val="accent4"/>
+              </a:solidFill>
+            </a:ln>
+          </p:spPr>
+          <p:style>
+            <a:lnRef idx="1">
+              <a:schemeClr val="accent1"/>
+            </a:lnRef>
+            <a:fillRef idx="0">
+              <a:schemeClr val="accent1"/>
+            </a:fillRef>
+            <a:effectRef idx="0">
+              <a:schemeClr val="accent1"/>
+            </a:effectRef>
+            <a:fontRef idx="minor">
+              <a:schemeClr val="tx1"/>
+            </a:fontRef>
+          </p:style>
+        </p:cxnSp>
+        <p:cxnSp>
+          <p:nvCxnSpPr>
+            <p:cNvPr id="61" name="Connecteur droit 60"/>
+            <p:cNvCxnSpPr/>
+            <p:nvPr/>
+          </p:nvCxnSpPr>
+          <p:spPr>
+            <a:xfrm>
+              <a:off x="8718829" y="3060749"/>
+              <a:ext cx="998088" cy="221470"/>
+            </a:xfrm>
+            <a:prstGeom prst="line">
+              <a:avLst/>
+            </a:prstGeom>
+            <a:ln>
+              <a:solidFill>
+                <a:schemeClr val="tx1"/>
+              </a:solidFill>
+              <a:prstDash val="dashDot"/>
+            </a:ln>
+          </p:spPr>
+          <p:style>
+            <a:lnRef idx="1">
+              <a:schemeClr val="accent1"/>
+            </a:lnRef>
+            <a:fillRef idx="0">
+              <a:schemeClr val="accent1"/>
+            </a:fillRef>
+            <a:effectRef idx="0">
+              <a:schemeClr val="accent1"/>
+            </a:effectRef>
+            <a:fontRef idx="minor">
+              <a:schemeClr val="tx1"/>
+            </a:fontRef>
+          </p:style>
+        </p:cxnSp>
+        <p:cxnSp>
+          <p:nvCxnSpPr>
+            <p:cNvPr id="80" name="Connecteur droit 79"/>
+            <p:cNvCxnSpPr/>
+            <p:nvPr/>
+          </p:nvCxnSpPr>
+          <p:spPr>
+            <a:xfrm flipV="1">
+              <a:off x="10529887" y="2973793"/>
+              <a:ext cx="1590676" cy="61079"/>
+            </a:xfrm>
+            <a:prstGeom prst="line">
+              <a:avLst/>
+            </a:prstGeom>
+            <a:ln w="28575">
+              <a:solidFill>
+                <a:schemeClr val="accent4"/>
+              </a:solidFill>
+            </a:ln>
+          </p:spPr>
+          <p:style>
+            <a:lnRef idx="1">
+              <a:schemeClr val="accent1"/>
+            </a:lnRef>
+            <a:fillRef idx="0">
+              <a:schemeClr val="accent1"/>
+            </a:fillRef>
+            <a:effectRef idx="0">
+              <a:schemeClr val="accent1"/>
+            </a:effectRef>
+            <a:fontRef idx="minor">
+              <a:schemeClr val="tx1"/>
+            </a:fontRef>
+          </p:style>
+        </p:cxnSp>
+        <p:cxnSp>
+          <p:nvCxnSpPr>
+            <p:cNvPr id="70" name="Connecteur droit 69"/>
+            <p:cNvCxnSpPr/>
+            <p:nvPr/>
+          </p:nvCxnSpPr>
+          <p:spPr>
+            <a:xfrm>
+              <a:off x="9948863" y="3020715"/>
+              <a:ext cx="1056253" cy="0"/>
+            </a:xfrm>
+            <a:prstGeom prst="line">
+              <a:avLst/>
+            </a:prstGeom>
+            <a:ln>
+              <a:solidFill>
+                <a:schemeClr val="tx1"/>
+              </a:solidFill>
+              <a:prstDash val="dashDot"/>
+            </a:ln>
+          </p:spPr>
+          <p:style>
+            <a:lnRef idx="1">
+              <a:schemeClr val="accent1"/>
+            </a:lnRef>
+            <a:fillRef idx="0">
+              <a:schemeClr val="accent1"/>
+            </a:fillRef>
+            <a:effectRef idx="0">
+              <a:schemeClr val="accent1"/>
+            </a:effectRef>
+            <a:fontRef idx="minor">
+              <a:schemeClr val="tx1"/>
+            </a:fontRef>
+          </p:style>
+        </p:cxnSp>
+      </p:grpSp>
+      <p:sp>
+        <p:nvSpPr>
+          <p:cNvPr id="107" name="Arc 106"/>
+          <p:cNvSpPr/>
+          <p:nvPr/>
+        </p:nvSpPr>
+        <p:spPr>
+          <a:xfrm rot="4410126" flipH="1" flipV="1">
+            <a:off x="1726170" y="2291972"/>
+            <a:ext cx="346654" cy="351887"/>
+          </a:xfrm>
+          <a:prstGeom prst="arc">
+            <a:avLst>
+              <a:gd name="adj1" fmla="val 16663458"/>
+              <a:gd name="adj2" fmla="val 20671197"/>
+            </a:avLst>
+          </a:prstGeom>
+          <a:ln>
+            <a:solidFill>
+              <a:schemeClr val="tx1"/>
+            </a:solidFill>
+            <a:headEnd type="arrow" w="med" len="med"/>
+            <a:tailEnd type="none" w="med" len="med"/>
+          </a:ln>
+        </p:spPr>
+        <p:style>
+          <a:lnRef idx="1">
+            <a:schemeClr val="accent1"/>
+          </a:lnRef>
+          <a:fillRef idx="0">
+            <a:schemeClr val="accent1"/>
+          </a:fillRef>
+          <a:effectRef idx="0">
+            <a:schemeClr val="accent1"/>
+          </a:effectRef>
+          <a:fontRef idx="minor">
+            <a:schemeClr val="tx1"/>
+          </a:fontRef>
+        </p:style>
+        <p:txBody>
+          <a:bodyPr rtlCol="0" anchor="ctr"/>
+          <a:lstStyle/>
+          <a:p>
+            <a:pPr algn="ctr"/>
+            <a:endParaRPr lang="en-GB"/>
+          </a:p>
+        </p:txBody>
+      </p:sp>
+      <p:sp>
+        <p:nvSpPr>
+          <p:cNvPr id="108" name="Arc 107"/>
+          <p:cNvSpPr/>
+          <p:nvPr/>
+        </p:nvSpPr>
+        <p:spPr>
+          <a:xfrm rot="15517079" flipH="1" flipV="1">
+            <a:off x="2168313" y="2330813"/>
+            <a:ext cx="286229" cy="317649"/>
+          </a:xfrm>
+          <a:prstGeom prst="arc">
+            <a:avLst>
+              <a:gd name="adj1" fmla="val 16663458"/>
+              <a:gd name="adj2" fmla="val 20671197"/>
+            </a:avLst>
+          </a:prstGeom>
+          <a:ln>
+            <a:solidFill>
+              <a:schemeClr val="tx1"/>
+            </a:solidFill>
+            <a:headEnd type="arrow" w="med" len="med"/>
+            <a:tailEnd type="none" w="med" len="med"/>
+          </a:ln>
+        </p:spPr>
+        <p:style>
+          <a:lnRef idx="1">
+            <a:schemeClr val="accent1"/>
+          </a:lnRef>
+          <a:fillRef idx="0">
+            <a:schemeClr val="accent1"/>
+          </a:fillRef>
+          <a:effectRef idx="0">
+            <a:schemeClr val="accent1"/>
+          </a:effectRef>
+          <a:fontRef idx="minor">
+            <a:schemeClr val="tx1"/>
+          </a:fontRef>
+        </p:style>
+        <p:txBody>
+          <a:bodyPr rtlCol="0" anchor="ctr"/>
+          <a:lstStyle/>
+          <a:p>
+            <a:pPr algn="ctr"/>
+            <a:endParaRPr lang="en-GB"/>
+          </a:p>
+        </p:txBody>
+      </p:sp>
+      <p:sp>
+        <p:nvSpPr>
+          <p:cNvPr id="110" name="Arc 109"/>
+          <p:cNvSpPr/>
+          <p:nvPr/>
+        </p:nvSpPr>
+        <p:spPr>
+          <a:xfrm rot="1942193" flipH="1" flipV="1">
+            <a:off x="2979219" y="2717655"/>
+            <a:ext cx="346654" cy="351887"/>
+          </a:xfrm>
+          <a:prstGeom prst="arc">
+            <a:avLst>
+              <a:gd name="adj1" fmla="val 16663458"/>
+              <a:gd name="adj2" fmla="val 20671197"/>
+            </a:avLst>
+          </a:prstGeom>
+          <a:ln>
+            <a:solidFill>
+              <a:schemeClr val="tx1"/>
+            </a:solidFill>
+            <a:headEnd type="arrow" w="med" len="med"/>
+            <a:tailEnd type="none" w="med" len="med"/>
+          </a:ln>
+        </p:spPr>
+        <p:style>
+          <a:lnRef idx="1">
+            <a:schemeClr val="accent1"/>
+          </a:lnRef>
+          <a:fillRef idx="0">
+            <a:schemeClr val="accent1"/>
+          </a:fillRef>
+          <a:effectRef idx="0">
+            <a:schemeClr val="accent1"/>
+          </a:effectRef>
+          <a:fontRef idx="minor">
+            <a:schemeClr val="tx1"/>
+          </a:fontRef>
+        </p:style>
+        <p:txBody>
+          <a:bodyPr rtlCol="0" anchor="ctr"/>
+          <a:lstStyle/>
+          <a:p>
+            <a:pPr algn="ctr"/>
+            <a:endParaRPr lang="en-GB"/>
+          </a:p>
+        </p:txBody>
+      </p:sp>
+      <p:sp>
+        <p:nvSpPr>
+          <p:cNvPr id="111" name="Arc 110"/>
+          <p:cNvSpPr/>
+          <p:nvPr/>
+        </p:nvSpPr>
+        <p:spPr>
+          <a:xfrm rot="14151145" flipH="1" flipV="1">
+            <a:off x="3397278" y="2779137"/>
+            <a:ext cx="313468" cy="265635"/>
+          </a:xfrm>
+          <a:prstGeom prst="arc">
+            <a:avLst>
+              <a:gd name="adj1" fmla="val 16663458"/>
+              <a:gd name="adj2" fmla="val 20671197"/>
+            </a:avLst>
+          </a:prstGeom>
+          <a:ln>
+            <a:solidFill>
+              <a:schemeClr val="tx1"/>
+            </a:solidFill>
+            <a:headEnd type="arrow" w="med" len="med"/>
+            <a:tailEnd type="none" w="med" len="med"/>
+          </a:ln>
+        </p:spPr>
+        <p:style>
+          <a:lnRef idx="1">
+            <a:schemeClr val="accent1"/>
+          </a:lnRef>
+          <a:fillRef idx="0">
+            <a:schemeClr val="accent1"/>
+          </a:fillRef>
+          <a:effectRef idx="0">
+            <a:schemeClr val="accent1"/>
+          </a:effectRef>
+          <a:fontRef idx="minor">
+            <a:schemeClr val="tx1"/>
+          </a:fontRef>
+        </p:style>
+        <p:txBody>
+          <a:bodyPr rtlCol="0" anchor="ctr"/>
+          <a:lstStyle/>
+          <a:p>
+            <a:pPr algn="ctr"/>
+            <a:endParaRPr lang="en-GB"/>
+          </a:p>
+        </p:txBody>
+      </p:sp>
+      <p:sp>
+        <p:nvSpPr>
+          <p:cNvPr id="112" name="Arc 111"/>
+          <p:cNvSpPr/>
+          <p:nvPr/>
+        </p:nvSpPr>
+        <p:spPr>
+          <a:xfrm rot="12402128" flipH="1" flipV="1">
+            <a:off x="4952969" y="3002180"/>
+            <a:ext cx="313468" cy="265635"/>
+          </a:xfrm>
+          <a:prstGeom prst="arc">
+            <a:avLst>
+              <a:gd name="adj1" fmla="val 16663458"/>
+              <a:gd name="adj2" fmla="val 20671197"/>
+            </a:avLst>
+          </a:prstGeom>
+          <a:ln>
+            <a:solidFill>
+              <a:schemeClr val="tx1"/>
+            </a:solidFill>
+            <a:headEnd type="arrow" w="med" len="med"/>
+            <a:tailEnd type="none" w="med" len="med"/>
+          </a:ln>
+        </p:spPr>
+        <p:style>
+          <a:lnRef idx="1">
+            <a:schemeClr val="accent1"/>
+          </a:lnRef>
+          <a:fillRef idx="0">
+            <a:schemeClr val="accent1"/>
+          </a:fillRef>
+          <a:effectRef idx="0">
+            <a:schemeClr val="accent1"/>
+          </a:effectRef>
+          <a:fontRef idx="minor">
+            <a:schemeClr val="tx1"/>
+          </a:fontRef>
+        </p:style>
+        <p:txBody>
+          <a:bodyPr rtlCol="0" anchor="ctr"/>
+          <a:lstStyle/>
+          <a:p>
+            <a:pPr algn="ctr"/>
+            <a:endParaRPr lang="en-GB"/>
+          </a:p>
+        </p:txBody>
+      </p:sp>
+      <p:sp>
+        <p:nvSpPr>
+          <p:cNvPr id="113" name="Arc 112"/>
+          <p:cNvSpPr/>
+          <p:nvPr/>
+        </p:nvSpPr>
+        <p:spPr>
+          <a:xfrm rot="1111206" flipH="1" flipV="1">
+            <a:off x="4618239" y="3002090"/>
+            <a:ext cx="313388" cy="328482"/>
+          </a:xfrm>
+          <a:prstGeom prst="arc">
+            <a:avLst>
+              <a:gd name="adj1" fmla="val 16663458"/>
+              <a:gd name="adj2" fmla="val 21231125"/>
+            </a:avLst>
+          </a:prstGeom>
+          <a:ln>
+            <a:solidFill>
+              <a:schemeClr val="tx1"/>
+            </a:solidFill>
+            <a:headEnd type="arrow" w="med" len="med"/>
+            <a:tailEnd type="none" w="med" len="med"/>
+          </a:ln>
+        </p:spPr>
+        <p:style>
+          <a:lnRef idx="1">
+            <a:schemeClr val="accent1"/>
+          </a:lnRef>
+          <a:fillRef idx="0">
+            <a:schemeClr val="accent1"/>
+          </a:fillRef>
+          <a:effectRef idx="0">
+            <a:schemeClr val="accent1"/>
+          </a:effectRef>
+          <a:fontRef idx="minor">
+            <a:schemeClr val="tx1"/>
+          </a:fontRef>
+        </p:style>
+        <p:txBody>
+          <a:bodyPr rtlCol="0" anchor="ctr"/>
+          <a:lstStyle/>
+          <a:p>
+            <a:pPr algn="ctr"/>
+            <a:endParaRPr lang="en-GB"/>
+          </a:p>
+        </p:txBody>
+      </p:sp>
+      <p:sp>
+        <p:nvSpPr>
+          <p:cNvPr id="115" name="Arc 114"/>
+          <p:cNvSpPr/>
+          <p:nvPr/>
+        </p:nvSpPr>
+        <p:spPr>
+          <a:xfrm rot="4410126" flipH="1" flipV="1">
+            <a:off x="7446415" y="2859888"/>
+            <a:ext cx="314125" cy="338984"/>
+          </a:xfrm>
+          <a:prstGeom prst="arc">
+            <a:avLst>
+              <a:gd name="adj1" fmla="val 16663458"/>
+              <a:gd name="adj2" fmla="val 20671197"/>
+            </a:avLst>
+          </a:prstGeom>
+          <a:ln>
+            <a:solidFill>
+              <a:schemeClr val="tx1"/>
+            </a:solidFill>
+            <a:headEnd type="none" w="med" len="med"/>
+            <a:tailEnd type="arrow" w="med" len="med"/>
+          </a:ln>
+        </p:spPr>
+        <p:style>
+          <a:lnRef idx="1">
+            <a:schemeClr val="accent1"/>
+          </a:lnRef>
+          <a:fillRef idx="0">
+            <a:schemeClr val="accent1"/>
+          </a:fillRef>
+          <a:effectRef idx="0">
+            <a:schemeClr val="accent1"/>
+          </a:effectRef>
+          <a:fontRef idx="minor">
+            <a:schemeClr val="tx1"/>
+          </a:fontRef>
+        </p:style>
+        <p:txBody>
+          <a:bodyPr rtlCol="0" anchor="ctr"/>
+          <a:lstStyle/>
+          <a:p>
+            <a:pPr algn="ctr"/>
+            <a:endParaRPr lang="en-GB"/>
+          </a:p>
+        </p:txBody>
+      </p:sp>
+      <p:sp>
+        <p:nvSpPr>
+          <p:cNvPr id="116" name="Arc 115"/>
+          <p:cNvSpPr/>
+          <p:nvPr/>
+        </p:nvSpPr>
+        <p:spPr>
+          <a:xfrm rot="15517079" flipH="1" flipV="1">
+            <a:off x="7858863" y="2930050"/>
+            <a:ext cx="249580" cy="283734"/>
+          </a:xfrm>
+          <a:prstGeom prst="arc">
+            <a:avLst>
+              <a:gd name="adj1" fmla="val 16663458"/>
+              <a:gd name="adj2" fmla="val 20671197"/>
+            </a:avLst>
+          </a:prstGeom>
+          <a:ln>
+            <a:solidFill>
+              <a:schemeClr val="tx1"/>
+            </a:solidFill>
+            <a:headEnd type="none" w="med" len="med"/>
+            <a:tailEnd type="arrow" w="med" len="med"/>
+          </a:ln>
+        </p:spPr>
+        <p:style>
+          <a:lnRef idx="1">
+            <a:schemeClr val="accent1"/>
+          </a:lnRef>
+          <a:fillRef idx="0">
+            <a:schemeClr val="accent1"/>
+          </a:fillRef>
+          <a:effectRef idx="0">
+            <a:schemeClr val="accent1"/>
+          </a:effectRef>
+          <a:fontRef idx="minor">
+            <a:schemeClr val="tx1"/>
+          </a:fontRef>
+        </p:style>
+        <p:txBody>
+          <a:bodyPr rtlCol="0" anchor="ctr"/>
+          <a:lstStyle/>
+          <a:p>
+            <a:pPr algn="ctr"/>
+            <a:endParaRPr lang="en-GB"/>
+          </a:p>
+        </p:txBody>
+      </p:sp>
+      <p:sp>
+        <p:nvSpPr>
+          <p:cNvPr id="137" name="Arc 136"/>
+          <p:cNvSpPr/>
+          <p:nvPr/>
+        </p:nvSpPr>
+        <p:spPr>
+          <a:xfrm rot="2789593" flipH="1" flipV="1">
+            <a:off x="8685324" y="2931787"/>
+            <a:ext cx="203728" cy="283326"/>
+          </a:xfrm>
+          <a:prstGeom prst="arc">
+            <a:avLst>
+              <a:gd name="adj1" fmla="val 16663458"/>
+              <a:gd name="adj2" fmla="val 20671197"/>
+            </a:avLst>
+          </a:prstGeom>
+          <a:ln>
+            <a:solidFill>
+              <a:schemeClr val="tx1"/>
+            </a:solidFill>
+            <a:headEnd type="none" w="med" len="med"/>
+            <a:tailEnd type="arrow" w="med" len="med"/>
+          </a:ln>
+        </p:spPr>
+        <p:style>
+          <a:lnRef idx="1">
+            <a:schemeClr val="accent1"/>
+          </a:lnRef>
+          <a:fillRef idx="0">
+            <a:schemeClr val="accent1"/>
+          </a:fillRef>
+          <a:effectRef idx="0">
+            <a:schemeClr val="accent1"/>
+          </a:effectRef>
+          <a:fontRef idx="minor">
+            <a:schemeClr val="tx1"/>
+          </a:fontRef>
+        </p:style>
+        <p:txBody>
+          <a:bodyPr rtlCol="0" anchor="ctr"/>
+          <a:lstStyle/>
+          <a:p>
+            <a:pPr algn="ctr"/>
+            <a:endParaRPr lang="en-GB" sz="1000"/>
+          </a:p>
+        </p:txBody>
+      </p:sp>
+      <p:sp>
+        <p:nvSpPr>
+          <p:cNvPr id="138" name="Arc 137"/>
+          <p:cNvSpPr/>
+          <p:nvPr/>
+        </p:nvSpPr>
+        <p:spPr>
+          <a:xfrm rot="13905692" flipH="1" flipV="1">
+            <a:off x="9429039" y="3014710"/>
+            <a:ext cx="224095" cy="390984"/>
+          </a:xfrm>
+          <a:prstGeom prst="arc">
+            <a:avLst>
+              <a:gd name="adj1" fmla="val 16663458"/>
+              <a:gd name="adj2" fmla="val 20671197"/>
+            </a:avLst>
+          </a:prstGeom>
+          <a:ln>
+            <a:solidFill>
+              <a:schemeClr val="tx1"/>
+            </a:solidFill>
+            <a:headEnd type="none" w="med" len="med"/>
+            <a:tailEnd type="arrow" w="med" len="med"/>
+          </a:ln>
+        </p:spPr>
+        <p:style>
+          <a:lnRef idx="1">
+            <a:schemeClr val="accent1"/>
+          </a:lnRef>
+          <a:fillRef idx="0">
+            <a:schemeClr val="accent1"/>
+          </a:fillRef>
+          <a:effectRef idx="0">
+            <a:schemeClr val="accent1"/>
+          </a:effectRef>
+          <a:fontRef idx="minor">
+            <a:schemeClr val="tx1"/>
+          </a:fontRef>
+        </p:style>
+        <p:txBody>
+          <a:bodyPr rtlCol="0" anchor="ctr"/>
+          <a:lstStyle/>
+          <a:p>
+            <a:pPr algn="ctr"/>
+            <a:endParaRPr lang="en-GB"/>
+          </a:p>
+        </p:txBody>
+      </p:sp>
+    </p:spTree>
+    <p:extLst>
+      <p:ext uri="{BB962C8B-B14F-4D97-AF65-F5344CB8AC3E}">
+        <p14:creationId xmlns:p14="http://schemas.microsoft.com/office/powerpoint/2010/main" val="4264108340"/>
       </p:ext>
     </p:extLst>
   </p:cSld>

</xml_diff>

<commit_message>
ADC design : python script to determine the best match of glasses in finished
the 'glassChoice.py' and 'modelisationADCfunctions.py' are updated in order to deliver the best glass combination depending on the criteria : exit angle BDCQ minimum
</commit_message>
<xml_diff>
--- a/20180518_AO_design_report/images/images_sketch.pptx
+++ b/20180518_AO_design_report/images/images_sketch.pptx
@@ -234,7 +234,7 @@
           <a:p>
             <a:fld id="{8EDEE2E2-4BE4-41CA-94FC-BC9DC2A64380}" type="datetimeFigureOut">
               <a:rPr lang="en-GB" smtClean="0"/>
-              <a:t>19/06/2018</a:t>
+              <a:t>20/06/2018</a:t>
             </a:fld>
             <a:endParaRPr lang="en-GB"/>
           </a:p>
@@ -633,7 +633,7 @@
           <a:p>
             <a:fld id="{24AF4860-EF53-429F-9816-8C3FCB6EDEF9}" type="datetimeFigureOut">
               <a:rPr lang="en-GB" smtClean="0"/>
-              <a:t>19/06/2018</a:t>
+              <a:t>20/06/2018</a:t>
             </a:fld>
             <a:endParaRPr lang="en-GB"/>
           </a:p>
@@ -803,7 +803,7 @@
           <a:p>
             <a:fld id="{24AF4860-EF53-429F-9816-8C3FCB6EDEF9}" type="datetimeFigureOut">
               <a:rPr lang="en-GB" smtClean="0"/>
-              <a:t>19/06/2018</a:t>
+              <a:t>20/06/2018</a:t>
             </a:fld>
             <a:endParaRPr lang="en-GB"/>
           </a:p>
@@ -983,7 +983,7 @@
           <a:p>
             <a:fld id="{24AF4860-EF53-429F-9816-8C3FCB6EDEF9}" type="datetimeFigureOut">
               <a:rPr lang="en-GB" smtClean="0"/>
-              <a:t>19/06/2018</a:t>
+              <a:t>20/06/2018</a:t>
             </a:fld>
             <a:endParaRPr lang="en-GB"/>
           </a:p>
@@ -1153,7 +1153,7 @@
           <a:p>
             <a:fld id="{24AF4860-EF53-429F-9816-8C3FCB6EDEF9}" type="datetimeFigureOut">
               <a:rPr lang="en-GB" smtClean="0"/>
-              <a:t>19/06/2018</a:t>
+              <a:t>20/06/2018</a:t>
             </a:fld>
             <a:endParaRPr lang="en-GB"/>
           </a:p>
@@ -1399,7 +1399,7 @@
           <a:p>
             <a:fld id="{24AF4860-EF53-429F-9816-8C3FCB6EDEF9}" type="datetimeFigureOut">
               <a:rPr lang="en-GB" smtClean="0"/>
-              <a:t>19/06/2018</a:t>
+              <a:t>20/06/2018</a:t>
             </a:fld>
             <a:endParaRPr lang="en-GB"/>
           </a:p>
@@ -1631,7 +1631,7 @@
           <a:p>
             <a:fld id="{24AF4860-EF53-429F-9816-8C3FCB6EDEF9}" type="datetimeFigureOut">
               <a:rPr lang="en-GB" smtClean="0"/>
-              <a:t>19/06/2018</a:t>
+              <a:t>20/06/2018</a:t>
             </a:fld>
             <a:endParaRPr lang="en-GB"/>
           </a:p>
@@ -1998,7 +1998,7 @@
           <a:p>
             <a:fld id="{24AF4860-EF53-429F-9816-8C3FCB6EDEF9}" type="datetimeFigureOut">
               <a:rPr lang="en-GB" smtClean="0"/>
-              <a:t>19/06/2018</a:t>
+              <a:t>20/06/2018</a:t>
             </a:fld>
             <a:endParaRPr lang="en-GB"/>
           </a:p>
@@ -2116,7 +2116,7 @@
           <a:p>
             <a:fld id="{24AF4860-EF53-429F-9816-8C3FCB6EDEF9}" type="datetimeFigureOut">
               <a:rPr lang="en-GB" smtClean="0"/>
-              <a:t>19/06/2018</a:t>
+              <a:t>20/06/2018</a:t>
             </a:fld>
             <a:endParaRPr lang="en-GB"/>
           </a:p>
@@ -2211,7 +2211,7 @@
           <a:p>
             <a:fld id="{24AF4860-EF53-429F-9816-8C3FCB6EDEF9}" type="datetimeFigureOut">
               <a:rPr lang="en-GB" smtClean="0"/>
-              <a:t>19/06/2018</a:t>
+              <a:t>20/06/2018</a:t>
             </a:fld>
             <a:endParaRPr lang="en-GB"/>
           </a:p>
@@ -2488,7 +2488,7 @@
           <a:p>
             <a:fld id="{24AF4860-EF53-429F-9816-8C3FCB6EDEF9}" type="datetimeFigureOut">
               <a:rPr lang="en-GB" smtClean="0"/>
-              <a:t>19/06/2018</a:t>
+              <a:t>20/06/2018</a:t>
             </a:fld>
             <a:endParaRPr lang="en-GB"/>
           </a:p>
@@ -2741,7 +2741,7 @@
           <a:p>
             <a:fld id="{24AF4860-EF53-429F-9816-8C3FCB6EDEF9}" type="datetimeFigureOut">
               <a:rPr lang="en-GB" smtClean="0"/>
-              <a:t>19/06/2018</a:t>
+              <a:t>20/06/2018</a:t>
             </a:fld>
             <a:endParaRPr lang="en-GB"/>
           </a:p>
@@ -2954,7 +2954,7 @@
           <a:p>
             <a:fld id="{24AF4860-EF53-429F-9816-8C3FCB6EDEF9}" type="datetimeFigureOut">
               <a:rPr lang="en-GB" smtClean="0"/>
-              <a:t>19/06/2018</a:t>
+              <a:t>20/06/2018</a:t>
             </a:fld>
             <a:endParaRPr lang="en-GB"/>
           </a:p>
@@ -7941,58 +7941,1116 @@
       </p:grpSpPr>
       <p:grpSp>
         <p:nvGrpSpPr>
-          <p:cNvPr id="20" name="Groupe 19"/>
+          <p:cNvPr id="2" name="Groupe 1"/>
           <p:cNvGrpSpPr/>
           <p:nvPr/>
         </p:nvGrpSpPr>
         <p:grpSpPr>
           <a:xfrm>
-            <a:off x="1565329" y="-2235200"/>
-            <a:ext cx="10337369" cy="7818469"/>
-            <a:chOff x="1565329" y="-2235200"/>
-            <a:chExt cx="10337369" cy="7818469"/>
+            <a:off x="1377950" y="-2235200"/>
+            <a:ext cx="10742613" cy="7818469"/>
+            <a:chOff x="1377950" y="-2235200"/>
+            <a:chExt cx="10742613" cy="7818469"/>
           </a:xfrm>
         </p:grpSpPr>
+        <p:grpSp>
+          <p:nvGrpSpPr>
+            <p:cNvPr id="20" name="Groupe 19"/>
+            <p:cNvGrpSpPr/>
+            <p:nvPr/>
+          </p:nvGrpSpPr>
+          <p:grpSpPr>
+            <a:xfrm>
+              <a:off x="1565329" y="-2235200"/>
+              <a:ext cx="10337369" cy="7818469"/>
+              <a:chOff x="1565329" y="-2235200"/>
+              <a:chExt cx="10337369" cy="7818469"/>
+            </a:xfrm>
+          </p:grpSpPr>
+          <p:sp>
+            <p:nvSpPr>
+              <p:cNvPr id="8" name="Organigramme : Entrée manuelle 7"/>
+              <p:cNvSpPr/>
+              <p:nvPr/>
+            </p:nvSpPr>
+            <p:spPr>
+              <a:xfrm rot="5400000">
+                <a:off x="1026762" y="2297629"/>
+                <a:ext cx="3742841" cy="1658317"/>
+              </a:xfrm>
+              <a:prstGeom prst="flowChartManualInput">
+                <a:avLst/>
+              </a:prstGeom>
+              <a:solidFill>
+                <a:schemeClr val="accent3">
+                  <a:lumMod val="20000"/>
+                  <a:lumOff val="80000"/>
+                </a:schemeClr>
+              </a:solidFill>
+              <a:ln>
+                <a:solidFill>
+                  <a:schemeClr val="tx1"/>
+                </a:solidFill>
+              </a:ln>
+            </p:spPr>
+            <p:style>
+              <a:lnRef idx="2">
+                <a:schemeClr val="accent1">
+                  <a:shade val="50000"/>
+                </a:schemeClr>
+              </a:lnRef>
+              <a:fillRef idx="1">
+                <a:schemeClr val="accent1"/>
+              </a:fillRef>
+              <a:effectRef idx="0">
+                <a:schemeClr val="accent1"/>
+              </a:effectRef>
+              <a:fontRef idx="minor">
+                <a:schemeClr val="lt1"/>
+              </a:fontRef>
+            </p:style>
+            <p:txBody>
+              <a:bodyPr rtlCol="0" anchor="ctr"/>
+              <a:lstStyle/>
+              <a:p>
+                <a:pPr algn="ctr"/>
+                <a:endParaRPr lang="en-GB" dirty="0"/>
+              </a:p>
+            </p:txBody>
+          </p:sp>
+          <p:sp>
+            <p:nvSpPr>
+              <p:cNvPr id="14" name="Triangle rectangle 13"/>
+              <p:cNvSpPr/>
+              <p:nvPr/>
+            </p:nvSpPr>
+            <p:spPr>
+              <a:xfrm rot="20766719">
+                <a:off x="3047778" y="-1901285"/>
+                <a:ext cx="2091800" cy="7256602"/>
+              </a:xfrm>
+              <a:prstGeom prst="rtTriangle">
+                <a:avLst/>
+              </a:prstGeom>
+              <a:solidFill>
+                <a:schemeClr val="accent3">
+                  <a:lumMod val="20000"/>
+                  <a:lumOff val="80000"/>
+                </a:schemeClr>
+              </a:solidFill>
+              <a:ln>
+                <a:solidFill>
+                  <a:schemeClr val="tx1"/>
+                </a:solidFill>
+              </a:ln>
+            </p:spPr>
+            <p:style>
+              <a:lnRef idx="2">
+                <a:schemeClr val="accent1">
+                  <a:shade val="50000"/>
+                </a:schemeClr>
+              </a:lnRef>
+              <a:fillRef idx="1">
+                <a:schemeClr val="accent1"/>
+              </a:fillRef>
+              <a:effectRef idx="0">
+                <a:schemeClr val="accent1"/>
+              </a:effectRef>
+              <a:fontRef idx="minor">
+                <a:schemeClr val="lt1"/>
+              </a:fontRef>
+            </p:style>
+            <p:txBody>
+              <a:bodyPr rtlCol="0" anchor="ctr"/>
+              <a:lstStyle/>
+              <a:p>
+                <a:pPr algn="ctr"/>
+                <a:endParaRPr lang="en-GB" dirty="0"/>
+              </a:p>
+            </p:txBody>
+          </p:sp>
+          <p:sp>
+            <p:nvSpPr>
+              <p:cNvPr id="12" name="Rectangle 11"/>
+              <p:cNvSpPr/>
+              <p:nvPr/>
+            </p:nvSpPr>
+            <p:spPr>
+              <a:xfrm>
+                <a:off x="1565329" y="-2235200"/>
+                <a:ext cx="3138407" cy="3847024"/>
+              </a:xfrm>
+              <a:prstGeom prst="rect">
+                <a:avLst/>
+              </a:prstGeom>
+              <a:solidFill>
+                <a:schemeClr val="bg1"/>
+              </a:solidFill>
+              <a:ln>
+                <a:noFill/>
+              </a:ln>
+            </p:spPr>
+            <p:style>
+              <a:lnRef idx="2">
+                <a:schemeClr val="accent1">
+                  <a:shade val="50000"/>
+                </a:schemeClr>
+              </a:lnRef>
+              <a:fillRef idx="1">
+                <a:schemeClr val="accent1"/>
+              </a:fillRef>
+              <a:effectRef idx="0">
+                <a:schemeClr val="accent1"/>
+              </a:effectRef>
+              <a:fontRef idx="minor">
+                <a:schemeClr val="lt1"/>
+              </a:fontRef>
+            </p:style>
+            <p:txBody>
+              <a:bodyPr rtlCol="0" anchor="ctr"/>
+              <a:lstStyle/>
+              <a:p>
+                <a:pPr algn="ctr"/>
+                <a:endParaRPr lang="en-GB" dirty="0"/>
+              </a:p>
+            </p:txBody>
+          </p:sp>
+          <p:sp>
+            <p:nvSpPr>
+              <p:cNvPr id="13" name="Rectangle 12"/>
+              <p:cNvSpPr/>
+              <p:nvPr/>
+            </p:nvSpPr>
+            <p:spPr>
+              <a:xfrm>
+                <a:off x="1786179" y="4413147"/>
+                <a:ext cx="10116519" cy="1170122"/>
+              </a:xfrm>
+              <a:prstGeom prst="rect">
+                <a:avLst/>
+              </a:prstGeom>
+              <a:solidFill>
+                <a:schemeClr val="bg1"/>
+              </a:solidFill>
+              <a:ln>
+                <a:noFill/>
+              </a:ln>
+            </p:spPr>
+            <p:style>
+              <a:lnRef idx="2">
+                <a:schemeClr val="accent1">
+                  <a:shade val="50000"/>
+                </a:schemeClr>
+              </a:lnRef>
+              <a:fillRef idx="1">
+                <a:schemeClr val="accent1"/>
+              </a:fillRef>
+              <a:effectRef idx="0">
+                <a:schemeClr val="accent1"/>
+              </a:effectRef>
+              <a:fontRef idx="minor">
+                <a:schemeClr val="lt1"/>
+              </a:fontRef>
+            </p:style>
+            <p:txBody>
+              <a:bodyPr rtlCol="0" anchor="ctr"/>
+              <a:lstStyle/>
+              <a:p>
+                <a:pPr algn="ctr"/>
+                <a:endParaRPr lang="en-GB" dirty="0"/>
+              </a:p>
+            </p:txBody>
+          </p:sp>
+          <p:cxnSp>
+            <p:nvCxnSpPr>
+              <p:cNvPr id="16" name="Connecteur droit 15"/>
+              <p:cNvCxnSpPr/>
+              <p:nvPr/>
+            </p:nvCxnSpPr>
+            <p:spPr>
+              <a:xfrm>
+                <a:off x="2069024" y="1611824"/>
+                <a:ext cx="1977196" cy="0"/>
+              </a:xfrm>
+              <a:prstGeom prst="line">
+                <a:avLst/>
+              </a:prstGeom>
+              <a:ln w="12700">
+                <a:solidFill>
+                  <a:schemeClr val="tx1"/>
+                </a:solidFill>
+              </a:ln>
+            </p:spPr>
+            <p:style>
+              <a:lnRef idx="1">
+                <a:schemeClr val="accent1"/>
+              </a:lnRef>
+              <a:fillRef idx="0">
+                <a:schemeClr val="accent1"/>
+              </a:fillRef>
+              <a:effectRef idx="0">
+                <a:schemeClr val="accent1"/>
+              </a:effectRef>
+              <a:fontRef idx="minor">
+                <a:schemeClr val="tx1"/>
+              </a:fontRef>
+            </p:style>
+          </p:cxnSp>
+          <p:cxnSp>
+            <p:nvCxnSpPr>
+              <p:cNvPr id="17" name="Connecteur droit 16"/>
+              <p:cNvCxnSpPr/>
+              <p:nvPr/>
+            </p:nvCxnSpPr>
+            <p:spPr>
+              <a:xfrm>
+                <a:off x="2069024" y="4394291"/>
+                <a:ext cx="3569776" cy="18856"/>
+              </a:xfrm>
+              <a:prstGeom prst="line">
+                <a:avLst/>
+              </a:prstGeom>
+              <a:ln w="12700">
+                <a:solidFill>
+                  <a:schemeClr val="tx1"/>
+                </a:solidFill>
+              </a:ln>
+            </p:spPr>
+            <p:style>
+              <a:lnRef idx="1">
+                <a:schemeClr val="accent1"/>
+              </a:lnRef>
+              <a:fillRef idx="0">
+                <a:schemeClr val="accent1"/>
+              </a:fillRef>
+              <a:effectRef idx="0">
+                <a:schemeClr val="accent1"/>
+              </a:effectRef>
+              <a:fontRef idx="minor">
+                <a:schemeClr val="tx1"/>
+              </a:fontRef>
+            </p:style>
+          </p:cxnSp>
+          <p:pic>
+            <p:nvPicPr>
+              <p:cNvPr id="19" name="Image 18"/>
+              <p:cNvPicPr>
+                <a:picLocks noChangeAspect="1"/>
+              </p:cNvPicPr>
+              <p:nvPr/>
+            </p:nvPicPr>
+            <p:blipFill>
+              <a:blip r:embed="rId2"/>
+              <a:stretch>
+                <a:fillRect/>
+              </a:stretch>
+            </p:blipFill>
+            <p:spPr>
+              <a:xfrm flipH="1">
+                <a:off x="6936217" y="1596584"/>
+                <a:ext cx="3636451" cy="2868736"/>
+              </a:xfrm>
+              <a:prstGeom prst="rect">
+                <a:avLst/>
+              </a:prstGeom>
+            </p:spPr>
+          </p:pic>
+        </p:grpSp>
+        <p:grpSp>
+          <p:nvGrpSpPr>
+            <p:cNvPr id="99" name="Groupe 98"/>
+            <p:cNvGrpSpPr/>
+            <p:nvPr/>
+          </p:nvGrpSpPr>
+          <p:grpSpPr>
+            <a:xfrm>
+              <a:off x="1377950" y="1611824"/>
+              <a:ext cx="10742613" cy="1687612"/>
+              <a:chOff x="1377950" y="1611824"/>
+              <a:chExt cx="10742613" cy="1687612"/>
+            </a:xfrm>
+          </p:grpSpPr>
+          <p:cxnSp>
+            <p:nvCxnSpPr>
+              <p:cNvPr id="22" name="Connecteur droit 21"/>
+              <p:cNvCxnSpPr/>
+              <p:nvPr/>
+            </p:nvCxnSpPr>
+            <p:spPr>
+              <a:xfrm>
+                <a:off x="2971800" y="1611824"/>
+                <a:ext cx="12700" cy="890076"/>
+              </a:xfrm>
+              <a:prstGeom prst="line">
+                <a:avLst/>
+              </a:prstGeom>
+              <a:ln>
+                <a:solidFill>
+                  <a:schemeClr val="tx1"/>
+                </a:solidFill>
+                <a:prstDash val="lgDash"/>
+              </a:ln>
+            </p:spPr>
+            <p:style>
+              <a:lnRef idx="1">
+                <a:schemeClr val="accent1"/>
+              </a:lnRef>
+              <a:fillRef idx="0">
+                <a:schemeClr val="accent1"/>
+              </a:fillRef>
+              <a:effectRef idx="0">
+                <a:schemeClr val="accent1"/>
+              </a:effectRef>
+              <a:fontRef idx="minor">
+                <a:schemeClr val="tx1"/>
+              </a:fontRef>
+            </p:style>
+          </p:cxnSp>
+          <p:cxnSp>
+            <p:nvCxnSpPr>
+              <p:cNvPr id="23" name="Connecteur droit 22"/>
+              <p:cNvCxnSpPr/>
+              <p:nvPr/>
+            </p:nvCxnSpPr>
+            <p:spPr>
+              <a:xfrm>
+                <a:off x="4031152" y="1611824"/>
+                <a:ext cx="12700" cy="890076"/>
+              </a:xfrm>
+              <a:prstGeom prst="line">
+                <a:avLst/>
+              </a:prstGeom>
+              <a:ln>
+                <a:solidFill>
+                  <a:schemeClr val="tx1"/>
+                </a:solidFill>
+                <a:prstDash val="lgDash"/>
+              </a:ln>
+            </p:spPr>
+            <p:style>
+              <a:lnRef idx="1">
+                <a:schemeClr val="accent1"/>
+              </a:lnRef>
+              <a:fillRef idx="0">
+                <a:schemeClr val="accent1"/>
+              </a:fillRef>
+              <a:effectRef idx="0">
+                <a:schemeClr val="accent1"/>
+              </a:effectRef>
+              <a:fontRef idx="minor">
+                <a:schemeClr val="tx1"/>
+              </a:fontRef>
+            </p:style>
+          </p:cxnSp>
+          <p:cxnSp>
+            <p:nvCxnSpPr>
+              <p:cNvPr id="24" name="Connecteur droit 23"/>
+              <p:cNvCxnSpPr/>
+              <p:nvPr/>
+            </p:nvCxnSpPr>
+            <p:spPr>
+              <a:xfrm flipH="1">
+                <a:off x="8571402" y="1611824"/>
+                <a:ext cx="1" cy="508774"/>
+              </a:xfrm>
+              <a:prstGeom prst="line">
+                <a:avLst/>
+              </a:prstGeom>
+              <a:ln>
+                <a:solidFill>
+                  <a:schemeClr val="tx1"/>
+                </a:solidFill>
+                <a:prstDash val="lgDash"/>
+              </a:ln>
+            </p:spPr>
+            <p:style>
+              <a:lnRef idx="1">
+                <a:schemeClr val="accent1"/>
+              </a:lnRef>
+              <a:fillRef idx="0">
+                <a:schemeClr val="accent1"/>
+              </a:fillRef>
+              <a:effectRef idx="0">
+                <a:schemeClr val="accent1"/>
+              </a:effectRef>
+              <a:fontRef idx="minor">
+                <a:schemeClr val="tx1"/>
+              </a:fontRef>
+            </p:style>
+          </p:cxnSp>
+          <p:cxnSp>
+            <p:nvCxnSpPr>
+              <p:cNvPr id="25" name="Connecteur droit 24"/>
+              <p:cNvCxnSpPr/>
+              <p:nvPr/>
+            </p:nvCxnSpPr>
+            <p:spPr>
+              <a:xfrm>
+                <a:off x="9619152" y="1623987"/>
+                <a:ext cx="0" cy="579463"/>
+              </a:xfrm>
+              <a:prstGeom prst="line">
+                <a:avLst/>
+              </a:prstGeom>
+              <a:ln>
+                <a:solidFill>
+                  <a:schemeClr val="tx1"/>
+                </a:solidFill>
+                <a:prstDash val="lgDash"/>
+              </a:ln>
+            </p:spPr>
+            <p:style>
+              <a:lnRef idx="1">
+                <a:schemeClr val="accent1"/>
+              </a:lnRef>
+              <a:fillRef idx="0">
+                <a:schemeClr val="accent1"/>
+              </a:fillRef>
+              <a:effectRef idx="0">
+                <a:schemeClr val="accent1"/>
+              </a:effectRef>
+              <a:fontRef idx="minor">
+                <a:schemeClr val="tx1"/>
+              </a:fontRef>
+            </p:style>
+          </p:cxnSp>
+          <p:sp>
+            <p:nvSpPr>
+              <p:cNvPr id="26" name="ZoneTexte 25"/>
+              <p:cNvSpPr txBox="1"/>
+              <p:nvPr/>
+            </p:nvSpPr>
+            <p:spPr>
+              <a:xfrm>
+                <a:off x="2911956" y="2142521"/>
+                <a:ext cx="325730" cy="276999"/>
+              </a:xfrm>
+              <a:prstGeom prst="rect">
+                <a:avLst/>
+              </a:prstGeom>
+              <a:noFill/>
+            </p:spPr>
+            <p:txBody>
+              <a:bodyPr wrap="none" rtlCol="0">
+                <a:spAutoFit/>
+              </a:bodyPr>
+              <a:lstStyle/>
+              <a:p>
+                <a:r>
+                  <a:rPr lang="el-GR" sz="1200" dirty="0" smtClean="0"/>
+                  <a:t>θ</a:t>
+                </a:r>
+                <a:r>
+                  <a:rPr lang="fr-CH" sz="1200" baseline="-25000" dirty="0" smtClean="0"/>
+                  <a:t>A</a:t>
+                </a:r>
+                <a:endParaRPr lang="en-GB" sz="1200" baseline="-25000" dirty="0"/>
+              </a:p>
+            </p:txBody>
+          </p:sp>
+          <p:sp>
+            <p:nvSpPr>
+              <p:cNvPr id="27" name="ZoneTexte 26"/>
+              <p:cNvSpPr txBox="1"/>
+              <p:nvPr/>
+            </p:nvSpPr>
+            <p:spPr>
+              <a:xfrm>
+                <a:off x="4002016" y="1866892"/>
+                <a:ext cx="325730" cy="276999"/>
+              </a:xfrm>
+              <a:prstGeom prst="rect">
+                <a:avLst/>
+              </a:prstGeom>
+              <a:noFill/>
+            </p:spPr>
+            <p:txBody>
+              <a:bodyPr wrap="none" rtlCol="0">
+                <a:spAutoFit/>
+              </a:bodyPr>
+              <a:lstStyle/>
+              <a:p>
+                <a:r>
+                  <a:rPr lang="el-GR" sz="1200" dirty="0" smtClean="0"/>
+                  <a:t>θ</a:t>
+                </a:r>
+                <a:r>
+                  <a:rPr lang="fr-CH" sz="1200" baseline="-25000" dirty="0" smtClean="0"/>
+                  <a:t>B</a:t>
+                </a:r>
+                <a:endParaRPr lang="en-GB" sz="1200" baseline="-25000" dirty="0"/>
+              </a:p>
+            </p:txBody>
+          </p:sp>
+          <p:sp>
+            <p:nvSpPr>
+              <p:cNvPr id="28" name="ZoneTexte 27"/>
+              <p:cNvSpPr txBox="1"/>
+              <p:nvPr/>
+            </p:nvSpPr>
+            <p:spPr>
+              <a:xfrm>
+                <a:off x="8569274" y="1790338"/>
+                <a:ext cx="325730" cy="276999"/>
+              </a:xfrm>
+              <a:prstGeom prst="rect">
+                <a:avLst/>
+              </a:prstGeom>
+              <a:noFill/>
+            </p:spPr>
+            <p:txBody>
+              <a:bodyPr wrap="none" rtlCol="0">
+                <a:spAutoFit/>
+              </a:bodyPr>
+              <a:lstStyle/>
+              <a:p>
+                <a:r>
+                  <a:rPr lang="el-GR" sz="1200" dirty="0" smtClean="0"/>
+                  <a:t>θ</a:t>
+                </a:r>
+                <a:r>
+                  <a:rPr lang="fr-CH" sz="1200" baseline="-25000" dirty="0" smtClean="0"/>
+                  <a:t>B</a:t>
+                </a:r>
+                <a:endParaRPr lang="en-GB" sz="1200" baseline="-25000" dirty="0"/>
+              </a:p>
+            </p:txBody>
+          </p:sp>
+          <p:sp>
+            <p:nvSpPr>
+              <p:cNvPr id="29" name="ZoneTexte 28"/>
+              <p:cNvSpPr txBox="1"/>
+              <p:nvPr/>
+            </p:nvSpPr>
+            <p:spPr>
+              <a:xfrm>
+                <a:off x="9404952" y="2135752"/>
+                <a:ext cx="325730" cy="276999"/>
+              </a:xfrm>
+              <a:prstGeom prst="rect">
+                <a:avLst/>
+              </a:prstGeom>
+              <a:noFill/>
+            </p:spPr>
+            <p:txBody>
+              <a:bodyPr wrap="none" rtlCol="0">
+                <a:spAutoFit/>
+              </a:bodyPr>
+              <a:lstStyle/>
+              <a:p>
+                <a:r>
+                  <a:rPr lang="el-GR" sz="1200" dirty="0" smtClean="0"/>
+                  <a:t>θ</a:t>
+                </a:r>
+                <a:r>
+                  <a:rPr lang="fr-CH" sz="1200" baseline="-25000" dirty="0" smtClean="0"/>
+                  <a:t>A</a:t>
+                </a:r>
+                <a:endParaRPr lang="en-GB" sz="1200" baseline="-25000" dirty="0"/>
+              </a:p>
+            </p:txBody>
+          </p:sp>
+          <p:cxnSp>
+            <p:nvCxnSpPr>
+              <p:cNvPr id="31" name="Connecteur droit 30"/>
+              <p:cNvCxnSpPr/>
+              <p:nvPr/>
+            </p:nvCxnSpPr>
+            <p:spPr>
+              <a:xfrm>
+                <a:off x="1733550" y="2501900"/>
+                <a:ext cx="761823" cy="0"/>
+              </a:xfrm>
+              <a:prstGeom prst="line">
+                <a:avLst/>
+              </a:prstGeom>
+              <a:ln>
+                <a:solidFill>
+                  <a:schemeClr val="tx1"/>
+                </a:solidFill>
+                <a:prstDash val="dashDot"/>
+              </a:ln>
+            </p:spPr>
+            <p:style>
+              <a:lnRef idx="1">
+                <a:schemeClr val="accent1"/>
+              </a:lnRef>
+              <a:fillRef idx="0">
+                <a:schemeClr val="accent1"/>
+              </a:fillRef>
+              <a:effectRef idx="0">
+                <a:schemeClr val="accent1"/>
+              </a:effectRef>
+              <a:fontRef idx="minor">
+                <a:schemeClr val="tx1"/>
+              </a:fontRef>
+            </p:style>
+          </p:cxnSp>
+          <p:cxnSp>
+            <p:nvCxnSpPr>
+              <p:cNvPr id="36" name="Connecteur droit 35"/>
+              <p:cNvCxnSpPr/>
+              <p:nvPr/>
+            </p:nvCxnSpPr>
+            <p:spPr>
+              <a:xfrm flipV="1">
+                <a:off x="3049757" y="2871969"/>
+                <a:ext cx="590550" cy="154437"/>
+              </a:xfrm>
+              <a:prstGeom prst="line">
+                <a:avLst/>
+              </a:prstGeom>
+              <a:ln>
+                <a:solidFill>
+                  <a:schemeClr val="tx1"/>
+                </a:solidFill>
+                <a:prstDash val="dashDot"/>
+              </a:ln>
+            </p:spPr>
+            <p:style>
+              <a:lnRef idx="1">
+                <a:schemeClr val="accent1"/>
+              </a:lnRef>
+              <a:fillRef idx="0">
+                <a:schemeClr val="accent1"/>
+              </a:fillRef>
+              <a:effectRef idx="0">
+                <a:schemeClr val="accent1"/>
+              </a:effectRef>
+              <a:fontRef idx="minor">
+                <a:schemeClr val="tx1"/>
+              </a:fontRef>
+            </p:style>
+          </p:cxnSp>
+          <p:cxnSp>
+            <p:nvCxnSpPr>
+              <p:cNvPr id="38" name="Connecteur droit 37"/>
+              <p:cNvCxnSpPr/>
+              <p:nvPr/>
+            </p:nvCxnSpPr>
+            <p:spPr>
+              <a:xfrm>
+                <a:off x="1377950" y="2001618"/>
+                <a:ext cx="691074" cy="500282"/>
+              </a:xfrm>
+              <a:prstGeom prst="line">
+                <a:avLst/>
+              </a:prstGeom>
+              <a:ln w="28575">
+                <a:solidFill>
+                  <a:schemeClr val="accent4"/>
+                </a:solidFill>
+              </a:ln>
+            </p:spPr>
+            <p:style>
+              <a:lnRef idx="1">
+                <a:schemeClr val="accent1"/>
+              </a:lnRef>
+              <a:fillRef idx="0">
+                <a:schemeClr val="accent1"/>
+              </a:fillRef>
+              <a:effectRef idx="0">
+                <a:schemeClr val="accent1"/>
+              </a:effectRef>
+              <a:fontRef idx="minor">
+                <a:schemeClr val="tx1"/>
+              </a:fontRef>
+            </p:style>
+          </p:cxnSp>
+          <p:cxnSp>
+            <p:nvCxnSpPr>
+              <p:cNvPr id="39" name="Connecteur droit 38"/>
+              <p:cNvCxnSpPr/>
+              <p:nvPr/>
+            </p:nvCxnSpPr>
+            <p:spPr>
+              <a:xfrm>
+                <a:off x="2079087" y="2502775"/>
+                <a:ext cx="1231776" cy="447441"/>
+              </a:xfrm>
+              <a:prstGeom prst="line">
+                <a:avLst/>
+              </a:prstGeom>
+              <a:ln w="28575">
+                <a:solidFill>
+                  <a:schemeClr val="accent4"/>
+                </a:solidFill>
+              </a:ln>
+            </p:spPr>
+            <p:style>
+              <a:lnRef idx="1">
+                <a:schemeClr val="accent1"/>
+              </a:lnRef>
+              <a:fillRef idx="0">
+                <a:schemeClr val="accent1"/>
+              </a:fillRef>
+              <a:effectRef idx="0">
+                <a:schemeClr val="accent1"/>
+              </a:effectRef>
+              <a:fontRef idx="minor">
+                <a:schemeClr val="tx1"/>
+              </a:fontRef>
+            </p:style>
+          </p:cxnSp>
+          <p:cxnSp>
+            <p:nvCxnSpPr>
+              <p:cNvPr id="43" name="Connecteur droit 42"/>
+              <p:cNvCxnSpPr/>
+              <p:nvPr/>
+            </p:nvCxnSpPr>
+            <p:spPr>
+              <a:xfrm>
+                <a:off x="3315080" y="2949188"/>
+                <a:ext cx="1604672" cy="245456"/>
+              </a:xfrm>
+              <a:prstGeom prst="line">
+                <a:avLst/>
+              </a:prstGeom>
+              <a:ln w="28575">
+                <a:solidFill>
+                  <a:schemeClr val="accent4"/>
+                </a:solidFill>
+              </a:ln>
+            </p:spPr>
+            <p:style>
+              <a:lnRef idx="1">
+                <a:schemeClr val="accent1"/>
+              </a:lnRef>
+              <a:fillRef idx="0">
+                <a:schemeClr val="accent1"/>
+              </a:fillRef>
+              <a:effectRef idx="0">
+                <a:schemeClr val="accent1"/>
+              </a:effectRef>
+              <a:fontRef idx="minor">
+                <a:schemeClr val="tx1"/>
+              </a:fontRef>
+            </p:style>
+          </p:cxnSp>
+          <p:cxnSp>
+            <p:nvCxnSpPr>
+              <p:cNvPr id="45" name="Connecteur droit 44"/>
+              <p:cNvCxnSpPr/>
+              <p:nvPr/>
+            </p:nvCxnSpPr>
+            <p:spPr>
+              <a:xfrm flipV="1">
+                <a:off x="4718008" y="3026406"/>
+                <a:ext cx="464480" cy="273030"/>
+              </a:xfrm>
+              <a:prstGeom prst="line">
+                <a:avLst/>
+              </a:prstGeom>
+              <a:ln>
+                <a:solidFill>
+                  <a:schemeClr val="tx1"/>
+                </a:solidFill>
+                <a:prstDash val="dashDot"/>
+              </a:ln>
+            </p:spPr>
+            <p:style>
+              <a:lnRef idx="1">
+                <a:schemeClr val="accent1"/>
+              </a:lnRef>
+              <a:fillRef idx="0">
+                <a:schemeClr val="accent1"/>
+              </a:fillRef>
+              <a:effectRef idx="0">
+                <a:schemeClr val="accent1"/>
+              </a:effectRef>
+              <a:fontRef idx="minor">
+                <a:schemeClr val="tx1"/>
+              </a:fontRef>
+            </p:style>
+          </p:cxnSp>
+          <p:cxnSp>
+            <p:nvCxnSpPr>
+              <p:cNvPr id="47" name="Connecteur droit 46"/>
+              <p:cNvCxnSpPr/>
+              <p:nvPr/>
+            </p:nvCxnSpPr>
+            <p:spPr>
+              <a:xfrm flipV="1">
+                <a:off x="4924043" y="3022230"/>
+                <a:ext cx="2852220" cy="166930"/>
+              </a:xfrm>
+              <a:prstGeom prst="line">
+                <a:avLst/>
+              </a:prstGeom>
+              <a:ln w="28575">
+                <a:solidFill>
+                  <a:schemeClr val="accent4"/>
+                </a:solidFill>
+              </a:ln>
+            </p:spPr>
+            <p:style>
+              <a:lnRef idx="1">
+                <a:schemeClr val="accent1"/>
+              </a:lnRef>
+              <a:fillRef idx="0">
+                <a:schemeClr val="accent1"/>
+              </a:fillRef>
+              <a:effectRef idx="0">
+                <a:schemeClr val="accent1"/>
+              </a:effectRef>
+              <a:fontRef idx="minor">
+                <a:schemeClr val="tx1"/>
+              </a:fontRef>
+            </p:style>
+          </p:cxnSp>
+          <p:cxnSp>
+            <p:nvCxnSpPr>
+              <p:cNvPr id="56" name="Connecteur droit 55"/>
+              <p:cNvCxnSpPr/>
+              <p:nvPr/>
+            </p:nvCxnSpPr>
+            <p:spPr>
+              <a:xfrm>
+                <a:off x="7541847" y="2911954"/>
+                <a:ext cx="468832" cy="234853"/>
+              </a:xfrm>
+              <a:prstGeom prst="line">
+                <a:avLst/>
+              </a:prstGeom>
+              <a:ln>
+                <a:solidFill>
+                  <a:schemeClr val="tx1"/>
+                </a:solidFill>
+                <a:prstDash val="dashDot"/>
+              </a:ln>
+            </p:spPr>
+            <p:style>
+              <a:lnRef idx="1">
+                <a:schemeClr val="accent1"/>
+              </a:lnRef>
+              <a:fillRef idx="0">
+                <a:schemeClr val="accent1"/>
+              </a:fillRef>
+              <a:effectRef idx="0">
+                <a:schemeClr val="accent1"/>
+              </a:effectRef>
+              <a:fontRef idx="minor">
+                <a:schemeClr val="tx1"/>
+              </a:fontRef>
+            </p:style>
+          </p:cxnSp>
+          <p:cxnSp>
+            <p:nvCxnSpPr>
+              <p:cNvPr id="59" name="Connecteur droit 58"/>
+              <p:cNvCxnSpPr/>
+              <p:nvPr/>
+            </p:nvCxnSpPr>
+            <p:spPr>
+              <a:xfrm>
+                <a:off x="7776263" y="3030905"/>
+                <a:ext cx="1462987" cy="158255"/>
+              </a:xfrm>
+              <a:prstGeom prst="line">
+                <a:avLst/>
+              </a:prstGeom>
+              <a:ln w="28575">
+                <a:solidFill>
+                  <a:schemeClr val="accent4"/>
+                </a:solidFill>
+              </a:ln>
+            </p:spPr>
+            <p:style>
+              <a:lnRef idx="1">
+                <a:schemeClr val="accent1"/>
+              </a:lnRef>
+              <a:fillRef idx="0">
+                <a:schemeClr val="accent1"/>
+              </a:fillRef>
+              <a:effectRef idx="0">
+                <a:schemeClr val="accent1"/>
+              </a:effectRef>
+              <a:fontRef idx="minor">
+                <a:schemeClr val="tx1"/>
+              </a:fontRef>
+            </p:style>
+          </p:cxnSp>
+          <p:cxnSp>
+            <p:nvCxnSpPr>
+              <p:cNvPr id="63" name="Connecteur droit 62"/>
+              <p:cNvCxnSpPr>
+                <a:endCxn id="19" idx="1"/>
+              </p:cNvCxnSpPr>
+              <p:nvPr/>
+            </p:nvCxnSpPr>
+            <p:spPr>
+              <a:xfrm flipV="1">
+                <a:off x="9234450" y="3030952"/>
+                <a:ext cx="1338218" cy="140119"/>
+              </a:xfrm>
+              <a:prstGeom prst="line">
+                <a:avLst/>
+              </a:prstGeom>
+              <a:ln w="28575">
+                <a:solidFill>
+                  <a:schemeClr val="accent4"/>
+                </a:solidFill>
+              </a:ln>
+            </p:spPr>
+            <p:style>
+              <a:lnRef idx="1">
+                <a:schemeClr val="accent1"/>
+              </a:lnRef>
+              <a:fillRef idx="0">
+                <a:schemeClr val="accent1"/>
+              </a:fillRef>
+              <a:effectRef idx="0">
+                <a:schemeClr val="accent1"/>
+              </a:effectRef>
+              <a:fontRef idx="minor">
+                <a:schemeClr val="tx1"/>
+              </a:fontRef>
+            </p:style>
+          </p:cxnSp>
+          <p:cxnSp>
+            <p:nvCxnSpPr>
+              <p:cNvPr id="61" name="Connecteur droit 60"/>
+              <p:cNvCxnSpPr/>
+              <p:nvPr/>
+            </p:nvCxnSpPr>
+            <p:spPr>
+              <a:xfrm>
+                <a:off x="8718829" y="3060749"/>
+                <a:ext cx="998088" cy="221470"/>
+              </a:xfrm>
+              <a:prstGeom prst="line">
+                <a:avLst/>
+              </a:prstGeom>
+              <a:ln>
+                <a:solidFill>
+                  <a:schemeClr val="tx1"/>
+                </a:solidFill>
+                <a:prstDash val="dashDot"/>
+              </a:ln>
+            </p:spPr>
+            <p:style>
+              <a:lnRef idx="1">
+                <a:schemeClr val="accent1"/>
+              </a:lnRef>
+              <a:fillRef idx="0">
+                <a:schemeClr val="accent1"/>
+              </a:fillRef>
+              <a:effectRef idx="0">
+                <a:schemeClr val="accent1"/>
+              </a:effectRef>
+              <a:fontRef idx="minor">
+                <a:schemeClr val="tx1"/>
+              </a:fontRef>
+            </p:style>
+          </p:cxnSp>
+          <p:cxnSp>
+            <p:nvCxnSpPr>
+              <p:cNvPr id="80" name="Connecteur droit 79"/>
+              <p:cNvCxnSpPr/>
+              <p:nvPr/>
+            </p:nvCxnSpPr>
+            <p:spPr>
+              <a:xfrm flipV="1">
+                <a:off x="10529887" y="2973793"/>
+                <a:ext cx="1590676" cy="61079"/>
+              </a:xfrm>
+              <a:prstGeom prst="line">
+                <a:avLst/>
+              </a:prstGeom>
+              <a:ln w="28575">
+                <a:solidFill>
+                  <a:schemeClr val="accent4"/>
+                </a:solidFill>
+              </a:ln>
+            </p:spPr>
+            <p:style>
+              <a:lnRef idx="1">
+                <a:schemeClr val="accent1"/>
+              </a:lnRef>
+              <a:fillRef idx="0">
+                <a:schemeClr val="accent1"/>
+              </a:fillRef>
+              <a:effectRef idx="0">
+                <a:schemeClr val="accent1"/>
+              </a:effectRef>
+              <a:fontRef idx="minor">
+                <a:schemeClr val="tx1"/>
+              </a:fontRef>
+            </p:style>
+          </p:cxnSp>
+          <p:cxnSp>
+            <p:nvCxnSpPr>
+              <p:cNvPr id="70" name="Connecteur droit 69"/>
+              <p:cNvCxnSpPr/>
+              <p:nvPr/>
+            </p:nvCxnSpPr>
+            <p:spPr>
+              <a:xfrm>
+                <a:off x="9948863" y="3020715"/>
+                <a:ext cx="2135981" cy="1515"/>
+              </a:xfrm>
+              <a:prstGeom prst="line">
+                <a:avLst/>
+              </a:prstGeom>
+              <a:ln>
+                <a:solidFill>
+                  <a:schemeClr val="tx1"/>
+                </a:solidFill>
+                <a:prstDash val="dashDot"/>
+              </a:ln>
+            </p:spPr>
+            <p:style>
+              <a:lnRef idx="1">
+                <a:schemeClr val="accent1"/>
+              </a:lnRef>
+              <a:fillRef idx="0">
+                <a:schemeClr val="accent1"/>
+              </a:fillRef>
+              <a:effectRef idx="0">
+                <a:schemeClr val="accent1"/>
+              </a:effectRef>
+              <a:fontRef idx="minor">
+                <a:schemeClr val="tx1"/>
+              </a:fontRef>
+            </p:style>
+          </p:cxnSp>
+        </p:grpSp>
         <p:sp>
           <p:nvSpPr>
-            <p:cNvPr id="8" name="Organigramme : Entrée manuelle 7"/>
+            <p:cNvPr id="107" name="Arc 106"/>
             <p:cNvSpPr/>
             <p:nvPr/>
           </p:nvSpPr>
           <p:spPr>
-            <a:xfrm rot="5400000">
-              <a:off x="1026762" y="2297629"/>
-              <a:ext cx="3742841" cy="1658317"/>
+            <a:xfrm rot="4410126" flipH="1" flipV="1">
+              <a:off x="1726170" y="2291972"/>
+              <a:ext cx="346654" cy="351887"/>
             </a:xfrm>
-            <a:prstGeom prst="flowChartManualInput">
-              <a:avLst/>
+            <a:prstGeom prst="arc">
+              <a:avLst>
+                <a:gd name="adj1" fmla="val 16663458"/>
+                <a:gd name="adj2" fmla="val 20671197"/>
+              </a:avLst>
             </a:prstGeom>
-            <a:solidFill>
-              <a:schemeClr val="accent3">
-                <a:lumMod val="20000"/>
-                <a:lumOff val="80000"/>
-              </a:schemeClr>
-            </a:solidFill>
             <a:ln>
               <a:solidFill>
                 <a:schemeClr val="tx1"/>
               </a:solidFill>
+              <a:headEnd type="arrow" w="med" len="med"/>
+              <a:tailEnd type="none" w="med" len="med"/>
             </a:ln>
           </p:spPr>
           <p:style>
-            <a:lnRef idx="2">
-              <a:schemeClr val="accent1">
-                <a:shade val="50000"/>
-              </a:schemeClr>
+            <a:lnRef idx="1">
+              <a:schemeClr val="accent1"/>
             </a:lnRef>
-            <a:fillRef idx="1">
+            <a:fillRef idx="0">
               <a:schemeClr val="accent1"/>
             </a:fillRef>
             <a:effectRef idx="0">
               <a:schemeClr val="accent1"/>
             </a:effectRef>
             <a:fontRef idx="minor">
-              <a:schemeClr val="lt1"/>
+              <a:schemeClr val="tx1"/>
             </a:fontRef>
           </p:style>
           <p:txBody>
@@ -8006,90 +9064,41 @@
         </p:sp>
         <p:sp>
           <p:nvSpPr>
-            <p:cNvPr id="14" name="Triangle rectangle 13"/>
+            <p:cNvPr id="108" name="Arc 107"/>
             <p:cNvSpPr/>
             <p:nvPr/>
           </p:nvSpPr>
           <p:spPr>
-            <a:xfrm rot="20766719">
-              <a:off x="3047778" y="-1901285"/>
-              <a:ext cx="2091800" cy="7256602"/>
+            <a:xfrm rot="15517079" flipH="1" flipV="1">
+              <a:off x="2168313" y="2330813"/>
+              <a:ext cx="286229" cy="317649"/>
             </a:xfrm>
-            <a:prstGeom prst="rtTriangle">
-              <a:avLst/>
+            <a:prstGeom prst="arc">
+              <a:avLst>
+                <a:gd name="adj1" fmla="val 16663458"/>
+                <a:gd name="adj2" fmla="val 20671197"/>
+              </a:avLst>
             </a:prstGeom>
-            <a:solidFill>
-              <a:schemeClr val="accent3">
-                <a:lumMod val="20000"/>
-                <a:lumOff val="80000"/>
-              </a:schemeClr>
-            </a:solidFill>
             <a:ln>
               <a:solidFill>
                 <a:schemeClr val="tx1"/>
               </a:solidFill>
+              <a:headEnd type="arrow" w="med" len="med"/>
+              <a:tailEnd type="none" w="med" len="med"/>
             </a:ln>
           </p:spPr>
           <p:style>
-            <a:lnRef idx="2">
-              <a:schemeClr val="accent1">
-                <a:shade val="50000"/>
-              </a:schemeClr>
+            <a:lnRef idx="1">
+              <a:schemeClr val="accent1"/>
             </a:lnRef>
-            <a:fillRef idx="1">
+            <a:fillRef idx="0">
               <a:schemeClr val="accent1"/>
             </a:fillRef>
             <a:effectRef idx="0">
               <a:schemeClr val="accent1"/>
             </a:effectRef>
             <a:fontRef idx="minor">
-              <a:schemeClr val="lt1"/>
-            </a:fontRef>
-          </p:style>
-          <p:txBody>
-            <a:bodyPr rtlCol="0" anchor="ctr"/>
-            <a:lstStyle/>
-            <a:p>
-              <a:pPr algn="ctr"/>
-              <a:endParaRPr lang="en-GB" dirty="0"/>
-            </a:p>
-          </p:txBody>
-        </p:sp>
-        <p:sp>
-          <p:nvSpPr>
-            <p:cNvPr id="12" name="Rectangle 11"/>
-            <p:cNvSpPr/>
-            <p:nvPr/>
-          </p:nvSpPr>
-          <p:spPr>
-            <a:xfrm>
-              <a:off x="1565329" y="-2235200"/>
-              <a:ext cx="3138407" cy="3847024"/>
-            </a:xfrm>
-            <a:prstGeom prst="rect">
-              <a:avLst/>
-            </a:prstGeom>
-            <a:solidFill>
-              <a:schemeClr val="bg1"/>
-            </a:solidFill>
-            <a:ln>
-              <a:noFill/>
-            </a:ln>
-          </p:spPr>
-          <p:style>
-            <a:lnRef idx="2">
-              <a:schemeClr val="accent1">
-                <a:shade val="50000"/>
-              </a:schemeClr>
-            </a:lnRef>
-            <a:fillRef idx="1">
-              <a:schemeClr val="accent1"/>
-            </a:fillRef>
-            <a:effectRef idx="0">
-              <a:schemeClr val="accent1"/>
-            </a:effectRef>
-            <a:fontRef idx="minor">
-              <a:schemeClr val="lt1"/>
+              <a:schemeClr val="tx1"/>
             </a:fontRef>
           </p:style>
           <p:txBody>
@@ -8103,39 +9112,41 @@
         </p:sp>
         <p:sp>
           <p:nvSpPr>
-            <p:cNvPr id="13" name="Rectangle 12"/>
+            <p:cNvPr id="110" name="Arc 109"/>
             <p:cNvSpPr/>
             <p:nvPr/>
           </p:nvSpPr>
           <p:spPr>
-            <a:xfrm>
-              <a:off x="1786179" y="4413147"/>
-              <a:ext cx="10116519" cy="1170122"/>
+            <a:xfrm rot="1942193" flipH="1" flipV="1">
+              <a:off x="2979219" y="2717655"/>
+              <a:ext cx="346654" cy="351887"/>
             </a:xfrm>
-            <a:prstGeom prst="rect">
-              <a:avLst/>
+            <a:prstGeom prst="arc">
+              <a:avLst>
+                <a:gd name="adj1" fmla="val 16663458"/>
+                <a:gd name="adj2" fmla="val 20671197"/>
+              </a:avLst>
             </a:prstGeom>
-            <a:solidFill>
-              <a:schemeClr val="bg1"/>
-            </a:solidFill>
             <a:ln>
-              <a:noFill/>
+              <a:solidFill>
+                <a:schemeClr val="tx1"/>
+              </a:solidFill>
+              <a:headEnd type="arrow" w="med" len="med"/>
+              <a:tailEnd type="none" w="med" len="med"/>
             </a:ln>
           </p:spPr>
           <p:style>
-            <a:lnRef idx="2">
-              <a:schemeClr val="accent1">
-                <a:shade val="50000"/>
-              </a:schemeClr>
+            <a:lnRef idx="1">
+              <a:schemeClr val="accent1"/>
             </a:lnRef>
-            <a:fillRef idx="1">
+            <a:fillRef idx="0">
               <a:schemeClr val="accent1"/>
             </a:fillRef>
             <a:effectRef idx="0">
               <a:schemeClr val="accent1"/>
             </a:effectRef>
             <a:fontRef idx="minor">
-              <a:schemeClr val="lt1"/>
+              <a:schemeClr val="tx1"/>
             </a:fontRef>
           </p:style>
           <p:txBody>
@@ -8147,24 +9158,1111 @@
             </a:p>
           </p:txBody>
         </p:sp>
+        <p:sp>
+          <p:nvSpPr>
+            <p:cNvPr id="111" name="Arc 110"/>
+            <p:cNvSpPr/>
+            <p:nvPr/>
+          </p:nvSpPr>
+          <p:spPr>
+            <a:xfrm rot="14151145" flipH="1" flipV="1">
+              <a:off x="3397278" y="2779137"/>
+              <a:ext cx="313468" cy="265635"/>
+            </a:xfrm>
+            <a:prstGeom prst="arc">
+              <a:avLst>
+                <a:gd name="adj1" fmla="val 16663458"/>
+                <a:gd name="adj2" fmla="val 20671197"/>
+              </a:avLst>
+            </a:prstGeom>
+            <a:ln>
+              <a:solidFill>
+                <a:schemeClr val="tx1"/>
+              </a:solidFill>
+              <a:headEnd type="arrow" w="med" len="med"/>
+              <a:tailEnd type="none" w="med" len="med"/>
+            </a:ln>
+          </p:spPr>
+          <p:style>
+            <a:lnRef idx="1">
+              <a:schemeClr val="accent1"/>
+            </a:lnRef>
+            <a:fillRef idx="0">
+              <a:schemeClr val="accent1"/>
+            </a:fillRef>
+            <a:effectRef idx="0">
+              <a:schemeClr val="accent1"/>
+            </a:effectRef>
+            <a:fontRef idx="minor">
+              <a:schemeClr val="tx1"/>
+            </a:fontRef>
+          </p:style>
+          <p:txBody>
+            <a:bodyPr rtlCol="0" anchor="ctr"/>
+            <a:lstStyle/>
+            <a:p>
+              <a:pPr algn="ctr"/>
+              <a:endParaRPr lang="en-GB"/>
+            </a:p>
+          </p:txBody>
+        </p:sp>
+        <p:sp>
+          <p:nvSpPr>
+            <p:cNvPr id="112" name="Arc 111"/>
+            <p:cNvSpPr/>
+            <p:nvPr/>
+          </p:nvSpPr>
+          <p:spPr>
+            <a:xfrm rot="12402128" flipH="1" flipV="1">
+              <a:off x="4952969" y="3002180"/>
+              <a:ext cx="313468" cy="265635"/>
+            </a:xfrm>
+            <a:prstGeom prst="arc">
+              <a:avLst>
+                <a:gd name="adj1" fmla="val 16663458"/>
+                <a:gd name="adj2" fmla="val 20671197"/>
+              </a:avLst>
+            </a:prstGeom>
+            <a:ln>
+              <a:solidFill>
+                <a:schemeClr val="tx1"/>
+              </a:solidFill>
+              <a:headEnd type="arrow" w="med" len="med"/>
+              <a:tailEnd type="none" w="med" len="med"/>
+            </a:ln>
+          </p:spPr>
+          <p:style>
+            <a:lnRef idx="1">
+              <a:schemeClr val="accent1"/>
+            </a:lnRef>
+            <a:fillRef idx="0">
+              <a:schemeClr val="accent1"/>
+            </a:fillRef>
+            <a:effectRef idx="0">
+              <a:schemeClr val="accent1"/>
+            </a:effectRef>
+            <a:fontRef idx="minor">
+              <a:schemeClr val="tx1"/>
+            </a:fontRef>
+          </p:style>
+          <p:txBody>
+            <a:bodyPr rtlCol="0" anchor="ctr"/>
+            <a:lstStyle/>
+            <a:p>
+              <a:pPr algn="ctr"/>
+              <a:endParaRPr lang="en-GB"/>
+            </a:p>
+          </p:txBody>
+        </p:sp>
+        <p:sp>
+          <p:nvSpPr>
+            <p:cNvPr id="113" name="Arc 112"/>
+            <p:cNvSpPr/>
+            <p:nvPr/>
+          </p:nvSpPr>
+          <p:spPr>
+            <a:xfrm rot="1111206" flipH="1" flipV="1">
+              <a:off x="4618239" y="3002090"/>
+              <a:ext cx="313388" cy="328482"/>
+            </a:xfrm>
+            <a:prstGeom prst="arc">
+              <a:avLst>
+                <a:gd name="adj1" fmla="val 16663458"/>
+                <a:gd name="adj2" fmla="val 21231125"/>
+              </a:avLst>
+            </a:prstGeom>
+            <a:ln>
+              <a:solidFill>
+                <a:schemeClr val="tx1"/>
+              </a:solidFill>
+              <a:headEnd type="arrow" w="med" len="med"/>
+              <a:tailEnd type="none" w="med" len="med"/>
+            </a:ln>
+          </p:spPr>
+          <p:style>
+            <a:lnRef idx="1">
+              <a:schemeClr val="accent1"/>
+            </a:lnRef>
+            <a:fillRef idx="0">
+              <a:schemeClr val="accent1"/>
+            </a:fillRef>
+            <a:effectRef idx="0">
+              <a:schemeClr val="accent1"/>
+            </a:effectRef>
+            <a:fontRef idx="minor">
+              <a:schemeClr val="tx1"/>
+            </a:fontRef>
+          </p:style>
+          <p:txBody>
+            <a:bodyPr rtlCol="0" anchor="ctr"/>
+            <a:lstStyle/>
+            <a:p>
+              <a:pPr algn="ctr"/>
+              <a:endParaRPr lang="en-GB"/>
+            </a:p>
+          </p:txBody>
+        </p:sp>
+        <p:sp>
+          <p:nvSpPr>
+            <p:cNvPr id="115" name="Arc 114"/>
+            <p:cNvSpPr/>
+            <p:nvPr/>
+          </p:nvSpPr>
+          <p:spPr>
+            <a:xfrm rot="4410126" flipH="1" flipV="1">
+              <a:off x="7446415" y="2859888"/>
+              <a:ext cx="314125" cy="338984"/>
+            </a:xfrm>
+            <a:prstGeom prst="arc">
+              <a:avLst>
+                <a:gd name="adj1" fmla="val 16663458"/>
+                <a:gd name="adj2" fmla="val 20671197"/>
+              </a:avLst>
+            </a:prstGeom>
+            <a:ln>
+              <a:solidFill>
+                <a:schemeClr val="tx1"/>
+              </a:solidFill>
+              <a:headEnd type="none" w="med" len="med"/>
+              <a:tailEnd type="arrow" w="med" len="med"/>
+            </a:ln>
+          </p:spPr>
+          <p:style>
+            <a:lnRef idx="1">
+              <a:schemeClr val="accent1"/>
+            </a:lnRef>
+            <a:fillRef idx="0">
+              <a:schemeClr val="accent1"/>
+            </a:fillRef>
+            <a:effectRef idx="0">
+              <a:schemeClr val="accent1"/>
+            </a:effectRef>
+            <a:fontRef idx="minor">
+              <a:schemeClr val="tx1"/>
+            </a:fontRef>
+          </p:style>
+          <p:txBody>
+            <a:bodyPr rtlCol="0" anchor="ctr"/>
+            <a:lstStyle/>
+            <a:p>
+              <a:pPr algn="ctr"/>
+              <a:endParaRPr lang="en-GB"/>
+            </a:p>
+          </p:txBody>
+        </p:sp>
+        <p:sp>
+          <p:nvSpPr>
+            <p:cNvPr id="116" name="Arc 115"/>
+            <p:cNvSpPr/>
+            <p:nvPr/>
+          </p:nvSpPr>
+          <p:spPr>
+            <a:xfrm rot="15517079" flipH="1" flipV="1">
+              <a:off x="7858863" y="2930050"/>
+              <a:ext cx="249580" cy="283734"/>
+            </a:xfrm>
+            <a:prstGeom prst="arc">
+              <a:avLst>
+                <a:gd name="adj1" fmla="val 16663458"/>
+                <a:gd name="adj2" fmla="val 20671197"/>
+              </a:avLst>
+            </a:prstGeom>
+            <a:ln>
+              <a:solidFill>
+                <a:schemeClr val="tx1"/>
+              </a:solidFill>
+              <a:headEnd type="none" w="med" len="med"/>
+              <a:tailEnd type="arrow" w="med" len="med"/>
+            </a:ln>
+          </p:spPr>
+          <p:style>
+            <a:lnRef idx="1">
+              <a:schemeClr val="accent1"/>
+            </a:lnRef>
+            <a:fillRef idx="0">
+              <a:schemeClr val="accent1"/>
+            </a:fillRef>
+            <a:effectRef idx="0">
+              <a:schemeClr val="accent1"/>
+            </a:effectRef>
+            <a:fontRef idx="minor">
+              <a:schemeClr val="tx1"/>
+            </a:fontRef>
+          </p:style>
+          <p:txBody>
+            <a:bodyPr rtlCol="0" anchor="ctr"/>
+            <a:lstStyle/>
+            <a:p>
+              <a:pPr algn="ctr"/>
+              <a:endParaRPr lang="en-GB"/>
+            </a:p>
+          </p:txBody>
+        </p:sp>
+        <p:sp>
+          <p:nvSpPr>
+            <p:cNvPr id="137" name="Arc 136"/>
+            <p:cNvSpPr/>
+            <p:nvPr/>
+          </p:nvSpPr>
+          <p:spPr>
+            <a:xfrm rot="2789593" flipH="1" flipV="1">
+              <a:off x="8685324" y="2931787"/>
+              <a:ext cx="203728" cy="283326"/>
+            </a:xfrm>
+            <a:prstGeom prst="arc">
+              <a:avLst>
+                <a:gd name="adj1" fmla="val 16663458"/>
+                <a:gd name="adj2" fmla="val 20671197"/>
+              </a:avLst>
+            </a:prstGeom>
+            <a:ln>
+              <a:solidFill>
+                <a:schemeClr val="tx1"/>
+              </a:solidFill>
+              <a:headEnd type="none" w="med" len="med"/>
+              <a:tailEnd type="arrow" w="med" len="med"/>
+            </a:ln>
+          </p:spPr>
+          <p:style>
+            <a:lnRef idx="1">
+              <a:schemeClr val="accent1"/>
+            </a:lnRef>
+            <a:fillRef idx="0">
+              <a:schemeClr val="accent1"/>
+            </a:fillRef>
+            <a:effectRef idx="0">
+              <a:schemeClr val="accent1"/>
+            </a:effectRef>
+            <a:fontRef idx="minor">
+              <a:schemeClr val="tx1"/>
+            </a:fontRef>
+          </p:style>
+          <p:txBody>
+            <a:bodyPr rtlCol="0" anchor="ctr"/>
+            <a:lstStyle/>
+            <a:p>
+              <a:pPr algn="ctr"/>
+              <a:endParaRPr lang="en-GB" sz="1000"/>
+            </a:p>
+          </p:txBody>
+        </p:sp>
+        <p:sp>
+          <p:nvSpPr>
+            <p:cNvPr id="138" name="Arc 137"/>
+            <p:cNvSpPr/>
+            <p:nvPr/>
+          </p:nvSpPr>
+          <p:spPr>
+            <a:xfrm rot="13905692" flipH="1" flipV="1">
+              <a:off x="9429039" y="3014710"/>
+              <a:ext cx="224095" cy="390984"/>
+            </a:xfrm>
+            <a:prstGeom prst="arc">
+              <a:avLst>
+                <a:gd name="adj1" fmla="val 16663458"/>
+                <a:gd name="adj2" fmla="val 20671197"/>
+              </a:avLst>
+            </a:prstGeom>
+            <a:ln>
+              <a:solidFill>
+                <a:schemeClr val="tx1"/>
+              </a:solidFill>
+              <a:headEnd type="none" w="med" len="med"/>
+              <a:tailEnd type="arrow" w="med" len="med"/>
+            </a:ln>
+          </p:spPr>
+          <p:style>
+            <a:lnRef idx="1">
+              <a:schemeClr val="accent1"/>
+            </a:lnRef>
+            <a:fillRef idx="0">
+              <a:schemeClr val="accent1"/>
+            </a:fillRef>
+            <a:effectRef idx="0">
+              <a:schemeClr val="accent1"/>
+            </a:effectRef>
+            <a:fontRef idx="minor">
+              <a:schemeClr val="tx1"/>
+            </a:fontRef>
+          </p:style>
+          <p:txBody>
+            <a:bodyPr rtlCol="0" anchor="ctr"/>
+            <a:lstStyle/>
+            <a:p>
+              <a:pPr algn="ctr"/>
+              <a:endParaRPr lang="en-GB"/>
+            </a:p>
+          </p:txBody>
+        </p:sp>
+        <p:sp>
+          <p:nvSpPr>
+            <p:cNvPr id="44" name="Arc 43"/>
+            <p:cNvSpPr/>
+            <p:nvPr/>
+          </p:nvSpPr>
+          <p:spPr>
+            <a:xfrm rot="11735101" flipH="1" flipV="1">
+              <a:off x="11077671" y="2767307"/>
+              <a:ext cx="188711" cy="457033"/>
+            </a:xfrm>
+            <a:prstGeom prst="arc">
+              <a:avLst>
+                <a:gd name="adj1" fmla="val 16663458"/>
+                <a:gd name="adj2" fmla="val 20671197"/>
+              </a:avLst>
+            </a:prstGeom>
+            <a:ln>
+              <a:solidFill>
+                <a:schemeClr val="tx1"/>
+              </a:solidFill>
+              <a:headEnd type="none" w="med" len="med"/>
+              <a:tailEnd type="arrow" w="med" len="med"/>
+            </a:ln>
+          </p:spPr>
+          <p:style>
+            <a:lnRef idx="1">
+              <a:schemeClr val="accent1"/>
+            </a:lnRef>
+            <a:fillRef idx="0">
+              <a:schemeClr val="accent1"/>
+            </a:fillRef>
+            <a:effectRef idx="0">
+              <a:schemeClr val="accent1"/>
+            </a:effectRef>
+            <a:fontRef idx="minor">
+              <a:schemeClr val="tx1"/>
+            </a:fontRef>
+          </p:style>
+          <p:txBody>
+            <a:bodyPr rtlCol="0" anchor="ctr"/>
+            <a:lstStyle/>
+            <a:p>
+              <a:pPr algn="ctr"/>
+              <a:endParaRPr lang="en-GB"/>
+            </a:p>
+          </p:txBody>
+        </p:sp>
+        <p:sp>
+          <p:nvSpPr>
+            <p:cNvPr id="3" name="ZoneTexte 2"/>
+            <p:cNvSpPr txBox="1"/>
+            <p:nvPr/>
+          </p:nvSpPr>
+          <p:spPr>
+            <a:xfrm>
+              <a:off x="1383838" y="2181860"/>
+              <a:ext cx="344966" cy="307777"/>
+            </a:xfrm>
+            <a:prstGeom prst="rect">
+              <a:avLst/>
+            </a:prstGeom>
+            <a:noFill/>
+          </p:spPr>
+          <p:txBody>
+            <a:bodyPr wrap="none" rtlCol="0">
+              <a:spAutoFit/>
+            </a:bodyPr>
+            <a:lstStyle/>
+            <a:p>
+              <a:r>
+                <a:rPr lang="el-GR" sz="1400" dirty="0" smtClean="0"/>
+                <a:t>α</a:t>
+              </a:r>
+              <a:r>
+                <a:rPr lang="en-GB" sz="1400" baseline="-25000" dirty="0" smtClean="0"/>
+                <a:t>E</a:t>
+              </a:r>
+              <a:endParaRPr lang="en-GB" sz="1400" baseline="-25000" dirty="0"/>
+            </a:p>
+          </p:txBody>
+        </p:sp>
+        <p:sp>
+          <p:nvSpPr>
+            <p:cNvPr id="46" name="ZoneTexte 45"/>
+            <p:cNvSpPr txBox="1"/>
+            <p:nvPr/>
+          </p:nvSpPr>
+          <p:spPr>
+            <a:xfrm>
+              <a:off x="2449320" y="2426585"/>
+              <a:ext cx="344966" cy="307777"/>
+            </a:xfrm>
+            <a:prstGeom prst="rect">
+              <a:avLst/>
+            </a:prstGeom>
+            <a:noFill/>
+          </p:spPr>
+          <p:txBody>
+            <a:bodyPr wrap="none" rtlCol="0">
+              <a:spAutoFit/>
+            </a:bodyPr>
+            <a:lstStyle/>
+            <a:p>
+              <a:r>
+                <a:rPr lang="el-GR" sz="1400" dirty="0" smtClean="0"/>
+                <a:t>α</a:t>
+              </a:r>
+              <a:r>
+                <a:rPr lang="en-GB" sz="1400" baseline="-25000" dirty="0" smtClean="0"/>
+                <a:t>1</a:t>
+              </a:r>
+              <a:endParaRPr lang="en-GB" sz="1400" baseline="-25000" dirty="0"/>
+            </a:p>
+          </p:txBody>
+        </p:sp>
+        <p:sp>
+          <p:nvSpPr>
+            <p:cNvPr id="48" name="ZoneTexte 47"/>
+            <p:cNvSpPr txBox="1"/>
+            <p:nvPr/>
+          </p:nvSpPr>
+          <p:spPr>
+            <a:xfrm>
+              <a:off x="2660105" y="2780113"/>
+              <a:ext cx="344966" cy="307777"/>
+            </a:xfrm>
+            <a:prstGeom prst="rect">
+              <a:avLst/>
+            </a:prstGeom>
+            <a:noFill/>
+          </p:spPr>
+          <p:txBody>
+            <a:bodyPr wrap="none" rtlCol="0">
+              <a:spAutoFit/>
+            </a:bodyPr>
+            <a:lstStyle/>
+            <a:p>
+              <a:r>
+                <a:rPr lang="el-GR" sz="1400" dirty="0" smtClean="0"/>
+                <a:t>α</a:t>
+              </a:r>
+              <a:r>
+                <a:rPr lang="en-GB" sz="1400" baseline="-25000" dirty="0" smtClean="0"/>
+                <a:t>2</a:t>
+              </a:r>
+              <a:endParaRPr lang="en-GB" sz="1400" baseline="-25000" dirty="0"/>
+            </a:p>
+          </p:txBody>
+        </p:sp>
+        <p:sp>
+          <p:nvSpPr>
+            <p:cNvPr id="49" name="ZoneTexte 48"/>
+            <p:cNvSpPr txBox="1"/>
+            <p:nvPr/>
+          </p:nvSpPr>
+          <p:spPr>
+            <a:xfrm>
+              <a:off x="3726143" y="2742752"/>
+              <a:ext cx="344966" cy="307777"/>
+            </a:xfrm>
+            <a:prstGeom prst="rect">
+              <a:avLst/>
+            </a:prstGeom>
+            <a:noFill/>
+          </p:spPr>
+          <p:txBody>
+            <a:bodyPr wrap="none" rtlCol="0">
+              <a:spAutoFit/>
+            </a:bodyPr>
+            <a:lstStyle/>
+            <a:p>
+              <a:r>
+                <a:rPr lang="el-GR" sz="1400" dirty="0" smtClean="0"/>
+                <a:t>α</a:t>
+              </a:r>
+              <a:r>
+                <a:rPr lang="en-GB" sz="1400" baseline="-25000" dirty="0" smtClean="0"/>
+                <a:t>3</a:t>
+              </a:r>
+              <a:endParaRPr lang="en-GB" sz="1400" baseline="-25000" dirty="0"/>
+            </a:p>
+          </p:txBody>
+        </p:sp>
+        <p:sp>
+          <p:nvSpPr>
+            <p:cNvPr id="50" name="ZoneTexte 49"/>
+            <p:cNvSpPr txBox="1"/>
+            <p:nvPr/>
+          </p:nvSpPr>
+          <p:spPr>
+            <a:xfrm>
+              <a:off x="4280009" y="3085719"/>
+              <a:ext cx="344966" cy="307777"/>
+            </a:xfrm>
+            <a:prstGeom prst="rect">
+              <a:avLst/>
+            </a:prstGeom>
+            <a:noFill/>
+          </p:spPr>
+          <p:txBody>
+            <a:bodyPr wrap="none" rtlCol="0">
+              <a:spAutoFit/>
+            </a:bodyPr>
+            <a:lstStyle/>
+            <a:p>
+              <a:r>
+                <a:rPr lang="el-GR" sz="1400" dirty="0" smtClean="0"/>
+                <a:t>α</a:t>
+              </a:r>
+              <a:r>
+                <a:rPr lang="en-GB" sz="1400" baseline="-25000" dirty="0" smtClean="0"/>
+                <a:t>4</a:t>
+              </a:r>
+              <a:endParaRPr lang="en-GB" sz="1400" baseline="-25000" dirty="0"/>
+            </a:p>
+          </p:txBody>
+        </p:sp>
+        <p:sp>
+          <p:nvSpPr>
+            <p:cNvPr id="51" name="ZoneTexte 50"/>
+            <p:cNvSpPr txBox="1"/>
+            <p:nvPr/>
+          </p:nvSpPr>
+          <p:spPr>
+            <a:xfrm>
+              <a:off x="7117173" y="2748153"/>
+              <a:ext cx="344966" cy="307777"/>
+            </a:xfrm>
+            <a:prstGeom prst="rect">
+              <a:avLst/>
+            </a:prstGeom>
+            <a:noFill/>
+          </p:spPr>
+          <p:txBody>
+            <a:bodyPr wrap="none" rtlCol="0">
+              <a:spAutoFit/>
+            </a:bodyPr>
+            <a:lstStyle/>
+            <a:p>
+              <a:r>
+                <a:rPr lang="el-GR" sz="1400" dirty="0" smtClean="0"/>
+                <a:t>α</a:t>
+              </a:r>
+              <a:r>
+                <a:rPr lang="en-GB" sz="1400" baseline="-25000" dirty="0" smtClean="0"/>
+                <a:t>6</a:t>
+              </a:r>
+              <a:endParaRPr lang="en-GB" sz="1400" baseline="-25000" dirty="0"/>
+            </a:p>
+          </p:txBody>
+        </p:sp>
+        <p:sp>
+          <p:nvSpPr>
+            <p:cNvPr id="52" name="ZoneTexte 51"/>
+            <p:cNvSpPr txBox="1"/>
+            <p:nvPr/>
+          </p:nvSpPr>
+          <p:spPr>
+            <a:xfrm>
+              <a:off x="5243482" y="2884362"/>
+              <a:ext cx="344966" cy="307777"/>
+            </a:xfrm>
+            <a:prstGeom prst="rect">
+              <a:avLst/>
+            </a:prstGeom>
+            <a:noFill/>
+          </p:spPr>
+          <p:txBody>
+            <a:bodyPr wrap="none" rtlCol="0">
+              <a:spAutoFit/>
+            </a:bodyPr>
+            <a:lstStyle/>
+            <a:p>
+              <a:r>
+                <a:rPr lang="el-GR" sz="1400" dirty="0" smtClean="0"/>
+                <a:t>α</a:t>
+              </a:r>
+              <a:r>
+                <a:rPr lang="en-GB" sz="1400" baseline="-25000" dirty="0" smtClean="0"/>
+                <a:t>5</a:t>
+              </a:r>
+              <a:endParaRPr lang="en-GB" sz="1400" baseline="-25000" dirty="0"/>
+            </a:p>
+          </p:txBody>
+        </p:sp>
+        <p:sp>
+          <p:nvSpPr>
+            <p:cNvPr id="53" name="ZoneTexte 52"/>
+            <p:cNvSpPr txBox="1"/>
+            <p:nvPr/>
+          </p:nvSpPr>
+          <p:spPr>
+            <a:xfrm>
+              <a:off x="8081943" y="3035271"/>
+              <a:ext cx="344966" cy="307777"/>
+            </a:xfrm>
+            <a:prstGeom prst="rect">
+              <a:avLst/>
+            </a:prstGeom>
+            <a:noFill/>
+          </p:spPr>
+          <p:txBody>
+            <a:bodyPr wrap="none" rtlCol="0">
+              <a:spAutoFit/>
+            </a:bodyPr>
+            <a:lstStyle/>
+            <a:p>
+              <a:r>
+                <a:rPr lang="el-GR" sz="1400" dirty="0" smtClean="0"/>
+                <a:t>α</a:t>
+              </a:r>
+              <a:r>
+                <a:rPr lang="en-GB" sz="1400" baseline="-25000" dirty="0" smtClean="0"/>
+                <a:t>7</a:t>
+              </a:r>
+              <a:endParaRPr lang="en-GB" sz="1400" baseline="-25000" dirty="0"/>
+            </a:p>
+          </p:txBody>
+        </p:sp>
+        <p:sp>
+          <p:nvSpPr>
+            <p:cNvPr id="54" name="ZoneTexte 53"/>
+            <p:cNvSpPr txBox="1"/>
+            <p:nvPr/>
+          </p:nvSpPr>
+          <p:spPr>
+            <a:xfrm>
+              <a:off x="8354778" y="2825218"/>
+              <a:ext cx="344966" cy="307777"/>
+            </a:xfrm>
+            <a:prstGeom prst="rect">
+              <a:avLst/>
+            </a:prstGeom>
+            <a:noFill/>
+          </p:spPr>
+          <p:txBody>
+            <a:bodyPr wrap="none" rtlCol="0">
+              <a:spAutoFit/>
+            </a:bodyPr>
+            <a:lstStyle/>
+            <a:p>
+              <a:r>
+                <a:rPr lang="el-GR" sz="1400" dirty="0" smtClean="0"/>
+                <a:t>α</a:t>
+              </a:r>
+              <a:r>
+                <a:rPr lang="en-GB" sz="1400" baseline="-25000" dirty="0" smtClean="0"/>
+                <a:t>8</a:t>
+              </a:r>
+              <a:endParaRPr lang="en-GB" sz="1400" baseline="-25000" dirty="0"/>
+            </a:p>
+          </p:txBody>
+        </p:sp>
+        <p:sp>
+          <p:nvSpPr>
+            <p:cNvPr id="55" name="ZoneTexte 54"/>
+            <p:cNvSpPr txBox="1"/>
+            <p:nvPr/>
+          </p:nvSpPr>
+          <p:spPr>
+            <a:xfrm>
+              <a:off x="9657415" y="3064153"/>
+              <a:ext cx="344966" cy="307777"/>
+            </a:xfrm>
+            <a:prstGeom prst="rect">
+              <a:avLst/>
+            </a:prstGeom>
+            <a:noFill/>
+          </p:spPr>
+          <p:txBody>
+            <a:bodyPr wrap="none" rtlCol="0">
+              <a:spAutoFit/>
+            </a:bodyPr>
+            <a:lstStyle/>
+            <a:p>
+              <a:r>
+                <a:rPr lang="el-GR" sz="1400" dirty="0" smtClean="0"/>
+                <a:t>α</a:t>
+              </a:r>
+              <a:r>
+                <a:rPr lang="en-GB" sz="1400" baseline="-25000" dirty="0" smtClean="0"/>
+                <a:t>9</a:t>
+              </a:r>
+              <a:endParaRPr lang="en-GB" sz="1400" baseline="-25000" dirty="0"/>
+            </a:p>
+          </p:txBody>
+        </p:sp>
+        <p:sp>
+          <p:nvSpPr>
+            <p:cNvPr id="57" name="ZoneTexte 56"/>
+            <p:cNvSpPr txBox="1"/>
+            <p:nvPr/>
+          </p:nvSpPr>
+          <p:spPr>
+            <a:xfrm>
+              <a:off x="9942374" y="2634248"/>
+              <a:ext cx="409086" cy="307777"/>
+            </a:xfrm>
+            <a:prstGeom prst="rect">
+              <a:avLst/>
+            </a:prstGeom>
+            <a:noFill/>
+          </p:spPr>
+          <p:txBody>
+            <a:bodyPr wrap="none" rtlCol="0">
+              <a:spAutoFit/>
+            </a:bodyPr>
+            <a:lstStyle/>
+            <a:p>
+              <a:r>
+                <a:rPr lang="el-GR" sz="1400" dirty="0" smtClean="0"/>
+                <a:t>α</a:t>
+              </a:r>
+              <a:r>
+                <a:rPr lang="en-GB" sz="1400" baseline="-25000" dirty="0" smtClean="0"/>
+                <a:t>10</a:t>
+              </a:r>
+              <a:endParaRPr lang="en-GB" sz="1400" baseline="-25000" dirty="0"/>
+            </a:p>
+          </p:txBody>
+        </p:sp>
+        <p:sp>
+          <p:nvSpPr>
+            <p:cNvPr id="58" name="Arc 57"/>
+            <p:cNvSpPr/>
+            <p:nvPr/>
+          </p:nvSpPr>
+          <p:spPr>
+            <a:xfrm rot="13981476" flipH="1" flipV="1">
+              <a:off x="10983746" y="2916488"/>
+              <a:ext cx="188711" cy="457033"/>
+            </a:xfrm>
+            <a:prstGeom prst="arc">
+              <a:avLst>
+                <a:gd name="adj1" fmla="val 16663458"/>
+                <a:gd name="adj2" fmla="val 20671197"/>
+              </a:avLst>
+            </a:prstGeom>
+            <a:ln>
+              <a:solidFill>
+                <a:schemeClr val="tx1"/>
+              </a:solidFill>
+              <a:headEnd type="arrow" w="med" len="med"/>
+              <a:tailEnd type="none" w="med" len="med"/>
+            </a:ln>
+          </p:spPr>
+          <p:style>
+            <a:lnRef idx="1">
+              <a:schemeClr val="accent1"/>
+            </a:lnRef>
+            <a:fillRef idx="0">
+              <a:schemeClr val="accent1"/>
+            </a:fillRef>
+            <a:effectRef idx="0">
+              <a:schemeClr val="accent1"/>
+            </a:effectRef>
+            <a:fontRef idx="minor">
+              <a:schemeClr val="tx1"/>
+            </a:fontRef>
+          </p:style>
+          <p:txBody>
+            <a:bodyPr rtlCol="0" anchor="ctr"/>
+            <a:lstStyle/>
+            <a:p>
+              <a:pPr algn="ctr"/>
+              <a:endParaRPr lang="en-GB"/>
+            </a:p>
+          </p:txBody>
+        </p:sp>
+        <p:sp>
+          <p:nvSpPr>
+            <p:cNvPr id="60" name="ZoneTexte 59"/>
+            <p:cNvSpPr txBox="1"/>
+            <p:nvPr/>
+          </p:nvSpPr>
+          <p:spPr>
+            <a:xfrm>
+              <a:off x="10922138" y="2652288"/>
+              <a:ext cx="344966" cy="307777"/>
+            </a:xfrm>
+            <a:prstGeom prst="rect">
+              <a:avLst/>
+            </a:prstGeom>
+            <a:noFill/>
+          </p:spPr>
+          <p:txBody>
+            <a:bodyPr wrap="none" rtlCol="0">
+              <a:spAutoFit/>
+            </a:bodyPr>
+            <a:lstStyle/>
+            <a:p>
+              <a:r>
+                <a:rPr lang="el-GR" sz="1400" dirty="0" smtClean="0"/>
+                <a:t>α</a:t>
+              </a:r>
+              <a:r>
+                <a:rPr lang="en-GB" sz="1400" baseline="-25000" dirty="0" smtClean="0"/>
+                <a:t>6</a:t>
+              </a:r>
+              <a:endParaRPr lang="en-GB" sz="1400" baseline="-25000" dirty="0"/>
+            </a:p>
+          </p:txBody>
+        </p:sp>
+        <p:sp>
+          <p:nvSpPr>
+            <p:cNvPr id="62" name="Arc 61"/>
+            <p:cNvSpPr/>
+            <p:nvPr/>
+          </p:nvSpPr>
+          <p:spPr>
+            <a:xfrm rot="11735101" flipV="1">
+              <a:off x="10214908" y="2809733"/>
+              <a:ext cx="85226" cy="457033"/>
+            </a:xfrm>
+            <a:prstGeom prst="arc">
+              <a:avLst>
+                <a:gd name="adj1" fmla="val 16663458"/>
+                <a:gd name="adj2" fmla="val 20671197"/>
+              </a:avLst>
+            </a:prstGeom>
+            <a:ln>
+              <a:solidFill>
+                <a:schemeClr val="tx1"/>
+              </a:solidFill>
+              <a:headEnd type="none" w="med" len="med"/>
+              <a:tailEnd type="arrow" w="med" len="med"/>
+            </a:ln>
+          </p:spPr>
+          <p:style>
+            <a:lnRef idx="1">
+              <a:schemeClr val="accent1"/>
+            </a:lnRef>
+            <a:fillRef idx="0">
+              <a:schemeClr val="accent1"/>
+            </a:fillRef>
+            <a:effectRef idx="0">
+              <a:schemeClr val="accent1"/>
+            </a:effectRef>
+            <a:fontRef idx="minor">
+              <a:schemeClr val="tx1"/>
+            </a:fontRef>
+          </p:style>
+          <p:txBody>
+            <a:bodyPr rtlCol="0" anchor="ctr"/>
+            <a:lstStyle/>
+            <a:p>
+              <a:pPr algn="ctr"/>
+              <a:endParaRPr lang="en-GB"/>
+            </a:p>
+          </p:txBody>
+        </p:sp>
+        <p:sp>
+          <p:nvSpPr>
+            <p:cNvPr id="64" name="Arc 63"/>
+            <p:cNvSpPr/>
+            <p:nvPr/>
+          </p:nvSpPr>
+          <p:spPr>
+            <a:xfrm rot="8554652" flipV="1">
+              <a:off x="10300241" y="2992816"/>
+              <a:ext cx="144902" cy="457033"/>
+            </a:xfrm>
+            <a:prstGeom prst="arc">
+              <a:avLst>
+                <a:gd name="adj1" fmla="val 16663458"/>
+                <a:gd name="adj2" fmla="val 20671197"/>
+              </a:avLst>
+            </a:prstGeom>
+            <a:ln>
+              <a:solidFill>
+                <a:schemeClr val="tx1"/>
+              </a:solidFill>
+              <a:headEnd type="arrow" w="med" len="med"/>
+              <a:tailEnd type="none" w="med" len="med"/>
+            </a:ln>
+          </p:spPr>
+          <p:style>
+            <a:lnRef idx="1">
+              <a:schemeClr val="accent1"/>
+            </a:lnRef>
+            <a:fillRef idx="0">
+              <a:schemeClr val="accent1"/>
+            </a:fillRef>
+            <a:effectRef idx="0">
+              <a:schemeClr val="accent1"/>
+            </a:effectRef>
+            <a:fontRef idx="minor">
+              <a:schemeClr val="tx1"/>
+            </a:fontRef>
+          </p:style>
+          <p:txBody>
+            <a:bodyPr rtlCol="0" anchor="ctr"/>
+            <a:lstStyle/>
+            <a:p>
+              <a:pPr algn="ctr"/>
+              <a:endParaRPr lang="en-GB"/>
+            </a:p>
+          </p:txBody>
+        </p:sp>
+      </p:grpSp>
+      <p:sp>
+        <p:nvSpPr>
+          <p:cNvPr id="4" name="ZoneTexte 3"/>
+          <p:cNvSpPr txBox="1"/>
+          <p:nvPr/>
+        </p:nvSpPr>
+        <p:spPr>
+          <a:xfrm>
+            <a:off x="2137341" y="4020714"/>
+            <a:ext cx="348172" cy="307777"/>
+          </a:xfrm>
+          <a:prstGeom prst="rect">
+            <a:avLst/>
+          </a:prstGeom>
+          <a:noFill/>
+        </p:spPr>
+        <p:txBody>
+          <a:bodyPr wrap="none" rtlCol="0">
+            <a:spAutoFit/>
+          </a:bodyPr>
+          <a:lstStyle/>
+          <a:p>
+            <a:r>
+              <a:rPr lang="en-GB" sz="1400" dirty="0"/>
+              <a:t>n</a:t>
+            </a:r>
+            <a:r>
+              <a:rPr lang="en-GB" sz="1400" baseline="-25000" dirty="0" smtClean="0"/>
+              <a:t>A</a:t>
+            </a:r>
+            <a:endParaRPr lang="en-GB" sz="1400" baseline="-25000" dirty="0"/>
+          </a:p>
+        </p:txBody>
+      </p:sp>
+      <p:sp>
+        <p:nvSpPr>
+          <p:cNvPr id="65" name="ZoneTexte 64"/>
+          <p:cNvSpPr txBox="1"/>
+          <p:nvPr/>
+        </p:nvSpPr>
+        <p:spPr>
+          <a:xfrm>
+            <a:off x="3718458" y="4008091"/>
+            <a:ext cx="344966" cy="307777"/>
+          </a:xfrm>
+          <a:prstGeom prst="rect">
+            <a:avLst/>
+          </a:prstGeom>
+          <a:noFill/>
+        </p:spPr>
+        <p:txBody>
+          <a:bodyPr wrap="none" rtlCol="0">
+            <a:spAutoFit/>
+          </a:bodyPr>
+          <a:lstStyle/>
+          <a:p>
+            <a:r>
+              <a:rPr lang="en-GB" sz="1400" dirty="0" smtClean="0"/>
+              <a:t>n</a:t>
+            </a:r>
+            <a:r>
+              <a:rPr lang="en-GB" sz="1400" baseline="-25000" dirty="0"/>
+              <a:t>B</a:t>
+            </a:r>
+          </a:p>
+        </p:txBody>
+      </p:sp>
+      <p:sp>
+        <p:nvSpPr>
+          <p:cNvPr id="66" name="ZoneTexte 65"/>
+          <p:cNvSpPr txBox="1"/>
+          <p:nvPr/>
+        </p:nvSpPr>
+        <p:spPr>
+          <a:xfrm>
+            <a:off x="8525658" y="4044541"/>
+            <a:ext cx="348172" cy="307777"/>
+          </a:xfrm>
+          <a:prstGeom prst="rect">
+            <a:avLst/>
+          </a:prstGeom>
+          <a:noFill/>
+        </p:spPr>
+        <p:txBody>
+          <a:bodyPr wrap="none" rtlCol="0">
+            <a:spAutoFit/>
+          </a:bodyPr>
+          <a:lstStyle/>
+          <a:p>
+            <a:r>
+              <a:rPr lang="en-GB" sz="1400" dirty="0" smtClean="0"/>
+              <a:t>n</a:t>
+            </a:r>
+            <a:r>
+              <a:rPr lang="en-GB" sz="1400" baseline="-25000" dirty="0" smtClean="0"/>
+              <a:t>B</a:t>
+            </a:r>
+            <a:endParaRPr lang="en-GB" sz="1400" baseline="-25000" dirty="0"/>
+          </a:p>
+        </p:txBody>
+      </p:sp>
+      <p:sp>
+        <p:nvSpPr>
+          <p:cNvPr id="67" name="ZoneTexte 66"/>
+          <p:cNvSpPr txBox="1"/>
+          <p:nvPr/>
+        </p:nvSpPr>
+        <p:spPr>
+          <a:xfrm>
+            <a:off x="10155180" y="4040199"/>
+            <a:ext cx="348172" cy="307777"/>
+          </a:xfrm>
+          <a:prstGeom prst="rect">
+            <a:avLst/>
+          </a:prstGeom>
+          <a:noFill/>
+        </p:spPr>
+        <p:txBody>
+          <a:bodyPr wrap="none" rtlCol="0">
+            <a:spAutoFit/>
+          </a:bodyPr>
+          <a:lstStyle/>
+          <a:p>
+            <a:r>
+              <a:rPr lang="en-GB" sz="1400" dirty="0"/>
+              <a:t>n</a:t>
+            </a:r>
+            <a:r>
+              <a:rPr lang="en-GB" sz="1400" baseline="-25000" dirty="0" smtClean="0"/>
+              <a:t>A</a:t>
+            </a:r>
+            <a:endParaRPr lang="en-GB" sz="1400" baseline="-25000" dirty="0"/>
+          </a:p>
+        </p:txBody>
+      </p:sp>
+      <p:grpSp>
+        <p:nvGrpSpPr>
+          <p:cNvPr id="11" name="Groupe 10"/>
+          <p:cNvGrpSpPr/>
+          <p:nvPr/>
+        </p:nvGrpSpPr>
+        <p:grpSpPr>
+          <a:xfrm>
+            <a:off x="1541194" y="2894981"/>
+            <a:ext cx="303391" cy="333128"/>
+            <a:chOff x="1337365" y="4267200"/>
+            <a:chExt cx="303391" cy="333128"/>
+          </a:xfrm>
+        </p:grpSpPr>
         <p:cxnSp>
           <p:nvCxnSpPr>
-            <p:cNvPr id="16" name="Connecteur droit 15"/>
+            <p:cNvPr id="6" name="Connecteur droit avec flèche 5"/>
             <p:cNvCxnSpPr/>
             <p:nvPr/>
           </p:nvCxnSpPr>
           <p:spPr>
-            <a:xfrm>
-              <a:off x="2069024" y="1611824"/>
-              <a:ext cx="1977196" cy="0"/>
+            <a:xfrm flipH="1" flipV="1">
+              <a:off x="1337365" y="4267200"/>
+              <a:ext cx="3175" cy="333128"/>
             </a:xfrm>
-            <a:prstGeom prst="line">
+            <a:prstGeom prst="straightConnector1">
               <a:avLst/>
             </a:prstGeom>
-            <a:ln w="12700">
+            <a:ln>
               <a:solidFill>
                 <a:schemeClr val="tx1"/>
               </a:solidFill>
+              <a:tailEnd type="triangle"/>
             </a:ln>
           </p:spPr>
           <p:style>
@@ -8184,804 +10282,23 @@
         </p:cxnSp>
         <p:cxnSp>
           <p:nvCxnSpPr>
-            <p:cNvPr id="17" name="Connecteur droit 16"/>
+            <p:cNvPr id="68" name="Connecteur droit avec flèche 67"/>
             <p:cNvCxnSpPr/>
             <p:nvPr/>
           </p:nvCxnSpPr>
           <p:spPr>
             <a:xfrm>
-              <a:off x="2069024" y="4394291"/>
-              <a:ext cx="3569776" cy="18856"/>
+              <a:off x="1337365" y="4600328"/>
+              <a:ext cx="303391" cy="0"/>
             </a:xfrm>
-            <a:prstGeom prst="line">
-              <a:avLst/>
-            </a:prstGeom>
-            <a:ln w="12700">
-              <a:solidFill>
-                <a:schemeClr val="tx1"/>
-              </a:solidFill>
-            </a:ln>
-          </p:spPr>
-          <p:style>
-            <a:lnRef idx="1">
-              <a:schemeClr val="accent1"/>
-            </a:lnRef>
-            <a:fillRef idx="0">
-              <a:schemeClr val="accent1"/>
-            </a:fillRef>
-            <a:effectRef idx="0">
-              <a:schemeClr val="accent1"/>
-            </a:effectRef>
-            <a:fontRef idx="minor">
-              <a:schemeClr val="tx1"/>
-            </a:fontRef>
-          </p:style>
-        </p:cxnSp>
-        <p:pic>
-          <p:nvPicPr>
-            <p:cNvPr id="19" name="Image 18"/>
-            <p:cNvPicPr>
-              <a:picLocks noChangeAspect="1"/>
-            </p:cNvPicPr>
-            <p:nvPr/>
-          </p:nvPicPr>
-          <p:blipFill>
-            <a:blip r:embed="rId2"/>
-            <a:stretch>
-              <a:fillRect/>
-            </a:stretch>
-          </p:blipFill>
-          <p:spPr>
-            <a:xfrm flipH="1">
-              <a:off x="6936217" y="1596584"/>
-              <a:ext cx="3636451" cy="2868736"/>
-            </a:xfrm>
-            <a:prstGeom prst="rect">
-              <a:avLst/>
-            </a:prstGeom>
-          </p:spPr>
-        </p:pic>
-      </p:grpSp>
-      <p:grpSp>
-        <p:nvGrpSpPr>
-          <p:cNvPr id="99" name="Groupe 98"/>
-          <p:cNvGrpSpPr/>
-          <p:nvPr/>
-        </p:nvGrpSpPr>
-        <p:grpSpPr>
-          <a:xfrm>
-            <a:off x="1377950" y="1611824"/>
-            <a:ext cx="10742613" cy="1687612"/>
-            <a:chOff x="1377950" y="1611824"/>
-            <a:chExt cx="10742613" cy="1687612"/>
-          </a:xfrm>
-        </p:grpSpPr>
-        <p:cxnSp>
-          <p:nvCxnSpPr>
-            <p:cNvPr id="22" name="Connecteur droit 21"/>
-            <p:cNvCxnSpPr/>
-            <p:nvPr/>
-          </p:nvCxnSpPr>
-          <p:spPr>
-            <a:xfrm>
-              <a:off x="2971800" y="1611824"/>
-              <a:ext cx="12700" cy="890076"/>
-            </a:xfrm>
-            <a:prstGeom prst="line">
+            <a:prstGeom prst="straightConnector1">
               <a:avLst/>
             </a:prstGeom>
             <a:ln>
               <a:solidFill>
                 <a:schemeClr val="tx1"/>
               </a:solidFill>
-              <a:prstDash val="lgDash"/>
-            </a:ln>
-          </p:spPr>
-          <p:style>
-            <a:lnRef idx="1">
-              <a:schemeClr val="accent1"/>
-            </a:lnRef>
-            <a:fillRef idx="0">
-              <a:schemeClr val="accent1"/>
-            </a:fillRef>
-            <a:effectRef idx="0">
-              <a:schemeClr val="accent1"/>
-            </a:effectRef>
-            <a:fontRef idx="minor">
-              <a:schemeClr val="tx1"/>
-            </a:fontRef>
-          </p:style>
-        </p:cxnSp>
-        <p:cxnSp>
-          <p:nvCxnSpPr>
-            <p:cNvPr id="23" name="Connecteur droit 22"/>
-            <p:cNvCxnSpPr/>
-            <p:nvPr/>
-          </p:nvCxnSpPr>
-          <p:spPr>
-            <a:xfrm>
-              <a:off x="4031152" y="1611824"/>
-              <a:ext cx="12700" cy="890076"/>
-            </a:xfrm>
-            <a:prstGeom prst="line">
-              <a:avLst/>
-            </a:prstGeom>
-            <a:ln>
-              <a:solidFill>
-                <a:schemeClr val="tx1"/>
-              </a:solidFill>
-              <a:prstDash val="lgDash"/>
-            </a:ln>
-          </p:spPr>
-          <p:style>
-            <a:lnRef idx="1">
-              <a:schemeClr val="accent1"/>
-            </a:lnRef>
-            <a:fillRef idx="0">
-              <a:schemeClr val="accent1"/>
-            </a:fillRef>
-            <a:effectRef idx="0">
-              <a:schemeClr val="accent1"/>
-            </a:effectRef>
-            <a:fontRef idx="minor">
-              <a:schemeClr val="tx1"/>
-            </a:fontRef>
-          </p:style>
-        </p:cxnSp>
-        <p:cxnSp>
-          <p:nvCxnSpPr>
-            <p:cNvPr id="24" name="Connecteur droit 23"/>
-            <p:cNvCxnSpPr/>
-            <p:nvPr/>
-          </p:nvCxnSpPr>
-          <p:spPr>
-            <a:xfrm flipH="1">
-              <a:off x="8571402" y="1611824"/>
-              <a:ext cx="1" cy="508774"/>
-            </a:xfrm>
-            <a:prstGeom prst="line">
-              <a:avLst/>
-            </a:prstGeom>
-            <a:ln>
-              <a:solidFill>
-                <a:schemeClr val="tx1"/>
-              </a:solidFill>
-              <a:prstDash val="lgDash"/>
-            </a:ln>
-          </p:spPr>
-          <p:style>
-            <a:lnRef idx="1">
-              <a:schemeClr val="accent1"/>
-            </a:lnRef>
-            <a:fillRef idx="0">
-              <a:schemeClr val="accent1"/>
-            </a:fillRef>
-            <a:effectRef idx="0">
-              <a:schemeClr val="accent1"/>
-            </a:effectRef>
-            <a:fontRef idx="minor">
-              <a:schemeClr val="tx1"/>
-            </a:fontRef>
-          </p:style>
-        </p:cxnSp>
-        <p:cxnSp>
-          <p:nvCxnSpPr>
-            <p:cNvPr id="25" name="Connecteur droit 24"/>
-            <p:cNvCxnSpPr/>
-            <p:nvPr/>
-          </p:nvCxnSpPr>
-          <p:spPr>
-            <a:xfrm>
-              <a:off x="9619152" y="1623987"/>
-              <a:ext cx="0" cy="579463"/>
-            </a:xfrm>
-            <a:prstGeom prst="line">
-              <a:avLst/>
-            </a:prstGeom>
-            <a:ln>
-              <a:solidFill>
-                <a:schemeClr val="tx1"/>
-              </a:solidFill>
-              <a:prstDash val="lgDash"/>
-            </a:ln>
-          </p:spPr>
-          <p:style>
-            <a:lnRef idx="1">
-              <a:schemeClr val="accent1"/>
-            </a:lnRef>
-            <a:fillRef idx="0">
-              <a:schemeClr val="accent1"/>
-            </a:fillRef>
-            <a:effectRef idx="0">
-              <a:schemeClr val="accent1"/>
-            </a:effectRef>
-            <a:fontRef idx="minor">
-              <a:schemeClr val="tx1"/>
-            </a:fontRef>
-          </p:style>
-        </p:cxnSp>
-        <p:sp>
-          <p:nvSpPr>
-            <p:cNvPr id="26" name="ZoneTexte 25"/>
-            <p:cNvSpPr txBox="1"/>
-            <p:nvPr/>
-          </p:nvSpPr>
-          <p:spPr>
-            <a:xfrm>
-              <a:off x="2911956" y="2142521"/>
-              <a:ext cx="325730" cy="276999"/>
-            </a:xfrm>
-            <a:prstGeom prst="rect">
-              <a:avLst/>
-            </a:prstGeom>
-            <a:noFill/>
-          </p:spPr>
-          <p:txBody>
-            <a:bodyPr wrap="none" rtlCol="0">
-              <a:spAutoFit/>
-            </a:bodyPr>
-            <a:lstStyle/>
-            <a:p>
-              <a:r>
-                <a:rPr lang="el-GR" sz="1200" dirty="0" smtClean="0"/>
-                <a:t>θ</a:t>
-              </a:r>
-              <a:r>
-                <a:rPr lang="fr-CH" sz="1200" baseline="-25000" dirty="0" smtClean="0"/>
-                <a:t>A</a:t>
-              </a:r>
-              <a:endParaRPr lang="en-GB" sz="1200" baseline="-25000" dirty="0"/>
-            </a:p>
-          </p:txBody>
-        </p:sp>
-        <p:sp>
-          <p:nvSpPr>
-            <p:cNvPr id="27" name="ZoneTexte 26"/>
-            <p:cNvSpPr txBox="1"/>
-            <p:nvPr/>
-          </p:nvSpPr>
-          <p:spPr>
-            <a:xfrm>
-              <a:off x="4002016" y="1866892"/>
-              <a:ext cx="325730" cy="276999"/>
-            </a:xfrm>
-            <a:prstGeom prst="rect">
-              <a:avLst/>
-            </a:prstGeom>
-            <a:noFill/>
-          </p:spPr>
-          <p:txBody>
-            <a:bodyPr wrap="none" rtlCol="0">
-              <a:spAutoFit/>
-            </a:bodyPr>
-            <a:lstStyle/>
-            <a:p>
-              <a:r>
-                <a:rPr lang="el-GR" sz="1200" dirty="0" smtClean="0"/>
-                <a:t>θ</a:t>
-              </a:r>
-              <a:r>
-                <a:rPr lang="fr-CH" sz="1200" baseline="-25000" dirty="0" smtClean="0"/>
-                <a:t>B</a:t>
-              </a:r>
-              <a:endParaRPr lang="en-GB" sz="1200" baseline="-25000" dirty="0"/>
-            </a:p>
-          </p:txBody>
-        </p:sp>
-        <p:sp>
-          <p:nvSpPr>
-            <p:cNvPr id="28" name="ZoneTexte 27"/>
-            <p:cNvSpPr txBox="1"/>
-            <p:nvPr/>
-          </p:nvSpPr>
-          <p:spPr>
-            <a:xfrm>
-              <a:off x="8569274" y="1790338"/>
-              <a:ext cx="325730" cy="276999"/>
-            </a:xfrm>
-            <a:prstGeom prst="rect">
-              <a:avLst/>
-            </a:prstGeom>
-            <a:noFill/>
-          </p:spPr>
-          <p:txBody>
-            <a:bodyPr wrap="none" rtlCol="0">
-              <a:spAutoFit/>
-            </a:bodyPr>
-            <a:lstStyle/>
-            <a:p>
-              <a:r>
-                <a:rPr lang="el-GR" sz="1200" dirty="0" smtClean="0"/>
-                <a:t>θ</a:t>
-              </a:r>
-              <a:r>
-                <a:rPr lang="fr-CH" sz="1200" baseline="-25000" dirty="0" smtClean="0"/>
-                <a:t>B</a:t>
-              </a:r>
-              <a:endParaRPr lang="en-GB" sz="1200" baseline="-25000" dirty="0"/>
-            </a:p>
-          </p:txBody>
-        </p:sp>
-        <p:sp>
-          <p:nvSpPr>
-            <p:cNvPr id="29" name="ZoneTexte 28"/>
-            <p:cNvSpPr txBox="1"/>
-            <p:nvPr/>
-          </p:nvSpPr>
-          <p:spPr>
-            <a:xfrm>
-              <a:off x="9404952" y="2135752"/>
-              <a:ext cx="325730" cy="276999"/>
-            </a:xfrm>
-            <a:prstGeom prst="rect">
-              <a:avLst/>
-            </a:prstGeom>
-            <a:noFill/>
-          </p:spPr>
-          <p:txBody>
-            <a:bodyPr wrap="none" rtlCol="0">
-              <a:spAutoFit/>
-            </a:bodyPr>
-            <a:lstStyle/>
-            <a:p>
-              <a:r>
-                <a:rPr lang="el-GR" sz="1200" dirty="0" smtClean="0"/>
-                <a:t>θ</a:t>
-              </a:r>
-              <a:r>
-                <a:rPr lang="fr-CH" sz="1200" baseline="-25000" dirty="0" smtClean="0"/>
-                <a:t>A</a:t>
-              </a:r>
-              <a:endParaRPr lang="en-GB" sz="1200" baseline="-25000" dirty="0"/>
-            </a:p>
-          </p:txBody>
-        </p:sp>
-        <p:cxnSp>
-          <p:nvCxnSpPr>
-            <p:cNvPr id="31" name="Connecteur droit 30"/>
-            <p:cNvCxnSpPr/>
-            <p:nvPr/>
-          </p:nvCxnSpPr>
-          <p:spPr>
-            <a:xfrm>
-              <a:off x="1733550" y="2501900"/>
-              <a:ext cx="761823" cy="0"/>
-            </a:xfrm>
-            <a:prstGeom prst="line">
-              <a:avLst/>
-            </a:prstGeom>
-            <a:ln>
-              <a:solidFill>
-                <a:schemeClr val="tx1"/>
-              </a:solidFill>
-              <a:prstDash val="dashDot"/>
-            </a:ln>
-          </p:spPr>
-          <p:style>
-            <a:lnRef idx="1">
-              <a:schemeClr val="accent1"/>
-            </a:lnRef>
-            <a:fillRef idx="0">
-              <a:schemeClr val="accent1"/>
-            </a:fillRef>
-            <a:effectRef idx="0">
-              <a:schemeClr val="accent1"/>
-            </a:effectRef>
-            <a:fontRef idx="minor">
-              <a:schemeClr val="tx1"/>
-            </a:fontRef>
-          </p:style>
-        </p:cxnSp>
-        <p:cxnSp>
-          <p:nvCxnSpPr>
-            <p:cNvPr id="36" name="Connecteur droit 35"/>
-            <p:cNvCxnSpPr/>
-            <p:nvPr/>
-          </p:nvCxnSpPr>
-          <p:spPr>
-            <a:xfrm flipV="1">
-              <a:off x="3049757" y="2871969"/>
-              <a:ext cx="590550" cy="154437"/>
-            </a:xfrm>
-            <a:prstGeom prst="line">
-              <a:avLst/>
-            </a:prstGeom>
-            <a:ln>
-              <a:solidFill>
-                <a:schemeClr val="tx1"/>
-              </a:solidFill>
-              <a:prstDash val="dashDot"/>
-            </a:ln>
-          </p:spPr>
-          <p:style>
-            <a:lnRef idx="1">
-              <a:schemeClr val="accent1"/>
-            </a:lnRef>
-            <a:fillRef idx="0">
-              <a:schemeClr val="accent1"/>
-            </a:fillRef>
-            <a:effectRef idx="0">
-              <a:schemeClr val="accent1"/>
-            </a:effectRef>
-            <a:fontRef idx="minor">
-              <a:schemeClr val="tx1"/>
-            </a:fontRef>
-          </p:style>
-        </p:cxnSp>
-        <p:cxnSp>
-          <p:nvCxnSpPr>
-            <p:cNvPr id="38" name="Connecteur droit 37"/>
-            <p:cNvCxnSpPr/>
-            <p:nvPr/>
-          </p:nvCxnSpPr>
-          <p:spPr>
-            <a:xfrm>
-              <a:off x="1377950" y="2001618"/>
-              <a:ext cx="691074" cy="500282"/>
-            </a:xfrm>
-            <a:prstGeom prst="line">
-              <a:avLst/>
-            </a:prstGeom>
-            <a:ln w="28575">
-              <a:solidFill>
-                <a:schemeClr val="accent4"/>
-              </a:solidFill>
-            </a:ln>
-          </p:spPr>
-          <p:style>
-            <a:lnRef idx="1">
-              <a:schemeClr val="accent1"/>
-            </a:lnRef>
-            <a:fillRef idx="0">
-              <a:schemeClr val="accent1"/>
-            </a:fillRef>
-            <a:effectRef idx="0">
-              <a:schemeClr val="accent1"/>
-            </a:effectRef>
-            <a:fontRef idx="minor">
-              <a:schemeClr val="tx1"/>
-            </a:fontRef>
-          </p:style>
-        </p:cxnSp>
-        <p:cxnSp>
-          <p:nvCxnSpPr>
-            <p:cNvPr id="39" name="Connecteur droit 38"/>
-            <p:cNvCxnSpPr/>
-            <p:nvPr/>
-          </p:nvCxnSpPr>
-          <p:spPr>
-            <a:xfrm>
-              <a:off x="2079087" y="2502775"/>
-              <a:ext cx="1231776" cy="447441"/>
-            </a:xfrm>
-            <a:prstGeom prst="line">
-              <a:avLst/>
-            </a:prstGeom>
-            <a:ln w="28575">
-              <a:solidFill>
-                <a:schemeClr val="accent4"/>
-              </a:solidFill>
-            </a:ln>
-          </p:spPr>
-          <p:style>
-            <a:lnRef idx="1">
-              <a:schemeClr val="accent1"/>
-            </a:lnRef>
-            <a:fillRef idx="0">
-              <a:schemeClr val="accent1"/>
-            </a:fillRef>
-            <a:effectRef idx="0">
-              <a:schemeClr val="accent1"/>
-            </a:effectRef>
-            <a:fontRef idx="minor">
-              <a:schemeClr val="tx1"/>
-            </a:fontRef>
-          </p:style>
-        </p:cxnSp>
-        <p:cxnSp>
-          <p:nvCxnSpPr>
-            <p:cNvPr id="43" name="Connecteur droit 42"/>
-            <p:cNvCxnSpPr/>
-            <p:nvPr/>
-          </p:nvCxnSpPr>
-          <p:spPr>
-            <a:xfrm>
-              <a:off x="3315080" y="2949188"/>
-              <a:ext cx="1604672" cy="245456"/>
-            </a:xfrm>
-            <a:prstGeom prst="line">
-              <a:avLst/>
-            </a:prstGeom>
-            <a:ln w="28575">
-              <a:solidFill>
-                <a:schemeClr val="accent4"/>
-              </a:solidFill>
-            </a:ln>
-          </p:spPr>
-          <p:style>
-            <a:lnRef idx="1">
-              <a:schemeClr val="accent1"/>
-            </a:lnRef>
-            <a:fillRef idx="0">
-              <a:schemeClr val="accent1"/>
-            </a:fillRef>
-            <a:effectRef idx="0">
-              <a:schemeClr val="accent1"/>
-            </a:effectRef>
-            <a:fontRef idx="minor">
-              <a:schemeClr val="tx1"/>
-            </a:fontRef>
-          </p:style>
-        </p:cxnSp>
-        <p:cxnSp>
-          <p:nvCxnSpPr>
-            <p:cNvPr id="45" name="Connecteur droit 44"/>
-            <p:cNvCxnSpPr/>
-            <p:nvPr/>
-          </p:nvCxnSpPr>
-          <p:spPr>
-            <a:xfrm flipV="1">
-              <a:off x="4718008" y="3026406"/>
-              <a:ext cx="464480" cy="273030"/>
-            </a:xfrm>
-            <a:prstGeom prst="line">
-              <a:avLst/>
-            </a:prstGeom>
-            <a:ln>
-              <a:solidFill>
-                <a:schemeClr val="tx1"/>
-              </a:solidFill>
-              <a:prstDash val="dashDot"/>
-            </a:ln>
-          </p:spPr>
-          <p:style>
-            <a:lnRef idx="1">
-              <a:schemeClr val="accent1"/>
-            </a:lnRef>
-            <a:fillRef idx="0">
-              <a:schemeClr val="accent1"/>
-            </a:fillRef>
-            <a:effectRef idx="0">
-              <a:schemeClr val="accent1"/>
-            </a:effectRef>
-            <a:fontRef idx="minor">
-              <a:schemeClr val="tx1"/>
-            </a:fontRef>
-          </p:style>
-        </p:cxnSp>
-        <p:cxnSp>
-          <p:nvCxnSpPr>
-            <p:cNvPr id="47" name="Connecteur droit 46"/>
-            <p:cNvCxnSpPr/>
-            <p:nvPr/>
-          </p:nvCxnSpPr>
-          <p:spPr>
-            <a:xfrm flipV="1">
-              <a:off x="4924043" y="3022230"/>
-              <a:ext cx="2852220" cy="166930"/>
-            </a:xfrm>
-            <a:prstGeom prst="line">
-              <a:avLst/>
-            </a:prstGeom>
-            <a:ln w="28575">
-              <a:solidFill>
-                <a:schemeClr val="accent4"/>
-              </a:solidFill>
-            </a:ln>
-          </p:spPr>
-          <p:style>
-            <a:lnRef idx="1">
-              <a:schemeClr val="accent1"/>
-            </a:lnRef>
-            <a:fillRef idx="0">
-              <a:schemeClr val="accent1"/>
-            </a:fillRef>
-            <a:effectRef idx="0">
-              <a:schemeClr val="accent1"/>
-            </a:effectRef>
-            <a:fontRef idx="minor">
-              <a:schemeClr val="tx1"/>
-            </a:fontRef>
-          </p:style>
-        </p:cxnSp>
-        <p:cxnSp>
-          <p:nvCxnSpPr>
-            <p:cNvPr id="56" name="Connecteur droit 55"/>
-            <p:cNvCxnSpPr/>
-            <p:nvPr/>
-          </p:nvCxnSpPr>
-          <p:spPr>
-            <a:xfrm>
-              <a:off x="7541847" y="2911954"/>
-              <a:ext cx="468832" cy="234853"/>
-            </a:xfrm>
-            <a:prstGeom prst="line">
-              <a:avLst/>
-            </a:prstGeom>
-            <a:ln>
-              <a:solidFill>
-                <a:schemeClr val="tx1"/>
-              </a:solidFill>
-              <a:prstDash val="dashDot"/>
-            </a:ln>
-          </p:spPr>
-          <p:style>
-            <a:lnRef idx="1">
-              <a:schemeClr val="accent1"/>
-            </a:lnRef>
-            <a:fillRef idx="0">
-              <a:schemeClr val="accent1"/>
-            </a:fillRef>
-            <a:effectRef idx="0">
-              <a:schemeClr val="accent1"/>
-            </a:effectRef>
-            <a:fontRef idx="minor">
-              <a:schemeClr val="tx1"/>
-            </a:fontRef>
-          </p:style>
-        </p:cxnSp>
-        <p:cxnSp>
-          <p:nvCxnSpPr>
-            <p:cNvPr id="59" name="Connecteur droit 58"/>
-            <p:cNvCxnSpPr/>
-            <p:nvPr/>
-          </p:nvCxnSpPr>
-          <p:spPr>
-            <a:xfrm>
-              <a:off x="7776263" y="3030905"/>
-              <a:ext cx="1462987" cy="158255"/>
-            </a:xfrm>
-            <a:prstGeom prst="line">
-              <a:avLst/>
-            </a:prstGeom>
-            <a:ln w="28575">
-              <a:solidFill>
-                <a:schemeClr val="accent4"/>
-              </a:solidFill>
-            </a:ln>
-          </p:spPr>
-          <p:style>
-            <a:lnRef idx="1">
-              <a:schemeClr val="accent1"/>
-            </a:lnRef>
-            <a:fillRef idx="0">
-              <a:schemeClr val="accent1"/>
-            </a:fillRef>
-            <a:effectRef idx="0">
-              <a:schemeClr val="accent1"/>
-            </a:effectRef>
-            <a:fontRef idx="minor">
-              <a:schemeClr val="tx1"/>
-            </a:fontRef>
-          </p:style>
-        </p:cxnSp>
-        <p:cxnSp>
-          <p:nvCxnSpPr>
-            <p:cNvPr id="63" name="Connecteur droit 62"/>
-            <p:cNvCxnSpPr>
-              <a:endCxn id="19" idx="1"/>
-            </p:cNvCxnSpPr>
-            <p:nvPr/>
-          </p:nvCxnSpPr>
-          <p:spPr>
-            <a:xfrm flipV="1">
-              <a:off x="9234450" y="3030952"/>
-              <a:ext cx="1338218" cy="140119"/>
-            </a:xfrm>
-            <a:prstGeom prst="line">
-              <a:avLst/>
-            </a:prstGeom>
-            <a:ln w="28575">
-              <a:solidFill>
-                <a:schemeClr val="accent4"/>
-              </a:solidFill>
-            </a:ln>
-          </p:spPr>
-          <p:style>
-            <a:lnRef idx="1">
-              <a:schemeClr val="accent1"/>
-            </a:lnRef>
-            <a:fillRef idx="0">
-              <a:schemeClr val="accent1"/>
-            </a:fillRef>
-            <a:effectRef idx="0">
-              <a:schemeClr val="accent1"/>
-            </a:effectRef>
-            <a:fontRef idx="minor">
-              <a:schemeClr val="tx1"/>
-            </a:fontRef>
-          </p:style>
-        </p:cxnSp>
-        <p:cxnSp>
-          <p:nvCxnSpPr>
-            <p:cNvPr id="61" name="Connecteur droit 60"/>
-            <p:cNvCxnSpPr/>
-            <p:nvPr/>
-          </p:nvCxnSpPr>
-          <p:spPr>
-            <a:xfrm>
-              <a:off x="8718829" y="3060749"/>
-              <a:ext cx="998088" cy="221470"/>
-            </a:xfrm>
-            <a:prstGeom prst="line">
-              <a:avLst/>
-            </a:prstGeom>
-            <a:ln>
-              <a:solidFill>
-                <a:schemeClr val="tx1"/>
-              </a:solidFill>
-              <a:prstDash val="dashDot"/>
-            </a:ln>
-          </p:spPr>
-          <p:style>
-            <a:lnRef idx="1">
-              <a:schemeClr val="accent1"/>
-            </a:lnRef>
-            <a:fillRef idx="0">
-              <a:schemeClr val="accent1"/>
-            </a:fillRef>
-            <a:effectRef idx="0">
-              <a:schemeClr val="accent1"/>
-            </a:effectRef>
-            <a:fontRef idx="minor">
-              <a:schemeClr val="tx1"/>
-            </a:fontRef>
-          </p:style>
-        </p:cxnSp>
-        <p:cxnSp>
-          <p:nvCxnSpPr>
-            <p:cNvPr id="80" name="Connecteur droit 79"/>
-            <p:cNvCxnSpPr/>
-            <p:nvPr/>
-          </p:nvCxnSpPr>
-          <p:spPr>
-            <a:xfrm flipV="1">
-              <a:off x="10529887" y="2973793"/>
-              <a:ext cx="1590676" cy="61079"/>
-            </a:xfrm>
-            <a:prstGeom prst="line">
-              <a:avLst/>
-            </a:prstGeom>
-            <a:ln w="28575">
-              <a:solidFill>
-                <a:schemeClr val="accent4"/>
-              </a:solidFill>
-            </a:ln>
-          </p:spPr>
-          <p:style>
-            <a:lnRef idx="1">
-              <a:schemeClr val="accent1"/>
-            </a:lnRef>
-            <a:fillRef idx="0">
-              <a:schemeClr val="accent1"/>
-            </a:fillRef>
-            <a:effectRef idx="0">
-              <a:schemeClr val="accent1"/>
-            </a:effectRef>
-            <a:fontRef idx="minor">
-              <a:schemeClr val="tx1"/>
-            </a:fontRef>
-          </p:style>
-        </p:cxnSp>
-        <p:cxnSp>
-          <p:nvCxnSpPr>
-            <p:cNvPr id="70" name="Connecteur droit 69"/>
-            <p:cNvCxnSpPr/>
-            <p:nvPr/>
-          </p:nvCxnSpPr>
-          <p:spPr>
-            <a:xfrm>
-              <a:off x="9948863" y="3020715"/>
-              <a:ext cx="1056253" cy="0"/>
-            </a:xfrm>
-            <a:prstGeom prst="line">
-              <a:avLst/>
-            </a:prstGeom>
-            <a:ln>
-              <a:solidFill>
-                <a:schemeClr val="tx1"/>
-              </a:solidFill>
-              <a:prstDash val="dashDot"/>
+              <a:tailEnd type="triangle"/>
             </a:ln>
           </p:spPr>
           <p:style>
@@ -9002,481 +10319,61 @@
       </p:grpSp>
       <p:sp>
         <p:nvSpPr>
-          <p:cNvPr id="107" name="Arc 106"/>
-          <p:cNvSpPr/>
-          <p:nvPr/>
-        </p:nvSpPr>
-        <p:spPr>
-          <a:xfrm rot="4410126" flipH="1" flipV="1">
-            <a:off x="1726170" y="2291972"/>
-            <a:ext cx="346654" cy="351887"/>
-          </a:xfrm>
-          <a:prstGeom prst="arc">
-            <a:avLst>
-              <a:gd name="adj1" fmla="val 16663458"/>
-              <a:gd name="adj2" fmla="val 20671197"/>
-            </a:avLst>
-          </a:prstGeom>
-          <a:ln>
-            <a:solidFill>
-              <a:schemeClr val="tx1"/>
-            </a:solidFill>
-            <a:headEnd type="arrow" w="med" len="med"/>
-            <a:tailEnd type="none" w="med" len="med"/>
-          </a:ln>
-        </p:spPr>
-        <p:style>
-          <a:lnRef idx="1">
-            <a:schemeClr val="accent1"/>
-          </a:lnRef>
-          <a:fillRef idx="0">
-            <a:schemeClr val="accent1"/>
-          </a:fillRef>
-          <a:effectRef idx="0">
-            <a:schemeClr val="accent1"/>
-          </a:effectRef>
-          <a:fontRef idx="minor">
-            <a:schemeClr val="tx1"/>
-          </a:fontRef>
-        </p:style>
-        <p:txBody>
-          <a:bodyPr rtlCol="0" anchor="ctr"/>
-          <a:lstStyle/>
-          <a:p>
-            <a:pPr algn="ctr"/>
-            <a:endParaRPr lang="en-GB"/>
-          </a:p>
-        </p:txBody>
-      </p:sp>
-      <p:sp>
-        <p:nvSpPr>
-          <p:cNvPr id="108" name="Arc 107"/>
-          <p:cNvSpPr/>
-          <p:nvPr/>
-        </p:nvSpPr>
-        <p:spPr>
-          <a:xfrm rot="15517079" flipH="1" flipV="1">
-            <a:off x="2168313" y="2330813"/>
-            <a:ext cx="286229" cy="317649"/>
-          </a:xfrm>
-          <a:prstGeom prst="arc">
-            <a:avLst>
-              <a:gd name="adj1" fmla="val 16663458"/>
-              <a:gd name="adj2" fmla="val 20671197"/>
-            </a:avLst>
-          </a:prstGeom>
-          <a:ln>
-            <a:solidFill>
-              <a:schemeClr val="tx1"/>
-            </a:solidFill>
-            <a:headEnd type="arrow" w="med" len="med"/>
-            <a:tailEnd type="none" w="med" len="med"/>
-          </a:ln>
-        </p:spPr>
-        <p:style>
-          <a:lnRef idx="1">
-            <a:schemeClr val="accent1"/>
-          </a:lnRef>
-          <a:fillRef idx="0">
-            <a:schemeClr val="accent1"/>
-          </a:fillRef>
-          <a:effectRef idx="0">
-            <a:schemeClr val="accent1"/>
-          </a:effectRef>
-          <a:fontRef idx="minor">
-            <a:schemeClr val="tx1"/>
-          </a:fontRef>
-        </p:style>
-        <p:txBody>
-          <a:bodyPr rtlCol="0" anchor="ctr"/>
-          <a:lstStyle/>
-          <a:p>
-            <a:pPr algn="ctr"/>
-            <a:endParaRPr lang="en-GB"/>
-          </a:p>
-        </p:txBody>
-      </p:sp>
-      <p:sp>
-        <p:nvSpPr>
-          <p:cNvPr id="110" name="Arc 109"/>
-          <p:cNvSpPr/>
-          <p:nvPr/>
-        </p:nvSpPr>
-        <p:spPr>
-          <a:xfrm rot="1942193" flipH="1" flipV="1">
-            <a:off x="2979219" y="2717655"/>
-            <a:ext cx="346654" cy="351887"/>
-          </a:xfrm>
-          <a:prstGeom prst="arc">
-            <a:avLst>
-              <a:gd name="adj1" fmla="val 16663458"/>
-              <a:gd name="adj2" fmla="val 20671197"/>
-            </a:avLst>
-          </a:prstGeom>
-          <a:ln>
-            <a:solidFill>
-              <a:schemeClr val="tx1"/>
-            </a:solidFill>
-            <a:headEnd type="arrow" w="med" len="med"/>
-            <a:tailEnd type="none" w="med" len="med"/>
-          </a:ln>
-        </p:spPr>
-        <p:style>
-          <a:lnRef idx="1">
-            <a:schemeClr val="accent1"/>
-          </a:lnRef>
-          <a:fillRef idx="0">
-            <a:schemeClr val="accent1"/>
-          </a:fillRef>
-          <a:effectRef idx="0">
-            <a:schemeClr val="accent1"/>
-          </a:effectRef>
-          <a:fontRef idx="minor">
-            <a:schemeClr val="tx1"/>
-          </a:fontRef>
-        </p:style>
-        <p:txBody>
-          <a:bodyPr rtlCol="0" anchor="ctr"/>
-          <a:lstStyle/>
-          <a:p>
-            <a:pPr algn="ctr"/>
-            <a:endParaRPr lang="en-GB"/>
-          </a:p>
-        </p:txBody>
-      </p:sp>
-      <p:sp>
-        <p:nvSpPr>
-          <p:cNvPr id="111" name="Arc 110"/>
-          <p:cNvSpPr/>
-          <p:nvPr/>
-        </p:nvSpPr>
-        <p:spPr>
-          <a:xfrm rot="14151145" flipH="1" flipV="1">
-            <a:off x="3397278" y="2779137"/>
-            <a:ext cx="313468" cy="265635"/>
-          </a:xfrm>
-          <a:prstGeom prst="arc">
-            <a:avLst>
-              <a:gd name="adj1" fmla="val 16663458"/>
-              <a:gd name="adj2" fmla="val 20671197"/>
-            </a:avLst>
-          </a:prstGeom>
-          <a:ln>
-            <a:solidFill>
-              <a:schemeClr val="tx1"/>
-            </a:solidFill>
-            <a:headEnd type="arrow" w="med" len="med"/>
-            <a:tailEnd type="none" w="med" len="med"/>
-          </a:ln>
-        </p:spPr>
-        <p:style>
-          <a:lnRef idx="1">
-            <a:schemeClr val="accent1"/>
-          </a:lnRef>
-          <a:fillRef idx="0">
-            <a:schemeClr val="accent1"/>
-          </a:fillRef>
-          <a:effectRef idx="0">
-            <a:schemeClr val="accent1"/>
-          </a:effectRef>
-          <a:fontRef idx="minor">
-            <a:schemeClr val="tx1"/>
-          </a:fontRef>
-        </p:style>
-        <p:txBody>
-          <a:bodyPr rtlCol="0" anchor="ctr"/>
-          <a:lstStyle/>
-          <a:p>
-            <a:pPr algn="ctr"/>
-            <a:endParaRPr lang="en-GB"/>
-          </a:p>
-        </p:txBody>
-      </p:sp>
-      <p:sp>
-        <p:nvSpPr>
-          <p:cNvPr id="112" name="Arc 111"/>
-          <p:cNvSpPr/>
-          <p:nvPr/>
-        </p:nvSpPr>
-        <p:spPr>
-          <a:xfrm rot="12402128" flipH="1" flipV="1">
-            <a:off x="4952969" y="3002180"/>
-            <a:ext cx="313468" cy="265635"/>
-          </a:xfrm>
-          <a:prstGeom prst="arc">
-            <a:avLst>
-              <a:gd name="adj1" fmla="val 16663458"/>
-              <a:gd name="adj2" fmla="val 20671197"/>
-            </a:avLst>
-          </a:prstGeom>
-          <a:ln>
-            <a:solidFill>
-              <a:schemeClr val="tx1"/>
-            </a:solidFill>
-            <a:headEnd type="arrow" w="med" len="med"/>
-            <a:tailEnd type="none" w="med" len="med"/>
-          </a:ln>
-        </p:spPr>
-        <p:style>
-          <a:lnRef idx="1">
-            <a:schemeClr val="accent1"/>
-          </a:lnRef>
-          <a:fillRef idx="0">
-            <a:schemeClr val="accent1"/>
-          </a:fillRef>
-          <a:effectRef idx="0">
-            <a:schemeClr val="accent1"/>
-          </a:effectRef>
-          <a:fontRef idx="minor">
-            <a:schemeClr val="tx1"/>
-          </a:fontRef>
-        </p:style>
-        <p:txBody>
-          <a:bodyPr rtlCol="0" anchor="ctr"/>
-          <a:lstStyle/>
-          <a:p>
-            <a:pPr algn="ctr"/>
-            <a:endParaRPr lang="en-GB"/>
-          </a:p>
-        </p:txBody>
-      </p:sp>
-      <p:sp>
-        <p:nvSpPr>
-          <p:cNvPr id="113" name="Arc 112"/>
-          <p:cNvSpPr/>
-          <p:nvPr/>
-        </p:nvSpPr>
-        <p:spPr>
-          <a:xfrm rot="1111206" flipH="1" flipV="1">
-            <a:off x="4618239" y="3002090"/>
-            <a:ext cx="313388" cy="328482"/>
-          </a:xfrm>
-          <a:prstGeom prst="arc">
-            <a:avLst>
-              <a:gd name="adj1" fmla="val 16663458"/>
-              <a:gd name="adj2" fmla="val 21231125"/>
-            </a:avLst>
-          </a:prstGeom>
-          <a:ln>
-            <a:solidFill>
-              <a:schemeClr val="tx1"/>
-            </a:solidFill>
-            <a:headEnd type="arrow" w="med" len="med"/>
-            <a:tailEnd type="none" w="med" len="med"/>
-          </a:ln>
-        </p:spPr>
-        <p:style>
-          <a:lnRef idx="1">
-            <a:schemeClr val="accent1"/>
-          </a:lnRef>
-          <a:fillRef idx="0">
-            <a:schemeClr val="accent1"/>
-          </a:fillRef>
-          <a:effectRef idx="0">
-            <a:schemeClr val="accent1"/>
-          </a:effectRef>
-          <a:fontRef idx="minor">
-            <a:schemeClr val="tx1"/>
-          </a:fontRef>
-        </p:style>
-        <p:txBody>
-          <a:bodyPr rtlCol="0" anchor="ctr"/>
-          <a:lstStyle/>
-          <a:p>
-            <a:pPr algn="ctr"/>
-            <a:endParaRPr lang="en-GB"/>
-          </a:p>
-        </p:txBody>
-      </p:sp>
-      <p:sp>
-        <p:nvSpPr>
-          <p:cNvPr id="115" name="Arc 114"/>
-          <p:cNvSpPr/>
-          <p:nvPr/>
-        </p:nvSpPr>
-        <p:spPr>
-          <a:xfrm rot="4410126" flipH="1" flipV="1">
-            <a:off x="7446415" y="2859888"/>
-            <a:ext cx="314125" cy="338984"/>
-          </a:xfrm>
-          <a:prstGeom prst="arc">
-            <a:avLst>
-              <a:gd name="adj1" fmla="val 16663458"/>
-              <a:gd name="adj2" fmla="val 20671197"/>
-            </a:avLst>
-          </a:prstGeom>
-          <a:ln>
-            <a:solidFill>
-              <a:schemeClr val="tx1"/>
-            </a:solidFill>
-            <a:headEnd type="none" w="med" len="med"/>
-            <a:tailEnd type="arrow" w="med" len="med"/>
-          </a:ln>
-        </p:spPr>
-        <p:style>
-          <a:lnRef idx="1">
-            <a:schemeClr val="accent1"/>
-          </a:lnRef>
-          <a:fillRef idx="0">
-            <a:schemeClr val="accent1"/>
-          </a:fillRef>
-          <a:effectRef idx="0">
-            <a:schemeClr val="accent1"/>
-          </a:effectRef>
-          <a:fontRef idx="minor">
-            <a:schemeClr val="tx1"/>
-          </a:fontRef>
-        </p:style>
-        <p:txBody>
-          <a:bodyPr rtlCol="0" anchor="ctr"/>
-          <a:lstStyle/>
-          <a:p>
-            <a:pPr algn="ctr"/>
-            <a:endParaRPr lang="en-GB"/>
-          </a:p>
-        </p:txBody>
-      </p:sp>
-      <p:sp>
-        <p:nvSpPr>
-          <p:cNvPr id="116" name="Arc 115"/>
-          <p:cNvSpPr/>
-          <p:nvPr/>
-        </p:nvSpPr>
-        <p:spPr>
-          <a:xfrm rot="15517079" flipH="1" flipV="1">
-            <a:off x="7858863" y="2930050"/>
-            <a:ext cx="249580" cy="283734"/>
-          </a:xfrm>
-          <a:prstGeom prst="arc">
-            <a:avLst>
-              <a:gd name="adj1" fmla="val 16663458"/>
-              <a:gd name="adj2" fmla="val 20671197"/>
-            </a:avLst>
-          </a:prstGeom>
-          <a:ln>
-            <a:solidFill>
-              <a:schemeClr val="tx1"/>
-            </a:solidFill>
-            <a:headEnd type="none" w="med" len="med"/>
-            <a:tailEnd type="arrow" w="med" len="med"/>
-          </a:ln>
-        </p:spPr>
-        <p:style>
-          <a:lnRef idx="1">
-            <a:schemeClr val="accent1"/>
-          </a:lnRef>
-          <a:fillRef idx="0">
-            <a:schemeClr val="accent1"/>
-          </a:fillRef>
-          <a:effectRef idx="0">
-            <a:schemeClr val="accent1"/>
-          </a:effectRef>
-          <a:fontRef idx="minor">
-            <a:schemeClr val="tx1"/>
-          </a:fontRef>
-        </p:style>
-        <p:txBody>
-          <a:bodyPr rtlCol="0" anchor="ctr"/>
-          <a:lstStyle/>
-          <a:p>
-            <a:pPr algn="ctr"/>
-            <a:endParaRPr lang="en-GB"/>
-          </a:p>
-        </p:txBody>
-      </p:sp>
-      <p:sp>
-        <p:nvSpPr>
-          <p:cNvPr id="137" name="Arc 136"/>
-          <p:cNvSpPr/>
-          <p:nvPr/>
-        </p:nvSpPr>
-        <p:spPr>
-          <a:xfrm rot="2789593" flipH="1" flipV="1">
-            <a:off x="8685324" y="2931787"/>
-            <a:ext cx="203728" cy="283326"/>
-          </a:xfrm>
-          <a:prstGeom prst="arc">
-            <a:avLst>
-              <a:gd name="adj1" fmla="val 16663458"/>
-              <a:gd name="adj2" fmla="val 20671197"/>
-            </a:avLst>
-          </a:prstGeom>
-          <a:ln>
-            <a:solidFill>
-              <a:schemeClr val="tx1"/>
-            </a:solidFill>
-            <a:headEnd type="none" w="med" len="med"/>
-            <a:tailEnd type="arrow" w="med" len="med"/>
-          </a:ln>
-        </p:spPr>
-        <p:style>
-          <a:lnRef idx="1">
-            <a:schemeClr val="accent1"/>
-          </a:lnRef>
-          <a:fillRef idx="0">
-            <a:schemeClr val="accent1"/>
-          </a:fillRef>
-          <a:effectRef idx="0">
-            <a:schemeClr val="accent1"/>
-          </a:effectRef>
-          <a:fontRef idx="minor">
-            <a:schemeClr val="tx1"/>
-          </a:fontRef>
-        </p:style>
-        <p:txBody>
-          <a:bodyPr rtlCol="0" anchor="ctr"/>
-          <a:lstStyle/>
-          <a:p>
-            <a:pPr algn="ctr"/>
-            <a:endParaRPr lang="en-GB" sz="1000"/>
-          </a:p>
-        </p:txBody>
-      </p:sp>
-      <p:sp>
-        <p:nvSpPr>
-          <p:cNvPr id="138" name="Arc 137"/>
-          <p:cNvSpPr/>
-          <p:nvPr/>
-        </p:nvSpPr>
-        <p:spPr>
-          <a:xfrm rot="13905692" flipH="1" flipV="1">
-            <a:off x="9429039" y="3014710"/>
-            <a:ext cx="224095" cy="390984"/>
-          </a:xfrm>
-          <a:prstGeom prst="arc">
-            <a:avLst>
-              <a:gd name="adj1" fmla="val 16663458"/>
-              <a:gd name="adj2" fmla="val 20671197"/>
-            </a:avLst>
-          </a:prstGeom>
-          <a:ln>
-            <a:solidFill>
-              <a:schemeClr val="tx1"/>
-            </a:solidFill>
-            <a:headEnd type="none" w="med" len="med"/>
-            <a:tailEnd type="arrow" w="med" len="med"/>
-          </a:ln>
-        </p:spPr>
-        <p:style>
-          <a:lnRef idx="1">
-            <a:schemeClr val="accent1"/>
-          </a:lnRef>
-          <a:fillRef idx="0">
-            <a:schemeClr val="accent1"/>
-          </a:fillRef>
-          <a:effectRef idx="0">
-            <a:schemeClr val="accent1"/>
-          </a:effectRef>
-          <a:fontRef idx="minor">
-            <a:schemeClr val="tx1"/>
-          </a:fontRef>
-        </p:style>
-        <p:txBody>
-          <a:bodyPr rtlCol="0" anchor="ctr"/>
-          <a:lstStyle/>
-          <a:p>
-            <a:pPr algn="ctr"/>
-            <a:endParaRPr lang="en-GB"/>
+          <p:cNvPr id="15" name="ZoneTexte 14"/>
+          <p:cNvSpPr txBox="1"/>
+          <p:nvPr/>
+        </p:nvSpPr>
+        <p:spPr>
+          <a:xfrm>
+            <a:off x="1288425" y="2781149"/>
+            <a:ext cx="245580" cy="261610"/>
+          </a:xfrm>
+          <a:prstGeom prst="rect">
+            <a:avLst/>
+          </a:prstGeom>
+          <a:noFill/>
+        </p:spPr>
+        <p:txBody>
+          <a:bodyPr wrap="none" rtlCol="0">
+            <a:spAutoFit/>
+          </a:bodyPr>
+          <a:lstStyle/>
+          <a:p>
+            <a:r>
+              <a:rPr lang="en-GB" sz="1100" dirty="0" smtClean="0"/>
+              <a:t>x</a:t>
+            </a:r>
+            <a:endParaRPr lang="en-GB" sz="1100" dirty="0"/>
+          </a:p>
+        </p:txBody>
+      </p:sp>
+      <p:sp>
+        <p:nvSpPr>
+          <p:cNvPr id="71" name="ZoneTexte 70"/>
+          <p:cNvSpPr txBox="1"/>
+          <p:nvPr/>
+        </p:nvSpPr>
+        <p:spPr>
+          <a:xfrm>
+            <a:off x="1705243" y="3182273"/>
+            <a:ext cx="248786" cy="261610"/>
+          </a:xfrm>
+          <a:prstGeom prst="rect">
+            <a:avLst/>
+          </a:prstGeom>
+          <a:noFill/>
+        </p:spPr>
+        <p:txBody>
+          <a:bodyPr wrap="none" rtlCol="0">
+            <a:spAutoFit/>
+          </a:bodyPr>
+          <a:lstStyle/>
+          <a:p>
+            <a:r>
+              <a:rPr lang="en-GB" sz="1100" dirty="0" smtClean="0"/>
+              <a:t>y</a:t>
+            </a:r>
+            <a:endParaRPr lang="en-GB" sz="1100" dirty="0"/>
           </a:p>
         </p:txBody>
       </p:sp>

</xml_diff>